<commit_message>
committed the new images
</commit_message>
<xml_diff>
--- a/pictures.pptx
+++ b/pictures.pptx
@@ -15,6 +15,11 @@
     <p:sldId id="263" r:id="rId9"/>
     <p:sldId id="264" r:id="rId10"/>
     <p:sldId id="265" r:id="rId11"/>
+    <p:sldId id="266" r:id="rId12"/>
+    <p:sldId id="267" r:id="rId13"/>
+    <p:sldId id="268" r:id="rId14"/>
+    <p:sldId id="269" r:id="rId15"/>
+    <p:sldId id="270" r:id="rId16"/>
   </p:sldIdLst>
   <p:sldSz cx="9144000" cy="6858000" type="screen4x3"/>
   <p:notesSz cx="6858000" cy="9144000"/>
@@ -1611,6 +1616,753 @@
 </file>
 
 <file path=ppt/diagrams/colors3.xml><?xml version="1.0" encoding="utf-8"?>
+<dgm:colorsDef xmlns:dgm="http://schemas.openxmlformats.org/drawingml/2006/diagram" xmlns:a="http://schemas.openxmlformats.org/drawingml/2006/main" uniqueId="urn:microsoft.com/office/officeart/2005/8/colors/accent1_2">
+  <dgm:title val=""/>
+  <dgm:desc val=""/>
+  <dgm:catLst>
+    <dgm:cat type="accent1" pri="11200"/>
+  </dgm:catLst>
+  <dgm:styleLbl name="node0">
+    <dgm:fillClrLst meth="repeat">
+      <a:schemeClr val="accent1"/>
+    </dgm:fillClrLst>
+    <dgm:linClrLst meth="repeat">
+      <a:schemeClr val="lt1"/>
+    </dgm:linClrLst>
+    <dgm:effectClrLst/>
+    <dgm:txLinClrLst/>
+    <dgm:txFillClrLst/>
+    <dgm:txEffectClrLst/>
+  </dgm:styleLbl>
+  <dgm:styleLbl name="alignNode1">
+    <dgm:fillClrLst meth="repeat">
+      <a:schemeClr val="accent1"/>
+    </dgm:fillClrLst>
+    <dgm:linClrLst meth="repeat">
+      <a:schemeClr val="accent1"/>
+    </dgm:linClrLst>
+    <dgm:effectClrLst/>
+    <dgm:txLinClrLst/>
+    <dgm:txFillClrLst/>
+    <dgm:txEffectClrLst/>
+  </dgm:styleLbl>
+  <dgm:styleLbl name="node1">
+    <dgm:fillClrLst meth="repeat">
+      <a:schemeClr val="accent1"/>
+    </dgm:fillClrLst>
+    <dgm:linClrLst meth="repeat">
+      <a:schemeClr val="lt1"/>
+    </dgm:linClrLst>
+    <dgm:effectClrLst/>
+    <dgm:txLinClrLst/>
+    <dgm:txFillClrLst/>
+    <dgm:txEffectClrLst/>
+  </dgm:styleLbl>
+  <dgm:styleLbl name="lnNode1">
+    <dgm:fillClrLst meth="repeat">
+      <a:schemeClr val="accent1"/>
+    </dgm:fillClrLst>
+    <dgm:linClrLst meth="repeat">
+      <a:schemeClr val="lt1"/>
+    </dgm:linClrLst>
+    <dgm:effectClrLst/>
+    <dgm:txLinClrLst/>
+    <dgm:txFillClrLst/>
+    <dgm:txEffectClrLst/>
+  </dgm:styleLbl>
+  <dgm:styleLbl name="vennNode1">
+    <dgm:fillClrLst meth="repeat">
+      <a:schemeClr val="accent1">
+        <a:alpha val="50000"/>
+      </a:schemeClr>
+    </dgm:fillClrLst>
+    <dgm:linClrLst meth="repeat">
+      <a:schemeClr val="lt1"/>
+    </dgm:linClrLst>
+    <dgm:effectClrLst/>
+    <dgm:txLinClrLst/>
+    <dgm:txFillClrLst/>
+    <dgm:txEffectClrLst/>
+  </dgm:styleLbl>
+  <dgm:styleLbl name="node2">
+    <dgm:fillClrLst meth="repeat">
+      <a:schemeClr val="accent1"/>
+    </dgm:fillClrLst>
+    <dgm:linClrLst meth="repeat">
+      <a:schemeClr val="lt1"/>
+    </dgm:linClrLst>
+    <dgm:effectClrLst/>
+    <dgm:txLinClrLst/>
+    <dgm:txFillClrLst/>
+    <dgm:txEffectClrLst/>
+  </dgm:styleLbl>
+  <dgm:styleLbl name="node3">
+    <dgm:fillClrLst meth="repeat">
+      <a:schemeClr val="accent1"/>
+    </dgm:fillClrLst>
+    <dgm:linClrLst meth="repeat">
+      <a:schemeClr val="lt1"/>
+    </dgm:linClrLst>
+    <dgm:effectClrLst/>
+    <dgm:txLinClrLst/>
+    <dgm:txFillClrLst/>
+    <dgm:txEffectClrLst/>
+  </dgm:styleLbl>
+  <dgm:styleLbl name="node4">
+    <dgm:fillClrLst meth="repeat">
+      <a:schemeClr val="accent1"/>
+    </dgm:fillClrLst>
+    <dgm:linClrLst meth="repeat">
+      <a:schemeClr val="lt1"/>
+    </dgm:linClrLst>
+    <dgm:effectClrLst/>
+    <dgm:txLinClrLst/>
+    <dgm:txFillClrLst/>
+    <dgm:txEffectClrLst/>
+  </dgm:styleLbl>
+  <dgm:styleLbl name="fgImgPlace1">
+    <dgm:fillClrLst meth="repeat">
+      <a:schemeClr val="accent1">
+        <a:tint val="50000"/>
+      </a:schemeClr>
+    </dgm:fillClrLst>
+    <dgm:linClrLst meth="repeat">
+      <a:schemeClr val="lt1"/>
+    </dgm:linClrLst>
+    <dgm:effectClrLst/>
+    <dgm:txLinClrLst/>
+    <dgm:txFillClrLst meth="repeat">
+      <a:schemeClr val="lt1"/>
+    </dgm:txFillClrLst>
+    <dgm:txEffectClrLst/>
+  </dgm:styleLbl>
+  <dgm:styleLbl name="alignImgPlace1">
+    <dgm:fillClrLst meth="repeat">
+      <a:schemeClr val="accent1">
+        <a:tint val="50000"/>
+      </a:schemeClr>
+    </dgm:fillClrLst>
+    <dgm:linClrLst meth="repeat">
+      <a:schemeClr val="lt1"/>
+    </dgm:linClrLst>
+    <dgm:effectClrLst/>
+    <dgm:txLinClrLst/>
+    <dgm:txFillClrLst meth="repeat">
+      <a:schemeClr val="lt1"/>
+    </dgm:txFillClrLst>
+    <dgm:txEffectClrLst/>
+  </dgm:styleLbl>
+  <dgm:styleLbl name="bgImgPlace1">
+    <dgm:fillClrLst meth="repeat">
+      <a:schemeClr val="accent1">
+        <a:tint val="50000"/>
+      </a:schemeClr>
+    </dgm:fillClrLst>
+    <dgm:linClrLst meth="repeat">
+      <a:schemeClr val="lt1"/>
+    </dgm:linClrLst>
+    <dgm:effectClrLst/>
+    <dgm:txLinClrLst/>
+    <dgm:txFillClrLst meth="repeat">
+      <a:schemeClr val="lt1"/>
+    </dgm:txFillClrLst>
+    <dgm:txEffectClrLst/>
+  </dgm:styleLbl>
+  <dgm:styleLbl name="sibTrans2D1">
+    <dgm:fillClrLst meth="repeat">
+      <a:schemeClr val="accent1">
+        <a:tint val="60000"/>
+      </a:schemeClr>
+    </dgm:fillClrLst>
+    <dgm:linClrLst meth="repeat">
+      <a:schemeClr val="accent1">
+        <a:tint val="60000"/>
+      </a:schemeClr>
+    </dgm:linClrLst>
+    <dgm:effectClrLst/>
+    <dgm:txLinClrLst/>
+    <dgm:txFillClrLst/>
+    <dgm:txEffectClrLst/>
+  </dgm:styleLbl>
+  <dgm:styleLbl name="fgSibTrans2D1">
+    <dgm:fillClrLst meth="repeat">
+      <a:schemeClr val="accent1">
+        <a:tint val="60000"/>
+      </a:schemeClr>
+    </dgm:fillClrLst>
+    <dgm:linClrLst meth="repeat">
+      <a:schemeClr val="accent1">
+        <a:tint val="60000"/>
+      </a:schemeClr>
+    </dgm:linClrLst>
+    <dgm:effectClrLst/>
+    <dgm:txLinClrLst/>
+    <dgm:txFillClrLst/>
+    <dgm:txEffectClrLst/>
+  </dgm:styleLbl>
+  <dgm:styleLbl name="bgSibTrans2D1">
+    <dgm:fillClrLst meth="repeat">
+      <a:schemeClr val="accent1">
+        <a:tint val="60000"/>
+      </a:schemeClr>
+    </dgm:fillClrLst>
+    <dgm:linClrLst meth="repeat">
+      <a:schemeClr val="accent1">
+        <a:tint val="60000"/>
+      </a:schemeClr>
+    </dgm:linClrLst>
+    <dgm:effectClrLst/>
+    <dgm:txLinClrLst/>
+    <dgm:txFillClrLst/>
+    <dgm:txEffectClrLst/>
+  </dgm:styleLbl>
+  <dgm:styleLbl name="sibTrans1D1">
+    <dgm:fillClrLst meth="repeat">
+      <a:schemeClr val="accent1"/>
+    </dgm:fillClrLst>
+    <dgm:linClrLst meth="repeat">
+      <a:schemeClr val="accent1"/>
+    </dgm:linClrLst>
+    <dgm:effectClrLst/>
+    <dgm:txLinClrLst/>
+    <dgm:txFillClrLst meth="repeat">
+      <a:schemeClr val="tx1"/>
+    </dgm:txFillClrLst>
+    <dgm:txEffectClrLst/>
+  </dgm:styleLbl>
+  <dgm:styleLbl name="callout">
+    <dgm:fillClrLst meth="repeat">
+      <a:schemeClr val="accent1"/>
+    </dgm:fillClrLst>
+    <dgm:linClrLst meth="repeat">
+      <a:schemeClr val="accent1">
+        <a:tint val="50000"/>
+      </a:schemeClr>
+    </dgm:linClrLst>
+    <dgm:effectClrLst/>
+    <dgm:txLinClrLst/>
+    <dgm:txFillClrLst meth="repeat">
+      <a:schemeClr val="tx1"/>
+    </dgm:txFillClrLst>
+    <dgm:txEffectClrLst/>
+  </dgm:styleLbl>
+  <dgm:styleLbl name="asst0">
+    <dgm:fillClrLst meth="repeat">
+      <a:schemeClr val="accent1"/>
+    </dgm:fillClrLst>
+    <dgm:linClrLst meth="repeat">
+      <a:schemeClr val="lt1"/>
+    </dgm:linClrLst>
+    <dgm:effectClrLst/>
+    <dgm:txLinClrLst/>
+    <dgm:txFillClrLst/>
+    <dgm:txEffectClrLst/>
+  </dgm:styleLbl>
+  <dgm:styleLbl name="asst1">
+    <dgm:fillClrLst meth="repeat">
+      <a:schemeClr val="accent1"/>
+    </dgm:fillClrLst>
+    <dgm:linClrLst meth="repeat">
+      <a:schemeClr val="lt1"/>
+    </dgm:linClrLst>
+    <dgm:effectClrLst/>
+    <dgm:txLinClrLst/>
+    <dgm:txFillClrLst/>
+    <dgm:txEffectClrLst/>
+  </dgm:styleLbl>
+  <dgm:styleLbl name="asst2">
+    <dgm:fillClrLst meth="repeat">
+      <a:schemeClr val="accent1"/>
+    </dgm:fillClrLst>
+    <dgm:linClrLst meth="repeat">
+      <a:schemeClr val="lt1"/>
+    </dgm:linClrLst>
+    <dgm:effectClrLst/>
+    <dgm:txLinClrLst/>
+    <dgm:txFillClrLst/>
+    <dgm:txEffectClrLst/>
+  </dgm:styleLbl>
+  <dgm:styleLbl name="asst3">
+    <dgm:fillClrLst meth="repeat">
+      <a:schemeClr val="accent1"/>
+    </dgm:fillClrLst>
+    <dgm:linClrLst meth="repeat">
+      <a:schemeClr val="lt1"/>
+    </dgm:linClrLst>
+    <dgm:effectClrLst/>
+    <dgm:txLinClrLst/>
+    <dgm:txFillClrLst/>
+    <dgm:txEffectClrLst/>
+  </dgm:styleLbl>
+  <dgm:styleLbl name="asst4">
+    <dgm:fillClrLst meth="repeat">
+      <a:schemeClr val="accent1"/>
+    </dgm:fillClrLst>
+    <dgm:linClrLst meth="repeat">
+      <a:schemeClr val="lt1"/>
+    </dgm:linClrLst>
+    <dgm:effectClrLst/>
+    <dgm:txLinClrLst/>
+    <dgm:txFillClrLst/>
+    <dgm:txEffectClrLst/>
+  </dgm:styleLbl>
+  <dgm:styleLbl name="parChTrans2D1">
+    <dgm:fillClrLst meth="repeat">
+      <a:schemeClr val="accent1">
+        <a:tint val="60000"/>
+      </a:schemeClr>
+    </dgm:fillClrLst>
+    <dgm:linClrLst meth="repeat">
+      <a:schemeClr val="accent1">
+        <a:tint val="60000"/>
+      </a:schemeClr>
+    </dgm:linClrLst>
+    <dgm:effectClrLst/>
+    <dgm:txLinClrLst/>
+    <dgm:txFillClrLst meth="repeat">
+      <a:schemeClr val="lt1"/>
+    </dgm:txFillClrLst>
+    <dgm:txEffectClrLst/>
+  </dgm:styleLbl>
+  <dgm:styleLbl name="parChTrans2D2">
+    <dgm:fillClrLst meth="repeat">
+      <a:schemeClr val="accent1"/>
+    </dgm:fillClrLst>
+    <dgm:linClrLst meth="repeat">
+      <a:schemeClr val="accent1"/>
+    </dgm:linClrLst>
+    <dgm:effectClrLst/>
+    <dgm:txLinClrLst/>
+    <dgm:txFillClrLst meth="repeat">
+      <a:schemeClr val="lt1"/>
+    </dgm:txFillClrLst>
+    <dgm:txEffectClrLst/>
+  </dgm:styleLbl>
+  <dgm:styleLbl name="parChTrans2D3">
+    <dgm:fillClrLst meth="repeat">
+      <a:schemeClr val="accent1"/>
+    </dgm:fillClrLst>
+    <dgm:linClrLst meth="repeat">
+      <a:schemeClr val="accent1"/>
+    </dgm:linClrLst>
+    <dgm:effectClrLst/>
+    <dgm:txLinClrLst/>
+    <dgm:txFillClrLst meth="repeat">
+      <a:schemeClr val="lt1"/>
+    </dgm:txFillClrLst>
+    <dgm:txEffectClrLst/>
+  </dgm:styleLbl>
+  <dgm:styleLbl name="parChTrans2D4">
+    <dgm:fillClrLst meth="repeat">
+      <a:schemeClr val="accent1"/>
+    </dgm:fillClrLst>
+    <dgm:linClrLst meth="repeat">
+      <a:schemeClr val="accent1"/>
+    </dgm:linClrLst>
+    <dgm:effectClrLst/>
+    <dgm:txLinClrLst/>
+    <dgm:txFillClrLst meth="repeat">
+      <a:schemeClr val="lt1"/>
+    </dgm:txFillClrLst>
+    <dgm:txEffectClrLst/>
+  </dgm:styleLbl>
+  <dgm:styleLbl name="parChTrans1D1">
+    <dgm:fillClrLst meth="repeat">
+      <a:schemeClr val="accent1"/>
+    </dgm:fillClrLst>
+    <dgm:linClrLst meth="repeat">
+      <a:schemeClr val="accent1">
+        <a:shade val="60000"/>
+      </a:schemeClr>
+    </dgm:linClrLst>
+    <dgm:effectClrLst/>
+    <dgm:txLinClrLst/>
+    <dgm:txFillClrLst meth="repeat">
+      <a:schemeClr val="tx1"/>
+    </dgm:txFillClrLst>
+    <dgm:txEffectClrLst/>
+  </dgm:styleLbl>
+  <dgm:styleLbl name="parChTrans1D2">
+    <dgm:fillClrLst meth="repeat">
+      <a:schemeClr val="accent1"/>
+    </dgm:fillClrLst>
+    <dgm:linClrLst meth="repeat">
+      <a:schemeClr val="accent1">
+        <a:shade val="60000"/>
+      </a:schemeClr>
+    </dgm:linClrLst>
+    <dgm:effectClrLst/>
+    <dgm:txLinClrLst/>
+    <dgm:txFillClrLst meth="repeat">
+      <a:schemeClr val="tx1"/>
+    </dgm:txFillClrLst>
+    <dgm:txEffectClrLst/>
+  </dgm:styleLbl>
+  <dgm:styleLbl name="parChTrans1D3">
+    <dgm:fillClrLst meth="repeat">
+      <a:schemeClr val="accent1"/>
+    </dgm:fillClrLst>
+    <dgm:linClrLst meth="repeat">
+      <a:schemeClr val="accent1">
+        <a:shade val="80000"/>
+      </a:schemeClr>
+    </dgm:linClrLst>
+    <dgm:effectClrLst/>
+    <dgm:txLinClrLst/>
+    <dgm:txFillClrLst meth="repeat">
+      <a:schemeClr val="tx1"/>
+    </dgm:txFillClrLst>
+    <dgm:txEffectClrLst/>
+  </dgm:styleLbl>
+  <dgm:styleLbl name="parChTrans1D4">
+    <dgm:fillClrLst meth="repeat">
+      <a:schemeClr val="accent1"/>
+    </dgm:fillClrLst>
+    <dgm:linClrLst meth="repeat">
+      <a:schemeClr val="accent1">
+        <a:shade val="80000"/>
+      </a:schemeClr>
+    </dgm:linClrLst>
+    <dgm:effectClrLst/>
+    <dgm:txLinClrLst/>
+    <dgm:txFillClrLst meth="repeat">
+      <a:schemeClr val="tx1"/>
+    </dgm:txFillClrLst>
+    <dgm:txEffectClrLst/>
+  </dgm:styleLbl>
+  <dgm:styleLbl name="fgAcc1">
+    <dgm:fillClrLst meth="repeat">
+      <a:schemeClr val="lt1">
+        <a:alpha val="90000"/>
+      </a:schemeClr>
+    </dgm:fillClrLst>
+    <dgm:linClrLst meth="repeat">
+      <a:schemeClr val="accent1"/>
+    </dgm:linClrLst>
+    <dgm:effectClrLst/>
+    <dgm:txLinClrLst/>
+    <dgm:txFillClrLst meth="repeat">
+      <a:schemeClr val="dk1"/>
+    </dgm:txFillClrLst>
+    <dgm:txEffectClrLst/>
+  </dgm:styleLbl>
+  <dgm:styleLbl name="conFgAcc1">
+    <dgm:fillClrLst meth="repeat">
+      <a:schemeClr val="lt1">
+        <a:alpha val="90000"/>
+      </a:schemeClr>
+    </dgm:fillClrLst>
+    <dgm:linClrLst meth="repeat">
+      <a:schemeClr val="accent1"/>
+    </dgm:linClrLst>
+    <dgm:effectClrLst/>
+    <dgm:txLinClrLst/>
+    <dgm:txFillClrLst meth="repeat">
+      <a:schemeClr val="dk1"/>
+    </dgm:txFillClrLst>
+    <dgm:txEffectClrLst/>
+  </dgm:styleLbl>
+  <dgm:styleLbl name="alignAcc1">
+    <dgm:fillClrLst meth="repeat">
+      <a:schemeClr val="lt1">
+        <a:alpha val="90000"/>
+      </a:schemeClr>
+    </dgm:fillClrLst>
+    <dgm:linClrLst meth="repeat">
+      <a:schemeClr val="accent1"/>
+    </dgm:linClrLst>
+    <dgm:effectClrLst/>
+    <dgm:txLinClrLst/>
+    <dgm:txFillClrLst meth="repeat">
+      <a:schemeClr val="dk1"/>
+    </dgm:txFillClrLst>
+    <dgm:txEffectClrLst/>
+  </dgm:styleLbl>
+  <dgm:styleLbl name="trAlignAcc1">
+    <dgm:fillClrLst meth="repeat">
+      <a:schemeClr val="lt1">
+        <a:alpha val="40000"/>
+      </a:schemeClr>
+    </dgm:fillClrLst>
+    <dgm:linClrLst meth="repeat">
+      <a:schemeClr val="accent1"/>
+    </dgm:linClrLst>
+    <dgm:effectClrLst/>
+    <dgm:txLinClrLst/>
+    <dgm:txFillClrLst meth="repeat">
+      <a:schemeClr val="dk1"/>
+    </dgm:txFillClrLst>
+    <dgm:txEffectClrLst/>
+  </dgm:styleLbl>
+  <dgm:styleLbl name="bgAcc1">
+    <dgm:fillClrLst meth="repeat">
+      <a:schemeClr val="lt1">
+        <a:alpha val="90000"/>
+      </a:schemeClr>
+    </dgm:fillClrLst>
+    <dgm:linClrLst meth="repeat">
+      <a:schemeClr val="accent1"/>
+    </dgm:linClrLst>
+    <dgm:effectClrLst/>
+    <dgm:txLinClrLst/>
+    <dgm:txFillClrLst meth="repeat">
+      <a:schemeClr val="dk1"/>
+    </dgm:txFillClrLst>
+    <dgm:txEffectClrLst/>
+  </dgm:styleLbl>
+  <dgm:styleLbl name="solidFgAcc1">
+    <dgm:fillClrLst meth="repeat">
+      <a:schemeClr val="lt1"/>
+    </dgm:fillClrLst>
+    <dgm:linClrLst meth="repeat">
+      <a:schemeClr val="accent1"/>
+    </dgm:linClrLst>
+    <dgm:effectClrLst/>
+    <dgm:txLinClrLst/>
+    <dgm:txFillClrLst meth="repeat">
+      <a:schemeClr val="dk1"/>
+    </dgm:txFillClrLst>
+    <dgm:txEffectClrLst/>
+  </dgm:styleLbl>
+  <dgm:styleLbl name="solidAlignAcc1">
+    <dgm:fillClrLst meth="repeat">
+      <a:schemeClr val="lt1"/>
+    </dgm:fillClrLst>
+    <dgm:linClrLst meth="repeat">
+      <a:schemeClr val="accent1"/>
+    </dgm:linClrLst>
+    <dgm:effectClrLst/>
+    <dgm:txLinClrLst/>
+    <dgm:txFillClrLst meth="repeat">
+      <a:schemeClr val="dk1"/>
+    </dgm:txFillClrLst>
+    <dgm:txEffectClrLst/>
+  </dgm:styleLbl>
+  <dgm:styleLbl name="solidBgAcc1">
+    <dgm:fillClrLst meth="repeat">
+      <a:schemeClr val="lt1"/>
+    </dgm:fillClrLst>
+    <dgm:linClrLst meth="repeat">
+      <a:schemeClr val="accent1"/>
+    </dgm:linClrLst>
+    <dgm:effectClrLst/>
+    <dgm:txLinClrLst/>
+    <dgm:txFillClrLst meth="repeat">
+      <a:schemeClr val="dk1"/>
+    </dgm:txFillClrLst>
+    <dgm:txEffectClrLst/>
+  </dgm:styleLbl>
+  <dgm:styleLbl name="fgAccFollowNode1">
+    <dgm:fillClrLst meth="repeat">
+      <a:schemeClr val="accent1">
+        <a:alpha val="90000"/>
+        <a:tint val="40000"/>
+      </a:schemeClr>
+    </dgm:fillClrLst>
+    <dgm:linClrLst meth="repeat">
+      <a:schemeClr val="accent1">
+        <a:alpha val="90000"/>
+        <a:tint val="40000"/>
+      </a:schemeClr>
+    </dgm:linClrLst>
+    <dgm:effectClrLst/>
+    <dgm:txLinClrLst/>
+    <dgm:txFillClrLst meth="repeat">
+      <a:schemeClr val="dk1"/>
+    </dgm:txFillClrLst>
+    <dgm:txEffectClrLst/>
+  </dgm:styleLbl>
+  <dgm:styleLbl name="alignAccFollowNode1">
+    <dgm:fillClrLst meth="repeat">
+      <a:schemeClr val="accent1">
+        <a:alpha val="90000"/>
+        <a:tint val="40000"/>
+      </a:schemeClr>
+    </dgm:fillClrLst>
+    <dgm:linClrLst meth="repeat">
+      <a:schemeClr val="accent1">
+        <a:alpha val="90000"/>
+        <a:tint val="40000"/>
+      </a:schemeClr>
+    </dgm:linClrLst>
+    <dgm:effectClrLst/>
+    <dgm:txLinClrLst/>
+    <dgm:txFillClrLst meth="repeat">
+      <a:schemeClr val="dk1"/>
+    </dgm:txFillClrLst>
+    <dgm:txEffectClrLst/>
+  </dgm:styleLbl>
+  <dgm:styleLbl name="bgAccFollowNode1">
+    <dgm:fillClrLst meth="repeat">
+      <a:schemeClr val="accent1">
+        <a:alpha val="90000"/>
+        <a:tint val="40000"/>
+      </a:schemeClr>
+    </dgm:fillClrLst>
+    <dgm:linClrLst meth="repeat">
+      <a:schemeClr val="accent1">
+        <a:alpha val="90000"/>
+        <a:tint val="40000"/>
+      </a:schemeClr>
+    </dgm:linClrLst>
+    <dgm:effectClrLst/>
+    <dgm:txLinClrLst/>
+    <dgm:txFillClrLst meth="repeat">
+      <a:schemeClr val="dk1"/>
+    </dgm:txFillClrLst>
+    <dgm:txEffectClrLst/>
+  </dgm:styleLbl>
+  <dgm:styleLbl name="fgAcc0">
+    <dgm:fillClrLst meth="repeat">
+      <a:schemeClr val="lt1">
+        <a:alpha val="90000"/>
+      </a:schemeClr>
+    </dgm:fillClrLst>
+    <dgm:linClrLst meth="repeat">
+      <a:schemeClr val="accent1"/>
+    </dgm:linClrLst>
+    <dgm:effectClrLst/>
+    <dgm:txLinClrLst/>
+    <dgm:txFillClrLst meth="repeat">
+      <a:schemeClr val="dk1"/>
+    </dgm:txFillClrLst>
+    <dgm:txEffectClrLst/>
+  </dgm:styleLbl>
+  <dgm:styleLbl name="fgAcc2">
+    <dgm:fillClrLst meth="repeat">
+      <a:schemeClr val="lt1">
+        <a:alpha val="90000"/>
+      </a:schemeClr>
+    </dgm:fillClrLst>
+    <dgm:linClrLst meth="repeat">
+      <a:schemeClr val="accent1"/>
+    </dgm:linClrLst>
+    <dgm:effectClrLst/>
+    <dgm:txLinClrLst/>
+    <dgm:txFillClrLst meth="repeat">
+      <a:schemeClr val="dk1"/>
+    </dgm:txFillClrLst>
+    <dgm:txEffectClrLst/>
+  </dgm:styleLbl>
+  <dgm:styleLbl name="fgAcc3">
+    <dgm:fillClrLst meth="repeat">
+      <a:schemeClr val="lt1">
+        <a:alpha val="90000"/>
+      </a:schemeClr>
+    </dgm:fillClrLst>
+    <dgm:linClrLst meth="repeat">
+      <a:schemeClr val="accent1"/>
+    </dgm:linClrLst>
+    <dgm:effectClrLst/>
+    <dgm:txLinClrLst/>
+    <dgm:txFillClrLst meth="repeat">
+      <a:schemeClr val="dk1"/>
+    </dgm:txFillClrLst>
+    <dgm:txEffectClrLst/>
+  </dgm:styleLbl>
+  <dgm:styleLbl name="fgAcc4">
+    <dgm:fillClrLst meth="repeat">
+      <a:schemeClr val="lt1">
+        <a:alpha val="90000"/>
+      </a:schemeClr>
+    </dgm:fillClrLst>
+    <dgm:linClrLst meth="repeat">
+      <a:schemeClr val="accent1"/>
+    </dgm:linClrLst>
+    <dgm:effectClrLst/>
+    <dgm:txLinClrLst/>
+    <dgm:txFillClrLst meth="repeat">
+      <a:schemeClr val="dk1"/>
+    </dgm:txFillClrLst>
+    <dgm:txEffectClrLst/>
+  </dgm:styleLbl>
+  <dgm:styleLbl name="bgShp">
+    <dgm:fillClrLst meth="repeat">
+      <a:schemeClr val="accent1">
+        <a:tint val="40000"/>
+      </a:schemeClr>
+    </dgm:fillClrLst>
+    <dgm:linClrLst meth="repeat">
+      <a:schemeClr val="accent1"/>
+    </dgm:linClrLst>
+    <dgm:effectClrLst/>
+    <dgm:txLinClrLst/>
+    <dgm:txFillClrLst meth="repeat">
+      <a:schemeClr val="dk1"/>
+    </dgm:txFillClrLst>
+    <dgm:txEffectClrLst/>
+  </dgm:styleLbl>
+  <dgm:styleLbl name="dkBgShp">
+    <dgm:fillClrLst meth="repeat">
+      <a:schemeClr val="accent1">
+        <a:shade val="80000"/>
+      </a:schemeClr>
+    </dgm:fillClrLst>
+    <dgm:linClrLst meth="repeat">
+      <a:schemeClr val="accent1"/>
+    </dgm:linClrLst>
+    <dgm:effectClrLst/>
+    <dgm:txLinClrLst/>
+    <dgm:txFillClrLst meth="repeat">
+      <a:schemeClr val="lt1"/>
+    </dgm:txFillClrLst>
+    <dgm:txEffectClrLst/>
+  </dgm:styleLbl>
+  <dgm:styleLbl name="trBgShp">
+    <dgm:fillClrLst meth="repeat">
+      <a:schemeClr val="accent1">
+        <a:tint val="50000"/>
+        <a:alpha val="40000"/>
+      </a:schemeClr>
+    </dgm:fillClrLst>
+    <dgm:linClrLst meth="repeat">
+      <a:schemeClr val="accent1"/>
+    </dgm:linClrLst>
+    <dgm:effectClrLst/>
+    <dgm:txLinClrLst/>
+    <dgm:txFillClrLst meth="repeat">
+      <a:schemeClr val="lt1"/>
+    </dgm:txFillClrLst>
+    <dgm:txEffectClrLst/>
+  </dgm:styleLbl>
+  <dgm:styleLbl name="fgShp">
+    <dgm:fillClrLst meth="repeat">
+      <a:schemeClr val="accent1">
+        <a:tint val="60000"/>
+      </a:schemeClr>
+    </dgm:fillClrLst>
+    <dgm:linClrLst meth="repeat">
+      <a:schemeClr val="lt1"/>
+    </dgm:linClrLst>
+    <dgm:effectClrLst/>
+    <dgm:txLinClrLst/>
+    <dgm:txFillClrLst meth="repeat">
+      <a:schemeClr val="dk1"/>
+    </dgm:txFillClrLst>
+    <dgm:txEffectClrLst/>
+  </dgm:styleLbl>
+  <dgm:styleLbl name="revTx">
+    <dgm:fillClrLst meth="repeat">
+      <a:schemeClr val="lt1">
+        <a:alpha val="0"/>
+      </a:schemeClr>
+    </dgm:fillClrLst>
+    <dgm:linClrLst meth="repeat">
+      <a:schemeClr val="dk1">
+        <a:alpha val="0"/>
+      </a:schemeClr>
+    </dgm:linClrLst>
+    <dgm:effectClrLst/>
+    <dgm:txLinClrLst/>
+    <dgm:txFillClrLst meth="repeat">
+      <a:schemeClr val="tx1"/>
+    </dgm:txFillClrLst>
+    <dgm:txEffectClrLst/>
+  </dgm:styleLbl>
+</dgm:colorsDef>
+</file>
+
+<file path=ppt/diagrams/colors4.xml><?xml version="1.0" encoding="utf-8"?>
 <dgm:colorsDef xmlns:dgm="http://schemas.openxmlformats.org/drawingml/2006/diagram" xmlns:a="http://schemas.openxmlformats.org/drawingml/2006/main" uniqueId="urn:microsoft.com/office/officeart/2005/8/colors/accent1_2">
   <dgm:title val=""/>
   <dgm:desc val=""/>
@@ -3570,9 +4322,9 @@
     <dgm:cxn modelId="{09C829B3-9421-472C-992B-F9C6C7EA8079}" srcId="{9450D4C9-C4B2-4911-A89A-514780CB9F15}" destId="{962489C9-99E7-4179-9C22-D64CAB835C31}" srcOrd="3" destOrd="0" parTransId="{44042CD2-4D4B-4F8B-847E-88E42BCD2928}" sibTransId="{4A484662-FBA7-4F43-BE10-51AB84EA0D6F}"/>
     <dgm:cxn modelId="{926CA9DC-DF6F-4A9D-9612-83D48BE5EA1C}" type="presOf" srcId="{64331C73-F894-4973-9E15-1A620C348097}" destId="{09A00682-3313-476D-9195-849AA0621560}" srcOrd="0" destOrd="0" presId="urn:microsoft.com/office/officeart/2005/8/layout/chevron1"/>
     <dgm:cxn modelId="{639D5D99-9E2A-4A71-BD4D-065403E54717}" type="presOf" srcId="{B537E5C6-AC88-45DE-A692-878DAC35B119}" destId="{5535CA09-926A-457A-A4B7-21390F15F94F}" srcOrd="0" destOrd="0" presId="urn:microsoft.com/office/officeart/2005/8/layout/chevron1"/>
-    <dgm:cxn modelId="{B3F5CCFA-FE39-4B4E-9CFC-BD7D8A83E842}" type="presOf" srcId="{CF478C61-00AD-4194-8D4F-7DB2AE098B5C}" destId="{1214DDDF-E3A3-4EB3-BFBD-CAE78864CA50}" srcOrd="0" destOrd="0" presId="urn:microsoft.com/office/officeart/2005/8/layout/chevron1"/>
     <dgm:cxn modelId="{77A0D87E-0458-4AB3-8FE4-5731CF46972A}" type="presOf" srcId="{C97B20BC-3CBA-411F-AB14-F158490C5BCC}" destId="{5D5D5C88-985A-485D-991E-57409E5BC77A}" srcOrd="0" destOrd="0" presId="urn:microsoft.com/office/officeart/2005/8/layout/chevron1"/>
     <dgm:cxn modelId="{1C1DB8ED-0C78-4531-81AD-594F179D4A4A}" type="presOf" srcId="{8A145133-89F4-4E11-BED7-033969110BEF}" destId="{47EC26A5-DB58-47F3-B21F-7ECE3520D744}" srcOrd="0" destOrd="0" presId="urn:microsoft.com/office/officeart/2005/8/layout/chevron1"/>
+    <dgm:cxn modelId="{B3F5CCFA-FE39-4B4E-9CFC-BD7D8A83E842}" type="presOf" srcId="{CF478C61-00AD-4194-8D4F-7DB2AE098B5C}" destId="{1214DDDF-E3A3-4EB3-BFBD-CAE78864CA50}" srcOrd="0" destOrd="0" presId="urn:microsoft.com/office/officeart/2005/8/layout/chevron1"/>
     <dgm:cxn modelId="{6189A4AA-D7EB-418F-9F2D-C66AC3C01A62}" srcId="{9450D4C9-C4B2-4911-A89A-514780CB9F15}" destId="{C97B20BC-3CBA-411F-AB14-F158490C5BCC}" srcOrd="6" destOrd="0" parTransId="{F7EE3B89-45E3-4220-BAF4-37722295D274}" sibTransId="{484765B2-A338-4F5A-B411-50FEAAE111D8}"/>
     <dgm:cxn modelId="{3472B545-712D-4EE5-A0FD-FCCE69A3F421}" srcId="{9450D4C9-C4B2-4911-A89A-514780CB9F15}" destId="{8A145133-89F4-4E11-BED7-033969110BEF}" srcOrd="4" destOrd="0" parTransId="{06C89CBF-459F-4019-BA59-A67EB395C5B9}" sibTransId="{A211C329-5A6A-4787-B4B1-98439EF8D8DC}"/>
     <dgm:cxn modelId="{4F2130A0-1415-4348-8853-90D1F7780598}" type="presOf" srcId="{962489C9-99E7-4179-9C22-D64CAB835C31}" destId="{9D68CD03-B1A7-4BEA-B058-FD22B6150897}" srcOrd="0" destOrd="0" presId="urn:microsoft.com/office/officeart/2005/8/layout/chevron1"/>
@@ -3590,6 +4342,391 @@
     <dgm:cxn modelId="{BFA956CC-EF8D-4872-BC32-DDABCAED0F1B}" type="presParOf" srcId="{460ED21A-C4DB-432F-A891-283E6D30FEEE}" destId="{1214DDDF-E3A3-4EB3-BFBD-CAE78864CA50}" srcOrd="10" destOrd="0" presId="urn:microsoft.com/office/officeart/2005/8/layout/chevron1"/>
     <dgm:cxn modelId="{DC7BDCDD-EE4A-4DBE-9D25-FAF6F4CCE6B6}" type="presParOf" srcId="{460ED21A-C4DB-432F-A891-283E6D30FEEE}" destId="{9B48478D-4364-4A01-B914-3ECAC052B879}" srcOrd="11" destOrd="0" presId="urn:microsoft.com/office/officeart/2005/8/layout/chevron1"/>
     <dgm:cxn modelId="{2012B53E-358B-4183-BA84-D3BDAAF8258D}" type="presParOf" srcId="{460ED21A-C4DB-432F-A891-283E6D30FEEE}" destId="{5D5D5C88-985A-485D-991E-57409E5BC77A}" srcOrd="12" destOrd="0" presId="urn:microsoft.com/office/officeart/2005/8/layout/chevron1"/>
+  </dgm:cxnLst>
+  <dgm:bg/>
+  <dgm:whole/>
+  <dgm:extLst>
+    <a:ext uri="http://schemas.microsoft.com/office/drawing/2008/diagram">
+      <dsp:dataModelExt xmlns:dsp="http://schemas.microsoft.com/office/drawing/2008/diagram" relId="rId6" minVer="http://schemas.openxmlformats.org/drawingml/2006/diagram"/>
+    </a:ext>
+  </dgm:extLst>
+</dgm:dataModel>
+</file>
+
+<file path=ppt/diagrams/data4.xml><?xml version="1.0" encoding="utf-8"?>
+<dgm:dataModel xmlns:dgm="http://schemas.openxmlformats.org/drawingml/2006/diagram" xmlns:a="http://schemas.openxmlformats.org/drawingml/2006/main">
+  <dgm:ptLst>
+    <dgm:pt modelId="{E599E731-E7DC-479C-8CF1-D6244889523C}" type="doc">
+      <dgm:prSet loTypeId="urn:microsoft.com/office/officeart/2005/8/layout/hierarchy1" loCatId="hierarchy" qsTypeId="urn:microsoft.com/office/officeart/2005/8/quickstyle/3d4" qsCatId="3D" csTypeId="urn:microsoft.com/office/officeart/2005/8/colors/accent1_2" csCatId="accent1" phldr="1"/>
+      <dgm:spPr/>
+      <dgm:t>
+        <a:bodyPr/>
+        <a:lstStyle/>
+        <a:p>
+          <a:endParaRPr lang="en-US"/>
+        </a:p>
+      </dgm:t>
+    </dgm:pt>
+    <dgm:pt modelId="{EDE96FF5-1D6F-40D9-BAA4-5F216284EA68}">
+      <dgm:prSet phldrT="[Text]" custT="1"/>
+      <dgm:spPr/>
+      <dgm:t>
+        <a:bodyPr/>
+        <a:lstStyle/>
+        <a:p>
+          <a:r>
+            <a:rPr lang="en-US" sz="1600" b="1" dirty="0" smtClean="0"/>
+            <a:t>Shared resources</a:t>
+          </a:r>
+          <a:endParaRPr lang="en-US" sz="1600" b="1" dirty="0"/>
+        </a:p>
+      </dgm:t>
+    </dgm:pt>
+    <dgm:pt modelId="{0321C310-AEF3-46E8-B8A4-6C11DB864603}" type="parTrans" cxnId="{01FB11D6-684D-4E49-B5B0-EAFE14330F37}">
+      <dgm:prSet/>
+      <dgm:spPr/>
+      <dgm:t>
+        <a:bodyPr/>
+        <a:lstStyle/>
+        <a:p>
+          <a:endParaRPr lang="en-US"/>
+        </a:p>
+      </dgm:t>
+    </dgm:pt>
+    <dgm:pt modelId="{D4600DEE-2AE6-474A-83CF-788E07829090}" type="sibTrans" cxnId="{01FB11D6-684D-4E49-B5B0-EAFE14330F37}">
+      <dgm:prSet/>
+      <dgm:spPr/>
+      <dgm:t>
+        <a:bodyPr/>
+        <a:lstStyle/>
+        <a:p>
+          <a:endParaRPr lang="en-US"/>
+        </a:p>
+      </dgm:t>
+    </dgm:pt>
+    <dgm:pt modelId="{D3416637-C472-49E7-8A77-42EA7EE4FB2D}">
+      <dgm:prSet phldrT="[Text]" custT="1"/>
+      <dgm:spPr/>
+      <dgm:t>
+        <a:bodyPr/>
+        <a:lstStyle/>
+        <a:p>
+          <a:pPr algn="ctr"/>
+          <a:r>
+            <a:rPr lang="en-US" sz="1600" b="1" dirty="0" smtClean="0"/>
+            <a:t>Physical Resources</a:t>
+          </a:r>
+        </a:p>
+        <a:p>
+          <a:pPr algn="ctr"/>
+          <a:r>
+            <a:rPr lang="en-US" sz="900" dirty="0" smtClean="0"/>
+            <a:t>- resources which can be shared with some dependence on their location </a:t>
+          </a:r>
+        </a:p>
+        <a:p>
+          <a:pPr algn="l"/>
+          <a:endParaRPr lang="en-US" sz="900" dirty="0" smtClean="0"/>
+        </a:p>
+        <a:p>
+          <a:pPr algn="l"/>
+          <a:r>
+            <a:rPr lang="en-US" sz="900" dirty="0" smtClean="0"/>
+            <a:t>Computation power</a:t>
+          </a:r>
+        </a:p>
+        <a:p>
+          <a:pPr algn="l"/>
+          <a:r>
+            <a:rPr lang="en-US" sz="900" dirty="0" smtClean="0"/>
+            <a:t>Storage devices</a:t>
+          </a:r>
+        </a:p>
+        <a:p>
+          <a:pPr algn="l"/>
+          <a:r>
+            <a:rPr lang="en-US" sz="900" dirty="0" smtClean="0"/>
+            <a:t>Communication capacity</a:t>
+          </a:r>
+        </a:p>
+        <a:p>
+          <a:pPr algn="ctr"/>
+          <a:endParaRPr lang="en-US" sz="900" dirty="0"/>
+        </a:p>
+      </dgm:t>
+    </dgm:pt>
+    <dgm:pt modelId="{3FF84238-6296-41FA-AC31-BE8D99191283}" type="parTrans" cxnId="{DCEFC734-5258-4187-81E2-2DA3C3A0600D}">
+      <dgm:prSet/>
+      <dgm:spPr/>
+      <dgm:t>
+        <a:bodyPr/>
+        <a:lstStyle/>
+        <a:p>
+          <a:endParaRPr lang="en-US"/>
+        </a:p>
+      </dgm:t>
+    </dgm:pt>
+    <dgm:pt modelId="{C2F2F837-7292-499A-9363-26D4909D7F7A}" type="sibTrans" cxnId="{DCEFC734-5258-4187-81E2-2DA3C3A0600D}">
+      <dgm:prSet/>
+      <dgm:spPr/>
+      <dgm:t>
+        <a:bodyPr/>
+        <a:lstStyle/>
+        <a:p>
+          <a:endParaRPr lang="en-US"/>
+        </a:p>
+      </dgm:t>
+    </dgm:pt>
+    <dgm:pt modelId="{B3EDA70C-121E-4511-8433-9E3CEA3A1041}">
+      <dgm:prSet phldrT="[Text]" custT="1"/>
+      <dgm:spPr/>
+      <dgm:t>
+        <a:bodyPr/>
+        <a:lstStyle/>
+        <a:p>
+          <a:pPr algn="ctr"/>
+          <a:r>
+            <a:rPr lang="en-US" sz="1600" b="1" dirty="0" smtClean="0"/>
+            <a:t>Virtual Resources</a:t>
+          </a:r>
+        </a:p>
+        <a:p>
+          <a:pPr algn="ctr"/>
+          <a:r>
+            <a:rPr lang="en-US" sz="900" dirty="0" smtClean="0"/>
+            <a:t>-resources which can be shared </a:t>
+          </a:r>
+          <a:r>
+            <a:rPr lang="en-US" sz="900" dirty="0" smtClean="0"/>
+            <a:t>independent of their </a:t>
+          </a:r>
+          <a:r>
+            <a:rPr lang="en-US" sz="900" dirty="0" smtClean="0"/>
+            <a:t>physical location</a:t>
+          </a:r>
+        </a:p>
+        <a:p>
+          <a:pPr algn="ctr"/>
+          <a:r>
+            <a:rPr lang="en-US" sz="900" dirty="0" smtClean="0"/>
+            <a:t> </a:t>
+          </a:r>
+        </a:p>
+        <a:p>
+          <a:pPr algn="l"/>
+          <a:r>
+            <a:rPr lang="en-US" sz="900" dirty="0" smtClean="0"/>
+            <a:t>Operating systems</a:t>
+          </a:r>
+        </a:p>
+        <a:p>
+          <a:pPr algn="l"/>
+          <a:r>
+            <a:rPr lang="en-US" sz="900" dirty="0" smtClean="0"/>
+            <a:t>Software and licenses</a:t>
+          </a:r>
+        </a:p>
+        <a:p>
+          <a:pPr algn="l"/>
+          <a:r>
+            <a:rPr lang="en-US" sz="900" dirty="0" smtClean="0"/>
+            <a:t>Tasks and applications </a:t>
+          </a:r>
+        </a:p>
+        <a:p>
+          <a:pPr algn="l"/>
+          <a:r>
+            <a:rPr lang="en-US" sz="900" dirty="0" smtClean="0"/>
+            <a:t>Services</a:t>
+          </a:r>
+          <a:endParaRPr lang="en-US" sz="900" dirty="0"/>
+        </a:p>
+      </dgm:t>
+    </dgm:pt>
+    <dgm:pt modelId="{3203F13A-12BF-4556-A522-A41B0A00850D}" type="parTrans" cxnId="{25D7E370-8D92-4E2B-B024-D053047D8CE2}">
+      <dgm:prSet/>
+      <dgm:spPr/>
+      <dgm:t>
+        <a:bodyPr/>
+        <a:lstStyle/>
+        <a:p>
+          <a:endParaRPr lang="en-US"/>
+        </a:p>
+      </dgm:t>
+    </dgm:pt>
+    <dgm:pt modelId="{0EFF336F-BB38-4F04-9D43-D16852737E47}" type="sibTrans" cxnId="{25D7E370-8D92-4E2B-B024-D053047D8CE2}">
+      <dgm:prSet/>
+      <dgm:spPr/>
+      <dgm:t>
+        <a:bodyPr/>
+        <a:lstStyle/>
+        <a:p>
+          <a:endParaRPr lang="en-US"/>
+        </a:p>
+      </dgm:t>
+    </dgm:pt>
+    <dgm:pt modelId="{D95F9AD9-2B6E-4F59-B64C-5D4FC2E366CE}" type="pres">
+      <dgm:prSet presAssocID="{E599E731-E7DC-479C-8CF1-D6244889523C}" presName="hierChild1" presStyleCnt="0">
+        <dgm:presLayoutVars>
+          <dgm:chPref val="1"/>
+          <dgm:dir/>
+          <dgm:animOne val="branch"/>
+          <dgm:animLvl val="lvl"/>
+          <dgm:resizeHandles/>
+        </dgm:presLayoutVars>
+      </dgm:prSet>
+      <dgm:spPr/>
+      <dgm:t>
+        <a:bodyPr/>
+        <a:lstStyle/>
+        <a:p>
+          <a:endParaRPr lang="en-US"/>
+        </a:p>
+      </dgm:t>
+    </dgm:pt>
+    <dgm:pt modelId="{CF8D7650-8692-446B-80AA-1D837010E69E}" type="pres">
+      <dgm:prSet presAssocID="{EDE96FF5-1D6F-40D9-BAA4-5F216284EA68}" presName="hierRoot1" presStyleCnt="0"/>
+      <dgm:spPr/>
+    </dgm:pt>
+    <dgm:pt modelId="{5C537912-794E-42DA-8968-3ADE7773EE31}" type="pres">
+      <dgm:prSet presAssocID="{EDE96FF5-1D6F-40D9-BAA4-5F216284EA68}" presName="composite" presStyleCnt="0"/>
+      <dgm:spPr/>
+    </dgm:pt>
+    <dgm:pt modelId="{53C24587-0A2B-4FE3-9D3F-3944C820D5B6}" type="pres">
+      <dgm:prSet presAssocID="{EDE96FF5-1D6F-40D9-BAA4-5F216284EA68}" presName="background" presStyleLbl="node0" presStyleIdx="0" presStyleCnt="1"/>
+      <dgm:spPr/>
+    </dgm:pt>
+    <dgm:pt modelId="{633A4F81-F993-47EB-820A-B68DB3A5390E}" type="pres">
+      <dgm:prSet presAssocID="{EDE96FF5-1D6F-40D9-BAA4-5F216284EA68}" presName="text" presStyleLbl="fgAcc0" presStyleIdx="0" presStyleCnt="1" custScaleX="70576" custScaleY="46480" custLinFactNeighborX="-2359" custLinFactNeighborY="537">
+        <dgm:presLayoutVars>
+          <dgm:chPref val="3"/>
+        </dgm:presLayoutVars>
+      </dgm:prSet>
+      <dgm:spPr/>
+      <dgm:t>
+        <a:bodyPr/>
+        <a:lstStyle/>
+        <a:p>
+          <a:endParaRPr lang="en-US"/>
+        </a:p>
+      </dgm:t>
+    </dgm:pt>
+    <dgm:pt modelId="{9525C4BF-B71D-4DF6-B5D8-7C3C93628DE9}" type="pres">
+      <dgm:prSet presAssocID="{EDE96FF5-1D6F-40D9-BAA4-5F216284EA68}" presName="hierChild2" presStyleCnt="0"/>
+      <dgm:spPr/>
+    </dgm:pt>
+    <dgm:pt modelId="{3B4976F8-1C91-4B4A-AF74-A6A32D597C6F}" type="pres">
+      <dgm:prSet presAssocID="{3FF84238-6296-41FA-AC31-BE8D99191283}" presName="Name10" presStyleLbl="parChTrans1D2" presStyleIdx="0" presStyleCnt="2"/>
+      <dgm:spPr/>
+      <dgm:t>
+        <a:bodyPr/>
+        <a:lstStyle/>
+        <a:p>
+          <a:endParaRPr lang="en-US"/>
+        </a:p>
+      </dgm:t>
+    </dgm:pt>
+    <dgm:pt modelId="{21FF550D-E877-43C1-9C96-8867747CD76B}" type="pres">
+      <dgm:prSet presAssocID="{D3416637-C472-49E7-8A77-42EA7EE4FB2D}" presName="hierRoot2" presStyleCnt="0"/>
+      <dgm:spPr/>
+    </dgm:pt>
+    <dgm:pt modelId="{6513E347-F1D0-4551-BE8C-624BBDE06C92}" type="pres">
+      <dgm:prSet presAssocID="{D3416637-C472-49E7-8A77-42EA7EE4FB2D}" presName="composite2" presStyleCnt="0"/>
+      <dgm:spPr/>
+    </dgm:pt>
+    <dgm:pt modelId="{6BAED831-1434-4AE7-8DB7-037BBAC56C31}" type="pres">
+      <dgm:prSet presAssocID="{D3416637-C472-49E7-8A77-42EA7EE4FB2D}" presName="background2" presStyleLbl="node2" presStyleIdx="0" presStyleCnt="2"/>
+      <dgm:spPr/>
+    </dgm:pt>
+    <dgm:pt modelId="{2CA332BF-C7D5-44C4-86AB-C5F8609888C3}" type="pres">
+      <dgm:prSet presAssocID="{D3416637-C472-49E7-8A77-42EA7EE4FB2D}" presName="text2" presStyleLbl="fgAcc2" presStyleIdx="0" presStyleCnt="2" custLinFactNeighborX="-28" custLinFactNeighborY="2983">
+        <dgm:presLayoutVars>
+          <dgm:chPref val="3"/>
+        </dgm:presLayoutVars>
+      </dgm:prSet>
+      <dgm:spPr/>
+      <dgm:t>
+        <a:bodyPr/>
+        <a:lstStyle/>
+        <a:p>
+          <a:endParaRPr lang="en-US"/>
+        </a:p>
+      </dgm:t>
+    </dgm:pt>
+    <dgm:pt modelId="{02A9C2E9-D720-4DC8-8099-7C06137BF772}" type="pres">
+      <dgm:prSet presAssocID="{D3416637-C472-49E7-8A77-42EA7EE4FB2D}" presName="hierChild3" presStyleCnt="0"/>
+      <dgm:spPr/>
+    </dgm:pt>
+    <dgm:pt modelId="{82B6CC98-E7D5-4D4E-ACD9-D9D53E7526DB}" type="pres">
+      <dgm:prSet presAssocID="{3203F13A-12BF-4556-A522-A41B0A00850D}" presName="Name10" presStyleLbl="parChTrans1D2" presStyleIdx="1" presStyleCnt="2"/>
+      <dgm:spPr/>
+      <dgm:t>
+        <a:bodyPr/>
+        <a:lstStyle/>
+        <a:p>
+          <a:endParaRPr lang="en-US"/>
+        </a:p>
+      </dgm:t>
+    </dgm:pt>
+    <dgm:pt modelId="{FD1E6DF3-1F96-46AD-8241-D014A12C880D}" type="pres">
+      <dgm:prSet presAssocID="{B3EDA70C-121E-4511-8433-9E3CEA3A1041}" presName="hierRoot2" presStyleCnt="0"/>
+      <dgm:spPr/>
+    </dgm:pt>
+    <dgm:pt modelId="{2B3A8281-D1C9-419D-93FE-4EE025A27E32}" type="pres">
+      <dgm:prSet presAssocID="{B3EDA70C-121E-4511-8433-9E3CEA3A1041}" presName="composite2" presStyleCnt="0"/>
+      <dgm:spPr/>
+    </dgm:pt>
+    <dgm:pt modelId="{54ED80A4-9519-416E-8692-A675E58D6A01}" type="pres">
+      <dgm:prSet presAssocID="{B3EDA70C-121E-4511-8433-9E3CEA3A1041}" presName="background2" presStyleLbl="node2" presStyleIdx="1" presStyleCnt="2"/>
+      <dgm:spPr/>
+    </dgm:pt>
+    <dgm:pt modelId="{62F573A8-C98B-4300-903C-ACC41DE49811}" type="pres">
+      <dgm:prSet presAssocID="{B3EDA70C-121E-4511-8433-9E3CEA3A1041}" presName="text2" presStyleLbl="fgAcc2" presStyleIdx="1" presStyleCnt="2" custLinFactNeighborX="279" custLinFactNeighborY="2983">
+        <dgm:presLayoutVars>
+          <dgm:chPref val="3"/>
+        </dgm:presLayoutVars>
+      </dgm:prSet>
+      <dgm:spPr/>
+      <dgm:t>
+        <a:bodyPr/>
+        <a:lstStyle/>
+        <a:p>
+          <a:endParaRPr lang="en-US"/>
+        </a:p>
+      </dgm:t>
+    </dgm:pt>
+    <dgm:pt modelId="{B89752FF-95A7-474E-A154-DD269E4F5DE4}" type="pres">
+      <dgm:prSet presAssocID="{B3EDA70C-121E-4511-8433-9E3CEA3A1041}" presName="hierChild3" presStyleCnt="0"/>
+      <dgm:spPr/>
+    </dgm:pt>
+  </dgm:ptLst>
+  <dgm:cxnLst>
+    <dgm:cxn modelId="{D29B2DFD-6448-43ED-AD6F-A88D3997D5AD}" type="presOf" srcId="{EDE96FF5-1D6F-40D9-BAA4-5F216284EA68}" destId="{633A4F81-F993-47EB-820A-B68DB3A5390E}" srcOrd="0" destOrd="0" presId="urn:microsoft.com/office/officeart/2005/8/layout/hierarchy1"/>
+    <dgm:cxn modelId="{25D7E370-8D92-4E2B-B024-D053047D8CE2}" srcId="{EDE96FF5-1D6F-40D9-BAA4-5F216284EA68}" destId="{B3EDA70C-121E-4511-8433-9E3CEA3A1041}" srcOrd="1" destOrd="0" parTransId="{3203F13A-12BF-4556-A522-A41B0A00850D}" sibTransId="{0EFF336F-BB38-4F04-9D43-D16852737E47}"/>
+    <dgm:cxn modelId="{E470C9C2-04B1-4DBA-BDD8-DA9E788EC044}" type="presOf" srcId="{E599E731-E7DC-479C-8CF1-D6244889523C}" destId="{D95F9AD9-2B6E-4F59-B64C-5D4FC2E366CE}" srcOrd="0" destOrd="0" presId="urn:microsoft.com/office/officeart/2005/8/layout/hierarchy1"/>
+    <dgm:cxn modelId="{DCEFC734-5258-4187-81E2-2DA3C3A0600D}" srcId="{EDE96FF5-1D6F-40D9-BAA4-5F216284EA68}" destId="{D3416637-C472-49E7-8A77-42EA7EE4FB2D}" srcOrd="0" destOrd="0" parTransId="{3FF84238-6296-41FA-AC31-BE8D99191283}" sibTransId="{C2F2F837-7292-499A-9363-26D4909D7F7A}"/>
+    <dgm:cxn modelId="{AA02A161-9E71-4263-A901-09BFD558970D}" type="presOf" srcId="{D3416637-C472-49E7-8A77-42EA7EE4FB2D}" destId="{2CA332BF-C7D5-44C4-86AB-C5F8609888C3}" srcOrd="0" destOrd="0" presId="urn:microsoft.com/office/officeart/2005/8/layout/hierarchy1"/>
+    <dgm:cxn modelId="{01FB11D6-684D-4E49-B5B0-EAFE14330F37}" srcId="{E599E731-E7DC-479C-8CF1-D6244889523C}" destId="{EDE96FF5-1D6F-40D9-BAA4-5F216284EA68}" srcOrd="0" destOrd="0" parTransId="{0321C310-AEF3-46E8-B8A4-6C11DB864603}" sibTransId="{D4600DEE-2AE6-474A-83CF-788E07829090}"/>
+    <dgm:cxn modelId="{FBEA6683-523A-4555-AC76-8EA8246433E8}" type="presOf" srcId="{B3EDA70C-121E-4511-8433-9E3CEA3A1041}" destId="{62F573A8-C98B-4300-903C-ACC41DE49811}" srcOrd="0" destOrd="0" presId="urn:microsoft.com/office/officeart/2005/8/layout/hierarchy1"/>
+    <dgm:cxn modelId="{B4B656B2-B9F5-4518-B1FC-D6049C1794CC}" type="presOf" srcId="{3203F13A-12BF-4556-A522-A41B0A00850D}" destId="{82B6CC98-E7D5-4D4E-ACD9-D9D53E7526DB}" srcOrd="0" destOrd="0" presId="urn:microsoft.com/office/officeart/2005/8/layout/hierarchy1"/>
+    <dgm:cxn modelId="{61E18A5C-F5D9-4D94-9A8A-644F91246958}" type="presOf" srcId="{3FF84238-6296-41FA-AC31-BE8D99191283}" destId="{3B4976F8-1C91-4B4A-AF74-A6A32D597C6F}" srcOrd="0" destOrd="0" presId="urn:microsoft.com/office/officeart/2005/8/layout/hierarchy1"/>
+    <dgm:cxn modelId="{0C7A26C2-1BBB-4A9B-BAED-D8019201ABB6}" type="presParOf" srcId="{D95F9AD9-2B6E-4F59-B64C-5D4FC2E366CE}" destId="{CF8D7650-8692-446B-80AA-1D837010E69E}" srcOrd="0" destOrd="0" presId="urn:microsoft.com/office/officeart/2005/8/layout/hierarchy1"/>
+    <dgm:cxn modelId="{34B243D6-3D1A-4412-9071-43C8F5F42BCD}" type="presParOf" srcId="{CF8D7650-8692-446B-80AA-1D837010E69E}" destId="{5C537912-794E-42DA-8968-3ADE7773EE31}" srcOrd="0" destOrd="0" presId="urn:microsoft.com/office/officeart/2005/8/layout/hierarchy1"/>
+    <dgm:cxn modelId="{A7F0C584-3116-495D-B238-7C602CC00206}" type="presParOf" srcId="{5C537912-794E-42DA-8968-3ADE7773EE31}" destId="{53C24587-0A2B-4FE3-9D3F-3944C820D5B6}" srcOrd="0" destOrd="0" presId="urn:microsoft.com/office/officeart/2005/8/layout/hierarchy1"/>
+    <dgm:cxn modelId="{14874694-B3D7-4310-A6E5-D1F5AE031643}" type="presParOf" srcId="{5C537912-794E-42DA-8968-3ADE7773EE31}" destId="{633A4F81-F993-47EB-820A-B68DB3A5390E}" srcOrd="1" destOrd="0" presId="urn:microsoft.com/office/officeart/2005/8/layout/hierarchy1"/>
+    <dgm:cxn modelId="{C0895DE8-E691-4F5E-B278-0FE8A57FE96C}" type="presParOf" srcId="{CF8D7650-8692-446B-80AA-1D837010E69E}" destId="{9525C4BF-B71D-4DF6-B5D8-7C3C93628DE9}" srcOrd="1" destOrd="0" presId="urn:microsoft.com/office/officeart/2005/8/layout/hierarchy1"/>
+    <dgm:cxn modelId="{9D9C5433-1549-47C4-B069-020B3287097C}" type="presParOf" srcId="{9525C4BF-B71D-4DF6-B5D8-7C3C93628DE9}" destId="{3B4976F8-1C91-4B4A-AF74-A6A32D597C6F}" srcOrd="0" destOrd="0" presId="urn:microsoft.com/office/officeart/2005/8/layout/hierarchy1"/>
+    <dgm:cxn modelId="{9FB6C0E8-723A-4B9D-A362-1B5DC256CB36}" type="presParOf" srcId="{9525C4BF-B71D-4DF6-B5D8-7C3C93628DE9}" destId="{21FF550D-E877-43C1-9C96-8867747CD76B}" srcOrd="1" destOrd="0" presId="urn:microsoft.com/office/officeart/2005/8/layout/hierarchy1"/>
+    <dgm:cxn modelId="{175BB7AC-2DB0-4FEF-A1E4-ABC666368D51}" type="presParOf" srcId="{21FF550D-E877-43C1-9C96-8867747CD76B}" destId="{6513E347-F1D0-4551-BE8C-624BBDE06C92}" srcOrd="0" destOrd="0" presId="urn:microsoft.com/office/officeart/2005/8/layout/hierarchy1"/>
+    <dgm:cxn modelId="{C692657B-EE98-42B4-9F5D-228C8C64C56C}" type="presParOf" srcId="{6513E347-F1D0-4551-BE8C-624BBDE06C92}" destId="{6BAED831-1434-4AE7-8DB7-037BBAC56C31}" srcOrd="0" destOrd="0" presId="urn:microsoft.com/office/officeart/2005/8/layout/hierarchy1"/>
+    <dgm:cxn modelId="{5FE2A403-CE24-409A-8B29-2034B9844647}" type="presParOf" srcId="{6513E347-F1D0-4551-BE8C-624BBDE06C92}" destId="{2CA332BF-C7D5-44C4-86AB-C5F8609888C3}" srcOrd="1" destOrd="0" presId="urn:microsoft.com/office/officeart/2005/8/layout/hierarchy1"/>
+    <dgm:cxn modelId="{D5E96431-9076-42C4-8D5C-C5E4FB49B615}" type="presParOf" srcId="{21FF550D-E877-43C1-9C96-8867747CD76B}" destId="{02A9C2E9-D720-4DC8-8099-7C06137BF772}" srcOrd="1" destOrd="0" presId="urn:microsoft.com/office/officeart/2005/8/layout/hierarchy1"/>
+    <dgm:cxn modelId="{E8512BFF-08DC-4AE6-B807-7369FB713AEB}" type="presParOf" srcId="{9525C4BF-B71D-4DF6-B5D8-7C3C93628DE9}" destId="{82B6CC98-E7D5-4D4E-ACD9-D9D53E7526DB}" srcOrd="2" destOrd="0" presId="urn:microsoft.com/office/officeart/2005/8/layout/hierarchy1"/>
+    <dgm:cxn modelId="{DC9AC2AB-8659-4C2B-A47B-C14D3820D8DF}" type="presParOf" srcId="{9525C4BF-B71D-4DF6-B5D8-7C3C93628DE9}" destId="{FD1E6DF3-1F96-46AD-8241-D014A12C880D}" srcOrd="3" destOrd="0" presId="urn:microsoft.com/office/officeart/2005/8/layout/hierarchy1"/>
+    <dgm:cxn modelId="{6B1945C1-60D3-445E-A46F-C5E23990F2D4}" type="presParOf" srcId="{FD1E6DF3-1F96-46AD-8241-D014A12C880D}" destId="{2B3A8281-D1C9-419D-93FE-4EE025A27E32}" srcOrd="0" destOrd="0" presId="urn:microsoft.com/office/officeart/2005/8/layout/hierarchy1"/>
+    <dgm:cxn modelId="{964576EB-FC5E-455D-B431-6343D0870E06}" type="presParOf" srcId="{2B3A8281-D1C9-419D-93FE-4EE025A27E32}" destId="{54ED80A4-9519-416E-8692-A675E58D6A01}" srcOrd="0" destOrd="0" presId="urn:microsoft.com/office/officeart/2005/8/layout/hierarchy1"/>
+    <dgm:cxn modelId="{EECFADF0-7901-47F2-B00E-5282F2840E37}" type="presParOf" srcId="{2B3A8281-D1C9-419D-93FE-4EE025A27E32}" destId="{62F573A8-C98B-4300-903C-ACC41DE49811}" srcOrd="1" destOrd="0" presId="urn:microsoft.com/office/officeart/2005/8/layout/hierarchy1"/>
+    <dgm:cxn modelId="{15580954-D31A-4BE9-BF7A-C14D2BC348A9}" type="presParOf" srcId="{FD1E6DF3-1F96-46AD-8241-D014A12C880D}" destId="{B89752FF-95A7-474E-A154-DD269E4F5DE4}" srcOrd="1" destOrd="0" presId="urn:microsoft.com/office/officeart/2005/8/layout/hierarchy1"/>
   </dgm:cxnLst>
   <dgm:bg/>
   <dgm:whole/>
@@ -5058,6 +6195,755 @@
 </dsp:drawing>
 </file>
 
+<file path=ppt/diagrams/drawing4.xml><?xml version="1.0" encoding="utf-8"?>
+<dsp:drawing xmlns:dgm="http://schemas.openxmlformats.org/drawingml/2006/diagram" xmlns:dsp="http://schemas.microsoft.com/office/drawing/2008/diagram" xmlns:a="http://schemas.openxmlformats.org/drawingml/2006/main">
+  <dsp:spTree>
+    <dsp:nvGrpSpPr>
+      <dsp:cNvPr id="0" name=""/>
+      <dsp:cNvGrpSpPr/>
+    </dsp:nvGrpSpPr>
+    <dsp:grpSpPr/>
+    <dsp:sp modelId="{82B6CC98-E7D5-4D4E-ACD9-D9D53E7526DB}">
+      <dsp:nvSpPr>
+        <dsp:cNvPr id="0" name=""/>
+        <dsp:cNvSpPr/>
+      </dsp:nvSpPr>
+      <dsp:spPr>
+        <a:xfrm>
+          <a:off x="2841277" y="1079400"/>
+          <a:ext cx="1658541" cy="800206"/>
+        </a:xfrm>
+        <a:custGeom>
+          <a:avLst/>
+          <a:gdLst/>
+          <a:ahLst/>
+          <a:cxnLst/>
+          <a:rect l="0" t="0" r="0" b="0"/>
+          <a:pathLst>
+            <a:path>
+              <a:moveTo>
+                <a:pt x="0" y="0"/>
+              </a:moveTo>
+              <a:lnTo>
+                <a:pt x="0" y="558239"/>
+              </a:lnTo>
+              <a:lnTo>
+                <a:pt x="1658541" y="558239"/>
+              </a:lnTo>
+              <a:lnTo>
+                <a:pt x="1658541" y="800206"/>
+              </a:lnTo>
+            </a:path>
+          </a:pathLst>
+        </a:custGeom>
+        <a:noFill/>
+        <a:ln w="25400" cap="flat" cmpd="sng" algn="ctr">
+          <a:solidFill>
+            <a:schemeClr val="accent1">
+              <a:shade val="60000"/>
+              <a:hueOff val="0"/>
+              <a:satOff val="0"/>
+              <a:lumOff val="0"/>
+              <a:alphaOff val="0"/>
+            </a:schemeClr>
+          </a:solidFill>
+          <a:prstDash val="solid"/>
+        </a:ln>
+        <a:effectLst/>
+        <a:sp3d z="-40000" prstMaterial="matte"/>
+      </dsp:spPr>
+      <dsp:style>
+        <a:lnRef idx="2">
+          <a:scrgbClr r="0" g="0" b="0"/>
+        </a:lnRef>
+        <a:fillRef idx="0">
+          <a:scrgbClr r="0" g="0" b="0"/>
+        </a:fillRef>
+        <a:effectRef idx="0">
+          <a:scrgbClr r="0" g="0" b="0"/>
+        </a:effectRef>
+        <a:fontRef idx="minor"/>
+      </dsp:style>
+    </dsp:sp>
+    <dsp:sp modelId="{3B4976F8-1C91-4B4A-AF74-A6A32D597C6F}">
+      <dsp:nvSpPr>
+        <dsp:cNvPr id="0" name=""/>
+        <dsp:cNvSpPr/>
+      </dsp:nvSpPr>
+      <dsp:spPr>
+        <a:xfrm>
+          <a:off x="1305979" y="1079400"/>
+          <a:ext cx="1535297" cy="800206"/>
+        </a:xfrm>
+        <a:custGeom>
+          <a:avLst/>
+          <a:gdLst/>
+          <a:ahLst/>
+          <a:cxnLst/>
+          <a:rect l="0" t="0" r="0" b="0"/>
+          <a:pathLst>
+            <a:path>
+              <a:moveTo>
+                <a:pt x="1535297" y="0"/>
+              </a:moveTo>
+              <a:lnTo>
+                <a:pt x="1535297" y="558239"/>
+              </a:lnTo>
+              <a:lnTo>
+                <a:pt x="0" y="558239"/>
+              </a:lnTo>
+              <a:lnTo>
+                <a:pt x="0" y="800206"/>
+              </a:lnTo>
+            </a:path>
+          </a:pathLst>
+        </a:custGeom>
+        <a:noFill/>
+        <a:ln w="25400" cap="flat" cmpd="sng" algn="ctr">
+          <a:solidFill>
+            <a:schemeClr val="accent1">
+              <a:shade val="60000"/>
+              <a:hueOff val="0"/>
+              <a:satOff val="0"/>
+              <a:lumOff val="0"/>
+              <a:alphaOff val="0"/>
+            </a:schemeClr>
+          </a:solidFill>
+          <a:prstDash val="solid"/>
+        </a:ln>
+        <a:effectLst/>
+        <a:sp3d z="-40000" prstMaterial="matte"/>
+      </dsp:spPr>
+      <dsp:style>
+        <a:lnRef idx="2">
+          <a:scrgbClr r="0" g="0" b="0"/>
+        </a:lnRef>
+        <a:fillRef idx="0">
+          <a:scrgbClr r="0" g="0" b="0"/>
+        </a:fillRef>
+        <a:effectRef idx="0">
+          <a:scrgbClr r="0" g="0" b="0"/>
+        </a:effectRef>
+        <a:fontRef idx="minor"/>
+      </dsp:style>
+    </dsp:sp>
+    <dsp:sp modelId="{53C24587-0A2B-4FE3-9D3F-3944C820D5B6}">
+      <dsp:nvSpPr>
+        <dsp:cNvPr id="0" name=""/>
+        <dsp:cNvSpPr/>
+      </dsp:nvSpPr>
+      <dsp:spPr>
+        <a:xfrm>
+          <a:off x="1919577" y="308493"/>
+          <a:ext cx="1843398" cy="770906"/>
+        </a:xfrm>
+        <a:prstGeom prst="roundRect">
+          <a:avLst>
+            <a:gd name="adj" fmla="val 10000"/>
+          </a:avLst>
+        </a:prstGeom>
+        <a:solidFill>
+          <a:schemeClr val="accent1">
+            <a:hueOff val="0"/>
+            <a:satOff val="0"/>
+            <a:lumOff val="0"/>
+            <a:alphaOff val="0"/>
+          </a:schemeClr>
+        </a:solidFill>
+        <a:ln>
+          <a:noFill/>
+        </a:ln>
+        <a:effectLst/>
+        <a:scene3d>
+          <a:camera prst="orthographicFront"/>
+          <a:lightRig rig="chilly" dir="t"/>
+        </a:scene3d>
+        <a:sp3d prstMaterial="translucentPowder">
+          <a:bevelT w="127000" h="25400" prst="softRound"/>
+        </a:sp3d>
+      </dsp:spPr>
+      <dsp:style>
+        <a:lnRef idx="0">
+          <a:scrgbClr r="0" g="0" b="0"/>
+        </a:lnRef>
+        <a:fillRef idx="1">
+          <a:scrgbClr r="0" g="0" b="0"/>
+        </a:fillRef>
+        <a:effectRef idx="0">
+          <a:scrgbClr r="0" g="0" b="0"/>
+        </a:effectRef>
+        <a:fontRef idx="minor">
+          <a:schemeClr val="lt1"/>
+        </a:fontRef>
+      </dsp:style>
+    </dsp:sp>
+    <dsp:sp modelId="{633A4F81-F993-47EB-820A-B68DB3A5390E}">
+      <dsp:nvSpPr>
+        <dsp:cNvPr id="0" name=""/>
+        <dsp:cNvSpPr/>
+      </dsp:nvSpPr>
+      <dsp:spPr>
+        <a:xfrm>
+          <a:off x="2209792" y="584197"/>
+          <a:ext cx="1843398" cy="770906"/>
+        </a:xfrm>
+        <a:prstGeom prst="roundRect">
+          <a:avLst>
+            <a:gd name="adj" fmla="val 10000"/>
+          </a:avLst>
+        </a:prstGeom>
+        <a:solidFill>
+          <a:schemeClr val="lt1">
+            <a:alpha val="90000"/>
+            <a:hueOff val="0"/>
+            <a:satOff val="0"/>
+            <a:lumOff val="0"/>
+            <a:alphaOff val="0"/>
+          </a:schemeClr>
+        </a:solidFill>
+        <a:ln w="9525" cap="flat" cmpd="sng" algn="ctr">
+          <a:solidFill>
+            <a:schemeClr val="accent1">
+              <a:hueOff val="0"/>
+              <a:satOff val="0"/>
+              <a:lumOff val="0"/>
+              <a:alphaOff val="0"/>
+            </a:schemeClr>
+          </a:solidFill>
+          <a:prstDash val="solid"/>
+        </a:ln>
+        <a:effectLst/>
+        <a:scene3d>
+          <a:camera prst="orthographicFront"/>
+          <a:lightRig rig="chilly" dir="t"/>
+        </a:scene3d>
+        <a:sp3d z="12700" extrusionH="1700" prstMaterial="dkEdge">
+          <a:bevelT w="25400" h="6350" prst="softRound"/>
+          <a:bevelB w="0" h="0" prst="convex"/>
+        </a:sp3d>
+      </dsp:spPr>
+      <dsp:style>
+        <a:lnRef idx="1">
+          <a:scrgbClr r="0" g="0" b="0"/>
+        </a:lnRef>
+        <a:fillRef idx="1">
+          <a:scrgbClr r="0" g="0" b="0"/>
+        </a:fillRef>
+        <a:effectRef idx="0">
+          <a:scrgbClr r="0" g="0" b="0"/>
+        </a:effectRef>
+        <a:fontRef idx="minor"/>
+      </dsp:style>
+      <dsp:txBody>
+        <a:bodyPr spcFirstLastPara="0" vert="horz" wrap="square" lIns="60960" tIns="60960" rIns="60960" bIns="60960" numCol="1" spcCol="1270" anchor="ctr" anchorCtr="0">
+          <a:noAutofit/>
+        </a:bodyPr>
+        <a:lstStyle/>
+        <a:p>
+          <a:pPr lvl="0" algn="ctr" defTabSz="711200">
+            <a:lnSpc>
+              <a:spcPct val="90000"/>
+            </a:lnSpc>
+            <a:spcBef>
+              <a:spcPct val="0"/>
+            </a:spcBef>
+            <a:spcAft>
+              <a:spcPct val="35000"/>
+            </a:spcAft>
+          </a:pPr>
+          <a:r>
+            <a:rPr lang="en-US" sz="1600" b="1" kern="1200" dirty="0" smtClean="0"/>
+            <a:t>Shared resources</a:t>
+          </a:r>
+          <a:endParaRPr lang="en-US" sz="1600" b="1" kern="1200" dirty="0"/>
+        </a:p>
+      </dsp:txBody>
+      <dsp:txXfrm>
+        <a:off x="2232371" y="606776"/>
+        <a:ext cx="1798240" cy="725748"/>
+      </dsp:txXfrm>
+    </dsp:sp>
+    <dsp:sp modelId="{6BAED831-1434-4AE7-8DB7-037BBAC56C31}">
+      <dsp:nvSpPr>
+        <dsp:cNvPr id="0" name=""/>
+        <dsp:cNvSpPr/>
+      </dsp:nvSpPr>
+      <dsp:spPr>
+        <a:xfrm>
+          <a:off x="12" y="1879606"/>
+          <a:ext cx="2611933" cy="1658577"/>
+        </a:xfrm>
+        <a:prstGeom prst="roundRect">
+          <a:avLst>
+            <a:gd name="adj" fmla="val 10000"/>
+          </a:avLst>
+        </a:prstGeom>
+        <a:solidFill>
+          <a:schemeClr val="accent1">
+            <a:hueOff val="0"/>
+            <a:satOff val="0"/>
+            <a:lumOff val="0"/>
+            <a:alphaOff val="0"/>
+          </a:schemeClr>
+        </a:solidFill>
+        <a:ln>
+          <a:noFill/>
+        </a:ln>
+        <a:effectLst/>
+        <a:scene3d>
+          <a:camera prst="orthographicFront"/>
+          <a:lightRig rig="chilly" dir="t"/>
+        </a:scene3d>
+        <a:sp3d prstMaterial="translucentPowder">
+          <a:bevelT w="127000" h="25400" prst="softRound"/>
+        </a:sp3d>
+      </dsp:spPr>
+      <dsp:style>
+        <a:lnRef idx="0">
+          <a:scrgbClr r="0" g="0" b="0"/>
+        </a:lnRef>
+        <a:fillRef idx="1">
+          <a:scrgbClr r="0" g="0" b="0"/>
+        </a:fillRef>
+        <a:effectRef idx="0">
+          <a:scrgbClr r="0" g="0" b="0"/>
+        </a:effectRef>
+        <a:fontRef idx="minor">
+          <a:schemeClr val="lt1"/>
+        </a:fontRef>
+      </dsp:style>
+    </dsp:sp>
+    <dsp:sp modelId="{2CA332BF-C7D5-44C4-86AB-C5F8609888C3}">
+      <dsp:nvSpPr>
+        <dsp:cNvPr id="0" name=""/>
+        <dsp:cNvSpPr/>
+      </dsp:nvSpPr>
+      <dsp:spPr>
+        <a:xfrm>
+          <a:off x="290227" y="2155310"/>
+          <a:ext cx="2611933" cy="1658577"/>
+        </a:xfrm>
+        <a:prstGeom prst="roundRect">
+          <a:avLst>
+            <a:gd name="adj" fmla="val 10000"/>
+          </a:avLst>
+        </a:prstGeom>
+        <a:solidFill>
+          <a:schemeClr val="lt1">
+            <a:alpha val="90000"/>
+            <a:hueOff val="0"/>
+            <a:satOff val="0"/>
+            <a:lumOff val="0"/>
+            <a:alphaOff val="0"/>
+          </a:schemeClr>
+        </a:solidFill>
+        <a:ln w="9525" cap="flat" cmpd="sng" algn="ctr">
+          <a:solidFill>
+            <a:schemeClr val="accent1">
+              <a:hueOff val="0"/>
+              <a:satOff val="0"/>
+              <a:lumOff val="0"/>
+              <a:alphaOff val="0"/>
+            </a:schemeClr>
+          </a:solidFill>
+          <a:prstDash val="solid"/>
+        </a:ln>
+        <a:effectLst/>
+        <a:scene3d>
+          <a:camera prst="orthographicFront"/>
+          <a:lightRig rig="chilly" dir="t"/>
+        </a:scene3d>
+        <a:sp3d z="12700" extrusionH="1700" prstMaterial="dkEdge">
+          <a:bevelT w="25400" h="6350" prst="softRound"/>
+          <a:bevelB w="0" h="0" prst="convex"/>
+        </a:sp3d>
+      </dsp:spPr>
+      <dsp:style>
+        <a:lnRef idx="1">
+          <a:scrgbClr r="0" g="0" b="0"/>
+        </a:lnRef>
+        <a:fillRef idx="1">
+          <a:scrgbClr r="0" g="0" b="0"/>
+        </a:fillRef>
+        <a:effectRef idx="0">
+          <a:scrgbClr r="0" g="0" b="0"/>
+        </a:effectRef>
+        <a:fontRef idx="minor"/>
+      </dsp:style>
+      <dsp:txBody>
+        <a:bodyPr spcFirstLastPara="0" vert="horz" wrap="square" lIns="60960" tIns="60960" rIns="60960" bIns="60960" numCol="1" spcCol="1270" anchor="ctr" anchorCtr="0">
+          <a:noAutofit/>
+        </a:bodyPr>
+        <a:lstStyle/>
+        <a:p>
+          <a:pPr lvl="0" algn="ctr" defTabSz="711200">
+            <a:lnSpc>
+              <a:spcPct val="90000"/>
+            </a:lnSpc>
+            <a:spcBef>
+              <a:spcPct val="0"/>
+            </a:spcBef>
+            <a:spcAft>
+              <a:spcPct val="35000"/>
+            </a:spcAft>
+          </a:pPr>
+          <a:r>
+            <a:rPr lang="en-US" sz="1600" b="1" kern="1200" dirty="0" smtClean="0"/>
+            <a:t>Physical Resources</a:t>
+          </a:r>
+        </a:p>
+        <a:p>
+          <a:pPr lvl="0" algn="ctr" defTabSz="711200">
+            <a:lnSpc>
+              <a:spcPct val="90000"/>
+            </a:lnSpc>
+            <a:spcBef>
+              <a:spcPct val="0"/>
+            </a:spcBef>
+            <a:spcAft>
+              <a:spcPct val="35000"/>
+            </a:spcAft>
+          </a:pPr>
+          <a:r>
+            <a:rPr lang="en-US" sz="900" kern="1200" dirty="0" smtClean="0"/>
+            <a:t>- resources which can be shared with some dependence on their location </a:t>
+          </a:r>
+        </a:p>
+        <a:p>
+          <a:pPr lvl="0" algn="l" defTabSz="711200">
+            <a:lnSpc>
+              <a:spcPct val="90000"/>
+            </a:lnSpc>
+            <a:spcBef>
+              <a:spcPct val="0"/>
+            </a:spcBef>
+            <a:spcAft>
+              <a:spcPct val="35000"/>
+            </a:spcAft>
+          </a:pPr>
+          <a:endParaRPr lang="en-US" sz="900" kern="1200" dirty="0" smtClean="0"/>
+        </a:p>
+        <a:p>
+          <a:pPr lvl="0" algn="l" defTabSz="711200">
+            <a:lnSpc>
+              <a:spcPct val="90000"/>
+            </a:lnSpc>
+            <a:spcBef>
+              <a:spcPct val="0"/>
+            </a:spcBef>
+            <a:spcAft>
+              <a:spcPct val="35000"/>
+            </a:spcAft>
+          </a:pPr>
+          <a:r>
+            <a:rPr lang="en-US" sz="900" kern="1200" dirty="0" smtClean="0"/>
+            <a:t>Computation power</a:t>
+          </a:r>
+        </a:p>
+        <a:p>
+          <a:pPr lvl="0" algn="l" defTabSz="711200">
+            <a:lnSpc>
+              <a:spcPct val="90000"/>
+            </a:lnSpc>
+            <a:spcBef>
+              <a:spcPct val="0"/>
+            </a:spcBef>
+            <a:spcAft>
+              <a:spcPct val="35000"/>
+            </a:spcAft>
+          </a:pPr>
+          <a:r>
+            <a:rPr lang="en-US" sz="900" kern="1200" dirty="0" smtClean="0"/>
+            <a:t>Storage devices</a:t>
+          </a:r>
+        </a:p>
+        <a:p>
+          <a:pPr lvl="0" algn="l" defTabSz="711200">
+            <a:lnSpc>
+              <a:spcPct val="90000"/>
+            </a:lnSpc>
+            <a:spcBef>
+              <a:spcPct val="0"/>
+            </a:spcBef>
+            <a:spcAft>
+              <a:spcPct val="35000"/>
+            </a:spcAft>
+          </a:pPr>
+          <a:r>
+            <a:rPr lang="en-US" sz="900" kern="1200" dirty="0" smtClean="0"/>
+            <a:t>Communication capacity</a:t>
+          </a:r>
+        </a:p>
+        <a:p>
+          <a:pPr lvl="0" algn="ctr" defTabSz="711200">
+            <a:lnSpc>
+              <a:spcPct val="90000"/>
+            </a:lnSpc>
+            <a:spcBef>
+              <a:spcPct val="0"/>
+            </a:spcBef>
+            <a:spcAft>
+              <a:spcPct val="35000"/>
+            </a:spcAft>
+          </a:pPr>
+          <a:endParaRPr lang="en-US" sz="900" kern="1200" dirty="0"/>
+        </a:p>
+      </dsp:txBody>
+      <dsp:txXfrm>
+        <a:off x="338805" y="2203888"/>
+        <a:ext cx="2514777" cy="1561421"/>
+      </dsp:txXfrm>
+    </dsp:sp>
+    <dsp:sp modelId="{54ED80A4-9519-416E-8692-A675E58D6A01}">
+      <dsp:nvSpPr>
+        <dsp:cNvPr id="0" name=""/>
+        <dsp:cNvSpPr/>
+      </dsp:nvSpPr>
+      <dsp:spPr>
+        <a:xfrm>
+          <a:off x="3193851" y="1879606"/>
+          <a:ext cx="2611933" cy="1658577"/>
+        </a:xfrm>
+        <a:prstGeom prst="roundRect">
+          <a:avLst>
+            <a:gd name="adj" fmla="val 10000"/>
+          </a:avLst>
+        </a:prstGeom>
+        <a:solidFill>
+          <a:schemeClr val="accent1">
+            <a:hueOff val="0"/>
+            <a:satOff val="0"/>
+            <a:lumOff val="0"/>
+            <a:alphaOff val="0"/>
+          </a:schemeClr>
+        </a:solidFill>
+        <a:ln>
+          <a:noFill/>
+        </a:ln>
+        <a:effectLst/>
+        <a:scene3d>
+          <a:camera prst="orthographicFront"/>
+          <a:lightRig rig="chilly" dir="t"/>
+        </a:scene3d>
+        <a:sp3d prstMaterial="translucentPowder">
+          <a:bevelT w="127000" h="25400" prst="softRound"/>
+        </a:sp3d>
+      </dsp:spPr>
+      <dsp:style>
+        <a:lnRef idx="0">
+          <a:scrgbClr r="0" g="0" b="0"/>
+        </a:lnRef>
+        <a:fillRef idx="1">
+          <a:scrgbClr r="0" g="0" b="0"/>
+        </a:fillRef>
+        <a:effectRef idx="0">
+          <a:scrgbClr r="0" g="0" b="0"/>
+        </a:effectRef>
+        <a:fontRef idx="minor">
+          <a:schemeClr val="lt1"/>
+        </a:fontRef>
+      </dsp:style>
+    </dsp:sp>
+    <dsp:sp modelId="{62F573A8-C98B-4300-903C-ACC41DE49811}">
+      <dsp:nvSpPr>
+        <dsp:cNvPr id="0" name=""/>
+        <dsp:cNvSpPr/>
+      </dsp:nvSpPr>
+      <dsp:spPr>
+        <a:xfrm>
+          <a:off x="3484066" y="2155310"/>
+          <a:ext cx="2611933" cy="1658577"/>
+        </a:xfrm>
+        <a:prstGeom prst="roundRect">
+          <a:avLst>
+            <a:gd name="adj" fmla="val 10000"/>
+          </a:avLst>
+        </a:prstGeom>
+        <a:solidFill>
+          <a:schemeClr val="lt1">
+            <a:alpha val="90000"/>
+            <a:hueOff val="0"/>
+            <a:satOff val="0"/>
+            <a:lumOff val="0"/>
+            <a:alphaOff val="0"/>
+          </a:schemeClr>
+        </a:solidFill>
+        <a:ln w="9525" cap="flat" cmpd="sng" algn="ctr">
+          <a:solidFill>
+            <a:schemeClr val="accent1">
+              <a:hueOff val="0"/>
+              <a:satOff val="0"/>
+              <a:lumOff val="0"/>
+              <a:alphaOff val="0"/>
+            </a:schemeClr>
+          </a:solidFill>
+          <a:prstDash val="solid"/>
+        </a:ln>
+        <a:effectLst/>
+        <a:scene3d>
+          <a:camera prst="orthographicFront"/>
+          <a:lightRig rig="chilly" dir="t"/>
+        </a:scene3d>
+        <a:sp3d z="12700" extrusionH="1700" prstMaterial="dkEdge">
+          <a:bevelT w="25400" h="6350" prst="softRound"/>
+          <a:bevelB w="0" h="0" prst="convex"/>
+        </a:sp3d>
+      </dsp:spPr>
+      <dsp:style>
+        <a:lnRef idx="1">
+          <a:scrgbClr r="0" g="0" b="0"/>
+        </a:lnRef>
+        <a:fillRef idx="1">
+          <a:scrgbClr r="0" g="0" b="0"/>
+        </a:fillRef>
+        <a:effectRef idx="0">
+          <a:scrgbClr r="0" g="0" b="0"/>
+        </a:effectRef>
+        <a:fontRef idx="minor"/>
+      </dsp:style>
+      <dsp:txBody>
+        <a:bodyPr spcFirstLastPara="0" vert="horz" wrap="square" lIns="60960" tIns="60960" rIns="60960" bIns="60960" numCol="1" spcCol="1270" anchor="ctr" anchorCtr="0">
+          <a:noAutofit/>
+        </a:bodyPr>
+        <a:lstStyle/>
+        <a:p>
+          <a:pPr lvl="0" algn="ctr" defTabSz="711200">
+            <a:lnSpc>
+              <a:spcPct val="90000"/>
+            </a:lnSpc>
+            <a:spcBef>
+              <a:spcPct val="0"/>
+            </a:spcBef>
+            <a:spcAft>
+              <a:spcPct val="35000"/>
+            </a:spcAft>
+          </a:pPr>
+          <a:r>
+            <a:rPr lang="en-US" sz="1600" b="1" kern="1200" dirty="0" smtClean="0"/>
+            <a:t>Virtual Resources</a:t>
+          </a:r>
+        </a:p>
+        <a:p>
+          <a:pPr lvl="0" algn="ctr" defTabSz="711200">
+            <a:lnSpc>
+              <a:spcPct val="90000"/>
+            </a:lnSpc>
+            <a:spcBef>
+              <a:spcPct val="0"/>
+            </a:spcBef>
+            <a:spcAft>
+              <a:spcPct val="35000"/>
+            </a:spcAft>
+          </a:pPr>
+          <a:r>
+            <a:rPr lang="en-US" sz="900" kern="1200" dirty="0" smtClean="0"/>
+            <a:t>-resources which can be shared </a:t>
+          </a:r>
+          <a:r>
+            <a:rPr lang="en-US" sz="900" kern="1200" dirty="0" smtClean="0"/>
+            <a:t>independent of their </a:t>
+          </a:r>
+          <a:r>
+            <a:rPr lang="en-US" sz="900" kern="1200" dirty="0" smtClean="0"/>
+            <a:t>physical location</a:t>
+          </a:r>
+        </a:p>
+        <a:p>
+          <a:pPr lvl="0" algn="ctr" defTabSz="711200">
+            <a:lnSpc>
+              <a:spcPct val="90000"/>
+            </a:lnSpc>
+            <a:spcBef>
+              <a:spcPct val="0"/>
+            </a:spcBef>
+            <a:spcAft>
+              <a:spcPct val="35000"/>
+            </a:spcAft>
+          </a:pPr>
+          <a:r>
+            <a:rPr lang="en-US" sz="900" kern="1200" dirty="0" smtClean="0"/>
+            <a:t> </a:t>
+          </a:r>
+        </a:p>
+        <a:p>
+          <a:pPr lvl="0" algn="l" defTabSz="711200">
+            <a:lnSpc>
+              <a:spcPct val="90000"/>
+            </a:lnSpc>
+            <a:spcBef>
+              <a:spcPct val="0"/>
+            </a:spcBef>
+            <a:spcAft>
+              <a:spcPct val="35000"/>
+            </a:spcAft>
+          </a:pPr>
+          <a:r>
+            <a:rPr lang="en-US" sz="900" kern="1200" dirty="0" smtClean="0"/>
+            <a:t>Operating systems</a:t>
+          </a:r>
+        </a:p>
+        <a:p>
+          <a:pPr lvl="0" algn="l" defTabSz="711200">
+            <a:lnSpc>
+              <a:spcPct val="90000"/>
+            </a:lnSpc>
+            <a:spcBef>
+              <a:spcPct val="0"/>
+            </a:spcBef>
+            <a:spcAft>
+              <a:spcPct val="35000"/>
+            </a:spcAft>
+          </a:pPr>
+          <a:r>
+            <a:rPr lang="en-US" sz="900" kern="1200" dirty="0" smtClean="0"/>
+            <a:t>Software and licenses</a:t>
+          </a:r>
+        </a:p>
+        <a:p>
+          <a:pPr lvl="0" algn="l" defTabSz="711200">
+            <a:lnSpc>
+              <a:spcPct val="90000"/>
+            </a:lnSpc>
+            <a:spcBef>
+              <a:spcPct val="0"/>
+            </a:spcBef>
+            <a:spcAft>
+              <a:spcPct val="35000"/>
+            </a:spcAft>
+          </a:pPr>
+          <a:r>
+            <a:rPr lang="en-US" sz="900" kern="1200" dirty="0" smtClean="0"/>
+            <a:t>Tasks and applications </a:t>
+          </a:r>
+        </a:p>
+        <a:p>
+          <a:pPr lvl="0" algn="l" defTabSz="711200">
+            <a:lnSpc>
+              <a:spcPct val="90000"/>
+            </a:lnSpc>
+            <a:spcBef>
+              <a:spcPct val="0"/>
+            </a:spcBef>
+            <a:spcAft>
+              <a:spcPct val="35000"/>
+            </a:spcAft>
+          </a:pPr>
+          <a:r>
+            <a:rPr lang="en-US" sz="900" kern="1200" dirty="0" smtClean="0"/>
+            <a:t>Services</a:t>
+          </a:r>
+          <a:endParaRPr lang="en-US" sz="900" kern="1200" dirty="0"/>
+        </a:p>
+      </dsp:txBody>
+      <dsp:txXfrm>
+        <a:off x="3532644" y="2203888"/>
+        <a:ext cx="2514777" cy="1561421"/>
+      </dsp:txXfrm>
+    </dsp:sp>
+  </dsp:spTree>
+</dsp:drawing>
+</file>
+
 <file path=ppt/diagrams/layout1.xml><?xml version="1.0" encoding="utf-8"?>
 <dgm:layoutDef xmlns:dgm="http://schemas.openxmlformats.org/drawingml/2006/diagram" xmlns:a="http://schemas.openxmlformats.org/drawingml/2006/main" uniqueId="urn:microsoft.com/office/officeart/2005/8/layout/chevron1">
   <dgm:title val=""/>
@@ -5907,6 +7793,569 @@
 </dgm:layoutDef>
 </file>
 
+<file path=ppt/diagrams/layout4.xml><?xml version="1.0" encoding="utf-8"?>
+<dgm:layoutDef xmlns:dgm="http://schemas.openxmlformats.org/drawingml/2006/diagram" xmlns:a="http://schemas.openxmlformats.org/drawingml/2006/main" uniqueId="urn:microsoft.com/office/officeart/2005/8/layout/hierarchy1">
+  <dgm:title val=""/>
+  <dgm:desc val=""/>
+  <dgm:catLst>
+    <dgm:cat type="hierarchy" pri="2000"/>
+  </dgm:catLst>
+  <dgm:sampData>
+    <dgm:dataModel>
+      <dgm:ptLst>
+        <dgm:pt modelId="0" type="doc"/>
+        <dgm:pt modelId="1">
+          <dgm:prSet phldr="1"/>
+        </dgm:pt>
+        <dgm:pt modelId="2">
+          <dgm:prSet phldr="1"/>
+        </dgm:pt>
+        <dgm:pt modelId="21">
+          <dgm:prSet phldr="1"/>
+        </dgm:pt>
+        <dgm:pt modelId="22">
+          <dgm:prSet phldr="1"/>
+        </dgm:pt>
+        <dgm:pt modelId="3">
+          <dgm:prSet phldr="1"/>
+        </dgm:pt>
+        <dgm:pt modelId="31">
+          <dgm:prSet phldr="1"/>
+        </dgm:pt>
+      </dgm:ptLst>
+      <dgm:cxnLst>
+        <dgm:cxn modelId="4" srcId="0" destId="1" srcOrd="0" destOrd="0"/>
+        <dgm:cxn modelId="5" srcId="1" destId="2" srcOrd="0" destOrd="0"/>
+        <dgm:cxn modelId="6" srcId="1" destId="3" srcOrd="1" destOrd="0"/>
+        <dgm:cxn modelId="23" srcId="2" destId="21" srcOrd="0" destOrd="0"/>
+        <dgm:cxn modelId="24" srcId="2" destId="22" srcOrd="1" destOrd="0"/>
+        <dgm:cxn modelId="33" srcId="3" destId="31" srcOrd="0" destOrd="0"/>
+      </dgm:cxnLst>
+      <dgm:bg/>
+      <dgm:whole/>
+    </dgm:dataModel>
+  </dgm:sampData>
+  <dgm:styleData>
+    <dgm:dataModel>
+      <dgm:ptLst>
+        <dgm:pt modelId="0" type="doc"/>
+        <dgm:pt modelId="1"/>
+        <dgm:pt modelId="11"/>
+        <dgm:pt modelId="12"/>
+      </dgm:ptLst>
+      <dgm:cxnLst>
+        <dgm:cxn modelId="2" srcId="0" destId="1" srcOrd="0" destOrd="0"/>
+        <dgm:cxn modelId="13" srcId="1" destId="11" srcOrd="0" destOrd="0"/>
+        <dgm:cxn modelId="14" srcId="1" destId="12" srcOrd="1" destOrd="0"/>
+      </dgm:cxnLst>
+      <dgm:bg/>
+      <dgm:whole/>
+    </dgm:dataModel>
+  </dgm:styleData>
+  <dgm:clrData>
+    <dgm:dataModel>
+      <dgm:ptLst>
+        <dgm:pt modelId="0" type="doc"/>
+        <dgm:pt modelId="1"/>
+        <dgm:pt modelId="2"/>
+        <dgm:pt modelId="21"/>
+        <dgm:pt modelId="211"/>
+        <dgm:pt modelId="3"/>
+        <dgm:pt modelId="31"/>
+        <dgm:pt modelId="311"/>
+      </dgm:ptLst>
+      <dgm:cxnLst>
+        <dgm:cxn modelId="4" srcId="0" destId="1" srcOrd="0" destOrd="0"/>
+        <dgm:cxn modelId="5" srcId="1" destId="2" srcOrd="0" destOrd="0"/>
+        <dgm:cxn modelId="6" srcId="1" destId="3" srcOrd="1" destOrd="0"/>
+        <dgm:cxn modelId="23" srcId="2" destId="21" srcOrd="0" destOrd="0"/>
+        <dgm:cxn modelId="24" srcId="21" destId="211" srcOrd="0" destOrd="0"/>
+        <dgm:cxn modelId="33" srcId="3" destId="31" srcOrd="0" destOrd="0"/>
+        <dgm:cxn modelId="34" srcId="31" destId="311" srcOrd="0" destOrd="0"/>
+      </dgm:cxnLst>
+      <dgm:bg/>
+      <dgm:whole/>
+    </dgm:dataModel>
+  </dgm:clrData>
+  <dgm:layoutNode name="hierChild1">
+    <dgm:varLst>
+      <dgm:chPref val="1"/>
+      <dgm:dir/>
+      <dgm:animOne val="branch"/>
+      <dgm:animLvl val="lvl"/>
+      <dgm:resizeHandles/>
+    </dgm:varLst>
+    <dgm:choose name="Name0">
+      <dgm:if name="Name1" func="var" arg="dir" op="equ" val="norm">
+        <dgm:alg type="hierChild">
+          <dgm:param type="linDir" val="fromL"/>
+        </dgm:alg>
+      </dgm:if>
+      <dgm:else name="Name2">
+        <dgm:alg type="hierChild">
+          <dgm:param type="linDir" val="fromR"/>
+        </dgm:alg>
+      </dgm:else>
+    </dgm:choose>
+    <dgm:shape xmlns:r="http://schemas.openxmlformats.org/officeDocument/2006/relationships" r:blip="">
+      <dgm:adjLst/>
+    </dgm:shape>
+    <dgm:presOf/>
+    <dgm:constrLst>
+      <dgm:constr type="primFontSz" for="des" ptType="node" op="equ" val="65"/>
+      <dgm:constr type="w" for="des" forName="composite" refType="w"/>
+      <dgm:constr type="h" for="des" forName="composite" refType="w" refFor="des" refForName="composite" fact="0.667"/>
+      <dgm:constr type="w" for="des" forName="composite2" refType="w" refFor="des" refForName="composite"/>
+      <dgm:constr type="h" for="des" forName="composite2" refType="h" refFor="des" refForName="composite"/>
+      <dgm:constr type="w" for="des" forName="composite3" refType="w" refFor="des" refForName="composite"/>
+      <dgm:constr type="h" for="des" forName="composite3" refType="h" refFor="des" refForName="composite"/>
+      <dgm:constr type="w" for="des" forName="composite4" refType="w" refFor="des" refForName="composite"/>
+      <dgm:constr type="h" for="des" forName="composite4" refType="h" refFor="des" refForName="composite"/>
+      <dgm:constr type="w" for="des" forName="composite5" refType="w" refFor="des" refForName="composite"/>
+      <dgm:constr type="h" for="des" forName="composite5" refType="h" refFor="des" refForName="composite"/>
+      <dgm:constr type="sibSp" refType="w" refFor="des" refForName="composite" fact="0.1"/>
+      <dgm:constr type="sibSp" for="des" forName="hierChild2" refType="sibSp"/>
+      <dgm:constr type="sibSp" for="des" forName="hierChild3" refType="sibSp"/>
+      <dgm:constr type="sibSp" for="des" forName="hierChild4" refType="sibSp"/>
+      <dgm:constr type="sibSp" for="des" forName="hierChild5" refType="sibSp"/>
+      <dgm:constr type="sibSp" for="des" forName="hierChild6" refType="sibSp"/>
+      <dgm:constr type="sp" for="des" forName="hierRoot1" refType="h" refFor="des" refForName="composite" fact="0.25"/>
+      <dgm:constr type="sp" for="des" forName="hierRoot2" refType="sp" refFor="des" refForName="hierRoot1"/>
+      <dgm:constr type="sp" for="des" forName="hierRoot3" refType="sp" refFor="des" refForName="hierRoot1"/>
+      <dgm:constr type="sp" for="des" forName="hierRoot4" refType="sp" refFor="des" refForName="hierRoot1"/>
+      <dgm:constr type="sp" for="des" forName="hierRoot5" refType="sp" refFor="des" refForName="hierRoot1"/>
+    </dgm:constrLst>
+    <dgm:ruleLst/>
+    <dgm:forEach name="Name3" axis="ch">
+      <dgm:forEach name="Name4" axis="self" ptType="node">
+        <dgm:layoutNode name="hierRoot1">
+          <dgm:alg type="hierRoot"/>
+          <dgm:shape xmlns:r="http://schemas.openxmlformats.org/officeDocument/2006/relationships" r:blip="">
+            <dgm:adjLst/>
+          </dgm:shape>
+          <dgm:presOf/>
+          <dgm:constrLst>
+            <dgm:constr type="bendDist" for="des" ptType="parTrans" refType="sp" fact="0.5"/>
+          </dgm:constrLst>
+          <dgm:ruleLst/>
+          <dgm:layoutNode name="composite">
+            <dgm:alg type="composite"/>
+            <dgm:shape xmlns:r="http://schemas.openxmlformats.org/officeDocument/2006/relationships" r:blip="">
+              <dgm:adjLst/>
+            </dgm:shape>
+            <dgm:presOf/>
+            <dgm:constrLst>
+              <dgm:constr type="w" for="ch" forName="background" refType="w" fact="0.9"/>
+              <dgm:constr type="h" for="ch" forName="background" refType="w" refFor="ch" refForName="background" fact="0.635"/>
+              <dgm:constr type="t" for="ch" forName="background"/>
+              <dgm:constr type="l" for="ch" forName="background"/>
+              <dgm:constr type="w" for="ch" forName="text" refType="w" fact="0.9"/>
+              <dgm:constr type="h" for="ch" forName="text" refType="w" refFor="ch" refForName="text" fact="0.635"/>
+              <dgm:constr type="t" for="ch" forName="text" refType="w" fact="0.095"/>
+              <dgm:constr type="l" for="ch" forName="text" refType="w" fact="0.1"/>
+            </dgm:constrLst>
+            <dgm:ruleLst/>
+            <dgm:layoutNode name="background" styleLbl="node0" moveWith="text">
+              <dgm:alg type="sp"/>
+              <dgm:shape xmlns:r="http://schemas.openxmlformats.org/officeDocument/2006/relationships" type="roundRect" r:blip="">
+                <dgm:adjLst>
+                  <dgm:adj idx="1" val="0.1"/>
+                </dgm:adjLst>
+              </dgm:shape>
+              <dgm:presOf/>
+              <dgm:constrLst/>
+              <dgm:ruleLst/>
+            </dgm:layoutNode>
+            <dgm:layoutNode name="text" styleLbl="fgAcc0">
+              <dgm:varLst>
+                <dgm:chPref val="3"/>
+              </dgm:varLst>
+              <dgm:alg type="tx"/>
+              <dgm:shape xmlns:r="http://schemas.openxmlformats.org/officeDocument/2006/relationships" type="roundRect" r:blip="">
+                <dgm:adjLst>
+                  <dgm:adj idx="1" val="0.1"/>
+                </dgm:adjLst>
+              </dgm:shape>
+              <dgm:presOf axis="self"/>
+              <dgm:constrLst>
+                <dgm:constr type="tMarg" refType="primFontSz" fact="0.3"/>
+                <dgm:constr type="bMarg" refType="primFontSz" fact="0.3"/>
+                <dgm:constr type="lMarg" refType="primFontSz" fact="0.3"/>
+                <dgm:constr type="rMarg" refType="primFontSz" fact="0.3"/>
+              </dgm:constrLst>
+              <dgm:ruleLst>
+                <dgm:rule type="primFontSz" val="5" fact="NaN" max="NaN"/>
+              </dgm:ruleLst>
+            </dgm:layoutNode>
+          </dgm:layoutNode>
+          <dgm:layoutNode name="hierChild2">
+            <dgm:choose name="Name5">
+              <dgm:if name="Name6" func="var" arg="dir" op="equ" val="norm">
+                <dgm:alg type="hierChild">
+                  <dgm:param type="linDir" val="fromL"/>
+                </dgm:alg>
+              </dgm:if>
+              <dgm:else name="Name7">
+                <dgm:alg type="hierChild">
+                  <dgm:param type="linDir" val="fromR"/>
+                </dgm:alg>
+              </dgm:else>
+            </dgm:choose>
+            <dgm:shape xmlns:r="http://schemas.openxmlformats.org/officeDocument/2006/relationships" r:blip="">
+              <dgm:adjLst/>
+            </dgm:shape>
+            <dgm:presOf/>
+            <dgm:constrLst/>
+            <dgm:ruleLst/>
+            <dgm:forEach name="Name8" axis="ch">
+              <dgm:forEach name="Name9" axis="self" ptType="parTrans" cnt="1">
+                <dgm:layoutNode name="Name10">
+                  <dgm:alg type="conn">
+                    <dgm:param type="dim" val="1D"/>
+                    <dgm:param type="endSty" val="noArr"/>
+                    <dgm:param type="connRout" val="bend"/>
+                    <dgm:param type="bendPt" val="end"/>
+                    <dgm:param type="begPts" val="bCtr"/>
+                    <dgm:param type="endPts" val="tCtr"/>
+                    <dgm:param type="srcNode" val="background"/>
+                    <dgm:param type="dstNode" val="background2"/>
+                  </dgm:alg>
+                  <dgm:shape xmlns:r="http://schemas.openxmlformats.org/officeDocument/2006/relationships" type="conn" r:blip="" zOrderOff="-999">
+                    <dgm:adjLst/>
+                  </dgm:shape>
+                  <dgm:presOf axis="self"/>
+                  <dgm:constrLst>
+                    <dgm:constr type="begPad"/>
+                    <dgm:constr type="endPad"/>
+                  </dgm:constrLst>
+                  <dgm:ruleLst/>
+                </dgm:layoutNode>
+              </dgm:forEach>
+              <dgm:forEach name="Name11" axis="self" ptType="node">
+                <dgm:layoutNode name="hierRoot2">
+                  <dgm:alg type="hierRoot"/>
+                  <dgm:shape xmlns:r="http://schemas.openxmlformats.org/officeDocument/2006/relationships" r:blip="">
+                    <dgm:adjLst/>
+                  </dgm:shape>
+                  <dgm:presOf/>
+                  <dgm:constrLst>
+                    <dgm:constr type="bendDist" for="des" ptType="parTrans" refType="sp" fact="0.5"/>
+                  </dgm:constrLst>
+                  <dgm:ruleLst/>
+                  <dgm:layoutNode name="composite2">
+                    <dgm:alg type="composite"/>
+                    <dgm:shape xmlns:r="http://schemas.openxmlformats.org/officeDocument/2006/relationships" r:blip="">
+                      <dgm:adjLst/>
+                    </dgm:shape>
+                    <dgm:presOf/>
+                    <dgm:constrLst>
+                      <dgm:constr type="w" for="ch" forName="background2" refType="w" fact="0.9"/>
+                      <dgm:constr type="h" for="ch" forName="background2" refType="w" refFor="ch" refForName="background2" fact="0.635"/>
+                      <dgm:constr type="t" for="ch" forName="background2"/>
+                      <dgm:constr type="l" for="ch" forName="background2"/>
+                      <dgm:constr type="w" for="ch" forName="text2" refType="w" fact="0.9"/>
+                      <dgm:constr type="h" for="ch" forName="text2" refType="w" refFor="ch" refForName="text2" fact="0.635"/>
+                      <dgm:constr type="t" for="ch" forName="text2" refType="w" fact="0.095"/>
+                      <dgm:constr type="l" for="ch" forName="text2" refType="w" fact="0.1"/>
+                    </dgm:constrLst>
+                    <dgm:ruleLst/>
+                    <dgm:layoutNode name="background2" moveWith="text2">
+                      <dgm:alg type="sp"/>
+                      <dgm:shape xmlns:r="http://schemas.openxmlformats.org/officeDocument/2006/relationships" type="roundRect" r:blip="">
+                        <dgm:adjLst>
+                          <dgm:adj idx="1" val="0.1"/>
+                        </dgm:adjLst>
+                      </dgm:shape>
+                      <dgm:presOf/>
+                      <dgm:constrLst/>
+                      <dgm:ruleLst/>
+                    </dgm:layoutNode>
+                    <dgm:layoutNode name="text2" styleLbl="fgAcc2">
+                      <dgm:varLst>
+                        <dgm:chPref val="3"/>
+                      </dgm:varLst>
+                      <dgm:alg type="tx"/>
+                      <dgm:shape xmlns:r="http://schemas.openxmlformats.org/officeDocument/2006/relationships" type="roundRect" r:blip="">
+                        <dgm:adjLst>
+                          <dgm:adj idx="1" val="0.1"/>
+                        </dgm:adjLst>
+                      </dgm:shape>
+                      <dgm:presOf axis="self"/>
+                      <dgm:constrLst>
+                        <dgm:constr type="tMarg" refType="primFontSz" fact="0.3"/>
+                        <dgm:constr type="bMarg" refType="primFontSz" fact="0.3"/>
+                        <dgm:constr type="lMarg" refType="primFontSz" fact="0.3"/>
+                        <dgm:constr type="rMarg" refType="primFontSz" fact="0.3"/>
+                      </dgm:constrLst>
+                      <dgm:ruleLst>
+                        <dgm:rule type="primFontSz" val="5" fact="NaN" max="NaN"/>
+                      </dgm:ruleLst>
+                    </dgm:layoutNode>
+                  </dgm:layoutNode>
+                  <dgm:layoutNode name="hierChild3">
+                    <dgm:choose name="Name12">
+                      <dgm:if name="Name13" func="var" arg="dir" op="equ" val="norm">
+                        <dgm:alg type="hierChild">
+                          <dgm:param type="linDir" val="fromL"/>
+                        </dgm:alg>
+                      </dgm:if>
+                      <dgm:else name="Name14">
+                        <dgm:alg type="hierChild">
+                          <dgm:param type="linDir" val="fromR"/>
+                        </dgm:alg>
+                      </dgm:else>
+                    </dgm:choose>
+                    <dgm:shape xmlns:r="http://schemas.openxmlformats.org/officeDocument/2006/relationships" r:blip="">
+                      <dgm:adjLst/>
+                    </dgm:shape>
+                    <dgm:presOf/>
+                    <dgm:constrLst/>
+                    <dgm:ruleLst/>
+                    <dgm:forEach name="Name15" axis="ch">
+                      <dgm:forEach name="Name16" axis="self" ptType="parTrans" cnt="1">
+                        <dgm:layoutNode name="Name17">
+                          <dgm:alg type="conn">
+                            <dgm:param type="dim" val="1D"/>
+                            <dgm:param type="endSty" val="noArr"/>
+                            <dgm:param type="connRout" val="bend"/>
+                            <dgm:param type="bendPt" val="end"/>
+                            <dgm:param type="begPts" val="bCtr"/>
+                            <dgm:param type="endPts" val="tCtr"/>
+                            <dgm:param type="srcNode" val="background2"/>
+                            <dgm:param type="dstNode" val="background3"/>
+                          </dgm:alg>
+                          <dgm:shape xmlns:r="http://schemas.openxmlformats.org/officeDocument/2006/relationships" type="conn" r:blip="" zOrderOff="-999">
+                            <dgm:adjLst/>
+                          </dgm:shape>
+                          <dgm:presOf axis="self"/>
+                          <dgm:constrLst>
+                            <dgm:constr type="begPad"/>
+                            <dgm:constr type="endPad"/>
+                          </dgm:constrLst>
+                          <dgm:ruleLst/>
+                        </dgm:layoutNode>
+                      </dgm:forEach>
+                      <dgm:forEach name="Name18" axis="self" ptType="node">
+                        <dgm:layoutNode name="hierRoot3">
+                          <dgm:alg type="hierRoot"/>
+                          <dgm:shape xmlns:r="http://schemas.openxmlformats.org/officeDocument/2006/relationships" r:blip="">
+                            <dgm:adjLst/>
+                          </dgm:shape>
+                          <dgm:presOf/>
+                          <dgm:constrLst>
+                            <dgm:constr type="bendDist" for="des" ptType="parTrans" refType="sp" fact="0.5"/>
+                          </dgm:constrLst>
+                          <dgm:ruleLst/>
+                          <dgm:layoutNode name="composite3">
+                            <dgm:alg type="composite"/>
+                            <dgm:shape xmlns:r="http://schemas.openxmlformats.org/officeDocument/2006/relationships" r:blip="">
+                              <dgm:adjLst/>
+                            </dgm:shape>
+                            <dgm:presOf/>
+                            <dgm:constrLst>
+                              <dgm:constr type="w" for="ch" forName="background3" refType="w" fact="0.9"/>
+                              <dgm:constr type="h" for="ch" forName="background3" refType="w" refFor="ch" refForName="background3" fact="0.635"/>
+                              <dgm:constr type="t" for="ch" forName="background3"/>
+                              <dgm:constr type="l" for="ch" forName="background3"/>
+                              <dgm:constr type="w" for="ch" forName="text3" refType="w" fact="0.9"/>
+                              <dgm:constr type="h" for="ch" forName="text3" refType="w" refFor="ch" refForName="text3" fact="0.635"/>
+                              <dgm:constr type="t" for="ch" forName="text3" refType="w" fact="0.095"/>
+                              <dgm:constr type="l" for="ch" forName="text3" refType="w" fact="0.1"/>
+                            </dgm:constrLst>
+                            <dgm:ruleLst/>
+                            <dgm:layoutNode name="background3" moveWith="text3">
+                              <dgm:alg type="sp"/>
+                              <dgm:shape xmlns:r="http://schemas.openxmlformats.org/officeDocument/2006/relationships" type="roundRect" r:blip="">
+                                <dgm:adjLst>
+                                  <dgm:adj idx="1" val="0.1"/>
+                                </dgm:adjLst>
+                              </dgm:shape>
+                              <dgm:presOf/>
+                              <dgm:constrLst/>
+                              <dgm:ruleLst/>
+                            </dgm:layoutNode>
+                            <dgm:layoutNode name="text3" styleLbl="fgAcc3">
+                              <dgm:varLst>
+                                <dgm:chPref val="3"/>
+                              </dgm:varLst>
+                              <dgm:alg type="tx"/>
+                              <dgm:shape xmlns:r="http://schemas.openxmlformats.org/officeDocument/2006/relationships" type="roundRect" r:blip="">
+                                <dgm:adjLst>
+                                  <dgm:adj idx="1" val="0.1"/>
+                                </dgm:adjLst>
+                              </dgm:shape>
+                              <dgm:presOf axis="self"/>
+                              <dgm:constrLst>
+                                <dgm:constr type="tMarg" refType="primFontSz" fact="0.3"/>
+                                <dgm:constr type="bMarg" refType="primFontSz" fact="0.3"/>
+                                <dgm:constr type="lMarg" refType="primFontSz" fact="0.3"/>
+                                <dgm:constr type="rMarg" refType="primFontSz" fact="0.3"/>
+                              </dgm:constrLst>
+                              <dgm:ruleLst>
+                                <dgm:rule type="primFontSz" val="5" fact="NaN" max="NaN"/>
+                              </dgm:ruleLst>
+                            </dgm:layoutNode>
+                          </dgm:layoutNode>
+                          <dgm:layoutNode name="hierChild4">
+                            <dgm:choose name="Name19">
+                              <dgm:if name="Name20" func="var" arg="dir" op="equ" val="norm">
+                                <dgm:alg type="hierChild">
+                                  <dgm:param type="linDir" val="fromL"/>
+                                </dgm:alg>
+                              </dgm:if>
+                              <dgm:else name="Name21">
+                                <dgm:alg type="hierChild">
+                                  <dgm:param type="linDir" val="fromR"/>
+                                </dgm:alg>
+                              </dgm:else>
+                            </dgm:choose>
+                            <dgm:shape xmlns:r="http://schemas.openxmlformats.org/officeDocument/2006/relationships" r:blip="">
+                              <dgm:adjLst/>
+                            </dgm:shape>
+                            <dgm:presOf/>
+                            <dgm:constrLst/>
+                            <dgm:ruleLst/>
+                            <dgm:forEach name="repeat" axis="ch">
+                              <dgm:forEach name="Name22" axis="self" ptType="parTrans" cnt="1">
+                                <dgm:layoutNode name="Name23">
+                                  <dgm:choose name="Name24">
+                                    <dgm:if name="Name25" axis="self" func="depth" op="lte" val="4">
+                                      <dgm:alg type="conn">
+                                        <dgm:param type="dim" val="1D"/>
+                                        <dgm:param type="endSty" val="noArr"/>
+                                        <dgm:param type="connRout" val="bend"/>
+                                        <dgm:param type="bendPt" val="end"/>
+                                        <dgm:param type="begPts" val="bCtr"/>
+                                        <dgm:param type="endPts" val="tCtr"/>
+                                        <dgm:param type="srcNode" val="background3"/>
+                                        <dgm:param type="dstNode" val="background4"/>
+                                      </dgm:alg>
+                                    </dgm:if>
+                                    <dgm:else name="Name26">
+                                      <dgm:alg type="conn">
+                                        <dgm:param type="dim" val="1D"/>
+                                        <dgm:param type="endSty" val="noArr"/>
+                                        <dgm:param type="connRout" val="bend"/>
+                                        <dgm:param type="bendPt" val="end"/>
+                                        <dgm:param type="begPts" val="bCtr"/>
+                                        <dgm:param type="endPts" val="tCtr"/>
+                                        <dgm:param type="srcNode" val="background4"/>
+                                        <dgm:param type="dstNode" val="background4"/>
+                                      </dgm:alg>
+                                    </dgm:else>
+                                  </dgm:choose>
+                                  <dgm:shape xmlns:r="http://schemas.openxmlformats.org/officeDocument/2006/relationships" type="conn" r:blip="" zOrderOff="-999">
+                                    <dgm:adjLst/>
+                                  </dgm:shape>
+                                  <dgm:presOf axis="self"/>
+                                  <dgm:constrLst>
+                                    <dgm:constr type="begPad"/>
+                                    <dgm:constr type="endPad"/>
+                                  </dgm:constrLst>
+                                  <dgm:ruleLst/>
+                                </dgm:layoutNode>
+                              </dgm:forEach>
+                              <dgm:forEach name="Name27" axis="self" ptType="node">
+                                <dgm:layoutNode name="hierRoot4">
+                                  <dgm:alg type="hierRoot"/>
+                                  <dgm:shape xmlns:r="http://schemas.openxmlformats.org/officeDocument/2006/relationships" r:blip="">
+                                    <dgm:adjLst/>
+                                  </dgm:shape>
+                                  <dgm:presOf/>
+                                  <dgm:constrLst>
+                                    <dgm:constr type="bendDist" for="des" ptType="parTrans" refType="sp" fact="0.5"/>
+                                  </dgm:constrLst>
+                                  <dgm:ruleLst/>
+                                  <dgm:layoutNode name="composite4">
+                                    <dgm:alg type="composite"/>
+                                    <dgm:shape xmlns:r="http://schemas.openxmlformats.org/officeDocument/2006/relationships" r:blip="">
+                                      <dgm:adjLst/>
+                                    </dgm:shape>
+                                    <dgm:presOf/>
+                                    <dgm:constrLst>
+                                      <dgm:constr type="w" for="ch" forName="background4" refType="w" fact="0.9"/>
+                                      <dgm:constr type="h" for="ch" forName="background4" refType="w" refFor="ch" refForName="background4" fact="0.635"/>
+                                      <dgm:constr type="t" for="ch" forName="background4"/>
+                                      <dgm:constr type="l" for="ch" forName="background4"/>
+                                      <dgm:constr type="w" for="ch" forName="text4" refType="w" fact="0.9"/>
+                                      <dgm:constr type="h" for="ch" forName="text4" refType="w" refFor="ch" refForName="text4" fact="0.635"/>
+                                      <dgm:constr type="t" for="ch" forName="text4" refType="w" fact="0.095"/>
+                                      <dgm:constr type="l" for="ch" forName="text4" refType="w" fact="0.1"/>
+                                    </dgm:constrLst>
+                                    <dgm:ruleLst/>
+                                    <dgm:layoutNode name="background4" moveWith="text4">
+                                      <dgm:alg type="sp"/>
+                                      <dgm:shape xmlns:r="http://schemas.openxmlformats.org/officeDocument/2006/relationships" type="roundRect" r:blip="">
+                                        <dgm:adjLst>
+                                          <dgm:adj idx="1" val="0.1"/>
+                                        </dgm:adjLst>
+                                      </dgm:shape>
+                                      <dgm:presOf/>
+                                      <dgm:constrLst/>
+                                      <dgm:ruleLst/>
+                                    </dgm:layoutNode>
+                                    <dgm:layoutNode name="text4" styleLbl="fgAcc4">
+                                      <dgm:varLst>
+                                        <dgm:chPref val="3"/>
+                                      </dgm:varLst>
+                                      <dgm:alg type="tx"/>
+                                      <dgm:shape xmlns:r="http://schemas.openxmlformats.org/officeDocument/2006/relationships" type="roundRect" r:blip="">
+                                        <dgm:adjLst>
+                                          <dgm:adj idx="1" val="0.1"/>
+                                        </dgm:adjLst>
+                                      </dgm:shape>
+                                      <dgm:presOf axis="self"/>
+                                      <dgm:constrLst>
+                                        <dgm:constr type="tMarg" refType="primFontSz" fact="0.3"/>
+                                        <dgm:constr type="bMarg" refType="primFontSz" fact="0.3"/>
+                                        <dgm:constr type="lMarg" refType="primFontSz" fact="0.3"/>
+                                        <dgm:constr type="rMarg" refType="primFontSz" fact="0.3"/>
+                                      </dgm:constrLst>
+                                      <dgm:ruleLst>
+                                        <dgm:rule type="primFontSz" val="5" fact="NaN" max="NaN"/>
+                                      </dgm:ruleLst>
+                                    </dgm:layoutNode>
+                                  </dgm:layoutNode>
+                                  <dgm:layoutNode name="hierChild5">
+                                    <dgm:choose name="Name28">
+                                      <dgm:if name="Name29" func="var" arg="dir" op="equ" val="norm">
+                                        <dgm:alg type="hierChild">
+                                          <dgm:param type="linDir" val="fromL"/>
+                                        </dgm:alg>
+                                      </dgm:if>
+                                      <dgm:else name="Name30">
+                                        <dgm:alg type="hierChild">
+                                          <dgm:param type="linDir" val="fromR"/>
+                                        </dgm:alg>
+                                      </dgm:else>
+                                    </dgm:choose>
+                                    <dgm:shape xmlns:r="http://schemas.openxmlformats.org/officeDocument/2006/relationships" r:blip="">
+                                      <dgm:adjLst/>
+                                    </dgm:shape>
+                                    <dgm:presOf/>
+                                    <dgm:constrLst/>
+                                    <dgm:ruleLst/>
+                                    <dgm:forEach name="Name31" ref="repeat"/>
+                                  </dgm:layoutNode>
+                                </dgm:layoutNode>
+                              </dgm:forEach>
+                            </dgm:forEach>
+                          </dgm:layoutNode>
+                        </dgm:layoutNode>
+                      </dgm:forEach>
+                    </dgm:forEach>
+                  </dgm:layoutNode>
+                </dgm:layoutNode>
+              </dgm:forEach>
+            </dgm:forEach>
+          </dgm:layoutNode>
+        </dgm:layoutNode>
+      </dgm:forEach>
+    </dgm:forEach>
+  </dgm:layoutNode>
+</dgm:layoutDef>
+</file>
+
 <file path=ppt/diagrams/quickStyle1.xml><?xml version="1.0" encoding="utf-8"?>
 <dgm:styleDef xmlns:dgm="http://schemas.openxmlformats.org/drawingml/2006/diagram" xmlns:a="http://schemas.openxmlformats.org/drawingml/2006/main" uniqueId="urn:microsoft.com/office/officeart/2005/8/quickstyle/simple1">
   <dgm:title val=""/>
@@ -8975,6 +11424,1117 @@
     <dgm:txPr/>
     <dgm:style>
       <a:lnRef idx="2">
+        <a:scrgbClr r="0" g="0" b="0"/>
+      </a:lnRef>
+      <a:fillRef idx="1">
+        <a:scrgbClr r="0" g="0" b="0"/>
+      </a:fillRef>
+      <a:effectRef idx="0">
+        <a:scrgbClr r="0" g="0" b="0"/>
+      </a:effectRef>
+      <a:fontRef idx="minor"/>
+    </dgm:style>
+  </dgm:styleLbl>
+  <dgm:styleLbl name="revTx">
+    <dgm:scene3d>
+      <a:camera prst="orthographicFront"/>
+      <a:lightRig rig="threePt" dir="t"/>
+    </dgm:scene3d>
+    <dgm:sp3d/>
+    <dgm:txPr/>
+    <dgm:style>
+      <a:lnRef idx="0">
+        <a:scrgbClr r="0" g="0" b="0"/>
+      </a:lnRef>
+      <a:fillRef idx="0">
+        <a:scrgbClr r="0" g="0" b="0"/>
+      </a:fillRef>
+      <a:effectRef idx="0">
+        <a:scrgbClr r="0" g="0" b="0"/>
+      </a:effectRef>
+      <a:fontRef idx="minor"/>
+    </dgm:style>
+  </dgm:styleLbl>
+</dgm:styleDef>
+</file>
+
+<file path=ppt/diagrams/quickStyle4.xml><?xml version="1.0" encoding="utf-8"?>
+<dgm:styleDef xmlns:dgm="http://schemas.openxmlformats.org/drawingml/2006/diagram" xmlns:a="http://schemas.openxmlformats.org/drawingml/2006/main" uniqueId="urn:microsoft.com/office/officeart/2005/8/quickstyle/3d4">
+  <dgm:title val=""/>
+  <dgm:desc val=""/>
+  <dgm:catLst>
+    <dgm:cat type="3D" pri="11400"/>
+  </dgm:catLst>
+  <dgm:scene3d>
+    <a:camera prst="orthographicFront"/>
+    <a:lightRig rig="threePt" dir="t"/>
+  </dgm:scene3d>
+  <dgm:styleLbl name="node0">
+    <dgm:scene3d>
+      <a:camera prst="orthographicFront"/>
+      <a:lightRig rig="chilly" dir="t"/>
+    </dgm:scene3d>
+    <dgm:sp3d prstMaterial="translucentPowder">
+      <a:bevelT w="127000" h="25400" prst="softRound"/>
+    </dgm:sp3d>
+    <dgm:txPr/>
+    <dgm:style>
+      <a:lnRef idx="0">
+        <a:scrgbClr r="0" g="0" b="0"/>
+      </a:lnRef>
+      <a:fillRef idx="1">
+        <a:scrgbClr r="0" g="0" b="0"/>
+      </a:fillRef>
+      <a:effectRef idx="0">
+        <a:scrgbClr r="0" g="0" b="0"/>
+      </a:effectRef>
+      <a:fontRef idx="minor">
+        <a:schemeClr val="lt1"/>
+      </a:fontRef>
+    </dgm:style>
+  </dgm:styleLbl>
+  <dgm:styleLbl name="lnNode1">
+    <dgm:scene3d>
+      <a:camera prst="orthographicFront"/>
+      <a:lightRig rig="chilly" dir="t"/>
+    </dgm:scene3d>
+    <dgm:sp3d prstMaterial="translucentPowder">
+      <a:bevelT w="127000" h="25400" prst="softRound"/>
+    </dgm:sp3d>
+    <dgm:txPr/>
+    <dgm:style>
+      <a:lnRef idx="0">
+        <a:scrgbClr r="0" g="0" b="0"/>
+      </a:lnRef>
+      <a:fillRef idx="1">
+        <a:scrgbClr r="0" g="0" b="0"/>
+      </a:fillRef>
+      <a:effectRef idx="0">
+        <a:scrgbClr r="0" g="0" b="0"/>
+      </a:effectRef>
+      <a:fontRef idx="minor">
+        <a:schemeClr val="lt1"/>
+      </a:fontRef>
+    </dgm:style>
+  </dgm:styleLbl>
+  <dgm:styleLbl name="vennNode1">
+    <dgm:scene3d>
+      <a:camera prst="orthographicFront"/>
+      <a:lightRig rig="chilly" dir="t"/>
+    </dgm:scene3d>
+    <dgm:sp3d prstMaterial="translucentPowder">
+      <a:bevelT w="127000" h="25400" prst="softRound"/>
+    </dgm:sp3d>
+    <dgm:txPr/>
+    <dgm:style>
+      <a:lnRef idx="0">
+        <a:scrgbClr r="0" g="0" b="0"/>
+      </a:lnRef>
+      <a:fillRef idx="1">
+        <a:scrgbClr r="0" g="0" b="0"/>
+      </a:fillRef>
+      <a:effectRef idx="0">
+        <a:scrgbClr r="0" g="0" b="0"/>
+      </a:effectRef>
+      <a:fontRef idx="minor">
+        <a:schemeClr val="tx1"/>
+      </a:fontRef>
+    </dgm:style>
+  </dgm:styleLbl>
+  <dgm:styleLbl name="alignNode1">
+    <dgm:scene3d>
+      <a:camera prst="orthographicFront"/>
+      <a:lightRig rig="chilly" dir="t"/>
+    </dgm:scene3d>
+    <dgm:sp3d prstMaterial="translucentPowder">
+      <a:bevelT w="127000" h="25400" prst="softRound"/>
+    </dgm:sp3d>
+    <dgm:txPr/>
+    <dgm:style>
+      <a:lnRef idx="1">
+        <a:scrgbClr r="0" g="0" b="0"/>
+      </a:lnRef>
+      <a:fillRef idx="1">
+        <a:scrgbClr r="0" g="0" b="0"/>
+      </a:fillRef>
+      <a:effectRef idx="0">
+        <a:scrgbClr r="0" g="0" b="0"/>
+      </a:effectRef>
+      <a:fontRef idx="minor">
+        <a:schemeClr val="lt1"/>
+      </a:fontRef>
+    </dgm:style>
+  </dgm:styleLbl>
+  <dgm:styleLbl name="node1">
+    <dgm:scene3d>
+      <a:camera prst="orthographicFront"/>
+      <a:lightRig rig="chilly" dir="t"/>
+    </dgm:scene3d>
+    <dgm:sp3d prstMaterial="translucentPowder">
+      <a:bevelT w="127000" h="25400" prst="softRound"/>
+    </dgm:sp3d>
+    <dgm:txPr/>
+    <dgm:style>
+      <a:lnRef idx="0">
+        <a:scrgbClr r="0" g="0" b="0"/>
+      </a:lnRef>
+      <a:fillRef idx="1">
+        <a:scrgbClr r="0" g="0" b="0"/>
+      </a:fillRef>
+      <a:effectRef idx="0">
+        <a:scrgbClr r="0" g="0" b="0"/>
+      </a:effectRef>
+      <a:fontRef idx="minor">
+        <a:schemeClr val="lt1"/>
+      </a:fontRef>
+    </dgm:style>
+  </dgm:styleLbl>
+  <dgm:styleLbl name="node2">
+    <dgm:scene3d>
+      <a:camera prst="orthographicFront"/>
+      <a:lightRig rig="chilly" dir="t"/>
+    </dgm:scene3d>
+    <dgm:sp3d prstMaterial="translucentPowder">
+      <a:bevelT w="127000" h="25400" prst="softRound"/>
+    </dgm:sp3d>
+    <dgm:txPr/>
+    <dgm:style>
+      <a:lnRef idx="0">
+        <a:scrgbClr r="0" g="0" b="0"/>
+      </a:lnRef>
+      <a:fillRef idx="1">
+        <a:scrgbClr r="0" g="0" b="0"/>
+      </a:fillRef>
+      <a:effectRef idx="0">
+        <a:scrgbClr r="0" g="0" b="0"/>
+      </a:effectRef>
+      <a:fontRef idx="minor">
+        <a:schemeClr val="lt1"/>
+      </a:fontRef>
+    </dgm:style>
+  </dgm:styleLbl>
+  <dgm:styleLbl name="node3">
+    <dgm:scene3d>
+      <a:camera prst="orthographicFront"/>
+      <a:lightRig rig="chilly" dir="t"/>
+    </dgm:scene3d>
+    <dgm:sp3d prstMaterial="translucentPowder">
+      <a:bevelT w="127000" h="25400" prst="softRound"/>
+    </dgm:sp3d>
+    <dgm:txPr/>
+    <dgm:style>
+      <a:lnRef idx="0">
+        <a:scrgbClr r="0" g="0" b="0"/>
+      </a:lnRef>
+      <a:fillRef idx="1">
+        <a:scrgbClr r="0" g="0" b="0"/>
+      </a:fillRef>
+      <a:effectRef idx="0">
+        <a:scrgbClr r="0" g="0" b="0"/>
+      </a:effectRef>
+      <a:fontRef idx="minor">
+        <a:schemeClr val="lt1"/>
+      </a:fontRef>
+    </dgm:style>
+  </dgm:styleLbl>
+  <dgm:styleLbl name="node4">
+    <dgm:scene3d>
+      <a:camera prst="orthographicFront"/>
+      <a:lightRig rig="chilly" dir="t"/>
+    </dgm:scene3d>
+    <dgm:sp3d prstMaterial="translucentPowder">
+      <a:bevelT w="127000" h="25400" prst="softRound"/>
+    </dgm:sp3d>
+    <dgm:txPr/>
+    <dgm:style>
+      <a:lnRef idx="0">
+        <a:scrgbClr r="0" g="0" b="0"/>
+      </a:lnRef>
+      <a:fillRef idx="1">
+        <a:scrgbClr r="0" g="0" b="0"/>
+      </a:fillRef>
+      <a:effectRef idx="0">
+        <a:scrgbClr r="0" g="0" b="0"/>
+      </a:effectRef>
+      <a:fontRef idx="minor">
+        <a:schemeClr val="lt1"/>
+      </a:fontRef>
+    </dgm:style>
+  </dgm:styleLbl>
+  <dgm:styleLbl name="fgImgPlace1">
+    <dgm:scene3d>
+      <a:camera prst="orthographicFront"/>
+      <a:lightRig rig="chilly" dir="t"/>
+    </dgm:scene3d>
+    <dgm:sp3d z="12700" extrusionH="12700" prstMaterial="translucentPowder">
+      <a:bevelT w="25400" h="6350" prst="softRound"/>
+      <a:bevelB w="0" h="0" prst="convex"/>
+    </dgm:sp3d>
+    <dgm:txPr/>
+    <dgm:style>
+      <a:lnRef idx="0">
+        <a:scrgbClr r="0" g="0" b="0"/>
+      </a:lnRef>
+      <a:fillRef idx="1">
+        <a:scrgbClr r="0" g="0" b="0"/>
+      </a:fillRef>
+      <a:effectRef idx="0">
+        <a:scrgbClr r="0" g="0" b="0"/>
+      </a:effectRef>
+      <a:fontRef idx="minor"/>
+    </dgm:style>
+  </dgm:styleLbl>
+  <dgm:styleLbl name="alignImgPlace1">
+    <dgm:scene3d>
+      <a:camera prst="orthographicFront"/>
+      <a:lightRig rig="chilly" dir="t"/>
+    </dgm:scene3d>
+    <dgm:sp3d prstMaterial="translucentPowder">
+      <a:bevelT w="127000" h="25400" prst="softRound"/>
+    </dgm:sp3d>
+    <dgm:txPr/>
+    <dgm:style>
+      <a:lnRef idx="0">
+        <a:scrgbClr r="0" g="0" b="0"/>
+      </a:lnRef>
+      <a:fillRef idx="1">
+        <a:scrgbClr r="0" g="0" b="0"/>
+      </a:fillRef>
+      <a:effectRef idx="0">
+        <a:scrgbClr r="0" g="0" b="0"/>
+      </a:effectRef>
+      <a:fontRef idx="minor">
+        <a:schemeClr val="lt1"/>
+      </a:fontRef>
+    </dgm:style>
+  </dgm:styleLbl>
+  <dgm:styleLbl name="bgImgPlace1">
+    <dgm:scene3d>
+      <a:camera prst="orthographicFront"/>
+      <a:lightRig rig="chilly" dir="t"/>
+    </dgm:scene3d>
+    <dgm:sp3d z="-25700" extrusionH="63500" contourW="12700" prstMaterial="matte">
+      <a:contourClr>
+        <a:schemeClr val="lt1"/>
+      </a:contourClr>
+    </dgm:sp3d>
+    <dgm:txPr/>
+    <dgm:style>
+      <a:lnRef idx="0">
+        <a:scrgbClr r="0" g="0" b="0"/>
+      </a:lnRef>
+      <a:fillRef idx="1">
+        <a:scrgbClr r="0" g="0" b="0"/>
+      </a:fillRef>
+      <a:effectRef idx="0">
+        <a:scrgbClr r="0" g="0" b="0"/>
+      </a:effectRef>
+      <a:fontRef idx="minor"/>
+    </dgm:style>
+  </dgm:styleLbl>
+  <dgm:styleLbl name="sibTrans2D1">
+    <dgm:scene3d>
+      <a:camera prst="orthographicFront"/>
+      <a:lightRig rig="chilly" dir="t"/>
+    </dgm:scene3d>
+    <dgm:sp3d z="-70000" extrusionH="1700" prstMaterial="translucentPowder">
+      <a:bevelT w="25400" h="6350" prst="softRound"/>
+      <a:bevelB w="0" h="0" prst="convex"/>
+    </dgm:sp3d>
+    <dgm:txPr/>
+    <dgm:style>
+      <a:lnRef idx="0">
+        <a:scrgbClr r="0" g="0" b="0"/>
+      </a:lnRef>
+      <a:fillRef idx="1">
+        <a:scrgbClr r="0" g="0" b="0"/>
+      </a:fillRef>
+      <a:effectRef idx="0">
+        <a:scrgbClr r="0" g="0" b="0"/>
+      </a:effectRef>
+      <a:fontRef idx="minor">
+        <a:schemeClr val="lt1"/>
+      </a:fontRef>
+    </dgm:style>
+  </dgm:styleLbl>
+  <dgm:styleLbl name="fgSibTrans2D1">
+    <dgm:scene3d>
+      <a:camera prst="orthographicFront"/>
+      <a:lightRig rig="chilly" dir="t"/>
+    </dgm:scene3d>
+    <dgm:sp3d z="12700" extrusionH="1700" prstMaterial="translucentPowder">
+      <a:bevelT w="25400" h="6350" prst="softRound"/>
+      <a:bevelB w="0" h="0" prst="convex"/>
+    </dgm:sp3d>
+    <dgm:txPr/>
+    <dgm:style>
+      <a:lnRef idx="0">
+        <a:scrgbClr r="0" g="0" b="0"/>
+      </a:lnRef>
+      <a:fillRef idx="1">
+        <a:scrgbClr r="0" g="0" b="0"/>
+      </a:fillRef>
+      <a:effectRef idx="0">
+        <a:scrgbClr r="0" g="0" b="0"/>
+      </a:effectRef>
+      <a:fontRef idx="minor"/>
+    </dgm:style>
+  </dgm:styleLbl>
+  <dgm:styleLbl name="bgSibTrans2D1">
+    <dgm:scene3d>
+      <a:camera prst="orthographicFront"/>
+      <a:lightRig rig="chilly" dir="t"/>
+    </dgm:scene3d>
+    <dgm:sp3d z="-25700" extrusionH="1700" prstMaterial="translucentPowder">
+      <a:bevelT w="25400" h="6350" prst="softRound"/>
+      <a:bevelB w="0" h="0" prst="convex"/>
+    </dgm:sp3d>
+    <dgm:txPr/>
+    <dgm:style>
+      <a:lnRef idx="0">
+        <a:scrgbClr r="0" g="0" b="0"/>
+      </a:lnRef>
+      <a:fillRef idx="1">
+        <a:scrgbClr r="0" g="0" b="0"/>
+      </a:fillRef>
+      <a:effectRef idx="0">
+        <a:scrgbClr r="0" g="0" b="0"/>
+      </a:effectRef>
+      <a:fontRef idx="minor"/>
+    </dgm:style>
+  </dgm:styleLbl>
+  <dgm:styleLbl name="sibTrans1D1">
+    <dgm:scene3d>
+      <a:camera prst="orthographicFront"/>
+      <a:lightRig rig="chilly" dir="t"/>
+    </dgm:scene3d>
+    <dgm:sp3d z="-40000" prstMaterial="matte"/>
+    <dgm:txPr/>
+    <dgm:style>
+      <a:lnRef idx="1">
+        <a:scrgbClr r="0" g="0" b="0"/>
+      </a:lnRef>
+      <a:fillRef idx="0">
+        <a:scrgbClr r="0" g="0" b="0"/>
+      </a:fillRef>
+      <a:effectRef idx="0">
+        <a:scrgbClr r="0" g="0" b="0"/>
+      </a:effectRef>
+      <a:fontRef idx="minor"/>
+    </dgm:style>
+  </dgm:styleLbl>
+  <dgm:styleLbl name="callout">
+    <dgm:scene3d>
+      <a:camera prst="orthographicFront"/>
+      <a:lightRig rig="chilly" dir="t"/>
+    </dgm:scene3d>
+    <dgm:sp3d z="127000" prstMaterial="matte"/>
+    <dgm:txPr/>
+    <dgm:style>
+      <a:lnRef idx="2">
+        <a:scrgbClr r="0" g="0" b="0"/>
+      </a:lnRef>
+      <a:fillRef idx="1">
+        <a:scrgbClr r="0" g="0" b="0"/>
+      </a:fillRef>
+      <a:effectRef idx="0">
+        <a:scrgbClr r="0" g="0" b="0"/>
+      </a:effectRef>
+      <a:fontRef idx="minor"/>
+    </dgm:style>
+  </dgm:styleLbl>
+  <dgm:styleLbl name="asst0">
+    <dgm:scene3d>
+      <a:camera prst="orthographicFront"/>
+      <a:lightRig rig="chilly" dir="t"/>
+    </dgm:scene3d>
+    <dgm:sp3d prstMaterial="translucentPowder">
+      <a:bevelT w="127000" h="25400" prst="softRound"/>
+    </dgm:sp3d>
+    <dgm:txPr/>
+    <dgm:style>
+      <a:lnRef idx="0">
+        <a:scrgbClr r="0" g="0" b="0"/>
+      </a:lnRef>
+      <a:fillRef idx="1">
+        <a:scrgbClr r="0" g="0" b="0"/>
+      </a:fillRef>
+      <a:effectRef idx="0">
+        <a:scrgbClr r="0" g="0" b="0"/>
+      </a:effectRef>
+      <a:fontRef idx="minor">
+        <a:schemeClr val="lt1"/>
+      </a:fontRef>
+    </dgm:style>
+  </dgm:styleLbl>
+  <dgm:styleLbl name="asst1">
+    <dgm:scene3d>
+      <a:camera prst="orthographicFront"/>
+      <a:lightRig rig="chilly" dir="t"/>
+    </dgm:scene3d>
+    <dgm:sp3d prstMaterial="translucentPowder">
+      <a:bevelT w="127000" h="25400" prst="softRound"/>
+    </dgm:sp3d>
+    <dgm:txPr/>
+    <dgm:style>
+      <a:lnRef idx="0">
+        <a:scrgbClr r="0" g="0" b="0"/>
+      </a:lnRef>
+      <a:fillRef idx="1">
+        <a:scrgbClr r="0" g="0" b="0"/>
+      </a:fillRef>
+      <a:effectRef idx="0">
+        <a:scrgbClr r="0" g="0" b="0"/>
+      </a:effectRef>
+      <a:fontRef idx="minor">
+        <a:schemeClr val="lt1"/>
+      </a:fontRef>
+    </dgm:style>
+  </dgm:styleLbl>
+  <dgm:styleLbl name="asst2">
+    <dgm:scene3d>
+      <a:camera prst="orthographicFront"/>
+      <a:lightRig rig="chilly" dir="t"/>
+    </dgm:scene3d>
+    <dgm:sp3d prstMaterial="translucentPowder">
+      <a:bevelT w="127000" h="25400" prst="softRound"/>
+    </dgm:sp3d>
+    <dgm:txPr/>
+    <dgm:style>
+      <a:lnRef idx="0">
+        <a:scrgbClr r="0" g="0" b="0"/>
+      </a:lnRef>
+      <a:fillRef idx="1">
+        <a:scrgbClr r="0" g="0" b="0"/>
+      </a:fillRef>
+      <a:effectRef idx="0">
+        <a:scrgbClr r="0" g="0" b="0"/>
+      </a:effectRef>
+      <a:fontRef idx="minor">
+        <a:schemeClr val="lt1"/>
+      </a:fontRef>
+    </dgm:style>
+  </dgm:styleLbl>
+  <dgm:styleLbl name="asst3">
+    <dgm:scene3d>
+      <a:camera prst="orthographicFront"/>
+      <a:lightRig rig="chilly" dir="t"/>
+    </dgm:scene3d>
+    <dgm:sp3d prstMaterial="translucentPowder">
+      <a:bevelT w="127000" h="25400" prst="softRound"/>
+    </dgm:sp3d>
+    <dgm:txPr/>
+    <dgm:style>
+      <a:lnRef idx="0">
+        <a:scrgbClr r="0" g="0" b="0"/>
+      </a:lnRef>
+      <a:fillRef idx="1">
+        <a:scrgbClr r="0" g="0" b="0"/>
+      </a:fillRef>
+      <a:effectRef idx="0">
+        <a:scrgbClr r="0" g="0" b="0"/>
+      </a:effectRef>
+      <a:fontRef idx="minor">
+        <a:schemeClr val="lt1"/>
+      </a:fontRef>
+    </dgm:style>
+  </dgm:styleLbl>
+  <dgm:styleLbl name="parChTrans2D1">
+    <dgm:scene3d>
+      <a:camera prst="orthographicFront"/>
+      <a:lightRig rig="chilly" dir="t"/>
+    </dgm:scene3d>
+    <dgm:sp3d z="1700" extrusionH="1700" prstMaterial="translucentPowder">
+      <a:bevelT w="25400" h="6350" prst="softRound"/>
+      <a:bevelB w="0" h="0" prst="convex"/>
+    </dgm:sp3d>
+    <dgm:txPr/>
+    <dgm:style>
+      <a:lnRef idx="0">
+        <a:scrgbClr r="0" g="0" b="0"/>
+      </a:lnRef>
+      <a:fillRef idx="1">
+        <a:scrgbClr r="0" g="0" b="0"/>
+      </a:fillRef>
+      <a:effectRef idx="0">
+        <a:scrgbClr r="0" g="0" b="0"/>
+      </a:effectRef>
+      <a:fontRef idx="minor"/>
+    </dgm:style>
+  </dgm:styleLbl>
+  <dgm:styleLbl name="parChTrans2D2">
+    <dgm:scene3d>
+      <a:camera prst="orthographicFront"/>
+      <a:lightRig rig="chilly" dir="t"/>
+    </dgm:scene3d>
+    <dgm:sp3d z="1700" extrusionH="1700" prstMaterial="translucentPowder">
+      <a:bevelT w="25400" h="6350" prst="softRound"/>
+      <a:bevelB w="0" h="0" prst="convex"/>
+    </dgm:sp3d>
+    <dgm:txPr/>
+    <dgm:style>
+      <a:lnRef idx="0">
+        <a:scrgbClr r="0" g="0" b="0"/>
+      </a:lnRef>
+      <a:fillRef idx="1">
+        <a:scrgbClr r="0" g="0" b="0"/>
+      </a:fillRef>
+      <a:effectRef idx="0">
+        <a:scrgbClr r="0" g="0" b="0"/>
+      </a:effectRef>
+      <a:fontRef idx="minor"/>
+    </dgm:style>
+  </dgm:styleLbl>
+  <dgm:styleLbl name="parChTrans2D3">
+    <dgm:scene3d>
+      <a:camera prst="orthographicFront"/>
+      <a:lightRig rig="chilly" dir="t"/>
+    </dgm:scene3d>
+    <dgm:sp3d extrusionH="1700" prstMaterial="translucentPowder">
+      <a:bevelT w="25400" h="6350" prst="softRound"/>
+      <a:bevelB w="0" h="0" prst="convex"/>
+    </dgm:sp3d>
+    <dgm:txPr/>
+    <dgm:style>
+      <a:lnRef idx="0">
+        <a:scrgbClr r="0" g="0" b="0"/>
+      </a:lnRef>
+      <a:fillRef idx="1">
+        <a:scrgbClr r="0" g="0" b="0"/>
+      </a:fillRef>
+      <a:effectRef idx="0">
+        <a:scrgbClr r="0" g="0" b="0"/>
+      </a:effectRef>
+      <a:fontRef idx="minor"/>
+    </dgm:style>
+  </dgm:styleLbl>
+  <dgm:styleLbl name="parChTrans2D4">
+    <dgm:scene3d>
+      <a:camera prst="orthographicFront"/>
+      <a:lightRig rig="chilly" dir="t"/>
+    </dgm:scene3d>
+    <dgm:sp3d extrusionH="1700" prstMaterial="translucentPowder">
+      <a:bevelT w="25400" h="6350" prst="softRound"/>
+      <a:bevelB w="0" h="0" prst="convex"/>
+    </dgm:sp3d>
+    <dgm:txPr/>
+    <dgm:style>
+      <a:lnRef idx="0">
+        <a:scrgbClr r="0" g="0" b="0"/>
+      </a:lnRef>
+      <a:fillRef idx="1">
+        <a:scrgbClr r="0" g="0" b="0"/>
+      </a:fillRef>
+      <a:effectRef idx="0">
+        <a:scrgbClr r="0" g="0" b="0"/>
+      </a:effectRef>
+      <a:fontRef idx="minor"/>
+    </dgm:style>
+  </dgm:styleLbl>
+  <dgm:styleLbl name="parChTrans1D1">
+    <dgm:scene3d>
+      <a:camera prst="orthographicFront"/>
+      <a:lightRig rig="chilly" dir="t"/>
+    </dgm:scene3d>
+    <dgm:sp3d z="-40000" prstMaterial="matte"/>
+    <dgm:txPr/>
+    <dgm:style>
+      <a:lnRef idx="2">
+        <a:scrgbClr r="0" g="0" b="0"/>
+      </a:lnRef>
+      <a:fillRef idx="0">
+        <a:scrgbClr r="0" g="0" b="0"/>
+      </a:fillRef>
+      <a:effectRef idx="0">
+        <a:scrgbClr r="0" g="0" b="0"/>
+      </a:effectRef>
+      <a:fontRef idx="minor"/>
+    </dgm:style>
+  </dgm:styleLbl>
+  <dgm:styleLbl name="parChTrans1D2">
+    <dgm:scene3d>
+      <a:camera prst="orthographicFront"/>
+      <a:lightRig rig="threePt" dir="t"/>
+    </dgm:scene3d>
+    <dgm:sp3d z="-40000" prstMaterial="matte"/>
+    <dgm:txPr/>
+    <dgm:style>
+      <a:lnRef idx="2">
+        <a:scrgbClr r="0" g="0" b="0"/>
+      </a:lnRef>
+      <a:fillRef idx="0">
+        <a:scrgbClr r="0" g="0" b="0"/>
+      </a:fillRef>
+      <a:effectRef idx="0">
+        <a:scrgbClr r="0" g="0" b="0"/>
+      </a:effectRef>
+      <a:fontRef idx="minor"/>
+    </dgm:style>
+  </dgm:styleLbl>
+  <dgm:styleLbl name="parChTrans1D3">
+    <dgm:scene3d>
+      <a:camera prst="orthographicFront"/>
+      <a:lightRig rig="chilly" dir="t"/>
+    </dgm:scene3d>
+    <dgm:sp3d z="-40000" prstMaterial="matte"/>
+    <dgm:txPr/>
+    <dgm:style>
+      <a:lnRef idx="2">
+        <a:scrgbClr r="0" g="0" b="0"/>
+      </a:lnRef>
+      <a:fillRef idx="0">
+        <a:scrgbClr r="0" g="0" b="0"/>
+      </a:fillRef>
+      <a:effectRef idx="0">
+        <a:scrgbClr r="0" g="0" b="0"/>
+      </a:effectRef>
+      <a:fontRef idx="minor"/>
+    </dgm:style>
+  </dgm:styleLbl>
+  <dgm:styleLbl name="parChTrans1D4">
+    <dgm:scene3d>
+      <a:camera prst="orthographicFront"/>
+      <a:lightRig rig="chilly" dir="t"/>
+    </dgm:scene3d>
+    <dgm:sp3d z="-40000" prstMaterial="matte"/>
+    <dgm:txPr/>
+    <dgm:style>
+      <a:lnRef idx="2">
+        <a:scrgbClr r="0" g="0" b="0"/>
+      </a:lnRef>
+      <a:fillRef idx="0">
+        <a:scrgbClr r="0" g="0" b="0"/>
+      </a:fillRef>
+      <a:effectRef idx="0">
+        <a:scrgbClr r="0" g="0" b="0"/>
+      </a:effectRef>
+      <a:fontRef idx="minor"/>
+    </dgm:style>
+  </dgm:styleLbl>
+  <dgm:styleLbl name="fgAcc1">
+    <dgm:scene3d>
+      <a:camera prst="orthographicFront"/>
+      <a:lightRig rig="chilly" dir="t"/>
+    </dgm:scene3d>
+    <dgm:sp3d z="12700" extrusionH="1700" prstMaterial="dkEdge">
+      <a:bevelT w="25400" h="6350" prst="softRound"/>
+      <a:bevelB w="0" h="0" prst="convex"/>
+    </dgm:sp3d>
+    <dgm:txPr/>
+    <dgm:style>
+      <a:lnRef idx="1">
+        <a:scrgbClr r="0" g="0" b="0"/>
+      </a:lnRef>
+      <a:fillRef idx="1">
+        <a:scrgbClr r="0" g="0" b="0"/>
+      </a:fillRef>
+      <a:effectRef idx="0">
+        <a:scrgbClr r="0" g="0" b="0"/>
+      </a:effectRef>
+      <a:fontRef idx="minor"/>
+    </dgm:style>
+  </dgm:styleLbl>
+  <dgm:styleLbl name="conFgAcc1">
+    <dgm:scene3d>
+      <a:camera prst="orthographicFront"/>
+      <a:lightRig rig="chilly" dir="t"/>
+    </dgm:scene3d>
+    <dgm:sp3d z="12700" extrusionH="1700" prstMaterial="dkEdge">
+      <a:bevelT w="25400" h="6350" prst="softRound"/>
+      <a:bevelB w="0" h="0" prst="convex"/>
+    </dgm:sp3d>
+    <dgm:txPr/>
+    <dgm:style>
+      <a:lnRef idx="1">
+        <a:scrgbClr r="0" g="0" b="0"/>
+      </a:lnRef>
+      <a:fillRef idx="1">
+        <a:scrgbClr r="0" g="0" b="0"/>
+      </a:fillRef>
+      <a:effectRef idx="0">
+        <a:scrgbClr r="0" g="0" b="0"/>
+      </a:effectRef>
+      <a:fontRef idx="minor"/>
+    </dgm:style>
+  </dgm:styleLbl>
+  <dgm:styleLbl name="alignAcc1">
+    <dgm:scene3d>
+      <a:camera prst="orthographicFront"/>
+      <a:lightRig rig="chilly" dir="t"/>
+    </dgm:scene3d>
+    <dgm:sp3d prstMaterial="dkEdge">
+      <a:bevelT w="25400" h="6350" prst="softRound"/>
+      <a:bevelB w="0" h="0" prst="convex"/>
+    </dgm:sp3d>
+    <dgm:txPr/>
+    <dgm:style>
+      <a:lnRef idx="1">
+        <a:scrgbClr r="0" g="0" b="0"/>
+      </a:lnRef>
+      <a:fillRef idx="1">
+        <a:scrgbClr r="0" g="0" b="0"/>
+      </a:fillRef>
+      <a:effectRef idx="0">
+        <a:scrgbClr r="0" g="0" b="0"/>
+      </a:effectRef>
+      <a:fontRef idx="minor"/>
+    </dgm:style>
+  </dgm:styleLbl>
+  <dgm:styleLbl name="trAlignAcc1">
+    <dgm:scene3d>
+      <a:camera prst="orthographicFront"/>
+      <a:lightRig rig="chilly" dir="t"/>
+    </dgm:scene3d>
+    <dgm:sp3d prstMaterial="dkEdge">
+      <a:bevelT w="127000" h="25400"/>
+    </dgm:sp3d>
+    <dgm:txPr/>
+    <dgm:style>
+      <a:lnRef idx="1">
+        <a:scrgbClr r="0" g="0" b="0"/>
+      </a:lnRef>
+      <a:fillRef idx="1">
+        <a:scrgbClr r="0" g="0" b="0"/>
+      </a:fillRef>
+      <a:effectRef idx="0">
+        <a:scrgbClr r="0" g="0" b="0"/>
+      </a:effectRef>
+      <a:fontRef idx="minor">
+        <a:schemeClr val="lt1"/>
+      </a:fontRef>
+    </dgm:style>
+  </dgm:styleLbl>
+  <dgm:styleLbl name="bgAcc1">
+    <dgm:scene3d>
+      <a:camera prst="orthographicFront"/>
+      <a:lightRig rig="chilly" dir="t"/>
+    </dgm:scene3d>
+    <dgm:sp3d z="-12700" extrusionH="1700" prstMaterial="dkEdge">
+      <a:bevelT w="25400" h="6350" prst="softRound"/>
+      <a:bevelB w="0" h="0" prst="convex"/>
+    </dgm:sp3d>
+    <dgm:txPr/>
+    <dgm:style>
+      <a:lnRef idx="1">
+        <a:scrgbClr r="0" g="0" b="0"/>
+      </a:lnRef>
+      <a:fillRef idx="1">
+        <a:scrgbClr r="0" g="0" b="0"/>
+      </a:fillRef>
+      <a:effectRef idx="0">
+        <a:scrgbClr r="0" g="0" b="0"/>
+      </a:effectRef>
+      <a:fontRef idx="minor"/>
+    </dgm:style>
+  </dgm:styleLbl>
+  <dgm:styleLbl name="solidFgAcc1">
+    <dgm:scene3d>
+      <a:camera prst="orthographicFront"/>
+      <a:lightRig rig="chilly" dir="t"/>
+    </dgm:scene3d>
+    <dgm:sp3d z="12700" extrusionH="1700" prstMaterial="dkEdge">
+      <a:bevelT w="25400" h="6350" prst="softRound"/>
+      <a:bevelB w="0" h="0" prst="convex"/>
+    </dgm:sp3d>
+    <dgm:txPr/>
+    <dgm:style>
+      <a:lnRef idx="1">
+        <a:scrgbClr r="0" g="0" b="0"/>
+      </a:lnRef>
+      <a:fillRef idx="1">
+        <a:scrgbClr r="0" g="0" b="0"/>
+      </a:fillRef>
+      <a:effectRef idx="0">
+        <a:scrgbClr r="0" g="0" b="0"/>
+      </a:effectRef>
+      <a:fontRef idx="minor"/>
+    </dgm:style>
+  </dgm:styleLbl>
+  <dgm:styleLbl name="solidAlignAcc1">
+    <dgm:scene3d>
+      <a:camera prst="orthographicFront"/>
+      <a:lightRig rig="chilly" dir="t"/>
+    </dgm:scene3d>
+    <dgm:sp3d extrusionH="1700" prstMaterial="dkEdge">
+      <a:bevelT w="25400" h="6350" prst="softRound"/>
+      <a:bevelB w="0" h="0" prst="convex"/>
+    </dgm:sp3d>
+    <dgm:txPr/>
+    <dgm:style>
+      <a:lnRef idx="1">
+        <a:scrgbClr r="0" g="0" b="0"/>
+      </a:lnRef>
+      <a:fillRef idx="1">
+        <a:scrgbClr r="0" g="0" b="0"/>
+      </a:fillRef>
+      <a:effectRef idx="0">
+        <a:scrgbClr r="0" g="0" b="0"/>
+      </a:effectRef>
+      <a:fontRef idx="minor"/>
+    </dgm:style>
+  </dgm:styleLbl>
+  <dgm:styleLbl name="solidBgAcc1">
+    <dgm:scene3d>
+      <a:camera prst="orthographicFront"/>
+      <a:lightRig rig="chilly" dir="t"/>
+    </dgm:scene3d>
+    <dgm:sp3d z="-12700" extrusionH="1700" prstMaterial="dkEdge">
+      <a:bevelT w="25400" h="6350" prst="softRound"/>
+      <a:bevelB w="0" h="0" prst="convex"/>
+    </dgm:sp3d>
+    <dgm:txPr/>
+    <dgm:style>
+      <a:lnRef idx="1">
+        <a:scrgbClr r="0" g="0" b="0"/>
+      </a:lnRef>
+      <a:fillRef idx="1">
+        <a:scrgbClr r="0" g="0" b="0"/>
+      </a:fillRef>
+      <a:effectRef idx="0">
+        <a:scrgbClr r="0" g="0" b="0"/>
+      </a:effectRef>
+      <a:fontRef idx="minor"/>
+    </dgm:style>
+  </dgm:styleLbl>
+  <dgm:styleLbl name="fgAccFollowNode1">
+    <dgm:scene3d>
+      <a:camera prst="orthographicFront"/>
+      <a:lightRig rig="chilly" dir="t"/>
+    </dgm:scene3d>
+    <dgm:sp3d z="12700" extrusionH="1700" prstMaterial="dkEdge">
+      <a:bevelT w="25400" h="6350" prst="softRound"/>
+      <a:bevelB w="0" h="0" prst="convex"/>
+    </dgm:sp3d>
+    <dgm:txPr/>
+    <dgm:style>
+      <a:lnRef idx="1">
+        <a:scrgbClr r="0" g="0" b="0"/>
+      </a:lnRef>
+      <a:fillRef idx="1">
+        <a:scrgbClr r="0" g="0" b="0"/>
+      </a:fillRef>
+      <a:effectRef idx="0">
+        <a:scrgbClr r="0" g="0" b="0"/>
+      </a:effectRef>
+      <a:fontRef idx="minor"/>
+    </dgm:style>
+  </dgm:styleLbl>
+  <dgm:styleLbl name="alignAccFollowNode1">
+    <dgm:scene3d>
+      <a:camera prst="orthographicFront"/>
+      <a:lightRig rig="chilly" dir="t"/>
+    </dgm:scene3d>
+    <dgm:sp3d extrusionH="1700" prstMaterial="dkEdge">
+      <a:bevelT w="25400" h="6350" prst="softRound"/>
+      <a:bevelB w="0" h="0" prst="convex"/>
+    </dgm:sp3d>
+    <dgm:txPr/>
+    <dgm:style>
+      <a:lnRef idx="1">
+        <a:scrgbClr r="0" g="0" b="0"/>
+      </a:lnRef>
+      <a:fillRef idx="1">
+        <a:scrgbClr r="0" g="0" b="0"/>
+      </a:fillRef>
+      <a:effectRef idx="0">
+        <a:scrgbClr r="0" g="0" b="0"/>
+      </a:effectRef>
+      <a:fontRef idx="minor"/>
+    </dgm:style>
+  </dgm:styleLbl>
+  <dgm:styleLbl name="bgAccFollowNode1">
+    <dgm:scene3d>
+      <a:camera prst="orthographicFront"/>
+      <a:lightRig rig="chilly" dir="t"/>
+    </dgm:scene3d>
+    <dgm:sp3d z="-12700" extrusionH="1700" prstMaterial="dkEdge">
+      <a:bevelT w="25400" h="6350" prst="softRound"/>
+      <a:bevelB w="0" h="0" prst="convex"/>
+    </dgm:sp3d>
+    <dgm:txPr/>
+    <dgm:style>
+      <a:lnRef idx="1">
+        <a:scrgbClr r="0" g="0" b="0"/>
+      </a:lnRef>
+      <a:fillRef idx="1">
+        <a:scrgbClr r="0" g="0" b="0"/>
+      </a:fillRef>
+      <a:effectRef idx="0">
+        <a:scrgbClr r="0" g="0" b="0"/>
+      </a:effectRef>
+      <a:fontRef idx="minor"/>
+    </dgm:style>
+  </dgm:styleLbl>
+  <dgm:styleLbl name="fgAcc0">
+    <dgm:scene3d>
+      <a:camera prst="orthographicFront"/>
+      <a:lightRig rig="chilly" dir="t"/>
+    </dgm:scene3d>
+    <dgm:sp3d z="12700" extrusionH="1700" prstMaterial="dkEdge">
+      <a:bevelT w="25400" h="6350" prst="softRound"/>
+      <a:bevelB w="0" h="0" prst="convex"/>
+    </dgm:sp3d>
+    <dgm:txPr/>
+    <dgm:style>
+      <a:lnRef idx="1">
+        <a:scrgbClr r="0" g="0" b="0"/>
+      </a:lnRef>
+      <a:fillRef idx="1">
+        <a:scrgbClr r="0" g="0" b="0"/>
+      </a:fillRef>
+      <a:effectRef idx="0">
+        <a:scrgbClr r="0" g="0" b="0"/>
+      </a:effectRef>
+      <a:fontRef idx="minor"/>
+    </dgm:style>
+  </dgm:styleLbl>
+  <dgm:styleLbl name="fgAcc2">
+    <dgm:scene3d>
+      <a:camera prst="orthographicFront"/>
+      <a:lightRig rig="chilly" dir="t"/>
+    </dgm:scene3d>
+    <dgm:sp3d z="12700" extrusionH="1700" prstMaterial="dkEdge">
+      <a:bevelT w="25400" h="6350" prst="softRound"/>
+      <a:bevelB w="0" h="0" prst="convex"/>
+    </dgm:sp3d>
+    <dgm:txPr/>
+    <dgm:style>
+      <a:lnRef idx="1">
+        <a:scrgbClr r="0" g="0" b="0"/>
+      </a:lnRef>
+      <a:fillRef idx="1">
+        <a:scrgbClr r="0" g="0" b="0"/>
+      </a:fillRef>
+      <a:effectRef idx="0">
+        <a:scrgbClr r="0" g="0" b="0"/>
+      </a:effectRef>
+      <a:fontRef idx="minor"/>
+    </dgm:style>
+  </dgm:styleLbl>
+  <dgm:styleLbl name="fgAcc3">
+    <dgm:scene3d>
+      <a:camera prst="orthographicFront"/>
+      <a:lightRig rig="chilly" dir="t"/>
+    </dgm:scene3d>
+    <dgm:sp3d z="12700" extrusionH="1700" prstMaterial="dkEdge">
+      <a:bevelT w="25400" h="6350" prst="softRound"/>
+      <a:bevelB w="0" h="0" prst="convex"/>
+    </dgm:sp3d>
+    <dgm:txPr/>
+    <dgm:style>
+      <a:lnRef idx="1">
+        <a:scrgbClr r="0" g="0" b="0"/>
+      </a:lnRef>
+      <a:fillRef idx="1">
+        <a:scrgbClr r="0" g="0" b="0"/>
+      </a:fillRef>
+      <a:effectRef idx="0">
+        <a:scrgbClr r="0" g="0" b="0"/>
+      </a:effectRef>
+      <a:fontRef idx="minor"/>
+    </dgm:style>
+  </dgm:styleLbl>
+  <dgm:styleLbl name="fgAcc4">
+    <dgm:scene3d>
+      <a:camera prst="orthographicFront"/>
+      <a:lightRig rig="chilly" dir="t"/>
+    </dgm:scene3d>
+    <dgm:sp3d z="12700" extrusionH="1700" prstMaterial="dkEdge">
+      <a:bevelT w="25400" h="6350" prst="softRound"/>
+      <a:bevelB w="0" h="0" prst="convex"/>
+    </dgm:sp3d>
+    <dgm:txPr/>
+    <dgm:style>
+      <a:lnRef idx="1">
+        <a:scrgbClr r="0" g="0" b="0"/>
+      </a:lnRef>
+      <a:fillRef idx="1">
+        <a:scrgbClr r="0" g="0" b="0"/>
+      </a:fillRef>
+      <a:effectRef idx="0">
+        <a:scrgbClr r="0" g="0" b="0"/>
+      </a:effectRef>
+      <a:fontRef idx="minor"/>
+    </dgm:style>
+  </dgm:styleLbl>
+  <dgm:styleLbl name="bgShp">
+    <dgm:scene3d>
+      <a:camera prst="orthographicFront"/>
+      <a:lightRig rig="chilly" dir="t"/>
+    </dgm:scene3d>
+    <dgm:sp3d z="-12700" extrusionH="1700" prstMaterial="translucentPowder">
+      <a:bevelT w="25400" h="6350" prst="softRound"/>
+      <a:bevelB w="0" h="0" prst="convex"/>
+    </dgm:sp3d>
+    <dgm:txPr/>
+    <dgm:style>
+      <a:lnRef idx="0">
+        <a:scrgbClr r="0" g="0" b="0"/>
+      </a:lnRef>
+      <a:fillRef idx="1">
+        <a:scrgbClr r="0" g="0" b="0"/>
+      </a:fillRef>
+      <a:effectRef idx="0">
+        <a:scrgbClr r="0" g="0" b="0"/>
+      </a:effectRef>
+      <a:fontRef idx="minor"/>
+    </dgm:style>
+  </dgm:styleLbl>
+  <dgm:styleLbl name="dkBgShp">
+    <dgm:scene3d>
+      <a:camera prst="orthographicFront"/>
+      <a:lightRig rig="chilly" dir="t"/>
+    </dgm:scene3d>
+    <dgm:sp3d extrusionH="1700" prstMaterial="translucentPowder">
+      <a:bevelT w="25400" h="6350" prst="softRound"/>
+      <a:bevelB w="0" h="0" prst="convex"/>
+    </dgm:sp3d>
+    <dgm:txPr/>
+    <dgm:style>
+      <a:lnRef idx="0">
+        <a:scrgbClr r="0" g="0" b="0"/>
+      </a:lnRef>
+      <a:fillRef idx="1">
+        <a:scrgbClr r="0" g="0" b="0"/>
+      </a:fillRef>
+      <a:effectRef idx="0">
+        <a:scrgbClr r="0" g="0" b="0"/>
+      </a:effectRef>
+      <a:fontRef idx="minor"/>
+    </dgm:style>
+  </dgm:styleLbl>
+  <dgm:styleLbl name="trBgShp">
+    <dgm:scene3d>
+      <a:camera prst="orthographicFront"/>
+      <a:lightRig rig="chilly" dir="t"/>
+    </dgm:scene3d>
+    <dgm:sp3d z="-152400" prstMaterial="matte"/>
+    <dgm:txPr/>
+    <dgm:style>
+      <a:lnRef idx="0">
+        <a:scrgbClr r="0" g="0" b="0"/>
+      </a:lnRef>
+      <a:fillRef idx="1">
+        <a:scrgbClr r="0" g="0" b="0"/>
+      </a:fillRef>
+      <a:effectRef idx="0">
+        <a:scrgbClr r="0" g="0" b="0"/>
+      </a:effectRef>
+      <a:fontRef idx="minor"/>
+    </dgm:style>
+  </dgm:styleLbl>
+  <dgm:styleLbl name="fgShp">
+    <dgm:scene3d>
+      <a:camera prst="orthographicFront"/>
+      <a:lightRig rig="chilly" dir="t"/>
+    </dgm:scene3d>
+    <dgm:sp3d z="12700" extrusionH="1700" prstMaterial="translucentPowder">
+      <a:bevelT w="25400" h="6350" prst="softRound"/>
+      <a:bevelB w="0" h="0" prst="convex"/>
+    </dgm:sp3d>
+    <dgm:txPr/>
+    <dgm:style>
+      <a:lnRef idx="0">
         <a:scrgbClr r="0" g="0" b="0"/>
       </a:lnRef>
       <a:fillRef idx="1">
@@ -9191,7 +12751,7 @@
             <a:fld id="{1D8BD707-D9CF-40AE-B4C6-C98DA3205C09}" type="datetimeFigureOut">
               <a:rPr lang="en-US" smtClean="0"/>
               <a:pPr/>
-              <a:t>9/21/2016</a:t>
+              <a:t>9/22/2016</a:t>
             </a:fld>
             <a:endParaRPr lang="en-US"/>
           </a:p>
@@ -9358,7 +12918,7 @@
             <a:fld id="{1D8BD707-D9CF-40AE-B4C6-C98DA3205C09}" type="datetimeFigureOut">
               <a:rPr lang="en-US" smtClean="0"/>
               <a:pPr/>
-              <a:t>9/21/2016</a:t>
+              <a:t>9/22/2016</a:t>
             </a:fld>
             <a:endParaRPr lang="en-US"/>
           </a:p>
@@ -9535,7 +13095,7 @@
             <a:fld id="{1D8BD707-D9CF-40AE-B4C6-C98DA3205C09}" type="datetimeFigureOut">
               <a:rPr lang="en-US" smtClean="0"/>
               <a:pPr/>
-              <a:t>9/21/2016</a:t>
+              <a:t>9/22/2016</a:t>
             </a:fld>
             <a:endParaRPr lang="en-US"/>
           </a:p>
@@ -9702,7 +13262,7 @@
             <a:fld id="{1D8BD707-D9CF-40AE-B4C6-C98DA3205C09}" type="datetimeFigureOut">
               <a:rPr lang="en-US" smtClean="0"/>
               <a:pPr/>
-              <a:t>9/21/2016</a:t>
+              <a:t>9/22/2016</a:t>
             </a:fld>
             <a:endParaRPr lang="en-US"/>
           </a:p>
@@ -9945,7 +13505,7 @@
             <a:fld id="{1D8BD707-D9CF-40AE-B4C6-C98DA3205C09}" type="datetimeFigureOut">
               <a:rPr lang="en-US" smtClean="0"/>
               <a:pPr/>
-              <a:t>9/21/2016</a:t>
+              <a:t>9/22/2016</a:t>
             </a:fld>
             <a:endParaRPr lang="en-US"/>
           </a:p>
@@ -10230,7 +13790,7 @@
             <a:fld id="{1D8BD707-D9CF-40AE-B4C6-C98DA3205C09}" type="datetimeFigureOut">
               <a:rPr lang="en-US" smtClean="0"/>
               <a:pPr/>
-              <a:t>9/21/2016</a:t>
+              <a:t>9/22/2016</a:t>
             </a:fld>
             <a:endParaRPr lang="en-US"/>
           </a:p>
@@ -10649,7 +14209,7 @@
             <a:fld id="{1D8BD707-D9CF-40AE-B4C6-C98DA3205C09}" type="datetimeFigureOut">
               <a:rPr lang="en-US" smtClean="0"/>
               <a:pPr/>
-              <a:t>9/21/2016</a:t>
+              <a:t>9/22/2016</a:t>
             </a:fld>
             <a:endParaRPr lang="en-US"/>
           </a:p>
@@ -10764,7 +14324,7 @@
             <a:fld id="{1D8BD707-D9CF-40AE-B4C6-C98DA3205C09}" type="datetimeFigureOut">
               <a:rPr lang="en-US" smtClean="0"/>
               <a:pPr/>
-              <a:t>9/21/2016</a:t>
+              <a:t>9/22/2016</a:t>
             </a:fld>
             <a:endParaRPr lang="en-US"/>
           </a:p>
@@ -10856,7 +14416,7 @@
             <a:fld id="{1D8BD707-D9CF-40AE-B4C6-C98DA3205C09}" type="datetimeFigureOut">
               <a:rPr lang="en-US" smtClean="0"/>
               <a:pPr/>
-              <a:t>9/21/2016</a:t>
+              <a:t>9/22/2016</a:t>
             </a:fld>
             <a:endParaRPr lang="en-US"/>
           </a:p>
@@ -11130,7 +14690,7 @@
             <a:fld id="{1D8BD707-D9CF-40AE-B4C6-C98DA3205C09}" type="datetimeFigureOut">
               <a:rPr lang="en-US" smtClean="0"/>
               <a:pPr/>
-              <a:t>9/21/2016</a:t>
+              <a:t>9/22/2016</a:t>
             </a:fld>
             <a:endParaRPr lang="en-US"/>
           </a:p>
@@ -11380,7 +14940,7 @@
             <a:fld id="{1D8BD707-D9CF-40AE-B4C6-C98DA3205C09}" type="datetimeFigureOut">
               <a:rPr lang="en-US" smtClean="0"/>
               <a:pPr/>
-              <a:t>9/21/2016</a:t>
+              <a:t>9/22/2016</a:t>
             </a:fld>
             <a:endParaRPr lang="en-US"/>
           </a:p>
@@ -11590,7 +15150,7 @@
             <a:fld id="{1D8BD707-D9CF-40AE-B4C6-C98DA3205C09}" type="datetimeFigureOut">
               <a:rPr lang="en-US" smtClean="0"/>
               <a:pPr/>
-              <a:t>9/21/2016</a:t>
+              <a:t>9/22/2016</a:t>
             </a:fld>
             <a:endParaRPr lang="en-US"/>
           </a:p>
@@ -12167,6 +15727,674 @@
     <p:extLst>
       <p:ext uri="{BB962C8B-B14F-4D97-AF65-F5344CB8AC3E}">
         <p14:creationId xmlns:p14="http://schemas.microsoft.com/office/powerpoint/2010/main" val="1044658037"/>
+      </p:ext>
+    </p:extLst>
+  </p:cSld>
+  <p:clrMapOvr>
+    <a:masterClrMapping/>
+  </p:clrMapOvr>
+</p:sld>
+</file>
+
+<file path=ppt/slides/slide11.xml><?xml version="1.0" encoding="utf-8"?>
+<p:sld xmlns:a="http://schemas.openxmlformats.org/drawingml/2006/main" xmlns:r="http://schemas.openxmlformats.org/officeDocument/2006/relationships" xmlns:p="http://schemas.openxmlformats.org/presentationml/2006/main">
+  <p:cSld>
+    <p:spTree>
+      <p:nvGrpSpPr>
+        <p:cNvPr id="1" name=""/>
+        <p:cNvGrpSpPr/>
+        <p:nvPr/>
+      </p:nvGrpSpPr>
+      <p:grpSpPr>
+        <a:xfrm>
+          <a:off x="0" y="0"/>
+          <a:ext cx="0" cy="0"/>
+          <a:chOff x="0" y="0"/>
+          <a:chExt cx="0" cy="0"/>
+        </a:xfrm>
+      </p:grpSpPr>
+      <p:sp>
+        <p:nvSpPr>
+          <p:cNvPr id="2" name="Title 1"/>
+          <p:cNvSpPr>
+            <a:spLocks noGrp="1"/>
+          </p:cNvSpPr>
+          <p:nvPr>
+            <p:ph type="title"/>
+          </p:nvPr>
+        </p:nvSpPr>
+        <p:spPr/>
+        <p:txBody>
+          <a:bodyPr>
+            <a:normAutofit fontScale="90000"/>
+          </a:bodyPr>
+          <a:lstStyle/>
+          <a:p>
+            <a:r>
+              <a:rPr lang="en-US" dirty="0" smtClean="0"/>
+              <a:t/>
+            </a:r>
+            <a:br>
+              <a:rPr lang="en-US" dirty="0" smtClean="0"/>
+            </a:br>
+            <a:endParaRPr lang="en-US" dirty="0"/>
+          </a:p>
+        </p:txBody>
+      </p:sp>
+      <p:sp>
+        <p:nvSpPr>
+          <p:cNvPr id="3" name="Content Placeholder 2"/>
+          <p:cNvSpPr>
+            <a:spLocks noGrp="1"/>
+          </p:cNvSpPr>
+          <p:nvPr>
+            <p:ph idx="1"/>
+          </p:nvPr>
+        </p:nvSpPr>
+        <p:spPr/>
+        <p:txBody>
+          <a:bodyPr/>
+          <a:lstStyle/>
+          <a:p>
+            <a:endParaRPr lang="en-US" dirty="0" smtClean="0"/>
+          </a:p>
+          <a:p>
+            <a:endParaRPr lang="en-US" dirty="0" smtClean="0"/>
+          </a:p>
+          <a:p>
+            <a:endParaRPr lang="en-US" dirty="0"/>
+          </a:p>
+        </p:txBody>
+      </p:sp>
+      <p:graphicFrame>
+        <p:nvGraphicFramePr>
+          <p:cNvPr id="4" name="Diagram 3"/>
+          <p:cNvGraphicFramePr/>
+          <p:nvPr>
+            <p:extLst>
+              <p:ext uri="{D42A27DB-BD31-4B8C-83A1-F6EECF244321}">
+                <p14:modId xmlns:p14="http://schemas.microsoft.com/office/powerpoint/2010/main" val="3864352614"/>
+              </p:ext>
+            </p:extLst>
+          </p:nvPr>
+        </p:nvGraphicFramePr>
+        <p:xfrm>
+          <a:off x="1524000" y="1397000"/>
+          <a:ext cx="6096000" cy="4064000"/>
+        </p:xfrm>
+        <a:graphic>
+          <a:graphicData uri="http://schemas.openxmlformats.org/drawingml/2006/diagram">
+            <dgm:relIds xmlns:dgm="http://schemas.openxmlformats.org/drawingml/2006/diagram" xmlns:r="http://schemas.openxmlformats.org/officeDocument/2006/relationships" r:dm="rId2" r:lo="rId3" r:qs="rId4" r:cs="rId5"/>
+          </a:graphicData>
+        </a:graphic>
+      </p:graphicFrame>
+    </p:spTree>
+    <p:extLst>
+      <p:ext uri="{BB962C8B-B14F-4D97-AF65-F5344CB8AC3E}">
+        <p14:creationId xmlns:p14="http://schemas.microsoft.com/office/powerpoint/2010/main" val="2295323102"/>
+      </p:ext>
+    </p:extLst>
+  </p:cSld>
+  <p:clrMapOvr>
+    <a:masterClrMapping/>
+  </p:clrMapOvr>
+</p:sld>
+</file>
+
+<file path=ppt/slides/slide12.xml><?xml version="1.0" encoding="utf-8"?>
+<p:sld xmlns:a="http://schemas.openxmlformats.org/drawingml/2006/main" xmlns:r="http://schemas.openxmlformats.org/officeDocument/2006/relationships" xmlns:p="http://schemas.openxmlformats.org/presentationml/2006/main">
+  <p:cSld>
+    <p:spTree>
+      <p:nvGrpSpPr>
+        <p:cNvPr id="1" name=""/>
+        <p:cNvGrpSpPr/>
+        <p:nvPr/>
+      </p:nvGrpSpPr>
+      <p:grpSpPr>
+        <a:xfrm>
+          <a:off x="0" y="0"/>
+          <a:ext cx="0" cy="0"/>
+          <a:chOff x="0" y="0"/>
+          <a:chExt cx="0" cy="0"/>
+        </a:xfrm>
+      </p:grpSpPr>
+      <p:sp>
+        <p:nvSpPr>
+          <p:cNvPr id="2" name="Title 1"/>
+          <p:cNvSpPr>
+            <a:spLocks noGrp="1"/>
+          </p:cNvSpPr>
+          <p:nvPr>
+            <p:ph type="title"/>
+          </p:nvPr>
+        </p:nvSpPr>
+        <p:spPr/>
+        <p:txBody>
+          <a:bodyPr/>
+          <a:lstStyle/>
+          <a:p>
+            <a:endParaRPr lang="en-US"/>
+          </a:p>
+        </p:txBody>
+      </p:sp>
+      <p:pic>
+        <p:nvPicPr>
+          <p:cNvPr id="2050" name="Picture 2"/>
+          <p:cNvPicPr>
+            <a:picLocks noGrp="1" noChangeAspect="1" noChangeArrowheads="1"/>
+          </p:cNvPicPr>
+          <p:nvPr>
+            <p:ph idx="1"/>
+          </p:nvPr>
+        </p:nvPicPr>
+        <p:blipFill>
+          <a:blip r:embed="rId2">
+            <a:clrChange>
+              <a:clrFrom>
+                <a:srgbClr val="F7F7F7"/>
+              </a:clrFrom>
+              <a:clrTo>
+                <a:srgbClr val="F7F7F7">
+                  <a:alpha val="0"/>
+                </a:srgbClr>
+              </a:clrTo>
+            </a:clrChange>
+            <a:extLst>
+              <a:ext uri="{28A0092B-C50C-407E-A947-70E740481C1C}">
+                <a14:useLocalDpi xmlns:a14="http://schemas.microsoft.com/office/drawing/2010/main" val="0"/>
+              </a:ext>
+            </a:extLst>
+          </a:blip>
+          <a:srcRect/>
+          <a:stretch>
+            <a:fillRect/>
+          </a:stretch>
+        </p:blipFill>
+        <p:spPr bwMode="auto">
+          <a:xfrm>
+            <a:off x="1700212" y="2339181"/>
+            <a:ext cx="5743575" cy="3048000"/>
+          </a:xfrm>
+          <a:prstGeom prst="rect">
+            <a:avLst/>
+          </a:prstGeom>
+          <a:noFill/>
+          <a:ln>
+            <a:noFill/>
+          </a:ln>
+          <a:extLst>
+            <a:ext uri="{909E8E84-426E-40DD-AFC4-6F175D3DCCD1}">
+              <a14:hiddenFill xmlns:a14="http://schemas.microsoft.com/office/drawing/2010/main">
+                <a:solidFill>
+                  <a:schemeClr val="accent1"/>
+                </a:solidFill>
+              </a14:hiddenFill>
+            </a:ext>
+            <a:ext uri="{91240B29-F687-4F45-9708-019B960494DF}">
+              <a14:hiddenLine xmlns:a14="http://schemas.microsoft.com/office/drawing/2010/main" w="9525">
+                <a:solidFill>
+                  <a:schemeClr val="tx1"/>
+                </a:solidFill>
+                <a:miter lim="800000"/>
+                <a:headEnd/>
+                <a:tailEnd/>
+              </a14:hiddenLine>
+            </a:ext>
+          </a:extLst>
+        </p:spPr>
+      </p:pic>
+    </p:spTree>
+    <p:extLst>
+      <p:ext uri="{BB962C8B-B14F-4D97-AF65-F5344CB8AC3E}">
+        <p14:creationId xmlns:p14="http://schemas.microsoft.com/office/powerpoint/2010/main" val="2745742463"/>
+      </p:ext>
+    </p:extLst>
+  </p:cSld>
+  <p:clrMapOvr>
+    <a:masterClrMapping/>
+  </p:clrMapOvr>
+</p:sld>
+</file>
+
+<file path=ppt/slides/slide13.xml><?xml version="1.0" encoding="utf-8"?>
+<p:sld xmlns:a="http://schemas.openxmlformats.org/drawingml/2006/main" xmlns:r="http://schemas.openxmlformats.org/officeDocument/2006/relationships" xmlns:p="http://schemas.openxmlformats.org/presentationml/2006/main">
+  <p:cSld>
+    <p:spTree>
+      <p:nvGrpSpPr>
+        <p:cNvPr id="1" name=""/>
+        <p:cNvGrpSpPr/>
+        <p:nvPr/>
+      </p:nvGrpSpPr>
+      <p:grpSpPr>
+        <a:xfrm>
+          <a:off x="0" y="0"/>
+          <a:ext cx="0" cy="0"/>
+          <a:chOff x="0" y="0"/>
+          <a:chExt cx="0" cy="0"/>
+        </a:xfrm>
+      </p:grpSpPr>
+      <p:sp>
+        <p:nvSpPr>
+          <p:cNvPr id="2" name="Title 1"/>
+          <p:cNvSpPr>
+            <a:spLocks noGrp="1"/>
+          </p:cNvSpPr>
+          <p:nvPr>
+            <p:ph type="title"/>
+          </p:nvPr>
+        </p:nvSpPr>
+        <p:spPr/>
+        <p:txBody>
+          <a:bodyPr>
+            <a:normAutofit fontScale="90000"/>
+          </a:bodyPr>
+          <a:lstStyle/>
+          <a:p>
+            <a:r>
+              <a:rPr lang="en-US" dirty="0" smtClean="0"/>
+              <a:t/>
+            </a:r>
+            <a:br>
+              <a:rPr lang="en-US" dirty="0" smtClean="0"/>
+            </a:br>
+            <a:endParaRPr lang="en-US" dirty="0"/>
+          </a:p>
+        </p:txBody>
+      </p:sp>
+      <p:sp>
+        <p:nvSpPr>
+          <p:cNvPr id="3" name="Content Placeholder 2"/>
+          <p:cNvSpPr>
+            <a:spLocks noGrp="1"/>
+          </p:cNvSpPr>
+          <p:nvPr>
+            <p:ph idx="1"/>
+          </p:nvPr>
+        </p:nvSpPr>
+        <p:spPr/>
+        <p:txBody>
+          <a:bodyPr/>
+          <a:lstStyle/>
+          <a:p>
+            <a:endParaRPr lang="en-US" dirty="0" smtClean="0"/>
+          </a:p>
+          <a:p>
+            <a:pPr marL="0" indent="0">
+              <a:buNone/>
+            </a:pPr>
+            <a:endParaRPr lang="en-US" dirty="0"/>
+          </a:p>
+        </p:txBody>
+      </p:sp>
+      <p:pic>
+        <p:nvPicPr>
+          <p:cNvPr id="3074" name="Picture 2"/>
+          <p:cNvPicPr>
+            <a:picLocks noChangeAspect="1" noChangeArrowheads="1"/>
+          </p:cNvPicPr>
+          <p:nvPr/>
+        </p:nvPicPr>
+        <p:blipFill>
+          <a:blip r:embed="rId2">
+            <a:clrChange>
+              <a:clrFrom>
+                <a:srgbClr val="F7F7F7"/>
+              </a:clrFrom>
+              <a:clrTo>
+                <a:srgbClr val="F7F7F7">
+                  <a:alpha val="0"/>
+                </a:srgbClr>
+              </a:clrTo>
+            </a:clrChange>
+            <a:extLst>
+              <a:ext uri="{28A0092B-C50C-407E-A947-70E740481C1C}">
+                <a14:useLocalDpi xmlns:a14="http://schemas.microsoft.com/office/drawing/2010/main" val="0"/>
+              </a:ext>
+            </a:extLst>
+          </a:blip>
+          <a:srcRect/>
+          <a:stretch>
+            <a:fillRect/>
+          </a:stretch>
+        </p:blipFill>
+        <p:spPr bwMode="auto">
+          <a:xfrm>
+            <a:off x="2143125" y="857250"/>
+            <a:ext cx="4857750" cy="5143500"/>
+          </a:xfrm>
+          <a:prstGeom prst="rect">
+            <a:avLst/>
+          </a:prstGeom>
+          <a:noFill/>
+          <a:ln>
+            <a:noFill/>
+          </a:ln>
+          <a:extLst>
+            <a:ext uri="{909E8E84-426E-40DD-AFC4-6F175D3DCCD1}">
+              <a14:hiddenFill xmlns:a14="http://schemas.microsoft.com/office/drawing/2010/main">
+                <a:solidFill>
+                  <a:schemeClr val="accent1"/>
+                </a:solidFill>
+              </a14:hiddenFill>
+            </a:ext>
+            <a:ext uri="{91240B29-F687-4F45-9708-019B960494DF}">
+              <a14:hiddenLine xmlns:a14="http://schemas.microsoft.com/office/drawing/2010/main" w="9525">
+                <a:solidFill>
+                  <a:schemeClr val="tx1"/>
+                </a:solidFill>
+                <a:miter lim="800000"/>
+                <a:headEnd/>
+                <a:tailEnd/>
+              </a14:hiddenLine>
+            </a:ext>
+          </a:extLst>
+        </p:spPr>
+      </p:pic>
+    </p:spTree>
+    <p:extLst>
+      <p:ext uri="{BB962C8B-B14F-4D97-AF65-F5344CB8AC3E}">
+        <p14:creationId xmlns:p14="http://schemas.microsoft.com/office/powerpoint/2010/main" val="1306052275"/>
+      </p:ext>
+    </p:extLst>
+  </p:cSld>
+  <p:clrMapOvr>
+    <a:masterClrMapping/>
+  </p:clrMapOvr>
+</p:sld>
+</file>
+
+<file path=ppt/slides/slide14.xml><?xml version="1.0" encoding="utf-8"?>
+<p:sld xmlns:a="http://schemas.openxmlformats.org/drawingml/2006/main" xmlns:r="http://schemas.openxmlformats.org/officeDocument/2006/relationships" xmlns:p="http://schemas.openxmlformats.org/presentationml/2006/main">
+  <p:cSld>
+    <p:spTree>
+      <p:nvGrpSpPr>
+        <p:cNvPr id="1" name=""/>
+        <p:cNvGrpSpPr/>
+        <p:nvPr/>
+      </p:nvGrpSpPr>
+      <p:grpSpPr>
+        <a:xfrm>
+          <a:off x="0" y="0"/>
+          <a:ext cx="0" cy="0"/>
+          <a:chOff x="0" y="0"/>
+          <a:chExt cx="0" cy="0"/>
+        </a:xfrm>
+      </p:grpSpPr>
+      <p:sp>
+        <p:nvSpPr>
+          <p:cNvPr id="2" name="Title 1"/>
+          <p:cNvSpPr>
+            <a:spLocks noGrp="1"/>
+          </p:cNvSpPr>
+          <p:nvPr>
+            <p:ph type="title"/>
+          </p:nvPr>
+        </p:nvSpPr>
+        <p:spPr/>
+        <p:txBody>
+          <a:bodyPr>
+            <a:normAutofit fontScale="90000"/>
+          </a:bodyPr>
+          <a:lstStyle/>
+          <a:p>
+            <a:r>
+              <a:rPr lang="en-US" dirty="0" smtClean="0"/>
+              <a:t/>
+            </a:r>
+            <a:br>
+              <a:rPr lang="en-US" dirty="0" smtClean="0"/>
+            </a:br>
+            <a:endParaRPr lang="en-US" dirty="0"/>
+          </a:p>
+        </p:txBody>
+      </p:sp>
+      <p:sp>
+        <p:nvSpPr>
+          <p:cNvPr id="3" name="Content Placeholder 2"/>
+          <p:cNvSpPr>
+            <a:spLocks noGrp="1"/>
+          </p:cNvSpPr>
+          <p:nvPr>
+            <p:ph idx="1"/>
+          </p:nvPr>
+        </p:nvSpPr>
+        <p:spPr/>
+        <p:txBody>
+          <a:bodyPr/>
+          <a:lstStyle/>
+          <a:p>
+            <a:endParaRPr lang="en-US" dirty="0" smtClean="0"/>
+          </a:p>
+          <a:p>
+            <a:pPr marL="0" indent="0">
+              <a:buNone/>
+            </a:pPr>
+            <a:endParaRPr lang="en-US" dirty="0"/>
+          </a:p>
+        </p:txBody>
+      </p:sp>
+      <p:pic>
+        <p:nvPicPr>
+          <p:cNvPr id="4098" name="Picture 2"/>
+          <p:cNvPicPr>
+            <a:picLocks noChangeAspect="1" noChangeArrowheads="1"/>
+          </p:cNvPicPr>
+          <p:nvPr/>
+        </p:nvPicPr>
+        <p:blipFill>
+          <a:blip r:embed="rId2">
+            <a:clrChange>
+              <a:clrFrom>
+                <a:srgbClr val="F7F7F7"/>
+              </a:clrFrom>
+              <a:clrTo>
+                <a:srgbClr val="F7F7F7">
+                  <a:alpha val="0"/>
+                </a:srgbClr>
+              </a:clrTo>
+            </a:clrChange>
+            <a:extLst>
+              <a:ext uri="{28A0092B-C50C-407E-A947-70E740481C1C}">
+                <a14:useLocalDpi xmlns:a14="http://schemas.microsoft.com/office/drawing/2010/main" val="0"/>
+              </a:ext>
+            </a:extLst>
+          </a:blip>
+          <a:srcRect/>
+          <a:stretch>
+            <a:fillRect/>
+          </a:stretch>
+        </p:blipFill>
+        <p:spPr bwMode="auto">
+          <a:xfrm>
+            <a:off x="2095500" y="714375"/>
+            <a:ext cx="4953000" cy="5429250"/>
+          </a:xfrm>
+          <a:prstGeom prst="rect">
+            <a:avLst/>
+          </a:prstGeom>
+          <a:noFill/>
+          <a:ln>
+            <a:noFill/>
+          </a:ln>
+          <a:extLst>
+            <a:ext uri="{909E8E84-426E-40DD-AFC4-6F175D3DCCD1}">
+              <a14:hiddenFill xmlns:a14="http://schemas.microsoft.com/office/drawing/2010/main">
+                <a:solidFill>
+                  <a:schemeClr val="accent1"/>
+                </a:solidFill>
+              </a14:hiddenFill>
+            </a:ext>
+            <a:ext uri="{91240B29-F687-4F45-9708-019B960494DF}">
+              <a14:hiddenLine xmlns:a14="http://schemas.microsoft.com/office/drawing/2010/main" w="9525">
+                <a:solidFill>
+                  <a:schemeClr val="tx1"/>
+                </a:solidFill>
+                <a:miter lim="800000"/>
+                <a:headEnd/>
+                <a:tailEnd/>
+              </a14:hiddenLine>
+            </a:ext>
+          </a:extLst>
+        </p:spPr>
+      </p:pic>
+    </p:spTree>
+    <p:extLst>
+      <p:ext uri="{BB962C8B-B14F-4D97-AF65-F5344CB8AC3E}">
+        <p14:creationId xmlns:p14="http://schemas.microsoft.com/office/powerpoint/2010/main" val="3886907763"/>
+      </p:ext>
+    </p:extLst>
+  </p:cSld>
+  <p:clrMapOvr>
+    <a:masterClrMapping/>
+  </p:clrMapOvr>
+</p:sld>
+</file>
+
+<file path=ppt/slides/slide15.xml><?xml version="1.0" encoding="utf-8"?>
+<p:sld xmlns:a="http://schemas.openxmlformats.org/drawingml/2006/main" xmlns:r="http://schemas.openxmlformats.org/officeDocument/2006/relationships" xmlns:p="http://schemas.openxmlformats.org/presentationml/2006/main">
+  <p:cSld>
+    <p:spTree>
+      <p:nvGrpSpPr>
+        <p:cNvPr id="1" name=""/>
+        <p:cNvGrpSpPr/>
+        <p:nvPr/>
+      </p:nvGrpSpPr>
+      <p:grpSpPr>
+        <a:xfrm>
+          <a:off x="0" y="0"/>
+          <a:ext cx="0" cy="0"/>
+          <a:chOff x="0" y="0"/>
+          <a:chExt cx="0" cy="0"/>
+        </a:xfrm>
+      </p:grpSpPr>
+      <p:sp>
+        <p:nvSpPr>
+          <p:cNvPr id="2" name="Title 1"/>
+          <p:cNvSpPr>
+            <a:spLocks noGrp="1"/>
+          </p:cNvSpPr>
+          <p:nvPr>
+            <p:ph type="title"/>
+          </p:nvPr>
+        </p:nvSpPr>
+        <p:spPr/>
+        <p:txBody>
+          <a:bodyPr>
+            <a:normAutofit fontScale="90000"/>
+          </a:bodyPr>
+          <a:lstStyle/>
+          <a:p>
+            <a:r>
+              <a:rPr lang="en-US" dirty="0" smtClean="0"/>
+              <a:t/>
+            </a:r>
+            <a:br>
+              <a:rPr lang="en-US" dirty="0" smtClean="0"/>
+            </a:br>
+            <a:r>
+              <a:rPr lang="en-US" dirty="0"/>
+              <a:t/>
+            </a:r>
+            <a:br>
+              <a:rPr lang="en-US" dirty="0"/>
+            </a:br>
+            <a:endParaRPr lang="en-US" dirty="0"/>
+          </a:p>
+        </p:txBody>
+      </p:sp>
+      <p:sp>
+        <p:nvSpPr>
+          <p:cNvPr id="3" name="Content Placeholder 2"/>
+          <p:cNvSpPr>
+            <a:spLocks noGrp="1"/>
+          </p:cNvSpPr>
+          <p:nvPr>
+            <p:ph idx="1"/>
+          </p:nvPr>
+        </p:nvSpPr>
+        <p:spPr/>
+        <p:txBody>
+          <a:bodyPr/>
+          <a:lstStyle/>
+          <a:p>
+            <a:endParaRPr lang="en-US" dirty="0" smtClean="0"/>
+          </a:p>
+          <a:p>
+            <a:pPr marL="0" indent="0">
+              <a:buNone/>
+            </a:pPr>
+            <a:endParaRPr lang="en-US" dirty="0"/>
+          </a:p>
+        </p:txBody>
+      </p:sp>
+      <p:pic>
+        <p:nvPicPr>
+          <p:cNvPr id="5122" name="Picture 2"/>
+          <p:cNvPicPr>
+            <a:picLocks noChangeAspect="1" noChangeArrowheads="1"/>
+          </p:cNvPicPr>
+          <p:nvPr/>
+        </p:nvPicPr>
+        <p:blipFill>
+          <a:blip r:embed="rId2">
+            <a:clrChange>
+              <a:clrFrom>
+                <a:srgbClr val="F7F7F7"/>
+              </a:clrFrom>
+              <a:clrTo>
+                <a:srgbClr val="F7F7F7">
+                  <a:alpha val="0"/>
+                </a:srgbClr>
+              </a:clrTo>
+            </a:clrChange>
+            <a:extLst>
+              <a:ext uri="{28A0092B-C50C-407E-A947-70E740481C1C}">
+                <a14:useLocalDpi xmlns:a14="http://schemas.microsoft.com/office/drawing/2010/main" val="0"/>
+              </a:ext>
+            </a:extLst>
+          </a:blip>
+          <a:srcRect/>
+          <a:stretch>
+            <a:fillRect/>
+          </a:stretch>
+        </p:blipFill>
+        <p:spPr bwMode="auto">
+          <a:xfrm>
+            <a:off x="2224088" y="1004888"/>
+            <a:ext cx="4695825" cy="4848225"/>
+          </a:xfrm>
+          <a:prstGeom prst="rect">
+            <a:avLst/>
+          </a:prstGeom>
+          <a:noFill/>
+          <a:ln>
+            <a:noFill/>
+          </a:ln>
+          <a:extLst>
+            <a:ext uri="{909E8E84-426E-40DD-AFC4-6F175D3DCCD1}">
+              <a14:hiddenFill xmlns:a14="http://schemas.microsoft.com/office/drawing/2010/main">
+                <a:solidFill>
+                  <a:schemeClr val="accent1"/>
+                </a:solidFill>
+              </a14:hiddenFill>
+            </a:ext>
+            <a:ext uri="{91240B29-F687-4F45-9708-019B960494DF}">
+              <a14:hiddenLine xmlns:a14="http://schemas.microsoft.com/office/drawing/2010/main" w="9525">
+                <a:solidFill>
+                  <a:schemeClr val="tx1"/>
+                </a:solidFill>
+                <a:miter lim="800000"/>
+                <a:headEnd/>
+                <a:tailEnd/>
+              </a14:hiddenLine>
+            </a:ext>
+          </a:extLst>
+        </p:spPr>
+      </p:pic>
+    </p:spTree>
+    <p:extLst>
+      <p:ext uri="{BB962C8B-B14F-4D97-AF65-F5344CB8AC3E}">
+        <p14:creationId xmlns:p14="http://schemas.microsoft.com/office/powerpoint/2010/main" val="2586967119"/>
       </p:ext>
     </p:extLst>
   </p:cSld>
@@ -12997,7 +17225,7 @@
         <p:spPr bwMode="auto">
           <a:xfrm>
             <a:off x="609600" y="-381000"/>
-            <a:ext cx="9144000" cy="6858000"/>
+            <a:ext cx="8026400" cy="6019800"/>
           </a:xfrm>
           <a:prstGeom prst="rect">
             <a:avLst/>

</xml_diff>

<commit_message>
added image for serialzation and deserialzation
</commit_message>
<xml_diff>
--- a/pictures.pptx
+++ b/pictures.pptx
@@ -25,6 +25,7 @@
     <p:sldId id="273" r:id="rId19"/>
     <p:sldId id="274" r:id="rId20"/>
     <p:sldId id="275" r:id="rId21"/>
+    <p:sldId id="276" r:id="rId22"/>
   </p:sldIdLst>
   <p:sldSz cx="9144000" cy="6858000" type="screen4x3"/>
   <p:notesSz cx="6858000" cy="9144000"/>
@@ -17162,7 +17163,7 @@
             <a:fld id="{1D8BD707-D9CF-40AE-B4C6-C98DA3205C09}" type="datetimeFigureOut">
               <a:rPr lang="en-US" smtClean="0"/>
               <a:pPr/>
-              <a:t>10/17/2016</a:t>
+              <a:t>12/2/2016</a:t>
             </a:fld>
             <a:endParaRPr lang="en-US"/>
           </a:p>
@@ -17329,7 +17330,7 @@
             <a:fld id="{1D8BD707-D9CF-40AE-B4C6-C98DA3205C09}" type="datetimeFigureOut">
               <a:rPr lang="en-US" smtClean="0"/>
               <a:pPr/>
-              <a:t>10/17/2016</a:t>
+              <a:t>12/2/2016</a:t>
             </a:fld>
             <a:endParaRPr lang="en-US"/>
           </a:p>
@@ -17506,7 +17507,7 @@
             <a:fld id="{1D8BD707-D9CF-40AE-B4C6-C98DA3205C09}" type="datetimeFigureOut">
               <a:rPr lang="en-US" smtClean="0"/>
               <a:pPr/>
-              <a:t>10/17/2016</a:t>
+              <a:t>12/2/2016</a:t>
             </a:fld>
             <a:endParaRPr lang="en-US"/>
           </a:p>
@@ -17673,7 +17674,7 @@
             <a:fld id="{1D8BD707-D9CF-40AE-B4C6-C98DA3205C09}" type="datetimeFigureOut">
               <a:rPr lang="en-US" smtClean="0"/>
               <a:pPr/>
-              <a:t>10/17/2016</a:t>
+              <a:t>12/2/2016</a:t>
             </a:fld>
             <a:endParaRPr lang="en-US"/>
           </a:p>
@@ -17916,7 +17917,7 @@
             <a:fld id="{1D8BD707-D9CF-40AE-B4C6-C98DA3205C09}" type="datetimeFigureOut">
               <a:rPr lang="en-US" smtClean="0"/>
               <a:pPr/>
-              <a:t>10/17/2016</a:t>
+              <a:t>12/2/2016</a:t>
             </a:fld>
             <a:endParaRPr lang="en-US"/>
           </a:p>
@@ -18201,7 +18202,7 @@
             <a:fld id="{1D8BD707-D9CF-40AE-B4C6-C98DA3205C09}" type="datetimeFigureOut">
               <a:rPr lang="en-US" smtClean="0"/>
               <a:pPr/>
-              <a:t>10/17/2016</a:t>
+              <a:t>12/2/2016</a:t>
             </a:fld>
             <a:endParaRPr lang="en-US"/>
           </a:p>
@@ -18620,7 +18621,7 @@
             <a:fld id="{1D8BD707-D9CF-40AE-B4C6-C98DA3205C09}" type="datetimeFigureOut">
               <a:rPr lang="en-US" smtClean="0"/>
               <a:pPr/>
-              <a:t>10/17/2016</a:t>
+              <a:t>12/2/2016</a:t>
             </a:fld>
             <a:endParaRPr lang="en-US"/>
           </a:p>
@@ -18735,7 +18736,7 @@
             <a:fld id="{1D8BD707-D9CF-40AE-B4C6-C98DA3205C09}" type="datetimeFigureOut">
               <a:rPr lang="en-US" smtClean="0"/>
               <a:pPr/>
-              <a:t>10/17/2016</a:t>
+              <a:t>12/2/2016</a:t>
             </a:fld>
             <a:endParaRPr lang="en-US"/>
           </a:p>
@@ -18827,7 +18828,7 @@
             <a:fld id="{1D8BD707-D9CF-40AE-B4C6-C98DA3205C09}" type="datetimeFigureOut">
               <a:rPr lang="en-US" smtClean="0"/>
               <a:pPr/>
-              <a:t>10/17/2016</a:t>
+              <a:t>12/2/2016</a:t>
             </a:fld>
             <a:endParaRPr lang="en-US"/>
           </a:p>
@@ -19101,7 +19102,7 @@
             <a:fld id="{1D8BD707-D9CF-40AE-B4C6-C98DA3205C09}" type="datetimeFigureOut">
               <a:rPr lang="en-US" smtClean="0"/>
               <a:pPr/>
-              <a:t>10/17/2016</a:t>
+              <a:t>12/2/2016</a:t>
             </a:fld>
             <a:endParaRPr lang="en-US"/>
           </a:p>
@@ -19351,7 +19352,7 @@
             <a:fld id="{1D8BD707-D9CF-40AE-B4C6-C98DA3205C09}" type="datetimeFigureOut">
               <a:rPr lang="en-US" smtClean="0"/>
               <a:pPr/>
-              <a:t>10/17/2016</a:t>
+              <a:t>12/2/2016</a:t>
             </a:fld>
             <a:endParaRPr lang="en-US"/>
           </a:p>
@@ -19561,7 +19562,7 @@
             <a:fld id="{1D8BD707-D9CF-40AE-B4C6-C98DA3205C09}" type="datetimeFigureOut">
               <a:rPr lang="en-US" smtClean="0"/>
               <a:pPr/>
-              <a:t>10/17/2016</a:t>
+              <a:t>12/2/2016</a:t>
             </a:fld>
             <a:endParaRPr lang="en-US"/>
           </a:p>
@@ -22851,6 +22852,1037 @@
 </p:sld>
 </file>
 
+<file path=ppt/slides/slide21.xml><?xml version="1.0" encoding="utf-8"?>
+<p:sld xmlns:a="http://schemas.openxmlformats.org/drawingml/2006/main" xmlns:r="http://schemas.openxmlformats.org/officeDocument/2006/relationships" xmlns:p="http://schemas.openxmlformats.org/presentationml/2006/main">
+  <p:cSld>
+    <p:spTree>
+      <p:nvGrpSpPr>
+        <p:cNvPr id="1" name=""/>
+        <p:cNvGrpSpPr/>
+        <p:nvPr/>
+      </p:nvGrpSpPr>
+      <p:grpSpPr>
+        <a:xfrm>
+          <a:off x="0" y="0"/>
+          <a:ext cx="0" cy="0"/>
+          <a:chOff x="0" y="0"/>
+          <a:chExt cx="0" cy="0"/>
+        </a:xfrm>
+      </p:grpSpPr>
+      <p:sp>
+        <p:nvSpPr>
+          <p:cNvPr id="2" name="Title 1"/>
+          <p:cNvSpPr>
+            <a:spLocks noGrp="1"/>
+          </p:cNvSpPr>
+          <p:nvPr>
+            <p:ph type="title"/>
+          </p:nvPr>
+        </p:nvSpPr>
+        <p:spPr/>
+        <p:txBody>
+          <a:bodyPr>
+            <a:normAutofit fontScale="90000"/>
+          </a:bodyPr>
+          <a:lstStyle/>
+          <a:p>
+            <a:r>
+              <a:rPr lang="en-US" dirty="0" smtClean="0"/>
+              <a:t/>
+            </a:r>
+            <a:br>
+              <a:rPr lang="en-US" dirty="0" smtClean="0"/>
+            </a:br>
+            <a:endParaRPr lang="en-US" dirty="0"/>
+          </a:p>
+        </p:txBody>
+      </p:sp>
+      <p:sp>
+        <p:nvSpPr>
+          <p:cNvPr id="3" name="Content Placeholder 2"/>
+          <p:cNvSpPr>
+            <a:spLocks noGrp="1"/>
+          </p:cNvSpPr>
+          <p:nvPr>
+            <p:ph idx="1"/>
+          </p:nvPr>
+        </p:nvSpPr>
+        <p:spPr/>
+        <p:txBody>
+          <a:bodyPr/>
+          <a:lstStyle/>
+          <a:p>
+            <a:pPr marL="0" indent="0">
+              <a:buNone/>
+            </a:pPr>
+            <a:endParaRPr lang="en-US" dirty="0" smtClean="0"/>
+          </a:p>
+          <a:p>
+            <a:pPr marL="0" indent="0">
+              <a:buNone/>
+            </a:pPr>
+            <a:endParaRPr lang="en-US" dirty="0" smtClean="0"/>
+          </a:p>
+        </p:txBody>
+      </p:sp>
+      <p:sp>
+        <p:nvSpPr>
+          <p:cNvPr id="5" name="Rectangle 4"/>
+          <p:cNvSpPr/>
+          <p:nvPr/>
+        </p:nvSpPr>
+        <p:spPr>
+          <a:xfrm>
+            <a:off x="152400" y="1423359"/>
+            <a:ext cx="2819400" cy="2310441"/>
+          </a:xfrm>
+          <a:prstGeom prst="rect">
+            <a:avLst/>
+          </a:prstGeom>
+          <a:solidFill>
+            <a:schemeClr val="accent1">
+              <a:lumMod val="20000"/>
+              <a:lumOff val="80000"/>
+            </a:schemeClr>
+          </a:solidFill>
+        </p:spPr>
+        <p:style>
+          <a:lnRef idx="2">
+            <a:schemeClr val="accent1">
+              <a:shade val="50000"/>
+            </a:schemeClr>
+          </a:lnRef>
+          <a:fillRef idx="1">
+            <a:schemeClr val="accent1"/>
+          </a:fillRef>
+          <a:effectRef idx="0">
+            <a:schemeClr val="accent1"/>
+          </a:effectRef>
+          <a:fontRef idx="minor">
+            <a:schemeClr val="lt1"/>
+          </a:fontRef>
+        </p:style>
+        <p:txBody>
+          <a:bodyPr rtlCol="0" anchor="ctr"/>
+          <a:lstStyle/>
+          <a:p>
+            <a:pPr algn="ctr"/>
+            <a:endParaRPr lang="en-US"/>
+          </a:p>
+        </p:txBody>
+      </p:sp>
+      <p:sp>
+        <p:nvSpPr>
+          <p:cNvPr id="6" name="Rectangle 5"/>
+          <p:cNvSpPr/>
+          <p:nvPr/>
+        </p:nvSpPr>
+        <p:spPr>
+          <a:xfrm>
+            <a:off x="6097438" y="1406106"/>
+            <a:ext cx="2895600" cy="2327694"/>
+          </a:xfrm>
+          <a:prstGeom prst="rect">
+            <a:avLst/>
+          </a:prstGeom>
+          <a:solidFill>
+            <a:schemeClr val="accent1">
+              <a:lumMod val="20000"/>
+              <a:lumOff val="80000"/>
+            </a:schemeClr>
+          </a:solidFill>
+        </p:spPr>
+        <p:style>
+          <a:lnRef idx="2">
+            <a:schemeClr val="accent1">
+              <a:shade val="50000"/>
+            </a:schemeClr>
+          </a:lnRef>
+          <a:fillRef idx="1">
+            <a:schemeClr val="accent1"/>
+          </a:fillRef>
+          <a:effectRef idx="0">
+            <a:schemeClr val="accent1"/>
+          </a:effectRef>
+          <a:fontRef idx="minor">
+            <a:schemeClr val="lt1"/>
+          </a:fontRef>
+        </p:style>
+        <p:txBody>
+          <a:bodyPr rtlCol="0" anchor="ctr"/>
+          <a:lstStyle/>
+          <a:p>
+            <a:pPr algn="ctr"/>
+            <a:endParaRPr lang="en-US"/>
+          </a:p>
+        </p:txBody>
+      </p:sp>
+      <p:pic>
+        <p:nvPicPr>
+          <p:cNvPr id="1026" name="Picture 2" descr="https://lh4.googleusercontent.com/rsiEutQMpDQ8JPa0Z57viaW6-nPgInssM-m9afFbGOiQeKpzWm0C1Nv4oGPTfDt59vzDH8dL2zo2Ywz7so_fS_Pu534mVc9q_fXe1TlpqYbvTTecT07qxf0f-FWtIarlEJw3u7-JNI9t"/>
+          <p:cNvPicPr>
+            <a:picLocks noChangeAspect="1" noChangeArrowheads="1"/>
+          </p:cNvPicPr>
+          <p:nvPr/>
+        </p:nvPicPr>
+        <p:blipFill>
+          <a:blip r:embed="rId2">
+            <a:extLst>
+              <a:ext uri="{28A0092B-C50C-407E-A947-70E740481C1C}">
+                <a14:useLocalDpi xmlns:a14="http://schemas.microsoft.com/office/drawing/2010/main" val="0"/>
+              </a:ext>
+            </a:extLst>
+          </a:blip>
+          <a:srcRect/>
+          <a:stretch>
+            <a:fillRect/>
+          </a:stretch>
+        </p:blipFill>
+        <p:spPr bwMode="auto">
+          <a:xfrm>
+            <a:off x="1066800" y="1726361"/>
+            <a:ext cx="990600" cy="990601"/>
+          </a:xfrm>
+          <a:prstGeom prst="rect">
+            <a:avLst/>
+          </a:prstGeom>
+          <a:noFill/>
+          <a:extLst>
+            <a:ext uri="{909E8E84-426E-40DD-AFC4-6F175D3DCCD1}">
+              <a14:hiddenFill xmlns:a14="http://schemas.microsoft.com/office/drawing/2010/main">
+                <a:solidFill>
+                  <a:srgbClr val="FFFFFF"/>
+                </a:solidFill>
+              </a14:hiddenFill>
+            </a:ext>
+          </a:extLst>
+        </p:spPr>
+      </p:pic>
+      <p:pic>
+        <p:nvPicPr>
+          <p:cNvPr id="1028" name="Picture 4" descr="https://lh6.googleusercontent.com/awuHlYg8VnbUKKTbw6BzhL0p3a_QE1h9Zx_5SlKXOWPBfH9k0rEyCmYbPwIYNU2L3Eidk3PZGC3_CkONcmwn1xGNY0l6MB4zi7uj9olYReGI5iRSBoUM_pvcIYwZgMZmBZQeCtJnj3V5"/>
+          <p:cNvPicPr>
+            <a:picLocks noChangeAspect="1" noChangeArrowheads="1"/>
+          </p:cNvPicPr>
+          <p:nvPr/>
+        </p:nvPicPr>
+        <p:blipFill>
+          <a:blip r:embed="rId3">
+            <a:extLst>
+              <a:ext uri="{BEBA8EAE-BF5A-486C-A8C5-ECC9F3942E4B}">
+                <a14:imgProps xmlns:a14="http://schemas.microsoft.com/office/drawing/2010/main">
+                  <a14:imgLayer r:embed="rId4">
+                    <a14:imgEffect>
+                      <a14:backgroundRemoval t="10000" b="90000" l="10000" r="90000"/>
+                    </a14:imgEffect>
+                  </a14:imgLayer>
+                </a14:imgProps>
+              </a:ext>
+              <a:ext uri="{28A0092B-C50C-407E-A947-70E740481C1C}">
+                <a14:useLocalDpi xmlns:a14="http://schemas.microsoft.com/office/drawing/2010/main" val="0"/>
+              </a:ext>
+            </a:extLst>
+          </a:blip>
+          <a:srcRect/>
+          <a:stretch>
+            <a:fillRect/>
+          </a:stretch>
+        </p:blipFill>
+        <p:spPr bwMode="auto">
+          <a:xfrm>
+            <a:off x="7248345" y="1573961"/>
+            <a:ext cx="838200" cy="1143001"/>
+          </a:xfrm>
+          <a:prstGeom prst="rect">
+            <a:avLst/>
+          </a:prstGeom>
+          <a:noFill/>
+          <a:extLst>
+            <a:ext uri="{909E8E84-426E-40DD-AFC4-6F175D3DCCD1}">
+              <a14:hiddenFill xmlns:a14="http://schemas.microsoft.com/office/drawing/2010/main">
+                <a:solidFill>
+                  <a:srgbClr val="FFFFFF"/>
+                </a:solidFill>
+              </a14:hiddenFill>
+            </a:ext>
+          </a:extLst>
+        </p:spPr>
+      </p:pic>
+      <p:sp>
+        <p:nvSpPr>
+          <p:cNvPr id="8" name="Rectangle 7"/>
+          <p:cNvSpPr/>
+          <p:nvPr/>
+        </p:nvSpPr>
+        <p:spPr>
+          <a:xfrm>
+            <a:off x="228600" y="2716962"/>
+            <a:ext cx="838200" cy="559638"/>
+          </a:xfrm>
+          <a:prstGeom prst="rect">
+            <a:avLst/>
+          </a:prstGeom>
+          <a:solidFill>
+            <a:schemeClr val="tx2">
+              <a:lumMod val="40000"/>
+              <a:lumOff val="60000"/>
+            </a:schemeClr>
+          </a:solidFill>
+        </p:spPr>
+        <p:style>
+          <a:lnRef idx="2">
+            <a:schemeClr val="accent1">
+              <a:shade val="50000"/>
+            </a:schemeClr>
+          </a:lnRef>
+          <a:fillRef idx="1">
+            <a:schemeClr val="accent1"/>
+          </a:fillRef>
+          <a:effectRef idx="0">
+            <a:schemeClr val="accent1"/>
+          </a:effectRef>
+          <a:fontRef idx="minor">
+            <a:schemeClr val="lt1"/>
+          </a:fontRef>
+        </p:style>
+        <p:txBody>
+          <a:bodyPr rtlCol="0" anchor="ctr"/>
+          <a:lstStyle/>
+          <a:p>
+            <a:pPr algn="ctr"/>
+            <a:r>
+              <a:rPr lang="en-US" dirty="0" smtClean="0"/>
+              <a:t>Object</a:t>
+            </a:r>
+            <a:endParaRPr lang="en-US" dirty="0"/>
+          </a:p>
+        </p:txBody>
+      </p:sp>
+      <p:sp>
+        <p:nvSpPr>
+          <p:cNvPr id="11" name="Rectangle 10"/>
+          <p:cNvSpPr/>
+          <p:nvPr/>
+        </p:nvSpPr>
+        <p:spPr>
+          <a:xfrm>
+            <a:off x="1562100" y="2716962"/>
+            <a:ext cx="1333500" cy="559638"/>
+          </a:xfrm>
+          <a:prstGeom prst="rect">
+            <a:avLst/>
+          </a:prstGeom>
+          <a:solidFill>
+            <a:schemeClr val="tx2">
+              <a:lumMod val="40000"/>
+              <a:lumOff val="60000"/>
+            </a:schemeClr>
+          </a:solidFill>
+        </p:spPr>
+        <p:style>
+          <a:lnRef idx="2">
+            <a:schemeClr val="accent1">
+              <a:shade val="50000"/>
+            </a:schemeClr>
+          </a:lnRef>
+          <a:fillRef idx="1">
+            <a:schemeClr val="accent1"/>
+          </a:fillRef>
+          <a:effectRef idx="0">
+            <a:schemeClr val="accent1"/>
+          </a:effectRef>
+          <a:fontRef idx="minor">
+            <a:schemeClr val="lt1"/>
+          </a:fontRef>
+        </p:style>
+        <p:txBody>
+          <a:bodyPr rtlCol="0" anchor="ctr"/>
+          <a:lstStyle/>
+          <a:p>
+            <a:pPr algn="ctr"/>
+            <a:r>
+              <a:rPr lang="en-US" dirty="0" smtClean="0"/>
+              <a:t>Stream of bytes</a:t>
+            </a:r>
+            <a:endParaRPr lang="en-US" dirty="0"/>
+          </a:p>
+        </p:txBody>
+      </p:sp>
+      <p:sp>
+        <p:nvSpPr>
+          <p:cNvPr id="24" name="Right Arrow 23"/>
+          <p:cNvSpPr/>
+          <p:nvPr/>
+        </p:nvSpPr>
+        <p:spPr>
+          <a:xfrm>
+            <a:off x="1066800" y="2951852"/>
+            <a:ext cx="495300" cy="158869"/>
+          </a:xfrm>
+          <a:prstGeom prst="rightArrow">
+            <a:avLst/>
+          </a:prstGeom>
+          <a:solidFill>
+            <a:schemeClr val="tx2">
+              <a:lumMod val="40000"/>
+              <a:lumOff val="60000"/>
+            </a:schemeClr>
+          </a:solidFill>
+        </p:spPr>
+        <p:style>
+          <a:lnRef idx="2">
+            <a:schemeClr val="accent1">
+              <a:shade val="50000"/>
+            </a:schemeClr>
+          </a:lnRef>
+          <a:fillRef idx="1">
+            <a:schemeClr val="accent1"/>
+          </a:fillRef>
+          <a:effectRef idx="0">
+            <a:schemeClr val="accent1"/>
+          </a:effectRef>
+          <a:fontRef idx="minor">
+            <a:schemeClr val="lt1"/>
+          </a:fontRef>
+        </p:style>
+        <p:txBody>
+          <a:bodyPr rtlCol="0" anchor="ctr"/>
+          <a:lstStyle/>
+          <a:p>
+            <a:pPr algn="ctr"/>
+            <a:endParaRPr lang="en-US"/>
+          </a:p>
+        </p:txBody>
+      </p:sp>
+      <p:sp>
+        <p:nvSpPr>
+          <p:cNvPr id="25" name="TextBox 24"/>
+          <p:cNvSpPr txBox="1"/>
+          <p:nvPr/>
+        </p:nvSpPr>
+        <p:spPr>
+          <a:xfrm>
+            <a:off x="808726" y="3364468"/>
+            <a:ext cx="1371600" cy="369332"/>
+          </a:xfrm>
+          <a:prstGeom prst="rect">
+            <a:avLst/>
+          </a:prstGeom>
+          <a:noFill/>
+        </p:spPr>
+        <p:txBody>
+          <a:bodyPr wrap="square" rtlCol="0">
+            <a:spAutoFit/>
+          </a:bodyPr>
+          <a:lstStyle/>
+          <a:p>
+            <a:r>
+              <a:rPr lang="en-US" dirty="0" smtClean="0"/>
+              <a:t>Serialization</a:t>
+            </a:r>
+            <a:endParaRPr lang="en-US" dirty="0"/>
+          </a:p>
+        </p:txBody>
+      </p:sp>
+      <p:sp>
+        <p:nvSpPr>
+          <p:cNvPr id="28" name="Rectangle 27"/>
+          <p:cNvSpPr/>
+          <p:nvPr/>
+        </p:nvSpPr>
+        <p:spPr>
+          <a:xfrm>
+            <a:off x="6172200" y="2716962"/>
+            <a:ext cx="1244360" cy="559638"/>
+          </a:xfrm>
+          <a:prstGeom prst="rect">
+            <a:avLst/>
+          </a:prstGeom>
+          <a:solidFill>
+            <a:schemeClr val="tx2">
+              <a:lumMod val="40000"/>
+              <a:lumOff val="60000"/>
+            </a:schemeClr>
+          </a:solidFill>
+        </p:spPr>
+        <p:style>
+          <a:lnRef idx="2">
+            <a:schemeClr val="accent1">
+              <a:shade val="50000"/>
+            </a:schemeClr>
+          </a:lnRef>
+          <a:fillRef idx="1">
+            <a:schemeClr val="accent1"/>
+          </a:fillRef>
+          <a:effectRef idx="0">
+            <a:schemeClr val="accent1"/>
+          </a:effectRef>
+          <a:fontRef idx="minor">
+            <a:schemeClr val="lt1"/>
+          </a:fontRef>
+        </p:style>
+        <p:txBody>
+          <a:bodyPr rtlCol="0" anchor="ctr"/>
+          <a:lstStyle/>
+          <a:p>
+            <a:pPr algn="ctr"/>
+            <a:r>
+              <a:rPr lang="en-US" dirty="0" smtClean="0"/>
+              <a:t>Stream of bytes</a:t>
+            </a:r>
+            <a:endParaRPr lang="en-US" dirty="0"/>
+          </a:p>
+        </p:txBody>
+      </p:sp>
+      <p:sp>
+        <p:nvSpPr>
+          <p:cNvPr id="29" name="Rectangle 28"/>
+          <p:cNvSpPr/>
+          <p:nvPr/>
+        </p:nvSpPr>
+        <p:spPr>
+          <a:xfrm>
+            <a:off x="8093734" y="2733676"/>
+            <a:ext cx="838200" cy="559638"/>
+          </a:xfrm>
+          <a:prstGeom prst="rect">
+            <a:avLst/>
+          </a:prstGeom>
+          <a:solidFill>
+            <a:schemeClr val="tx2">
+              <a:lumMod val="40000"/>
+              <a:lumOff val="60000"/>
+            </a:schemeClr>
+          </a:solidFill>
+        </p:spPr>
+        <p:style>
+          <a:lnRef idx="2">
+            <a:schemeClr val="accent1">
+              <a:shade val="50000"/>
+            </a:schemeClr>
+          </a:lnRef>
+          <a:fillRef idx="1">
+            <a:schemeClr val="accent1"/>
+          </a:fillRef>
+          <a:effectRef idx="0">
+            <a:schemeClr val="accent1"/>
+          </a:effectRef>
+          <a:fontRef idx="minor">
+            <a:schemeClr val="lt1"/>
+          </a:fontRef>
+        </p:style>
+        <p:txBody>
+          <a:bodyPr rtlCol="0" anchor="ctr"/>
+          <a:lstStyle/>
+          <a:p>
+            <a:pPr algn="ctr"/>
+            <a:r>
+              <a:rPr lang="en-US" dirty="0" smtClean="0"/>
+              <a:t>Object</a:t>
+            </a:r>
+            <a:endParaRPr lang="en-US" dirty="0"/>
+          </a:p>
+        </p:txBody>
+      </p:sp>
+      <p:sp>
+        <p:nvSpPr>
+          <p:cNvPr id="30" name="Right Arrow 29"/>
+          <p:cNvSpPr/>
+          <p:nvPr/>
+        </p:nvSpPr>
+        <p:spPr>
+          <a:xfrm>
+            <a:off x="7416560" y="2877271"/>
+            <a:ext cx="669985" cy="136224"/>
+          </a:xfrm>
+          <a:prstGeom prst="rightArrow">
+            <a:avLst/>
+          </a:prstGeom>
+          <a:solidFill>
+            <a:schemeClr val="tx2">
+              <a:lumMod val="40000"/>
+              <a:lumOff val="60000"/>
+            </a:schemeClr>
+          </a:solidFill>
+        </p:spPr>
+        <p:style>
+          <a:lnRef idx="2">
+            <a:schemeClr val="accent1">
+              <a:shade val="50000"/>
+            </a:schemeClr>
+          </a:lnRef>
+          <a:fillRef idx="1">
+            <a:schemeClr val="accent1"/>
+          </a:fillRef>
+          <a:effectRef idx="0">
+            <a:schemeClr val="accent1"/>
+          </a:effectRef>
+          <a:fontRef idx="minor">
+            <a:schemeClr val="lt1"/>
+          </a:fontRef>
+        </p:style>
+        <p:txBody>
+          <a:bodyPr rtlCol="0" anchor="ctr"/>
+          <a:lstStyle/>
+          <a:p>
+            <a:pPr algn="ctr"/>
+            <a:endParaRPr lang="en-US"/>
+          </a:p>
+        </p:txBody>
+      </p:sp>
+      <p:sp>
+        <p:nvSpPr>
+          <p:cNvPr id="31" name="TextBox 30"/>
+          <p:cNvSpPr txBox="1"/>
+          <p:nvPr/>
+        </p:nvSpPr>
+        <p:spPr>
+          <a:xfrm>
+            <a:off x="6972300" y="3364468"/>
+            <a:ext cx="1600200" cy="369332"/>
+          </a:xfrm>
+          <a:prstGeom prst="rect">
+            <a:avLst/>
+          </a:prstGeom>
+          <a:noFill/>
+        </p:spPr>
+        <p:txBody>
+          <a:bodyPr wrap="square" rtlCol="0">
+            <a:spAutoFit/>
+          </a:bodyPr>
+          <a:lstStyle/>
+          <a:p>
+            <a:r>
+              <a:rPr lang="en-US" dirty="0" smtClean="0"/>
+              <a:t>Deserialization</a:t>
+            </a:r>
+            <a:endParaRPr lang="en-US" dirty="0"/>
+          </a:p>
+        </p:txBody>
+      </p:sp>
+      <p:sp>
+        <p:nvSpPr>
+          <p:cNvPr id="32" name="TextBox 31"/>
+          <p:cNvSpPr txBox="1"/>
+          <p:nvPr/>
+        </p:nvSpPr>
+        <p:spPr>
+          <a:xfrm>
+            <a:off x="647700" y="1427037"/>
+            <a:ext cx="1532626" cy="369332"/>
+          </a:xfrm>
+          <a:prstGeom prst="rect">
+            <a:avLst/>
+          </a:prstGeom>
+          <a:noFill/>
+        </p:spPr>
+        <p:txBody>
+          <a:bodyPr wrap="square" rtlCol="0">
+            <a:spAutoFit/>
+          </a:bodyPr>
+          <a:lstStyle/>
+          <a:p>
+            <a:r>
+              <a:rPr lang="en-US" dirty="0" smtClean="0"/>
+              <a:t>Master Node</a:t>
+            </a:r>
+            <a:endParaRPr lang="en-US" dirty="0"/>
+          </a:p>
+        </p:txBody>
+      </p:sp>
+      <p:sp>
+        <p:nvSpPr>
+          <p:cNvPr id="33" name="TextBox 32"/>
+          <p:cNvSpPr txBox="1"/>
+          <p:nvPr/>
+        </p:nvSpPr>
+        <p:spPr>
+          <a:xfrm>
+            <a:off x="7027652" y="1427037"/>
+            <a:ext cx="1532626" cy="369332"/>
+          </a:xfrm>
+          <a:prstGeom prst="rect">
+            <a:avLst/>
+          </a:prstGeom>
+          <a:noFill/>
+        </p:spPr>
+        <p:txBody>
+          <a:bodyPr wrap="square" rtlCol="0">
+            <a:spAutoFit/>
+          </a:bodyPr>
+          <a:lstStyle/>
+          <a:p>
+            <a:r>
+              <a:rPr lang="en-US" dirty="0" smtClean="0"/>
+              <a:t>Slave Node</a:t>
+            </a:r>
+            <a:endParaRPr lang="en-US" dirty="0"/>
+          </a:p>
+        </p:txBody>
+      </p:sp>
+      <p:sp>
+        <p:nvSpPr>
+          <p:cNvPr id="37" name="Oval 36"/>
+          <p:cNvSpPr/>
+          <p:nvPr/>
+        </p:nvSpPr>
+        <p:spPr>
+          <a:xfrm>
+            <a:off x="5550235" y="2661039"/>
+            <a:ext cx="182880" cy="182880"/>
+          </a:xfrm>
+          <a:prstGeom prst="ellipse">
+            <a:avLst/>
+          </a:prstGeom>
+        </p:spPr>
+        <p:style>
+          <a:lnRef idx="2">
+            <a:schemeClr val="accent1">
+              <a:shade val="50000"/>
+            </a:schemeClr>
+          </a:lnRef>
+          <a:fillRef idx="1">
+            <a:schemeClr val="accent1"/>
+          </a:fillRef>
+          <a:effectRef idx="0">
+            <a:schemeClr val="accent1"/>
+          </a:effectRef>
+          <a:fontRef idx="minor">
+            <a:schemeClr val="lt1"/>
+          </a:fontRef>
+        </p:style>
+        <p:txBody>
+          <a:bodyPr rtlCol="0" anchor="ctr"/>
+          <a:lstStyle/>
+          <a:p>
+            <a:pPr algn="ctr"/>
+            <a:endParaRPr lang="en-US"/>
+          </a:p>
+        </p:txBody>
+      </p:sp>
+      <p:sp>
+        <p:nvSpPr>
+          <p:cNvPr id="38" name="Oval 37"/>
+          <p:cNvSpPr/>
+          <p:nvPr/>
+        </p:nvSpPr>
+        <p:spPr>
+          <a:xfrm>
+            <a:off x="5865962" y="2661692"/>
+            <a:ext cx="182880" cy="182880"/>
+          </a:xfrm>
+          <a:prstGeom prst="ellipse">
+            <a:avLst/>
+          </a:prstGeom>
+        </p:spPr>
+        <p:style>
+          <a:lnRef idx="2">
+            <a:schemeClr val="accent1">
+              <a:shade val="50000"/>
+            </a:schemeClr>
+          </a:lnRef>
+          <a:fillRef idx="1">
+            <a:schemeClr val="accent1"/>
+          </a:fillRef>
+          <a:effectRef idx="0">
+            <a:schemeClr val="accent1"/>
+          </a:effectRef>
+          <a:fontRef idx="minor">
+            <a:schemeClr val="lt1"/>
+          </a:fontRef>
+        </p:style>
+        <p:txBody>
+          <a:bodyPr rtlCol="0" anchor="ctr"/>
+          <a:lstStyle/>
+          <a:p>
+            <a:pPr algn="ctr"/>
+            <a:endParaRPr lang="en-US"/>
+          </a:p>
+        </p:txBody>
+      </p:sp>
+      <p:sp>
+        <p:nvSpPr>
+          <p:cNvPr id="26" name="TextBox 25"/>
+          <p:cNvSpPr txBox="1"/>
+          <p:nvPr/>
+        </p:nvSpPr>
+        <p:spPr>
+          <a:xfrm>
+            <a:off x="3337560" y="2285202"/>
+            <a:ext cx="2306990" cy="369332"/>
+          </a:xfrm>
+          <a:prstGeom prst="rect">
+            <a:avLst/>
+          </a:prstGeom>
+          <a:noFill/>
+        </p:spPr>
+        <p:txBody>
+          <a:bodyPr wrap="square" rtlCol="0">
+            <a:spAutoFit/>
+          </a:bodyPr>
+          <a:lstStyle/>
+          <a:p>
+            <a:r>
+              <a:rPr lang="en-US" dirty="0" smtClean="0"/>
+              <a:t>Sent over the network</a:t>
+            </a:r>
+            <a:endParaRPr lang="en-US" dirty="0"/>
+          </a:p>
+        </p:txBody>
+      </p:sp>
+      <p:sp>
+        <p:nvSpPr>
+          <p:cNvPr id="49" name="Oval 48"/>
+          <p:cNvSpPr/>
+          <p:nvPr/>
+        </p:nvSpPr>
+        <p:spPr>
+          <a:xfrm>
+            <a:off x="5254925" y="2661039"/>
+            <a:ext cx="182880" cy="182880"/>
+          </a:xfrm>
+          <a:prstGeom prst="ellipse">
+            <a:avLst/>
+          </a:prstGeom>
+        </p:spPr>
+        <p:style>
+          <a:lnRef idx="2">
+            <a:schemeClr val="accent1">
+              <a:shade val="50000"/>
+            </a:schemeClr>
+          </a:lnRef>
+          <a:fillRef idx="1">
+            <a:schemeClr val="accent1"/>
+          </a:fillRef>
+          <a:effectRef idx="0">
+            <a:schemeClr val="accent1"/>
+          </a:effectRef>
+          <a:fontRef idx="minor">
+            <a:schemeClr val="lt1"/>
+          </a:fontRef>
+        </p:style>
+        <p:txBody>
+          <a:bodyPr rtlCol="0" anchor="ctr"/>
+          <a:lstStyle/>
+          <a:p>
+            <a:pPr algn="ctr"/>
+            <a:endParaRPr lang="en-US"/>
+          </a:p>
+        </p:txBody>
+      </p:sp>
+      <p:sp>
+        <p:nvSpPr>
+          <p:cNvPr id="50" name="Oval 49"/>
+          <p:cNvSpPr/>
+          <p:nvPr/>
+        </p:nvSpPr>
+        <p:spPr>
+          <a:xfrm>
+            <a:off x="3123340" y="2678793"/>
+            <a:ext cx="182880" cy="182880"/>
+          </a:xfrm>
+          <a:prstGeom prst="ellipse">
+            <a:avLst/>
+          </a:prstGeom>
+        </p:spPr>
+        <p:style>
+          <a:lnRef idx="2">
+            <a:schemeClr val="accent1">
+              <a:shade val="50000"/>
+            </a:schemeClr>
+          </a:lnRef>
+          <a:fillRef idx="1">
+            <a:schemeClr val="accent1"/>
+          </a:fillRef>
+          <a:effectRef idx="0">
+            <a:schemeClr val="accent1"/>
+          </a:effectRef>
+          <a:fontRef idx="minor">
+            <a:schemeClr val="lt1"/>
+          </a:fontRef>
+        </p:style>
+        <p:txBody>
+          <a:bodyPr rtlCol="0" anchor="ctr"/>
+          <a:lstStyle/>
+          <a:p>
+            <a:pPr algn="ctr"/>
+            <a:endParaRPr lang="en-US"/>
+          </a:p>
+        </p:txBody>
+      </p:sp>
+      <p:sp>
+        <p:nvSpPr>
+          <p:cNvPr id="51" name="Oval 50"/>
+          <p:cNvSpPr/>
+          <p:nvPr/>
+        </p:nvSpPr>
+        <p:spPr>
+          <a:xfrm>
+            <a:off x="3426125" y="2678793"/>
+            <a:ext cx="182880" cy="182880"/>
+          </a:xfrm>
+          <a:prstGeom prst="ellipse">
+            <a:avLst/>
+          </a:prstGeom>
+        </p:spPr>
+        <p:style>
+          <a:lnRef idx="2">
+            <a:schemeClr val="accent1">
+              <a:shade val="50000"/>
+            </a:schemeClr>
+          </a:lnRef>
+          <a:fillRef idx="1">
+            <a:schemeClr val="accent1"/>
+          </a:fillRef>
+          <a:effectRef idx="0">
+            <a:schemeClr val="accent1"/>
+          </a:effectRef>
+          <a:fontRef idx="minor">
+            <a:schemeClr val="lt1"/>
+          </a:fontRef>
+        </p:style>
+        <p:txBody>
+          <a:bodyPr rtlCol="0" anchor="ctr"/>
+          <a:lstStyle/>
+          <a:p>
+            <a:pPr algn="ctr"/>
+            <a:endParaRPr lang="en-US"/>
+          </a:p>
+        </p:txBody>
+      </p:sp>
+      <p:sp>
+        <p:nvSpPr>
+          <p:cNvPr id="52" name="Oval 51"/>
+          <p:cNvSpPr/>
+          <p:nvPr/>
+        </p:nvSpPr>
+        <p:spPr>
+          <a:xfrm>
+            <a:off x="3715685" y="2678793"/>
+            <a:ext cx="182880" cy="182880"/>
+          </a:xfrm>
+          <a:prstGeom prst="ellipse">
+            <a:avLst/>
+          </a:prstGeom>
+        </p:spPr>
+        <p:style>
+          <a:lnRef idx="2">
+            <a:schemeClr val="accent1">
+              <a:shade val="50000"/>
+            </a:schemeClr>
+          </a:lnRef>
+          <a:fillRef idx="1">
+            <a:schemeClr val="accent1"/>
+          </a:fillRef>
+          <a:effectRef idx="0">
+            <a:schemeClr val="accent1"/>
+          </a:effectRef>
+          <a:fontRef idx="minor">
+            <a:schemeClr val="lt1"/>
+          </a:fontRef>
+        </p:style>
+        <p:txBody>
+          <a:bodyPr rtlCol="0" anchor="ctr"/>
+          <a:lstStyle/>
+          <a:p>
+            <a:pPr algn="ctr"/>
+            <a:endParaRPr lang="en-US"/>
+          </a:p>
+        </p:txBody>
+      </p:sp>
+      <p:sp>
+        <p:nvSpPr>
+          <p:cNvPr id="53" name="Oval 52"/>
+          <p:cNvSpPr/>
+          <p:nvPr/>
+        </p:nvSpPr>
+        <p:spPr>
+          <a:xfrm>
+            <a:off x="4038600" y="2678292"/>
+            <a:ext cx="182880" cy="182880"/>
+          </a:xfrm>
+          <a:prstGeom prst="ellipse">
+            <a:avLst/>
+          </a:prstGeom>
+        </p:spPr>
+        <p:style>
+          <a:lnRef idx="2">
+            <a:schemeClr val="accent1">
+              <a:shade val="50000"/>
+            </a:schemeClr>
+          </a:lnRef>
+          <a:fillRef idx="1">
+            <a:schemeClr val="accent1"/>
+          </a:fillRef>
+          <a:effectRef idx="0">
+            <a:schemeClr val="accent1"/>
+          </a:effectRef>
+          <a:fontRef idx="minor">
+            <a:schemeClr val="lt1"/>
+          </a:fontRef>
+        </p:style>
+        <p:txBody>
+          <a:bodyPr rtlCol="0" anchor="ctr"/>
+          <a:lstStyle/>
+          <a:p>
+            <a:pPr algn="ctr"/>
+            <a:endParaRPr lang="en-US"/>
+          </a:p>
+        </p:txBody>
+      </p:sp>
+      <p:sp>
+        <p:nvSpPr>
+          <p:cNvPr id="54" name="Oval 53"/>
+          <p:cNvSpPr/>
+          <p:nvPr/>
+        </p:nvSpPr>
+        <p:spPr>
+          <a:xfrm>
+            <a:off x="4967090" y="2661692"/>
+            <a:ext cx="182880" cy="182880"/>
+          </a:xfrm>
+          <a:prstGeom prst="ellipse">
+            <a:avLst/>
+          </a:prstGeom>
+        </p:spPr>
+        <p:style>
+          <a:lnRef idx="2">
+            <a:schemeClr val="accent1">
+              <a:shade val="50000"/>
+            </a:schemeClr>
+          </a:lnRef>
+          <a:fillRef idx="1">
+            <a:schemeClr val="accent1"/>
+          </a:fillRef>
+          <a:effectRef idx="0">
+            <a:schemeClr val="accent1"/>
+          </a:effectRef>
+          <a:fontRef idx="minor">
+            <a:schemeClr val="lt1"/>
+          </a:fontRef>
+        </p:style>
+        <p:txBody>
+          <a:bodyPr rtlCol="0" anchor="ctr"/>
+          <a:lstStyle/>
+          <a:p>
+            <a:pPr algn="ctr"/>
+            <a:endParaRPr lang="en-US"/>
+          </a:p>
+        </p:txBody>
+      </p:sp>
+    </p:spTree>
+    <p:extLst>
+      <p:ext uri="{BB962C8B-B14F-4D97-AF65-F5344CB8AC3E}">
+        <p14:creationId xmlns:p14="http://schemas.microsoft.com/office/powerpoint/2010/main" val="860012903"/>
+      </p:ext>
+    </p:extLst>
+  </p:cSld>
+  <p:clrMapOvr>
+    <a:masterClrMapping/>
+  </p:clrMapOvr>
+</p:sld>
+</file>
+
 <file path=ppt/slides/slide3.xml><?xml version="1.0" encoding="utf-8"?>
 <p:sld xmlns:a="http://schemas.openxmlformats.org/drawingml/2006/main" xmlns:r="http://schemas.openxmlformats.org/officeDocument/2006/relationships" xmlns:p="http://schemas.openxmlformats.org/presentationml/2006/main">
   <p:cSld>

</xml_diff>

<commit_message>
added the picture for Communication Abstraction
</commit_message>
<xml_diff>
--- a/pictures.pptx
+++ b/pictures.pptx
@@ -26,6 +26,7 @@
     <p:sldId id="274" r:id="rId20"/>
     <p:sldId id="275" r:id="rId21"/>
     <p:sldId id="276" r:id="rId22"/>
+    <p:sldId id="277" r:id="rId23"/>
   </p:sldIdLst>
   <p:sldSz cx="9144000" cy="6858000" type="screen4x3"/>
   <p:notesSz cx="6858000" cy="9144000"/>
@@ -17163,7 +17164,7 @@
             <a:fld id="{1D8BD707-D9CF-40AE-B4C6-C98DA3205C09}" type="datetimeFigureOut">
               <a:rPr lang="en-US" smtClean="0"/>
               <a:pPr/>
-              <a:t>12/2/2016</a:t>
+              <a:t>12/5/2016</a:t>
             </a:fld>
             <a:endParaRPr lang="en-US"/>
           </a:p>
@@ -17330,7 +17331,7 @@
             <a:fld id="{1D8BD707-D9CF-40AE-B4C6-C98DA3205C09}" type="datetimeFigureOut">
               <a:rPr lang="en-US" smtClean="0"/>
               <a:pPr/>
-              <a:t>12/2/2016</a:t>
+              <a:t>12/5/2016</a:t>
             </a:fld>
             <a:endParaRPr lang="en-US"/>
           </a:p>
@@ -17507,7 +17508,7 @@
             <a:fld id="{1D8BD707-D9CF-40AE-B4C6-C98DA3205C09}" type="datetimeFigureOut">
               <a:rPr lang="en-US" smtClean="0"/>
               <a:pPr/>
-              <a:t>12/2/2016</a:t>
+              <a:t>12/5/2016</a:t>
             </a:fld>
             <a:endParaRPr lang="en-US"/>
           </a:p>
@@ -17674,7 +17675,7 @@
             <a:fld id="{1D8BD707-D9CF-40AE-B4C6-C98DA3205C09}" type="datetimeFigureOut">
               <a:rPr lang="en-US" smtClean="0"/>
               <a:pPr/>
-              <a:t>12/2/2016</a:t>
+              <a:t>12/5/2016</a:t>
             </a:fld>
             <a:endParaRPr lang="en-US"/>
           </a:p>
@@ -17917,7 +17918,7 @@
             <a:fld id="{1D8BD707-D9CF-40AE-B4C6-C98DA3205C09}" type="datetimeFigureOut">
               <a:rPr lang="en-US" smtClean="0"/>
               <a:pPr/>
-              <a:t>12/2/2016</a:t>
+              <a:t>12/5/2016</a:t>
             </a:fld>
             <a:endParaRPr lang="en-US"/>
           </a:p>
@@ -18202,7 +18203,7 @@
             <a:fld id="{1D8BD707-D9CF-40AE-B4C6-C98DA3205C09}" type="datetimeFigureOut">
               <a:rPr lang="en-US" smtClean="0"/>
               <a:pPr/>
-              <a:t>12/2/2016</a:t>
+              <a:t>12/5/2016</a:t>
             </a:fld>
             <a:endParaRPr lang="en-US"/>
           </a:p>
@@ -18621,7 +18622,7 @@
             <a:fld id="{1D8BD707-D9CF-40AE-B4C6-C98DA3205C09}" type="datetimeFigureOut">
               <a:rPr lang="en-US" smtClean="0"/>
               <a:pPr/>
-              <a:t>12/2/2016</a:t>
+              <a:t>12/5/2016</a:t>
             </a:fld>
             <a:endParaRPr lang="en-US"/>
           </a:p>
@@ -18736,7 +18737,7 @@
             <a:fld id="{1D8BD707-D9CF-40AE-B4C6-C98DA3205C09}" type="datetimeFigureOut">
               <a:rPr lang="en-US" smtClean="0"/>
               <a:pPr/>
-              <a:t>12/2/2016</a:t>
+              <a:t>12/5/2016</a:t>
             </a:fld>
             <a:endParaRPr lang="en-US"/>
           </a:p>
@@ -18828,7 +18829,7 @@
             <a:fld id="{1D8BD707-D9CF-40AE-B4C6-C98DA3205C09}" type="datetimeFigureOut">
               <a:rPr lang="en-US" smtClean="0"/>
               <a:pPr/>
-              <a:t>12/2/2016</a:t>
+              <a:t>12/5/2016</a:t>
             </a:fld>
             <a:endParaRPr lang="en-US"/>
           </a:p>
@@ -19102,7 +19103,7 @@
             <a:fld id="{1D8BD707-D9CF-40AE-B4C6-C98DA3205C09}" type="datetimeFigureOut">
               <a:rPr lang="en-US" smtClean="0"/>
               <a:pPr/>
-              <a:t>12/2/2016</a:t>
+              <a:t>12/5/2016</a:t>
             </a:fld>
             <a:endParaRPr lang="en-US"/>
           </a:p>
@@ -19352,7 +19353,7 @@
             <a:fld id="{1D8BD707-D9CF-40AE-B4C6-C98DA3205C09}" type="datetimeFigureOut">
               <a:rPr lang="en-US" smtClean="0"/>
               <a:pPr/>
-              <a:t>12/2/2016</a:t>
+              <a:t>12/5/2016</a:t>
             </a:fld>
             <a:endParaRPr lang="en-US"/>
           </a:p>
@@ -19562,7 +19563,7 @@
             <a:fld id="{1D8BD707-D9CF-40AE-B4C6-C98DA3205C09}" type="datetimeFigureOut">
               <a:rPr lang="en-US" smtClean="0"/>
               <a:pPr/>
-              <a:t>12/2/2016</a:t>
+              <a:t>12/5/2016</a:t>
             </a:fld>
             <a:endParaRPr lang="en-US"/>
           </a:p>
@@ -23883,6 +23884,934 @@
 </p:sld>
 </file>
 
+<file path=ppt/slides/slide22.xml><?xml version="1.0" encoding="utf-8"?>
+<p:sld xmlns:a="http://schemas.openxmlformats.org/drawingml/2006/main" xmlns:r="http://schemas.openxmlformats.org/officeDocument/2006/relationships" xmlns:p="http://schemas.openxmlformats.org/presentationml/2006/main">
+  <p:cSld>
+    <p:spTree>
+      <p:nvGrpSpPr>
+        <p:cNvPr id="1" name=""/>
+        <p:cNvGrpSpPr/>
+        <p:nvPr/>
+      </p:nvGrpSpPr>
+      <p:grpSpPr>
+        <a:xfrm>
+          <a:off x="0" y="0"/>
+          <a:ext cx="0" cy="0"/>
+          <a:chOff x="0" y="0"/>
+          <a:chExt cx="0" cy="0"/>
+        </a:xfrm>
+      </p:grpSpPr>
+      <p:sp>
+        <p:nvSpPr>
+          <p:cNvPr id="2" name="Title 1"/>
+          <p:cNvSpPr>
+            <a:spLocks noGrp="1"/>
+          </p:cNvSpPr>
+          <p:nvPr>
+            <p:ph type="title"/>
+          </p:nvPr>
+        </p:nvSpPr>
+        <p:spPr>
+          <a:xfrm>
+            <a:off x="457200" y="274638"/>
+            <a:ext cx="731520" cy="228600"/>
+          </a:xfrm>
+        </p:spPr>
+        <p:txBody>
+          <a:bodyPr>
+            <a:normAutofit fontScale="90000"/>
+          </a:bodyPr>
+          <a:lstStyle/>
+          <a:p>
+            <a:r>
+              <a:rPr lang="en-US" dirty="0" smtClean="0"/>
+              <a:t/>
+            </a:r>
+            <a:br>
+              <a:rPr lang="en-US" dirty="0" smtClean="0"/>
+            </a:br>
+            <a:endParaRPr lang="en-US" dirty="0"/>
+          </a:p>
+        </p:txBody>
+      </p:sp>
+      <p:sp>
+        <p:nvSpPr>
+          <p:cNvPr id="3" name="Content Placeholder 2"/>
+          <p:cNvSpPr>
+            <a:spLocks noGrp="1"/>
+          </p:cNvSpPr>
+          <p:nvPr>
+            <p:ph idx="1"/>
+          </p:nvPr>
+        </p:nvSpPr>
+        <p:spPr>
+          <a:xfrm>
+            <a:off x="457200" y="228600"/>
+            <a:ext cx="8229600" cy="5897563"/>
+          </a:xfrm>
+        </p:spPr>
+        <p:txBody>
+          <a:bodyPr/>
+          <a:lstStyle/>
+          <a:p>
+            <a:endParaRPr lang="en-US" dirty="0" smtClean="0"/>
+          </a:p>
+          <a:p>
+            <a:pPr marL="0" indent="0">
+              <a:buNone/>
+            </a:pPr>
+            <a:endParaRPr lang="en-US" dirty="0"/>
+          </a:p>
+          <a:p>
+            <a:pPr marL="0" indent="0">
+              <a:buNone/>
+            </a:pPr>
+            <a:endParaRPr lang="en-US" dirty="0" smtClean="0"/>
+          </a:p>
+        </p:txBody>
+      </p:sp>
+      <p:pic>
+        <p:nvPicPr>
+          <p:cNvPr id="1026" name="Picture 2"/>
+          <p:cNvPicPr>
+            <a:picLocks noChangeAspect="1" noChangeArrowheads="1"/>
+          </p:cNvPicPr>
+          <p:nvPr/>
+        </p:nvPicPr>
+        <p:blipFill>
+          <a:blip r:embed="rId2">
+            <a:extLst>
+              <a:ext uri="{28A0092B-C50C-407E-A947-70E740481C1C}">
+                <a14:useLocalDpi xmlns:a14="http://schemas.microsoft.com/office/drawing/2010/main" val="0"/>
+              </a:ext>
+            </a:extLst>
+          </a:blip>
+          <a:srcRect/>
+          <a:stretch>
+            <a:fillRect/>
+          </a:stretch>
+        </p:blipFill>
+        <p:spPr bwMode="auto">
+          <a:xfrm>
+            <a:off x="55854" y="1355829"/>
+            <a:ext cx="858841" cy="1006371"/>
+          </a:xfrm>
+          <a:prstGeom prst="rect">
+            <a:avLst/>
+          </a:prstGeom>
+          <a:noFill/>
+          <a:ln>
+            <a:noFill/>
+          </a:ln>
+          <a:extLst>
+            <a:ext uri="{909E8E84-426E-40DD-AFC4-6F175D3DCCD1}">
+              <a14:hiddenFill xmlns:a14="http://schemas.microsoft.com/office/drawing/2010/main">
+                <a:solidFill>
+                  <a:schemeClr val="accent1"/>
+                </a:solidFill>
+              </a14:hiddenFill>
+            </a:ext>
+            <a:ext uri="{91240B29-F687-4F45-9708-019B960494DF}">
+              <a14:hiddenLine xmlns:a14="http://schemas.microsoft.com/office/drawing/2010/main" w="9525">
+                <a:solidFill>
+                  <a:schemeClr val="tx1"/>
+                </a:solidFill>
+                <a:miter lim="800000"/>
+                <a:headEnd/>
+                <a:tailEnd/>
+              </a14:hiddenLine>
+            </a:ext>
+          </a:extLst>
+        </p:spPr>
+      </p:pic>
+      <p:sp>
+        <p:nvSpPr>
+          <p:cNvPr id="4" name="Right Arrow 3"/>
+          <p:cNvSpPr/>
+          <p:nvPr/>
+        </p:nvSpPr>
+        <p:spPr>
+          <a:xfrm>
+            <a:off x="965439" y="1744714"/>
+            <a:ext cx="731520" cy="228600"/>
+          </a:xfrm>
+          <a:prstGeom prst="rightArrow">
+            <a:avLst/>
+          </a:prstGeom>
+          <a:solidFill>
+            <a:schemeClr val="accent1">
+              <a:lumMod val="40000"/>
+              <a:lumOff val="60000"/>
+            </a:schemeClr>
+          </a:solidFill>
+        </p:spPr>
+        <p:style>
+          <a:lnRef idx="2">
+            <a:schemeClr val="accent1">
+              <a:shade val="50000"/>
+            </a:schemeClr>
+          </a:lnRef>
+          <a:fillRef idx="1">
+            <a:schemeClr val="accent1"/>
+          </a:fillRef>
+          <a:effectRef idx="0">
+            <a:schemeClr val="accent1"/>
+          </a:effectRef>
+          <a:fontRef idx="minor">
+            <a:schemeClr val="lt1"/>
+          </a:fontRef>
+        </p:style>
+        <p:txBody>
+          <a:bodyPr rtlCol="0" anchor="ctr"/>
+          <a:lstStyle/>
+          <a:p>
+            <a:pPr algn="ctr"/>
+            <a:endParaRPr lang="en-US"/>
+          </a:p>
+        </p:txBody>
+      </p:sp>
+      <p:pic>
+        <p:nvPicPr>
+          <p:cNvPr id="6" name="Picture 2" descr="https://lh4.googleusercontent.com/rsiEutQMpDQ8JPa0Z57viaW6-nPgInssM-m9afFbGOiQeKpzWm0C1Nv4oGPTfDt59vzDH8dL2zo2Ywz7so_fS_Pu534mVc9q_fXe1TlpqYbvTTecT07qxf0f-FWtIarlEJw3u7-JNI9t"/>
+          <p:cNvPicPr>
+            <a:picLocks noChangeAspect="1" noChangeArrowheads="1"/>
+          </p:cNvPicPr>
+          <p:nvPr/>
+        </p:nvPicPr>
+        <p:blipFill>
+          <a:blip r:embed="rId3">
+            <a:extLst>
+              <a:ext uri="{28A0092B-C50C-407E-A947-70E740481C1C}">
+                <a14:useLocalDpi xmlns:a14="http://schemas.microsoft.com/office/drawing/2010/main" val="0"/>
+              </a:ext>
+            </a:extLst>
+          </a:blip>
+          <a:srcRect/>
+          <a:stretch>
+            <a:fillRect/>
+          </a:stretch>
+        </p:blipFill>
+        <p:spPr bwMode="auto">
+          <a:xfrm>
+            <a:off x="1828800" y="1282851"/>
+            <a:ext cx="1279585" cy="1279586"/>
+          </a:xfrm>
+          <a:prstGeom prst="rect">
+            <a:avLst/>
+          </a:prstGeom>
+          <a:noFill/>
+          <a:extLst>
+            <a:ext uri="{909E8E84-426E-40DD-AFC4-6F175D3DCCD1}">
+              <a14:hiddenFill xmlns:a14="http://schemas.microsoft.com/office/drawing/2010/main">
+                <a:solidFill>
+                  <a:srgbClr val="FFFFFF"/>
+                </a:solidFill>
+              </a14:hiddenFill>
+            </a:ext>
+          </a:extLst>
+        </p:spPr>
+      </p:pic>
+      <p:sp>
+        <p:nvSpPr>
+          <p:cNvPr id="5" name="AutoShape 4" descr="Image result for JSON file icon"/>
+          <p:cNvSpPr>
+            <a:spLocks noChangeAspect="1" noChangeArrowheads="1"/>
+          </p:cNvSpPr>
+          <p:nvPr/>
+        </p:nvSpPr>
+        <p:spPr bwMode="auto">
+          <a:xfrm>
+            <a:off x="155575" y="-144463"/>
+            <a:ext cx="304800" cy="304801"/>
+          </a:xfrm>
+          <a:prstGeom prst="rect">
+            <a:avLst/>
+          </a:prstGeom>
+          <a:noFill/>
+          <a:extLst>
+            <a:ext uri="{909E8E84-426E-40DD-AFC4-6F175D3DCCD1}">
+              <a14:hiddenFill xmlns:a14="http://schemas.microsoft.com/office/drawing/2010/main">
+                <a:solidFill>
+                  <a:srgbClr val="FFFFFF"/>
+                </a:solidFill>
+              </a14:hiddenFill>
+            </a:ext>
+          </a:extLst>
+        </p:spPr>
+        <p:txBody>
+          <a:bodyPr vert="horz" wrap="square" lIns="91440" tIns="45720" rIns="91440" bIns="45720" numCol="1" anchor="t" anchorCtr="0" compatLnSpc="1">
+            <a:prstTxWarp prst="textNoShape">
+              <a:avLst/>
+            </a:prstTxWarp>
+          </a:bodyPr>
+          <a:lstStyle/>
+          <a:p>
+            <a:endParaRPr lang="en-US"/>
+          </a:p>
+        </p:txBody>
+      </p:sp>
+      <p:sp>
+        <p:nvSpPr>
+          <p:cNvPr id="7" name="AutoShape 6" descr="Image result for JSON file icon"/>
+          <p:cNvSpPr>
+            <a:spLocks noChangeAspect="1" noChangeArrowheads="1"/>
+          </p:cNvSpPr>
+          <p:nvPr/>
+        </p:nvSpPr>
+        <p:spPr bwMode="auto">
+          <a:xfrm>
+            <a:off x="307975" y="7937"/>
+            <a:ext cx="304800" cy="304801"/>
+          </a:xfrm>
+          <a:prstGeom prst="rect">
+            <a:avLst/>
+          </a:prstGeom>
+          <a:noFill/>
+          <a:extLst>
+            <a:ext uri="{909E8E84-426E-40DD-AFC4-6F175D3DCCD1}">
+              <a14:hiddenFill xmlns:a14="http://schemas.microsoft.com/office/drawing/2010/main">
+                <a:solidFill>
+                  <a:srgbClr val="FFFFFF"/>
+                </a:solidFill>
+              </a14:hiddenFill>
+            </a:ext>
+          </a:extLst>
+        </p:spPr>
+        <p:txBody>
+          <a:bodyPr vert="horz" wrap="square" lIns="91440" tIns="45720" rIns="91440" bIns="45720" numCol="1" anchor="t" anchorCtr="0" compatLnSpc="1">
+            <a:prstTxWarp prst="textNoShape">
+              <a:avLst/>
+            </a:prstTxWarp>
+          </a:bodyPr>
+          <a:lstStyle/>
+          <a:p>
+            <a:endParaRPr lang="en-US"/>
+          </a:p>
+        </p:txBody>
+      </p:sp>
+      <p:pic>
+        <p:nvPicPr>
+          <p:cNvPr id="1031" name="Picture 7"/>
+          <p:cNvPicPr>
+            <a:picLocks noChangeAspect="1" noChangeArrowheads="1"/>
+          </p:cNvPicPr>
+          <p:nvPr/>
+        </p:nvPicPr>
+        <p:blipFill>
+          <a:blip r:embed="rId4" cstate="print">
+            <a:extLst>
+              <a:ext uri="{28A0092B-C50C-407E-A947-70E740481C1C}">
+                <a14:useLocalDpi xmlns:a14="http://schemas.microsoft.com/office/drawing/2010/main" val="0"/>
+              </a:ext>
+            </a:extLst>
+          </a:blip>
+          <a:srcRect/>
+          <a:stretch>
+            <a:fillRect/>
+          </a:stretch>
+        </p:blipFill>
+        <p:spPr bwMode="auto">
+          <a:xfrm>
+            <a:off x="1004977" y="2033472"/>
+            <a:ext cx="536635" cy="595476"/>
+          </a:xfrm>
+          <a:prstGeom prst="rect">
+            <a:avLst/>
+          </a:prstGeom>
+          <a:noFill/>
+          <a:ln>
+            <a:noFill/>
+          </a:ln>
+          <a:extLst>
+            <a:ext uri="{909E8E84-426E-40DD-AFC4-6F175D3DCCD1}">
+              <a14:hiddenFill xmlns:a14="http://schemas.microsoft.com/office/drawing/2010/main">
+                <a:solidFill>
+                  <a:schemeClr val="accent1"/>
+                </a:solidFill>
+              </a14:hiddenFill>
+            </a:ext>
+            <a:ext uri="{91240B29-F687-4F45-9708-019B960494DF}">
+              <a14:hiddenLine xmlns:a14="http://schemas.microsoft.com/office/drawing/2010/main" w="9525">
+                <a:solidFill>
+                  <a:schemeClr val="tx1"/>
+                </a:solidFill>
+                <a:miter lim="800000"/>
+                <a:headEnd/>
+                <a:tailEnd/>
+              </a14:hiddenLine>
+            </a:ext>
+          </a:extLst>
+        </p:spPr>
+      </p:pic>
+      <p:sp>
+        <p:nvSpPr>
+          <p:cNvPr id="8" name="TextBox 7"/>
+          <p:cNvSpPr txBox="1"/>
+          <p:nvPr/>
+        </p:nvSpPr>
+        <p:spPr>
+          <a:xfrm>
+            <a:off x="155575" y="2536558"/>
+            <a:ext cx="795307" cy="369332"/>
+          </a:xfrm>
+          <a:prstGeom prst="rect">
+            <a:avLst/>
+          </a:prstGeom>
+          <a:noFill/>
+        </p:spPr>
+        <p:txBody>
+          <a:bodyPr wrap="square" rtlCol="0">
+            <a:spAutoFit/>
+          </a:bodyPr>
+          <a:lstStyle/>
+          <a:p>
+            <a:r>
+              <a:rPr lang="en-US" dirty="0" smtClean="0"/>
+              <a:t>User</a:t>
+            </a:r>
+            <a:endParaRPr lang="en-US" dirty="0"/>
+          </a:p>
+        </p:txBody>
+      </p:sp>
+      <p:sp>
+        <p:nvSpPr>
+          <p:cNvPr id="9" name="TextBox 8"/>
+          <p:cNvSpPr txBox="1"/>
+          <p:nvPr/>
+        </p:nvSpPr>
+        <p:spPr>
+          <a:xfrm>
+            <a:off x="1905000" y="2562437"/>
+            <a:ext cx="762000" cy="369332"/>
+          </a:xfrm>
+          <a:prstGeom prst="rect">
+            <a:avLst/>
+          </a:prstGeom>
+          <a:noFill/>
+        </p:spPr>
+        <p:txBody>
+          <a:bodyPr wrap="square" rtlCol="0">
+            <a:spAutoFit/>
+          </a:bodyPr>
+          <a:lstStyle/>
+          <a:p>
+            <a:r>
+              <a:rPr lang="en-US" dirty="0" smtClean="0"/>
+              <a:t>Node</a:t>
+            </a:r>
+            <a:endParaRPr lang="en-US" dirty="0"/>
+          </a:p>
+        </p:txBody>
+      </p:sp>
+      <p:sp>
+        <p:nvSpPr>
+          <p:cNvPr id="13" name="Right Arrow 12"/>
+          <p:cNvSpPr/>
+          <p:nvPr/>
+        </p:nvSpPr>
+        <p:spPr>
+          <a:xfrm>
+            <a:off x="3131388" y="1793884"/>
+            <a:ext cx="602412" cy="228600"/>
+          </a:xfrm>
+          <a:prstGeom prst="rightArrow">
+            <a:avLst/>
+          </a:prstGeom>
+          <a:solidFill>
+            <a:schemeClr val="accent1">
+              <a:lumMod val="40000"/>
+              <a:lumOff val="60000"/>
+            </a:schemeClr>
+          </a:solidFill>
+        </p:spPr>
+        <p:style>
+          <a:lnRef idx="2">
+            <a:schemeClr val="accent1">
+              <a:shade val="50000"/>
+            </a:schemeClr>
+          </a:lnRef>
+          <a:fillRef idx="1">
+            <a:schemeClr val="accent1"/>
+          </a:fillRef>
+          <a:effectRef idx="0">
+            <a:schemeClr val="accent1"/>
+          </a:effectRef>
+          <a:fontRef idx="minor">
+            <a:schemeClr val="lt1"/>
+          </a:fontRef>
+        </p:style>
+        <p:txBody>
+          <a:bodyPr rtlCol="0" anchor="ctr"/>
+          <a:lstStyle/>
+          <a:p>
+            <a:pPr algn="ctr"/>
+            <a:endParaRPr lang="en-US"/>
+          </a:p>
+        </p:txBody>
+      </p:sp>
+      <p:sp>
+        <p:nvSpPr>
+          <p:cNvPr id="11" name="Rectangle 10"/>
+          <p:cNvSpPr/>
+          <p:nvPr/>
+        </p:nvSpPr>
+        <p:spPr>
+          <a:xfrm>
+            <a:off x="3810000" y="1447800"/>
+            <a:ext cx="2667000" cy="1299303"/>
+          </a:xfrm>
+          <a:prstGeom prst="rect">
+            <a:avLst/>
+          </a:prstGeom>
+          <a:solidFill>
+            <a:schemeClr val="accent1">
+              <a:lumMod val="60000"/>
+              <a:lumOff val="40000"/>
+            </a:schemeClr>
+          </a:solidFill>
+        </p:spPr>
+        <p:style>
+          <a:lnRef idx="2">
+            <a:schemeClr val="accent1">
+              <a:shade val="50000"/>
+            </a:schemeClr>
+          </a:lnRef>
+          <a:fillRef idx="1">
+            <a:schemeClr val="accent1"/>
+          </a:fillRef>
+          <a:effectRef idx="0">
+            <a:schemeClr val="accent1"/>
+          </a:effectRef>
+          <a:fontRef idx="minor">
+            <a:schemeClr val="lt1"/>
+          </a:fontRef>
+        </p:style>
+        <p:txBody>
+          <a:bodyPr rtlCol="0" anchor="ctr"/>
+          <a:lstStyle/>
+          <a:p>
+            <a:pPr algn="ctr"/>
+            <a:endParaRPr lang="en-US"/>
+          </a:p>
+        </p:txBody>
+      </p:sp>
+      <p:sp>
+        <p:nvSpPr>
+          <p:cNvPr id="12" name="TextBox 11"/>
+          <p:cNvSpPr txBox="1"/>
+          <p:nvPr/>
+        </p:nvSpPr>
+        <p:spPr>
+          <a:xfrm>
+            <a:off x="3810000" y="1522346"/>
+            <a:ext cx="2667000" cy="1200329"/>
+          </a:xfrm>
+          <a:prstGeom prst="rect">
+            <a:avLst/>
+          </a:prstGeom>
+          <a:noFill/>
+        </p:spPr>
+        <p:txBody>
+          <a:bodyPr wrap="square" rtlCol="0">
+            <a:spAutoFit/>
+          </a:bodyPr>
+          <a:lstStyle/>
+          <a:p>
+            <a:r>
+              <a:rPr lang="en-US" dirty="0" smtClean="0"/>
+              <a:t>Parse the JSON file and get communicator which uses chosen protocol by querying the interface</a:t>
+            </a:r>
+            <a:endParaRPr lang="en-US" dirty="0"/>
+          </a:p>
+        </p:txBody>
+      </p:sp>
+      <p:sp>
+        <p:nvSpPr>
+          <p:cNvPr id="16" name="Right Arrow 15"/>
+          <p:cNvSpPr/>
+          <p:nvPr/>
+        </p:nvSpPr>
+        <p:spPr>
+          <a:xfrm>
+            <a:off x="6565329" y="1841391"/>
+            <a:ext cx="573478" cy="228600"/>
+          </a:xfrm>
+          <a:prstGeom prst="rightArrow">
+            <a:avLst/>
+          </a:prstGeom>
+          <a:solidFill>
+            <a:schemeClr val="accent1">
+              <a:lumMod val="40000"/>
+              <a:lumOff val="60000"/>
+            </a:schemeClr>
+          </a:solidFill>
+        </p:spPr>
+        <p:style>
+          <a:lnRef idx="2">
+            <a:schemeClr val="accent1">
+              <a:shade val="50000"/>
+            </a:schemeClr>
+          </a:lnRef>
+          <a:fillRef idx="1">
+            <a:schemeClr val="accent1"/>
+          </a:fillRef>
+          <a:effectRef idx="0">
+            <a:schemeClr val="accent1"/>
+          </a:effectRef>
+          <a:fontRef idx="minor">
+            <a:schemeClr val="lt1"/>
+          </a:fontRef>
+        </p:style>
+        <p:txBody>
+          <a:bodyPr rtlCol="0" anchor="ctr"/>
+          <a:lstStyle/>
+          <a:p>
+            <a:pPr algn="ctr"/>
+            <a:endParaRPr lang="en-US"/>
+          </a:p>
+        </p:txBody>
+      </p:sp>
+      <p:sp>
+        <p:nvSpPr>
+          <p:cNvPr id="18" name="Rectangle 17"/>
+          <p:cNvSpPr/>
+          <p:nvPr/>
+        </p:nvSpPr>
+        <p:spPr>
+          <a:xfrm>
+            <a:off x="7170437" y="1428904"/>
+            <a:ext cx="1821163" cy="1299303"/>
+          </a:xfrm>
+          <a:prstGeom prst="rect">
+            <a:avLst/>
+          </a:prstGeom>
+          <a:solidFill>
+            <a:schemeClr val="accent1">
+              <a:lumMod val="60000"/>
+              <a:lumOff val="40000"/>
+            </a:schemeClr>
+          </a:solidFill>
+        </p:spPr>
+        <p:style>
+          <a:lnRef idx="2">
+            <a:schemeClr val="accent1">
+              <a:shade val="50000"/>
+            </a:schemeClr>
+          </a:lnRef>
+          <a:fillRef idx="1">
+            <a:schemeClr val="accent1"/>
+          </a:fillRef>
+          <a:effectRef idx="0">
+            <a:schemeClr val="accent1"/>
+          </a:effectRef>
+          <a:fontRef idx="minor">
+            <a:schemeClr val="lt1"/>
+          </a:fontRef>
+        </p:style>
+        <p:txBody>
+          <a:bodyPr rtlCol="0" anchor="ctr"/>
+          <a:lstStyle/>
+          <a:p>
+            <a:pPr algn="ctr"/>
+            <a:endParaRPr lang="en-US"/>
+          </a:p>
+        </p:txBody>
+      </p:sp>
+      <p:sp>
+        <p:nvSpPr>
+          <p:cNvPr id="19" name="TextBox 18"/>
+          <p:cNvSpPr txBox="1"/>
+          <p:nvPr/>
+        </p:nvSpPr>
+        <p:spPr>
+          <a:xfrm>
+            <a:off x="7315200" y="1478390"/>
+            <a:ext cx="1600200" cy="1200329"/>
+          </a:xfrm>
+          <a:prstGeom prst="rect">
+            <a:avLst/>
+          </a:prstGeom>
+          <a:noFill/>
+        </p:spPr>
+        <p:txBody>
+          <a:bodyPr wrap="square" rtlCol="0">
+            <a:spAutoFit/>
+          </a:bodyPr>
+          <a:lstStyle/>
+          <a:p>
+            <a:r>
+              <a:rPr lang="en-US" dirty="0" smtClean="0"/>
+              <a:t>Call send and receive using the communicator</a:t>
+            </a:r>
+            <a:endParaRPr lang="en-US" dirty="0"/>
+          </a:p>
+        </p:txBody>
+      </p:sp>
+      <p:pic>
+        <p:nvPicPr>
+          <p:cNvPr id="1033" name="Picture 9" descr="Image result for communicator"/>
+          <p:cNvPicPr>
+            <a:picLocks noChangeAspect="1" noChangeArrowheads="1"/>
+          </p:cNvPicPr>
+          <p:nvPr/>
+        </p:nvPicPr>
+        <p:blipFill>
+          <a:blip r:embed="rId5" cstate="print">
+            <a:extLst>
+              <a:ext uri="{28A0092B-C50C-407E-A947-70E740481C1C}">
+                <a14:useLocalDpi xmlns:a14="http://schemas.microsoft.com/office/drawing/2010/main" val="0"/>
+              </a:ext>
+            </a:extLst>
+          </a:blip>
+          <a:srcRect/>
+          <a:stretch>
+            <a:fillRect/>
+          </a:stretch>
+        </p:blipFill>
+        <p:spPr bwMode="auto">
+          <a:xfrm>
+            <a:off x="6180676" y="3242906"/>
+            <a:ext cx="769305" cy="797193"/>
+          </a:xfrm>
+          <a:prstGeom prst="rect">
+            <a:avLst/>
+          </a:prstGeom>
+          <a:noFill/>
+          <a:extLst>
+            <a:ext uri="{909E8E84-426E-40DD-AFC4-6F175D3DCCD1}">
+              <a14:hiddenFill xmlns:a14="http://schemas.microsoft.com/office/drawing/2010/main">
+                <a:solidFill>
+                  <a:srgbClr val="FFFFFF"/>
+                </a:solidFill>
+              </a14:hiddenFill>
+            </a:ext>
+          </a:extLst>
+        </p:spPr>
+      </p:pic>
+      <p:sp>
+        <p:nvSpPr>
+          <p:cNvPr id="15" name="Cloud 14"/>
+          <p:cNvSpPr/>
+          <p:nvPr/>
+        </p:nvSpPr>
+        <p:spPr>
+          <a:xfrm>
+            <a:off x="5791200" y="2905890"/>
+            <a:ext cx="2895600" cy="2199510"/>
+          </a:xfrm>
+          <a:prstGeom prst="cloud">
+            <a:avLst/>
+          </a:prstGeom>
+          <a:noFill/>
+        </p:spPr>
+        <p:style>
+          <a:lnRef idx="2">
+            <a:schemeClr val="accent1">
+              <a:shade val="50000"/>
+            </a:schemeClr>
+          </a:lnRef>
+          <a:fillRef idx="1">
+            <a:schemeClr val="accent1"/>
+          </a:fillRef>
+          <a:effectRef idx="0">
+            <a:schemeClr val="accent1"/>
+          </a:effectRef>
+          <a:fontRef idx="minor">
+            <a:schemeClr val="lt1"/>
+          </a:fontRef>
+        </p:style>
+        <p:txBody>
+          <a:bodyPr rtlCol="0" anchor="ctr"/>
+          <a:lstStyle/>
+          <a:p>
+            <a:pPr algn="ctr"/>
+            <a:endParaRPr lang="en-US"/>
+          </a:p>
+        </p:txBody>
+      </p:sp>
+      <p:sp>
+        <p:nvSpPr>
+          <p:cNvPr id="20" name="TextBox 19"/>
+          <p:cNvSpPr txBox="1"/>
+          <p:nvPr/>
+        </p:nvSpPr>
+        <p:spPr>
+          <a:xfrm>
+            <a:off x="7822719" y="3352800"/>
+            <a:ext cx="820228" cy="369332"/>
+          </a:xfrm>
+          <a:prstGeom prst="rect">
+            <a:avLst/>
+          </a:prstGeom>
+          <a:noFill/>
+        </p:spPr>
+        <p:txBody>
+          <a:bodyPr wrap="square" rtlCol="0">
+            <a:spAutoFit/>
+          </a:bodyPr>
+          <a:lstStyle/>
+          <a:p>
+            <a:r>
+              <a:rPr lang="en-US" dirty="0" smtClean="0"/>
+              <a:t>MPI</a:t>
+            </a:r>
+            <a:endParaRPr lang="en-US" dirty="0"/>
+          </a:p>
+        </p:txBody>
+      </p:sp>
+      <p:sp>
+        <p:nvSpPr>
+          <p:cNvPr id="25" name="TextBox 24"/>
+          <p:cNvSpPr txBox="1"/>
+          <p:nvPr/>
+        </p:nvSpPr>
+        <p:spPr>
+          <a:xfrm>
+            <a:off x="6210300" y="4105355"/>
+            <a:ext cx="1600199" cy="646331"/>
+          </a:xfrm>
+          <a:prstGeom prst="rect">
+            <a:avLst/>
+          </a:prstGeom>
+          <a:noFill/>
+        </p:spPr>
+        <p:txBody>
+          <a:bodyPr wrap="square" rtlCol="0">
+            <a:spAutoFit/>
+          </a:bodyPr>
+          <a:lstStyle/>
+          <a:p>
+            <a:r>
+              <a:rPr lang="en-US" dirty="0" smtClean="0"/>
+              <a:t>TCP/UDP sockets</a:t>
+            </a:r>
+            <a:endParaRPr lang="en-US" dirty="0"/>
+          </a:p>
+        </p:txBody>
+      </p:sp>
+      <p:sp>
+        <p:nvSpPr>
+          <p:cNvPr id="26" name="TextBox 25"/>
+          <p:cNvSpPr txBox="1"/>
+          <p:nvPr/>
+        </p:nvSpPr>
+        <p:spPr>
+          <a:xfrm>
+            <a:off x="7138807" y="3670767"/>
+            <a:ext cx="820228" cy="369332"/>
+          </a:xfrm>
+          <a:prstGeom prst="rect">
+            <a:avLst/>
+          </a:prstGeom>
+          <a:noFill/>
+        </p:spPr>
+        <p:txBody>
+          <a:bodyPr wrap="square" rtlCol="0">
+            <a:spAutoFit/>
+          </a:bodyPr>
+          <a:lstStyle/>
+          <a:p>
+            <a:r>
+              <a:rPr lang="en-US" dirty="0" smtClean="0"/>
+              <a:t>REST</a:t>
+            </a:r>
+            <a:endParaRPr lang="en-US" dirty="0"/>
+          </a:p>
+        </p:txBody>
+      </p:sp>
+      <p:sp>
+        <p:nvSpPr>
+          <p:cNvPr id="27" name="TextBox 26"/>
+          <p:cNvSpPr txBox="1"/>
+          <p:nvPr/>
+        </p:nvSpPr>
+        <p:spPr>
+          <a:xfrm>
+            <a:off x="7295072" y="4243854"/>
+            <a:ext cx="820228" cy="369332"/>
+          </a:xfrm>
+          <a:prstGeom prst="rect">
+            <a:avLst/>
+          </a:prstGeom>
+          <a:noFill/>
+        </p:spPr>
+        <p:txBody>
+          <a:bodyPr wrap="square" rtlCol="0">
+            <a:spAutoFit/>
+          </a:bodyPr>
+          <a:lstStyle/>
+          <a:p>
+            <a:r>
+              <a:rPr lang="en-US" dirty="0" smtClean="0"/>
+              <a:t>HTTP</a:t>
+            </a:r>
+            <a:endParaRPr lang="en-US" dirty="0"/>
+          </a:p>
+        </p:txBody>
+      </p:sp>
+      <p:sp>
+        <p:nvSpPr>
+          <p:cNvPr id="22" name="Curved Up Arrow 21"/>
+          <p:cNvSpPr/>
+          <p:nvPr/>
+        </p:nvSpPr>
+        <p:spPr>
+          <a:xfrm rot="2626550">
+            <a:off x="4864165" y="3100444"/>
+            <a:ext cx="1200943" cy="435178"/>
+          </a:xfrm>
+          <a:prstGeom prst="curvedUpArrow">
+            <a:avLst/>
+          </a:prstGeom>
+          <a:solidFill>
+            <a:schemeClr val="accent1">
+              <a:lumMod val="60000"/>
+              <a:lumOff val="40000"/>
+            </a:schemeClr>
+          </a:solidFill>
+        </p:spPr>
+        <p:style>
+          <a:lnRef idx="2">
+            <a:schemeClr val="accent1">
+              <a:shade val="50000"/>
+            </a:schemeClr>
+          </a:lnRef>
+          <a:fillRef idx="1">
+            <a:schemeClr val="accent1"/>
+          </a:fillRef>
+          <a:effectRef idx="0">
+            <a:schemeClr val="accent1"/>
+          </a:effectRef>
+          <a:fontRef idx="minor">
+            <a:schemeClr val="lt1"/>
+          </a:fontRef>
+        </p:style>
+        <p:txBody>
+          <a:bodyPr rtlCol="0" anchor="ctr"/>
+          <a:lstStyle/>
+          <a:p>
+            <a:pPr algn="ctr"/>
+            <a:endParaRPr lang="en-US">
+              <a:solidFill>
+                <a:schemeClr val="tx1"/>
+              </a:solidFill>
+            </a:endParaRPr>
+          </a:p>
+        </p:txBody>
+      </p:sp>
+    </p:spTree>
+    <p:extLst>
+      <p:ext uri="{BB962C8B-B14F-4D97-AF65-F5344CB8AC3E}">
+        <p14:creationId xmlns:p14="http://schemas.microsoft.com/office/powerpoint/2010/main" val="2956477278"/>
+      </p:ext>
+    </p:extLst>
+  </p:cSld>
+  <p:clrMapOvr>
+    <a:masterClrMapping/>
+  </p:clrMapOvr>
+</p:sld>
+</file>
+
 <file path=ppt/slides/slide3.xml><?xml version="1.0" encoding="utf-8"?>
 <p:sld xmlns:a="http://schemas.openxmlformats.org/drawingml/2006/main" xmlns:r="http://schemas.openxmlformats.org/officeDocument/2006/relationships" xmlns:p="http://schemas.openxmlformats.org/presentationml/2006/main">
   <p:cSld>

</xml_diff>

<commit_message>
added content for implementation chapter and a picture for interface diagram1
</commit_message>
<xml_diff>
--- a/pictures.pptx
+++ b/pictures.pptx
@@ -27,6 +27,7 @@
     <p:sldId id="275" r:id="rId21"/>
     <p:sldId id="276" r:id="rId22"/>
     <p:sldId id="277" r:id="rId23"/>
+    <p:sldId id="278" r:id="rId24"/>
   </p:sldIdLst>
   <p:sldSz cx="9144000" cy="6858000" type="screen4x3"/>
   <p:notesSz cx="6858000" cy="9144000"/>
@@ -4055,10 +4056,10 @@
     <dgm:cxn modelId="{275DCCED-1CF8-47A7-B91F-8CAC53BF4272}" type="presOf" srcId="{5D21D8BC-666E-4114-80E6-FA46EFBB1481}" destId="{F879393D-987D-4A4F-9334-D42AB832B066}" srcOrd="0" destOrd="0" presId="urn:microsoft.com/office/officeart/2005/8/layout/chevron1"/>
     <dgm:cxn modelId="{44F816F0-8F9B-4FCC-BC66-8CEB73A0B259}" srcId="{5D21D8BC-666E-4114-80E6-FA46EFBB1481}" destId="{22E627A8-270D-449A-9889-7489D589131E}" srcOrd="1" destOrd="0" parTransId="{5F8071CA-105D-46D2-8F43-FD742F090B0D}" sibTransId="{4D18BCB8-F079-4C81-93C0-0D6AE7277CB1}"/>
     <dgm:cxn modelId="{F096248B-DBD5-44C4-9262-47B37A3486C9}" type="presOf" srcId="{B777BD26-EC81-4478-9E42-1BFF505858F2}" destId="{C62F374F-7C9B-4AD8-A4E0-355BE21DECAD}" srcOrd="0" destOrd="0" presId="urn:microsoft.com/office/officeart/2005/8/layout/chevron1"/>
-    <dgm:cxn modelId="{F33B0DB6-20CB-44F7-819B-E3108391589E}" type="presOf" srcId="{22E627A8-270D-449A-9889-7489D589131E}" destId="{5BAAEAA7-D021-43B8-879F-390B2EF9DB92}" srcOrd="0" destOrd="0" presId="urn:microsoft.com/office/officeart/2005/8/layout/chevron1"/>
+    <dgm:cxn modelId="{E7B56E9F-FBA9-47CC-A31A-3639C09881DD}" srcId="{5D21D8BC-666E-4114-80E6-FA46EFBB1481}" destId="{74A560BC-7102-44EB-877C-7E4ECCDE9746}" srcOrd="2" destOrd="0" parTransId="{2E880692-1496-4A21-B250-C67B174AF5EB}" sibTransId="{F3E5B471-7858-41A3-BE7B-1A274593F4CB}"/>
     <dgm:cxn modelId="{ACFE56FE-85BB-4734-9CEE-F820EA779125}" srcId="{5D21D8BC-666E-4114-80E6-FA46EFBB1481}" destId="{B777BD26-EC81-4478-9E42-1BFF505858F2}" srcOrd="0" destOrd="0" parTransId="{A174C541-9C03-422C-9349-36B0589ADCEC}" sibTransId="{2A43A43A-D58F-4F84-A074-0A4612A5D417}"/>
     <dgm:cxn modelId="{2C03FBD0-A5EE-4978-AD78-DF65A6DFCD23}" type="presOf" srcId="{74A560BC-7102-44EB-877C-7E4ECCDE9746}" destId="{68FBF925-E59F-4056-9E04-C1A849D3EDC9}" srcOrd="0" destOrd="0" presId="urn:microsoft.com/office/officeart/2005/8/layout/chevron1"/>
-    <dgm:cxn modelId="{E7B56E9F-FBA9-47CC-A31A-3639C09881DD}" srcId="{5D21D8BC-666E-4114-80E6-FA46EFBB1481}" destId="{74A560BC-7102-44EB-877C-7E4ECCDE9746}" srcOrd="2" destOrd="0" parTransId="{2E880692-1496-4A21-B250-C67B174AF5EB}" sibTransId="{F3E5B471-7858-41A3-BE7B-1A274593F4CB}"/>
+    <dgm:cxn modelId="{F33B0DB6-20CB-44F7-819B-E3108391589E}" type="presOf" srcId="{22E627A8-270D-449A-9889-7489D589131E}" destId="{5BAAEAA7-D021-43B8-879F-390B2EF9DB92}" srcOrd="0" destOrd="0" presId="urn:microsoft.com/office/officeart/2005/8/layout/chevron1"/>
     <dgm:cxn modelId="{D28DC277-4588-4CED-A3B9-C378A09561F5}" type="presParOf" srcId="{F879393D-987D-4A4F-9334-D42AB832B066}" destId="{C62F374F-7C9B-4AD8-A4E0-355BE21DECAD}" srcOrd="0" destOrd="0" presId="urn:microsoft.com/office/officeart/2005/8/layout/chevron1"/>
     <dgm:cxn modelId="{7AA790E6-6EB5-49C5-96E3-E55D9F51A029}" type="presParOf" srcId="{F879393D-987D-4A4F-9334-D42AB832B066}" destId="{D9D3CDE9-440A-4E0F-9713-36C6DCD423EE}" srcOrd="1" destOrd="0" presId="urn:microsoft.com/office/officeart/2005/8/layout/chevron1"/>
     <dgm:cxn modelId="{92256D3B-D8D0-45EC-AA96-D725095AB19A}" type="presParOf" srcId="{F879393D-987D-4A4F-9334-D42AB832B066}" destId="{5BAAEAA7-D021-43B8-879F-390B2EF9DB92}" srcOrd="2" destOrd="0" presId="urn:microsoft.com/office/officeart/2005/8/layout/chevron1"/>
@@ -4069,7 +4070,7 @@
   <dgm:whole/>
   <dgm:extLst>
     <a:ext uri="http://schemas.microsoft.com/office/drawing/2008/diagram">
-      <dsp:dataModelExt xmlns:dsp="http://schemas.microsoft.com/office/drawing/2008/diagram" relId="rId6" minVer="http://schemas.openxmlformats.org/drawingml/2006/diagram"/>
+      <dsp:dataModelExt xmlns:dsp="http://schemas.microsoft.com/office/drawing/2008/diagram" xmlns="" relId="rId6" minVer="http://schemas.openxmlformats.org/drawingml/2006/diagram"/>
     </a:ext>
   </dgm:extLst>
 </dgm:dataModel>
@@ -4552,21 +4553,21 @@
     </dgm:pt>
   </dgm:ptLst>
   <dgm:cxnLst>
+    <dgm:cxn modelId="{0634C07E-9B92-4862-AE73-669FB447C23A}" type="presOf" srcId="{B537E5C6-AC88-45DE-A692-878DAC35B119}" destId="{5535CA09-926A-457A-A4B7-21390F15F94F}" srcOrd="0" destOrd="0" presId="urn:microsoft.com/office/officeart/2005/8/layout/chevron1"/>
     <dgm:cxn modelId="{6189A4AA-D7EB-418F-9F2D-C66AC3C01A62}" srcId="{9450D4C9-C4B2-4911-A89A-514780CB9F15}" destId="{C97B20BC-3CBA-411F-AB14-F158490C5BCC}" srcOrd="6" destOrd="0" parTransId="{F7EE3B89-45E3-4220-BAF4-37722295D274}" sibTransId="{484765B2-A338-4F5A-B411-50FEAAE111D8}"/>
+    <dgm:cxn modelId="{3472B545-712D-4EE5-A0FD-FCCE69A3F421}" srcId="{9450D4C9-C4B2-4911-A89A-514780CB9F15}" destId="{8A145133-89F4-4E11-BED7-033969110BEF}" srcOrd="4" destOrd="0" parTransId="{06C89CBF-459F-4019-BA59-A67EB395C5B9}" sibTransId="{A211C329-5A6A-4787-B4B1-98439EF8D8DC}"/>
+    <dgm:cxn modelId="{C378ED72-E206-4B76-B23C-B3B4B3340B73}" srcId="{9450D4C9-C4B2-4911-A89A-514780CB9F15}" destId="{CF478C61-00AD-4194-8D4F-7DB2AE098B5C}" srcOrd="5" destOrd="0" parTransId="{2EC35964-DAF3-4C89-B364-499868C294A8}" sibTransId="{58567C9B-A274-4468-A0E3-EA814A581623}"/>
+    <dgm:cxn modelId="{B22E7FC3-8354-4071-9729-712A64B6BD46}" type="presOf" srcId="{9450D4C9-C4B2-4911-A89A-514780CB9F15}" destId="{460ED21A-C4DB-432F-A891-283E6D30FEEE}" srcOrd="0" destOrd="0" presId="urn:microsoft.com/office/officeart/2005/8/layout/chevron1"/>
+    <dgm:cxn modelId="{5F875D11-DB50-43F9-BDF2-78334F8D7E58}" srcId="{9450D4C9-C4B2-4911-A89A-514780CB9F15}" destId="{64331C73-F894-4973-9E15-1A620C348097}" srcOrd="0" destOrd="0" parTransId="{77CFB40D-6F23-4B24-A619-E0E618CEB0D8}" sibTransId="{FFC0C0DB-5B55-4194-A6BD-4ACC55D2B470}"/>
+    <dgm:cxn modelId="{482379BC-5645-4FD0-878F-8EC4CDA2EED3}" type="presOf" srcId="{CF478C61-00AD-4194-8D4F-7DB2AE098B5C}" destId="{1214DDDF-E3A3-4EB3-BFBD-CAE78864CA50}" srcOrd="0" destOrd="0" presId="urn:microsoft.com/office/officeart/2005/8/layout/chevron1"/>
+    <dgm:cxn modelId="{7000B5C2-4F63-48D2-B345-7AAD7E3D400A}" type="presOf" srcId="{C97B20BC-3CBA-411F-AB14-F158490C5BCC}" destId="{5D5D5C88-985A-485D-991E-57409E5BC77A}" srcOrd="0" destOrd="0" presId="urn:microsoft.com/office/officeart/2005/8/layout/chevron1"/>
+    <dgm:cxn modelId="{DCDA388B-27FF-47A0-B71D-9F49880F0540}" type="presOf" srcId="{64331C73-F894-4973-9E15-1A620C348097}" destId="{09A00682-3313-476D-9195-849AA0621560}" srcOrd="0" destOrd="0" presId="urn:microsoft.com/office/officeart/2005/8/layout/chevron1"/>
+    <dgm:cxn modelId="{863F3A18-B337-4D3B-86F0-8953E07EAC44}" srcId="{9450D4C9-C4B2-4911-A89A-514780CB9F15}" destId="{868111AE-E299-4D01-BF58-8129A9506C06}" srcOrd="1" destOrd="0" parTransId="{C75652AF-634A-420D-9D96-F9B77B193B68}" sibTransId="{44CBE08D-1567-41F1-8953-1BAC21412B7A}"/>
+    <dgm:cxn modelId="{09C829B3-9421-472C-992B-F9C6C7EA8079}" srcId="{9450D4C9-C4B2-4911-A89A-514780CB9F15}" destId="{962489C9-99E7-4179-9C22-D64CAB835C31}" srcOrd="3" destOrd="0" parTransId="{44042CD2-4D4B-4F8B-847E-88E42BCD2928}" sibTransId="{4A484662-FBA7-4F43-BE10-51AB84EA0D6F}"/>
     <dgm:cxn modelId="{C04C286E-F3CB-4F9C-A9D3-E1C714569928}" type="presOf" srcId="{962489C9-99E7-4179-9C22-D64CAB835C31}" destId="{9D68CD03-B1A7-4BEA-B058-FD22B6150897}" srcOrd="0" destOrd="0" presId="urn:microsoft.com/office/officeart/2005/8/layout/chevron1"/>
-    <dgm:cxn modelId="{3472B545-712D-4EE5-A0FD-FCCE69A3F421}" srcId="{9450D4C9-C4B2-4911-A89A-514780CB9F15}" destId="{8A145133-89F4-4E11-BED7-033969110BEF}" srcOrd="4" destOrd="0" parTransId="{06C89CBF-459F-4019-BA59-A67EB395C5B9}" sibTransId="{A211C329-5A6A-4787-B4B1-98439EF8D8DC}"/>
+    <dgm:cxn modelId="{57BA3C68-BC2F-4757-8247-D0ABECA113C8}" type="presOf" srcId="{8A145133-89F4-4E11-BED7-033969110BEF}" destId="{47EC26A5-DB58-47F3-B21F-7ECE3520D744}" srcOrd="0" destOrd="0" presId="urn:microsoft.com/office/officeart/2005/8/layout/chevron1"/>
     <dgm:cxn modelId="{9DF62359-97EF-4CF4-AE53-CD7F768719C7}" srcId="{9450D4C9-C4B2-4911-A89A-514780CB9F15}" destId="{B537E5C6-AC88-45DE-A692-878DAC35B119}" srcOrd="2" destOrd="0" parTransId="{21C1899A-364B-44E7-8777-92B33ED6457F}" sibTransId="{DE041BA8-1086-4C93-A56B-5A6A7F7943AB}"/>
-    <dgm:cxn modelId="{09C829B3-9421-472C-992B-F9C6C7EA8079}" srcId="{9450D4C9-C4B2-4911-A89A-514780CB9F15}" destId="{962489C9-99E7-4179-9C22-D64CAB835C31}" srcOrd="3" destOrd="0" parTransId="{44042CD2-4D4B-4F8B-847E-88E42BCD2928}" sibTransId="{4A484662-FBA7-4F43-BE10-51AB84EA0D6F}"/>
-    <dgm:cxn modelId="{7000B5C2-4F63-48D2-B345-7AAD7E3D400A}" type="presOf" srcId="{C97B20BC-3CBA-411F-AB14-F158490C5BCC}" destId="{5D5D5C88-985A-485D-991E-57409E5BC77A}" srcOrd="0" destOrd="0" presId="urn:microsoft.com/office/officeart/2005/8/layout/chevron1"/>
     <dgm:cxn modelId="{7301DC52-2307-4D26-BB4E-D7886F63C24A}" type="presOf" srcId="{868111AE-E299-4D01-BF58-8129A9506C06}" destId="{771B5359-AC59-491F-AE7E-C91287E4A360}" srcOrd="0" destOrd="0" presId="urn:microsoft.com/office/officeart/2005/8/layout/chevron1"/>
-    <dgm:cxn modelId="{C378ED72-E206-4B76-B23C-B3B4B3340B73}" srcId="{9450D4C9-C4B2-4911-A89A-514780CB9F15}" destId="{CF478C61-00AD-4194-8D4F-7DB2AE098B5C}" srcOrd="5" destOrd="0" parTransId="{2EC35964-DAF3-4C89-B364-499868C294A8}" sibTransId="{58567C9B-A274-4468-A0E3-EA814A581623}"/>
-    <dgm:cxn modelId="{482379BC-5645-4FD0-878F-8EC4CDA2EED3}" type="presOf" srcId="{CF478C61-00AD-4194-8D4F-7DB2AE098B5C}" destId="{1214DDDF-E3A3-4EB3-BFBD-CAE78864CA50}" srcOrd="0" destOrd="0" presId="urn:microsoft.com/office/officeart/2005/8/layout/chevron1"/>
-    <dgm:cxn modelId="{0634C07E-9B92-4862-AE73-669FB447C23A}" type="presOf" srcId="{B537E5C6-AC88-45DE-A692-878DAC35B119}" destId="{5535CA09-926A-457A-A4B7-21390F15F94F}" srcOrd="0" destOrd="0" presId="urn:microsoft.com/office/officeart/2005/8/layout/chevron1"/>
-    <dgm:cxn modelId="{57BA3C68-BC2F-4757-8247-D0ABECA113C8}" type="presOf" srcId="{8A145133-89F4-4E11-BED7-033969110BEF}" destId="{47EC26A5-DB58-47F3-B21F-7ECE3520D744}" srcOrd="0" destOrd="0" presId="urn:microsoft.com/office/officeart/2005/8/layout/chevron1"/>
-    <dgm:cxn modelId="{B22E7FC3-8354-4071-9729-712A64B6BD46}" type="presOf" srcId="{9450D4C9-C4B2-4911-A89A-514780CB9F15}" destId="{460ED21A-C4DB-432F-A891-283E6D30FEEE}" srcOrd="0" destOrd="0" presId="urn:microsoft.com/office/officeart/2005/8/layout/chevron1"/>
-    <dgm:cxn modelId="{863F3A18-B337-4D3B-86F0-8953E07EAC44}" srcId="{9450D4C9-C4B2-4911-A89A-514780CB9F15}" destId="{868111AE-E299-4D01-BF58-8129A9506C06}" srcOrd="1" destOrd="0" parTransId="{C75652AF-634A-420D-9D96-F9B77B193B68}" sibTransId="{44CBE08D-1567-41F1-8953-1BAC21412B7A}"/>
-    <dgm:cxn modelId="{5F875D11-DB50-43F9-BDF2-78334F8D7E58}" srcId="{9450D4C9-C4B2-4911-A89A-514780CB9F15}" destId="{64331C73-F894-4973-9E15-1A620C348097}" srcOrd="0" destOrd="0" parTransId="{77CFB40D-6F23-4B24-A619-E0E618CEB0D8}" sibTransId="{FFC0C0DB-5B55-4194-A6BD-4ACC55D2B470}"/>
-    <dgm:cxn modelId="{DCDA388B-27FF-47A0-B71D-9F49880F0540}" type="presOf" srcId="{64331C73-F894-4973-9E15-1A620C348097}" destId="{09A00682-3313-476D-9195-849AA0621560}" srcOrd="0" destOrd="0" presId="urn:microsoft.com/office/officeart/2005/8/layout/chevron1"/>
     <dgm:cxn modelId="{1F1AC9A6-1863-4DF6-8A35-A9EC6BD71052}" type="presParOf" srcId="{460ED21A-C4DB-432F-A891-283E6D30FEEE}" destId="{09A00682-3313-476D-9195-849AA0621560}" srcOrd="0" destOrd="0" presId="urn:microsoft.com/office/officeart/2005/8/layout/chevron1"/>
     <dgm:cxn modelId="{2F60A8DF-413C-41EB-8BDD-E90ED6C35836}" type="presParOf" srcId="{460ED21A-C4DB-432F-A891-283E6D30FEEE}" destId="{99E3799A-A836-4FE8-B104-89D1C921FE24}" srcOrd="1" destOrd="0" presId="urn:microsoft.com/office/officeart/2005/8/layout/chevron1"/>
     <dgm:cxn modelId="{118B86F9-54D1-46F1-92FC-BA458827B6E9}" type="presParOf" srcId="{460ED21A-C4DB-432F-A891-283E6D30FEEE}" destId="{771B5359-AC59-491F-AE7E-C91287E4A360}" srcOrd="2" destOrd="0" presId="urn:microsoft.com/office/officeart/2005/8/layout/chevron1"/>
@@ -4585,7 +4586,7 @@
   <dgm:whole/>
   <dgm:extLst>
     <a:ext uri="http://schemas.microsoft.com/office/drawing/2008/diagram">
-      <dsp:dataModelExt xmlns:dsp="http://schemas.microsoft.com/office/drawing/2008/diagram" relId="rId6" minVer="http://schemas.openxmlformats.org/drawingml/2006/diagram"/>
+      <dsp:dataModelExt xmlns:dsp="http://schemas.microsoft.com/office/drawing/2008/diagram" xmlns="" relId="rId6" minVer="http://schemas.openxmlformats.org/drawingml/2006/diagram"/>
     </a:ext>
   </dgm:extLst>
 </dgm:dataModel>
@@ -5068,21 +5069,21 @@
     </dgm:pt>
   </dgm:ptLst>
   <dgm:cxnLst>
+    <dgm:cxn modelId="{9DF62359-97EF-4CF4-AE53-CD7F768719C7}" srcId="{9450D4C9-C4B2-4911-A89A-514780CB9F15}" destId="{B537E5C6-AC88-45DE-A692-878DAC35B119}" srcOrd="2" destOrd="0" parTransId="{21C1899A-364B-44E7-8777-92B33ED6457F}" sibTransId="{DE041BA8-1086-4C93-A56B-5A6A7F7943AB}"/>
+    <dgm:cxn modelId="{5F875D11-DB50-43F9-BDF2-78334F8D7E58}" srcId="{9450D4C9-C4B2-4911-A89A-514780CB9F15}" destId="{64331C73-F894-4973-9E15-1A620C348097}" srcOrd="0" destOrd="0" parTransId="{77CFB40D-6F23-4B24-A619-E0E618CEB0D8}" sibTransId="{FFC0C0DB-5B55-4194-A6BD-4ACC55D2B470}"/>
+    <dgm:cxn modelId="{926CA9DC-DF6F-4A9D-9612-83D48BE5EA1C}" type="presOf" srcId="{64331C73-F894-4973-9E15-1A620C348097}" destId="{09A00682-3313-476D-9195-849AA0621560}" srcOrd="0" destOrd="0" presId="urn:microsoft.com/office/officeart/2005/8/layout/chevron1"/>
+    <dgm:cxn modelId="{3472B545-712D-4EE5-A0FD-FCCE69A3F421}" srcId="{9450D4C9-C4B2-4911-A89A-514780CB9F15}" destId="{8A145133-89F4-4E11-BED7-033969110BEF}" srcOrd="4" destOrd="0" parTransId="{06C89CBF-459F-4019-BA59-A67EB395C5B9}" sibTransId="{A211C329-5A6A-4787-B4B1-98439EF8D8DC}"/>
+    <dgm:cxn modelId="{6189A4AA-D7EB-418F-9F2D-C66AC3C01A62}" srcId="{9450D4C9-C4B2-4911-A89A-514780CB9F15}" destId="{C97B20BC-3CBA-411F-AB14-F158490C5BCC}" srcOrd="6" destOrd="0" parTransId="{F7EE3B89-45E3-4220-BAF4-37722295D274}" sibTransId="{484765B2-A338-4F5A-B411-50FEAAE111D8}"/>
+    <dgm:cxn modelId="{639D5D99-9E2A-4A71-BD4D-065403E54717}" type="presOf" srcId="{B537E5C6-AC88-45DE-A692-878DAC35B119}" destId="{5535CA09-926A-457A-A4B7-21390F15F94F}" srcOrd="0" destOrd="0" presId="urn:microsoft.com/office/officeart/2005/8/layout/chevron1"/>
+    <dgm:cxn modelId="{B3F5CCFA-FE39-4B4E-9CFC-BD7D8A83E842}" type="presOf" srcId="{CF478C61-00AD-4194-8D4F-7DB2AE098B5C}" destId="{1214DDDF-E3A3-4EB3-BFBD-CAE78864CA50}" srcOrd="0" destOrd="0" presId="urn:microsoft.com/office/officeart/2005/8/layout/chevron1"/>
+    <dgm:cxn modelId="{1C1DB8ED-0C78-4531-81AD-594F179D4A4A}" type="presOf" srcId="{8A145133-89F4-4E11-BED7-033969110BEF}" destId="{47EC26A5-DB58-47F3-B21F-7ECE3520D744}" srcOrd="0" destOrd="0" presId="urn:microsoft.com/office/officeart/2005/8/layout/chevron1"/>
+    <dgm:cxn modelId="{863F3A18-B337-4D3B-86F0-8953E07EAC44}" srcId="{9450D4C9-C4B2-4911-A89A-514780CB9F15}" destId="{868111AE-E299-4D01-BF58-8129A9506C06}" srcOrd="1" destOrd="0" parTransId="{C75652AF-634A-420D-9D96-F9B77B193B68}" sibTransId="{44CBE08D-1567-41F1-8953-1BAC21412B7A}"/>
     <dgm:cxn modelId="{A4A6F842-F938-4989-939A-E610F0BEDC3D}" type="presOf" srcId="{9450D4C9-C4B2-4911-A89A-514780CB9F15}" destId="{460ED21A-C4DB-432F-A891-283E6D30FEEE}" srcOrd="0" destOrd="0" presId="urn:microsoft.com/office/officeart/2005/8/layout/chevron1"/>
     <dgm:cxn modelId="{C378ED72-E206-4B76-B23C-B3B4B3340B73}" srcId="{9450D4C9-C4B2-4911-A89A-514780CB9F15}" destId="{CF478C61-00AD-4194-8D4F-7DB2AE098B5C}" srcOrd="5" destOrd="0" parTransId="{2EC35964-DAF3-4C89-B364-499868C294A8}" sibTransId="{58567C9B-A274-4468-A0E3-EA814A581623}"/>
-    <dgm:cxn modelId="{5F875D11-DB50-43F9-BDF2-78334F8D7E58}" srcId="{9450D4C9-C4B2-4911-A89A-514780CB9F15}" destId="{64331C73-F894-4973-9E15-1A620C348097}" srcOrd="0" destOrd="0" parTransId="{77CFB40D-6F23-4B24-A619-E0E618CEB0D8}" sibTransId="{FFC0C0DB-5B55-4194-A6BD-4ACC55D2B470}"/>
-    <dgm:cxn modelId="{9DF62359-97EF-4CF4-AE53-CD7F768719C7}" srcId="{9450D4C9-C4B2-4911-A89A-514780CB9F15}" destId="{B537E5C6-AC88-45DE-A692-878DAC35B119}" srcOrd="2" destOrd="0" parTransId="{21C1899A-364B-44E7-8777-92B33ED6457F}" sibTransId="{DE041BA8-1086-4C93-A56B-5A6A7F7943AB}"/>
     <dgm:cxn modelId="{7668A89A-29E8-4E15-83A2-61AF98F853AA}" type="presOf" srcId="{868111AE-E299-4D01-BF58-8129A9506C06}" destId="{771B5359-AC59-491F-AE7E-C91287E4A360}" srcOrd="0" destOrd="0" presId="urn:microsoft.com/office/officeart/2005/8/layout/chevron1"/>
+    <dgm:cxn modelId="{4F2130A0-1415-4348-8853-90D1F7780598}" type="presOf" srcId="{962489C9-99E7-4179-9C22-D64CAB835C31}" destId="{9D68CD03-B1A7-4BEA-B058-FD22B6150897}" srcOrd="0" destOrd="0" presId="urn:microsoft.com/office/officeart/2005/8/layout/chevron1"/>
     <dgm:cxn modelId="{09C829B3-9421-472C-992B-F9C6C7EA8079}" srcId="{9450D4C9-C4B2-4911-A89A-514780CB9F15}" destId="{962489C9-99E7-4179-9C22-D64CAB835C31}" srcOrd="3" destOrd="0" parTransId="{44042CD2-4D4B-4F8B-847E-88E42BCD2928}" sibTransId="{4A484662-FBA7-4F43-BE10-51AB84EA0D6F}"/>
-    <dgm:cxn modelId="{926CA9DC-DF6F-4A9D-9612-83D48BE5EA1C}" type="presOf" srcId="{64331C73-F894-4973-9E15-1A620C348097}" destId="{09A00682-3313-476D-9195-849AA0621560}" srcOrd="0" destOrd="0" presId="urn:microsoft.com/office/officeart/2005/8/layout/chevron1"/>
-    <dgm:cxn modelId="{639D5D99-9E2A-4A71-BD4D-065403E54717}" type="presOf" srcId="{B537E5C6-AC88-45DE-A692-878DAC35B119}" destId="{5535CA09-926A-457A-A4B7-21390F15F94F}" srcOrd="0" destOrd="0" presId="urn:microsoft.com/office/officeart/2005/8/layout/chevron1"/>
     <dgm:cxn modelId="{77A0D87E-0458-4AB3-8FE4-5731CF46972A}" type="presOf" srcId="{C97B20BC-3CBA-411F-AB14-F158490C5BCC}" destId="{5D5D5C88-985A-485D-991E-57409E5BC77A}" srcOrd="0" destOrd="0" presId="urn:microsoft.com/office/officeart/2005/8/layout/chevron1"/>
-    <dgm:cxn modelId="{1C1DB8ED-0C78-4531-81AD-594F179D4A4A}" type="presOf" srcId="{8A145133-89F4-4E11-BED7-033969110BEF}" destId="{47EC26A5-DB58-47F3-B21F-7ECE3520D744}" srcOrd="0" destOrd="0" presId="urn:microsoft.com/office/officeart/2005/8/layout/chevron1"/>
-    <dgm:cxn modelId="{B3F5CCFA-FE39-4B4E-9CFC-BD7D8A83E842}" type="presOf" srcId="{CF478C61-00AD-4194-8D4F-7DB2AE098B5C}" destId="{1214DDDF-E3A3-4EB3-BFBD-CAE78864CA50}" srcOrd="0" destOrd="0" presId="urn:microsoft.com/office/officeart/2005/8/layout/chevron1"/>
-    <dgm:cxn modelId="{6189A4AA-D7EB-418F-9F2D-C66AC3C01A62}" srcId="{9450D4C9-C4B2-4911-A89A-514780CB9F15}" destId="{C97B20BC-3CBA-411F-AB14-F158490C5BCC}" srcOrd="6" destOrd="0" parTransId="{F7EE3B89-45E3-4220-BAF4-37722295D274}" sibTransId="{484765B2-A338-4F5A-B411-50FEAAE111D8}"/>
-    <dgm:cxn modelId="{3472B545-712D-4EE5-A0FD-FCCE69A3F421}" srcId="{9450D4C9-C4B2-4911-A89A-514780CB9F15}" destId="{8A145133-89F4-4E11-BED7-033969110BEF}" srcOrd="4" destOrd="0" parTransId="{06C89CBF-459F-4019-BA59-A67EB395C5B9}" sibTransId="{A211C329-5A6A-4787-B4B1-98439EF8D8DC}"/>
-    <dgm:cxn modelId="{4F2130A0-1415-4348-8853-90D1F7780598}" type="presOf" srcId="{962489C9-99E7-4179-9C22-D64CAB835C31}" destId="{9D68CD03-B1A7-4BEA-B058-FD22B6150897}" srcOrd="0" destOrd="0" presId="urn:microsoft.com/office/officeart/2005/8/layout/chevron1"/>
-    <dgm:cxn modelId="{863F3A18-B337-4D3B-86F0-8953E07EAC44}" srcId="{9450D4C9-C4B2-4911-A89A-514780CB9F15}" destId="{868111AE-E299-4D01-BF58-8129A9506C06}" srcOrd="1" destOrd="0" parTransId="{C75652AF-634A-420D-9D96-F9B77B193B68}" sibTransId="{44CBE08D-1567-41F1-8953-1BAC21412B7A}"/>
     <dgm:cxn modelId="{98901DD5-2768-4888-AE47-AD4093D629AA}" type="presParOf" srcId="{460ED21A-C4DB-432F-A891-283E6D30FEEE}" destId="{09A00682-3313-476D-9195-849AA0621560}" srcOrd="0" destOrd="0" presId="urn:microsoft.com/office/officeart/2005/8/layout/chevron1"/>
     <dgm:cxn modelId="{793183C6-7351-48F1-81BD-406C0C7251A1}" type="presParOf" srcId="{460ED21A-C4DB-432F-A891-283E6D30FEEE}" destId="{99E3799A-A836-4FE8-B104-89D1C921FE24}" srcOrd="1" destOrd="0" presId="urn:microsoft.com/office/officeart/2005/8/layout/chevron1"/>
     <dgm:cxn modelId="{0B271C2D-988A-408B-94F8-D7ABC20F8653}" type="presParOf" srcId="{460ED21A-C4DB-432F-A891-283E6D30FEEE}" destId="{771B5359-AC59-491F-AE7E-C91287E4A360}" srcOrd="2" destOrd="0" presId="urn:microsoft.com/office/officeart/2005/8/layout/chevron1"/>
@@ -5101,7 +5102,7 @@
   <dgm:whole/>
   <dgm:extLst>
     <a:ext uri="http://schemas.microsoft.com/office/drawing/2008/diagram">
-      <dsp:dataModelExt xmlns:dsp="http://schemas.microsoft.com/office/drawing/2008/diagram" relId="rId6" minVer="http://schemas.openxmlformats.org/drawingml/2006/diagram"/>
+      <dsp:dataModelExt xmlns:dsp="http://schemas.microsoft.com/office/drawing/2008/diagram" xmlns="" relId="rId6" minVer="http://schemas.openxmlformats.org/drawingml/2006/diagram"/>
     </a:ext>
   </dgm:extLst>
 </dgm:dataModel>
@@ -5447,14 +5448,14 @@
     </dgm:pt>
   </dgm:ptLst>
   <dgm:cxnLst>
+    <dgm:cxn modelId="{DCEFC734-5258-4187-81E2-2DA3C3A0600D}" srcId="{EDE96FF5-1D6F-40D9-BAA4-5F216284EA68}" destId="{D3416637-C472-49E7-8A77-42EA7EE4FB2D}" srcOrd="0" destOrd="0" parTransId="{3FF84238-6296-41FA-AC31-BE8D99191283}" sibTransId="{C2F2F837-7292-499A-9363-26D4909D7F7A}"/>
     <dgm:cxn modelId="{D29B2DFD-6448-43ED-AD6F-A88D3997D5AD}" type="presOf" srcId="{EDE96FF5-1D6F-40D9-BAA4-5F216284EA68}" destId="{633A4F81-F993-47EB-820A-B68DB3A5390E}" srcOrd="0" destOrd="0" presId="urn:microsoft.com/office/officeart/2005/8/layout/hierarchy1"/>
     <dgm:cxn modelId="{25D7E370-8D92-4E2B-B024-D053047D8CE2}" srcId="{EDE96FF5-1D6F-40D9-BAA4-5F216284EA68}" destId="{B3EDA70C-121E-4511-8433-9E3CEA3A1041}" srcOrd="1" destOrd="0" parTransId="{3203F13A-12BF-4556-A522-A41B0A00850D}" sibTransId="{0EFF336F-BB38-4F04-9D43-D16852737E47}"/>
     <dgm:cxn modelId="{E470C9C2-04B1-4DBA-BDD8-DA9E788EC044}" type="presOf" srcId="{E599E731-E7DC-479C-8CF1-D6244889523C}" destId="{D95F9AD9-2B6E-4F59-B64C-5D4FC2E366CE}" srcOrd="0" destOrd="0" presId="urn:microsoft.com/office/officeart/2005/8/layout/hierarchy1"/>
-    <dgm:cxn modelId="{DCEFC734-5258-4187-81E2-2DA3C3A0600D}" srcId="{EDE96FF5-1D6F-40D9-BAA4-5F216284EA68}" destId="{D3416637-C472-49E7-8A77-42EA7EE4FB2D}" srcOrd="0" destOrd="0" parTransId="{3FF84238-6296-41FA-AC31-BE8D99191283}" sibTransId="{C2F2F837-7292-499A-9363-26D4909D7F7A}"/>
+    <dgm:cxn modelId="{FBEA6683-523A-4555-AC76-8EA8246433E8}" type="presOf" srcId="{B3EDA70C-121E-4511-8433-9E3CEA3A1041}" destId="{62F573A8-C98B-4300-903C-ACC41DE49811}" srcOrd="0" destOrd="0" presId="urn:microsoft.com/office/officeart/2005/8/layout/hierarchy1"/>
+    <dgm:cxn modelId="{B4B656B2-B9F5-4518-B1FC-D6049C1794CC}" type="presOf" srcId="{3203F13A-12BF-4556-A522-A41B0A00850D}" destId="{82B6CC98-E7D5-4D4E-ACD9-D9D53E7526DB}" srcOrd="0" destOrd="0" presId="urn:microsoft.com/office/officeart/2005/8/layout/hierarchy1"/>
     <dgm:cxn modelId="{AA02A161-9E71-4263-A901-09BFD558970D}" type="presOf" srcId="{D3416637-C472-49E7-8A77-42EA7EE4FB2D}" destId="{2CA332BF-C7D5-44C4-86AB-C5F8609888C3}" srcOrd="0" destOrd="0" presId="urn:microsoft.com/office/officeart/2005/8/layout/hierarchy1"/>
     <dgm:cxn modelId="{01FB11D6-684D-4E49-B5B0-EAFE14330F37}" srcId="{E599E731-E7DC-479C-8CF1-D6244889523C}" destId="{EDE96FF5-1D6F-40D9-BAA4-5F216284EA68}" srcOrd="0" destOrd="0" parTransId="{0321C310-AEF3-46E8-B8A4-6C11DB864603}" sibTransId="{D4600DEE-2AE6-474A-83CF-788E07829090}"/>
-    <dgm:cxn modelId="{FBEA6683-523A-4555-AC76-8EA8246433E8}" type="presOf" srcId="{B3EDA70C-121E-4511-8433-9E3CEA3A1041}" destId="{62F573A8-C98B-4300-903C-ACC41DE49811}" srcOrd="0" destOrd="0" presId="urn:microsoft.com/office/officeart/2005/8/layout/hierarchy1"/>
-    <dgm:cxn modelId="{B4B656B2-B9F5-4518-B1FC-D6049C1794CC}" type="presOf" srcId="{3203F13A-12BF-4556-A522-A41B0A00850D}" destId="{82B6CC98-E7D5-4D4E-ACD9-D9D53E7526DB}" srcOrd="0" destOrd="0" presId="urn:microsoft.com/office/officeart/2005/8/layout/hierarchy1"/>
     <dgm:cxn modelId="{61E18A5C-F5D9-4D94-9A8A-644F91246958}" type="presOf" srcId="{3FF84238-6296-41FA-AC31-BE8D99191283}" destId="{3B4976F8-1C91-4B4A-AF74-A6A32D597C6F}" srcOrd="0" destOrd="0" presId="urn:microsoft.com/office/officeart/2005/8/layout/hierarchy1"/>
     <dgm:cxn modelId="{0C7A26C2-1BBB-4A9B-BAED-D8019201ABB6}" type="presParOf" srcId="{D95F9AD9-2B6E-4F59-B64C-5D4FC2E366CE}" destId="{CF8D7650-8692-446B-80AA-1D837010E69E}" srcOrd="0" destOrd="0" presId="urn:microsoft.com/office/officeart/2005/8/layout/hierarchy1"/>
     <dgm:cxn modelId="{34B243D6-3D1A-4412-9071-43C8F5F42BCD}" type="presParOf" srcId="{CF8D7650-8692-446B-80AA-1D837010E69E}" destId="{5C537912-794E-42DA-8968-3ADE7773EE31}" srcOrd="0" destOrd="0" presId="urn:microsoft.com/office/officeart/2005/8/layout/hierarchy1"/>
@@ -5478,7 +5479,7 @@
   <dgm:whole/>
   <dgm:extLst>
     <a:ext uri="http://schemas.microsoft.com/office/drawing/2008/diagram">
-      <dsp:dataModelExt xmlns:dsp="http://schemas.microsoft.com/office/drawing/2008/diagram" relId="rId6" minVer="http://schemas.openxmlformats.org/drawingml/2006/diagram"/>
+      <dsp:dataModelExt xmlns:dsp="http://schemas.microsoft.com/office/drawing/2008/diagram" xmlns="" relId="rId6" minVer="http://schemas.openxmlformats.org/drawingml/2006/diagram"/>
     </a:ext>
   </dgm:extLst>
 </dgm:dataModel>
@@ -6068,27 +6069,27 @@
     </dgm:pt>
   </dgm:ptLst>
   <dgm:cxnLst>
-    <dgm:cxn modelId="{1E232702-92AF-4E01-AF65-5B01B06BC5F9}" type="presOf" srcId="{BE3C59D4-0C3A-4CE8-8412-0142FC9112E5}" destId="{35FDEEF8-A771-4D6A-821D-5DD0765F4E3F}" srcOrd="0" destOrd="0" presId="urn:microsoft.com/office/officeart/2005/8/layout/hierarchy1"/>
-    <dgm:cxn modelId="{9AA3F2B4-85D7-4E67-A53B-D83B94482039}" type="presOf" srcId="{091F882E-0915-4AFC-AFCD-B1181E37E14D}" destId="{E753A8D8-B50F-42C4-B0CE-D216BE908656}" srcOrd="0" destOrd="0" presId="urn:microsoft.com/office/officeart/2005/8/layout/hierarchy1"/>
+    <dgm:cxn modelId="{7952A79E-9A23-4A9A-BE2E-18CB79CFAA62}" srcId="{E355DCEE-CFED-4B4E-95C1-C3ED3918F3D3}" destId="{6509BC69-7715-4AE9-8545-833A23F1F7D0}" srcOrd="0" destOrd="0" parTransId="{BD130280-A84B-4826-90BB-E35618FA7329}" sibTransId="{08030457-AA43-4093-AB35-36508039FC04}"/>
     <dgm:cxn modelId="{29A742B8-1028-4B3A-86FA-1F7740909746}" type="presOf" srcId="{6621E396-22BB-4BAA-86D9-A1D5854857CA}" destId="{7E592DA7-86CE-4FE6-B528-72BCA053EDAC}" srcOrd="0" destOrd="0" presId="urn:microsoft.com/office/officeart/2005/8/layout/hierarchy1"/>
-    <dgm:cxn modelId="{1481D2D9-EBDC-4E7C-ACB9-80B1F694C79C}" type="presOf" srcId="{E355DCEE-CFED-4B4E-95C1-C3ED3918F3D3}" destId="{C62030B6-9838-4D35-81EF-6AE86E8FD0B7}" srcOrd="0" destOrd="0" presId="urn:microsoft.com/office/officeart/2005/8/layout/hierarchy1"/>
-    <dgm:cxn modelId="{A5E4A230-47AD-4CCE-B63D-290746125B89}" srcId="{64341ED1-133E-4A5F-B2CA-B7839122E5E1}" destId="{E355DCEE-CFED-4B4E-95C1-C3ED3918F3D3}" srcOrd="2" destOrd="0" parTransId="{7343F464-1509-45F9-836B-82E0B529AC39}" sibTransId="{078DB322-C08D-4312-8C12-D8384FE5D6EB}"/>
-    <dgm:cxn modelId="{EAAC68D4-7227-400B-9B95-0206ABD7B679}" type="presOf" srcId="{7343F464-1509-45F9-836B-82E0B529AC39}" destId="{ECDC51A7-6312-4B5B-9113-87639623B933}" srcOrd="0" destOrd="0" presId="urn:microsoft.com/office/officeart/2005/8/layout/hierarchy1"/>
-    <dgm:cxn modelId="{869C7012-692A-402E-BF92-F79C2A072C8A}" type="presOf" srcId="{B426D3DF-981A-4ACA-BDCD-74F52BC54F36}" destId="{B20123EC-DD70-4002-B34F-72383B5AD1D0}" srcOrd="0" destOrd="0" presId="urn:microsoft.com/office/officeart/2005/8/layout/hierarchy1"/>
-    <dgm:cxn modelId="{FF4E295E-7BB3-4B76-B185-4F0106A708BA}" srcId="{6621E396-22BB-4BAA-86D9-A1D5854857CA}" destId="{64341ED1-133E-4A5F-B2CA-B7839122E5E1}" srcOrd="0" destOrd="0" parTransId="{9D095FE8-8213-4B2B-8FC7-77FFB4BB1B88}" sibTransId="{6B23510D-A384-4590-9F26-464C17EB856C}"/>
+    <dgm:cxn modelId="{06343924-9343-490C-8185-42B81C07BFD5}" type="presOf" srcId="{9C1EE866-C214-4A82-9547-61A5AA867C03}" destId="{35177D51-DA6B-4B74-8542-DDCB57DE5FAE}" srcOrd="0" destOrd="0" presId="urn:microsoft.com/office/officeart/2005/8/layout/hierarchy1"/>
     <dgm:cxn modelId="{7622F0F6-314F-4E6B-BFFE-FF0CED15058F}" srcId="{64341ED1-133E-4A5F-B2CA-B7839122E5E1}" destId="{FD996A20-6A09-41F5-9196-06E15DA4ED74}" srcOrd="1" destOrd="0" parTransId="{BE3C59D4-0C3A-4CE8-8412-0142FC9112E5}" sibTransId="{44B172B9-B2CB-4CB3-8660-38A30D50B387}"/>
     <dgm:cxn modelId="{785E77C6-80DB-499B-A7BB-61E8D05FCBB3}" type="presOf" srcId="{535ADC1B-E987-4114-88E1-0020E71ACB45}" destId="{85343B2D-6766-4596-A7C0-7ED78437CB26}" srcOrd="0" destOrd="0" presId="urn:microsoft.com/office/officeart/2005/8/layout/hierarchy1"/>
+    <dgm:cxn modelId="{AF143184-4851-4174-9641-5243E80A1E41}" type="presOf" srcId="{A92319EC-B566-4DF5-8DC2-9B499E48805C}" destId="{2E78A703-B9DD-425D-8C61-5CF4A53FAFA3}" srcOrd="0" destOrd="0" presId="urn:microsoft.com/office/officeart/2005/8/layout/hierarchy1"/>
+    <dgm:cxn modelId="{1481D2D9-EBDC-4E7C-ACB9-80B1F694C79C}" type="presOf" srcId="{E355DCEE-CFED-4B4E-95C1-C3ED3918F3D3}" destId="{C62030B6-9838-4D35-81EF-6AE86E8FD0B7}" srcOrd="0" destOrd="0" presId="urn:microsoft.com/office/officeart/2005/8/layout/hierarchy1"/>
+    <dgm:cxn modelId="{1E232702-92AF-4E01-AF65-5B01B06BC5F9}" type="presOf" srcId="{BE3C59D4-0C3A-4CE8-8412-0142FC9112E5}" destId="{35FDEEF8-A771-4D6A-821D-5DD0765F4E3F}" srcOrd="0" destOrd="0" presId="urn:microsoft.com/office/officeart/2005/8/layout/hierarchy1"/>
+    <dgm:cxn modelId="{A5E4A230-47AD-4CCE-B63D-290746125B89}" srcId="{64341ED1-133E-4A5F-B2CA-B7839122E5E1}" destId="{E355DCEE-CFED-4B4E-95C1-C3ED3918F3D3}" srcOrd="2" destOrd="0" parTransId="{7343F464-1509-45F9-836B-82E0B529AC39}" sibTransId="{078DB322-C08D-4312-8C12-D8384FE5D6EB}"/>
+    <dgm:cxn modelId="{869C7012-692A-402E-BF92-F79C2A072C8A}" type="presOf" srcId="{B426D3DF-981A-4ACA-BDCD-74F52BC54F36}" destId="{B20123EC-DD70-4002-B34F-72383B5AD1D0}" srcOrd="0" destOrd="0" presId="urn:microsoft.com/office/officeart/2005/8/layout/hierarchy1"/>
+    <dgm:cxn modelId="{239411CF-1F0E-4179-854E-288A6804E8C1}" type="presOf" srcId="{44337762-FFBD-474D-B88E-C618616EDE17}" destId="{C15F7BDE-BE17-440A-AFDC-26911405FC39}" srcOrd="0" destOrd="0" presId="urn:microsoft.com/office/officeart/2005/8/layout/hierarchy1"/>
+    <dgm:cxn modelId="{9AA3F2B4-85D7-4E67-A53B-D83B94482039}" type="presOf" srcId="{091F882E-0915-4AFC-AFCD-B1181E37E14D}" destId="{E753A8D8-B50F-42C4-B0CE-D216BE908656}" srcOrd="0" destOrd="0" presId="urn:microsoft.com/office/officeart/2005/8/layout/hierarchy1"/>
+    <dgm:cxn modelId="{FF4E295E-7BB3-4B76-B185-4F0106A708BA}" srcId="{6621E396-22BB-4BAA-86D9-A1D5854857CA}" destId="{64341ED1-133E-4A5F-B2CA-B7839122E5E1}" srcOrd="0" destOrd="0" parTransId="{9D095FE8-8213-4B2B-8FC7-77FFB4BB1B88}" sibTransId="{6B23510D-A384-4590-9F26-464C17EB856C}"/>
+    <dgm:cxn modelId="{2ABE6B4F-D2AE-4111-892F-4E82F39FE582}" type="presOf" srcId="{BD130280-A84B-4826-90BB-E35618FA7329}" destId="{1FDAFF91-CC20-4CEC-A22C-6CFA1AF43D26}" srcOrd="0" destOrd="0" presId="urn:microsoft.com/office/officeart/2005/8/layout/hierarchy1"/>
+    <dgm:cxn modelId="{973EF651-2A9A-44E8-9B31-B34D541E13C6}" type="presOf" srcId="{6509BC69-7715-4AE9-8545-833A23F1F7D0}" destId="{1DF10A25-C6B6-4B35-9C02-9BD8BC53F595}" srcOrd="0" destOrd="0" presId="urn:microsoft.com/office/officeart/2005/8/layout/hierarchy1"/>
+    <dgm:cxn modelId="{D7553362-3A4C-4B33-B7BF-53247DE2E997}" type="presOf" srcId="{64341ED1-133E-4A5F-B2CA-B7839122E5E1}" destId="{5573FD94-740A-4861-83F1-29D0DAEBDC74}" srcOrd="0" destOrd="0" presId="urn:microsoft.com/office/officeart/2005/8/layout/hierarchy1"/>
+    <dgm:cxn modelId="{EAAC68D4-7227-400B-9B95-0206ABD7B679}" type="presOf" srcId="{7343F464-1509-45F9-836B-82E0B529AC39}" destId="{ECDC51A7-6312-4B5B-9113-87639623B933}" srcOrd="0" destOrd="0" presId="urn:microsoft.com/office/officeart/2005/8/layout/hierarchy1"/>
+    <dgm:cxn modelId="{2525302B-B5D2-4C25-98D9-D15418FED570}" srcId="{E355DCEE-CFED-4B4E-95C1-C3ED3918F3D3}" destId="{9C1EE866-C214-4A82-9547-61A5AA867C03}" srcOrd="1" destOrd="0" parTransId="{535ADC1B-E987-4114-88E1-0020E71ACB45}" sibTransId="{F593FCBC-3BDA-47E4-BC69-F0F6F7CF17CA}"/>
     <dgm:cxn modelId="{628A9C82-BA29-4E3F-B65F-F63F75B68E9D}" srcId="{64341ED1-133E-4A5F-B2CA-B7839122E5E1}" destId="{091F882E-0915-4AFC-AFCD-B1181E37E14D}" srcOrd="3" destOrd="0" parTransId="{44337762-FFBD-474D-B88E-C618616EDE17}" sibTransId="{15C21F9D-4E60-420E-B892-0287CAD226B2}"/>
-    <dgm:cxn modelId="{7952A79E-9A23-4A9A-BE2E-18CB79CFAA62}" srcId="{E355DCEE-CFED-4B4E-95C1-C3ED3918F3D3}" destId="{6509BC69-7715-4AE9-8545-833A23F1F7D0}" srcOrd="0" destOrd="0" parTransId="{BD130280-A84B-4826-90BB-E35618FA7329}" sibTransId="{08030457-AA43-4093-AB35-36508039FC04}"/>
+    <dgm:cxn modelId="{1F2F3D80-A2AC-4DFD-9FDD-F19D7BC04570}" srcId="{64341ED1-133E-4A5F-B2CA-B7839122E5E1}" destId="{B426D3DF-981A-4ACA-BDCD-74F52BC54F36}" srcOrd="0" destOrd="0" parTransId="{A92319EC-B566-4DF5-8DC2-9B499E48805C}" sibTransId="{7F8B996A-D72C-4828-95CF-F00D2E1FEFCD}"/>
     <dgm:cxn modelId="{D7F088F7-70F2-4D80-B287-C9676E3ACC1D}" type="presOf" srcId="{FD996A20-6A09-41F5-9196-06E15DA4ED74}" destId="{E8E6B3F1-996D-4405-A520-CB4BB672E79C}" srcOrd="0" destOrd="0" presId="urn:microsoft.com/office/officeart/2005/8/layout/hierarchy1"/>
-    <dgm:cxn modelId="{2ABE6B4F-D2AE-4111-892F-4E82F39FE582}" type="presOf" srcId="{BD130280-A84B-4826-90BB-E35618FA7329}" destId="{1FDAFF91-CC20-4CEC-A22C-6CFA1AF43D26}" srcOrd="0" destOrd="0" presId="urn:microsoft.com/office/officeart/2005/8/layout/hierarchy1"/>
-    <dgm:cxn modelId="{1F2F3D80-A2AC-4DFD-9FDD-F19D7BC04570}" srcId="{64341ED1-133E-4A5F-B2CA-B7839122E5E1}" destId="{B426D3DF-981A-4ACA-BDCD-74F52BC54F36}" srcOrd="0" destOrd="0" parTransId="{A92319EC-B566-4DF5-8DC2-9B499E48805C}" sibTransId="{7F8B996A-D72C-4828-95CF-F00D2E1FEFCD}"/>
-    <dgm:cxn modelId="{2525302B-B5D2-4C25-98D9-D15418FED570}" srcId="{E355DCEE-CFED-4B4E-95C1-C3ED3918F3D3}" destId="{9C1EE866-C214-4A82-9547-61A5AA867C03}" srcOrd="1" destOrd="0" parTransId="{535ADC1B-E987-4114-88E1-0020E71ACB45}" sibTransId="{F593FCBC-3BDA-47E4-BC69-F0F6F7CF17CA}"/>
-    <dgm:cxn modelId="{06343924-9343-490C-8185-42B81C07BFD5}" type="presOf" srcId="{9C1EE866-C214-4A82-9547-61A5AA867C03}" destId="{35177D51-DA6B-4B74-8542-DDCB57DE5FAE}" srcOrd="0" destOrd="0" presId="urn:microsoft.com/office/officeart/2005/8/layout/hierarchy1"/>
-    <dgm:cxn modelId="{973EF651-2A9A-44E8-9B31-B34D541E13C6}" type="presOf" srcId="{6509BC69-7715-4AE9-8545-833A23F1F7D0}" destId="{1DF10A25-C6B6-4B35-9C02-9BD8BC53F595}" srcOrd="0" destOrd="0" presId="urn:microsoft.com/office/officeart/2005/8/layout/hierarchy1"/>
-    <dgm:cxn modelId="{239411CF-1F0E-4179-854E-288A6804E8C1}" type="presOf" srcId="{44337762-FFBD-474D-B88E-C618616EDE17}" destId="{C15F7BDE-BE17-440A-AFDC-26911405FC39}" srcOrd="0" destOrd="0" presId="urn:microsoft.com/office/officeart/2005/8/layout/hierarchy1"/>
-    <dgm:cxn modelId="{D7553362-3A4C-4B33-B7BF-53247DE2E997}" type="presOf" srcId="{64341ED1-133E-4A5F-B2CA-B7839122E5E1}" destId="{5573FD94-740A-4861-83F1-29D0DAEBDC74}" srcOrd="0" destOrd="0" presId="urn:microsoft.com/office/officeart/2005/8/layout/hierarchy1"/>
-    <dgm:cxn modelId="{AF143184-4851-4174-9641-5243E80A1E41}" type="presOf" srcId="{A92319EC-B566-4DF5-8DC2-9B499E48805C}" destId="{2E78A703-B9DD-425D-8C61-5CF4A53FAFA3}" srcOrd="0" destOrd="0" presId="urn:microsoft.com/office/officeart/2005/8/layout/hierarchy1"/>
     <dgm:cxn modelId="{A37C1BA9-717B-4608-BD6A-5F5D1626B9F1}" type="presParOf" srcId="{7E592DA7-86CE-4FE6-B528-72BCA053EDAC}" destId="{EB47D686-E303-417E-9EF5-4CB31FF033BA}" srcOrd="0" destOrd="0" presId="urn:microsoft.com/office/officeart/2005/8/layout/hierarchy1"/>
     <dgm:cxn modelId="{67D688D3-2880-4676-97BB-B1436622610C}" type="presParOf" srcId="{EB47D686-E303-417E-9EF5-4CB31FF033BA}" destId="{2D4E0BC2-F9F1-4407-8F38-F218C07A2C33}" srcOrd="0" destOrd="0" presId="urn:microsoft.com/office/officeart/2005/8/layout/hierarchy1"/>
     <dgm:cxn modelId="{E273DEE2-EA34-4263-86DB-F8EFFB5821F6}" type="presParOf" srcId="{2D4E0BC2-F9F1-4407-8F38-F218C07A2C33}" destId="{BEF97BD1-8EDB-42ED-B248-3EEE60E32564}" srcOrd="0" destOrd="0" presId="urn:microsoft.com/office/officeart/2005/8/layout/hierarchy1"/>
@@ -6135,7 +6136,7 @@
   <dgm:whole/>
   <dgm:extLst>
     <a:ext uri="http://schemas.microsoft.com/office/drawing/2008/diagram">
-      <dsp:dataModelExt xmlns:dsp="http://schemas.microsoft.com/office/drawing/2008/diagram" relId="rId6" minVer="http://schemas.openxmlformats.org/drawingml/2006/diagram"/>
+      <dsp:dataModelExt xmlns:dsp="http://schemas.microsoft.com/office/drawing/2008/diagram" xmlns="" relId="rId6" minVer="http://schemas.openxmlformats.org/drawingml/2006/diagram"/>
     </a:ext>
   </dgm:extLst>
 </dgm:dataModel>
@@ -17164,7 +17165,7 @@
             <a:fld id="{1D8BD707-D9CF-40AE-B4C6-C98DA3205C09}" type="datetimeFigureOut">
               <a:rPr lang="en-US" smtClean="0"/>
               <a:pPr/>
-              <a:t>12/5/2016</a:t>
+              <a:t>12/28/2016</a:t>
             </a:fld>
             <a:endParaRPr lang="en-US"/>
           </a:p>
@@ -17331,7 +17332,7 @@
             <a:fld id="{1D8BD707-D9CF-40AE-B4C6-C98DA3205C09}" type="datetimeFigureOut">
               <a:rPr lang="en-US" smtClean="0"/>
               <a:pPr/>
-              <a:t>12/5/2016</a:t>
+              <a:t>12/28/2016</a:t>
             </a:fld>
             <a:endParaRPr lang="en-US"/>
           </a:p>
@@ -17508,7 +17509,7 @@
             <a:fld id="{1D8BD707-D9CF-40AE-B4C6-C98DA3205C09}" type="datetimeFigureOut">
               <a:rPr lang="en-US" smtClean="0"/>
               <a:pPr/>
-              <a:t>12/5/2016</a:t>
+              <a:t>12/28/2016</a:t>
             </a:fld>
             <a:endParaRPr lang="en-US"/>
           </a:p>
@@ -17675,7 +17676,7 @@
             <a:fld id="{1D8BD707-D9CF-40AE-B4C6-C98DA3205C09}" type="datetimeFigureOut">
               <a:rPr lang="en-US" smtClean="0"/>
               <a:pPr/>
-              <a:t>12/5/2016</a:t>
+              <a:t>12/28/2016</a:t>
             </a:fld>
             <a:endParaRPr lang="en-US"/>
           </a:p>
@@ -17918,7 +17919,7 @@
             <a:fld id="{1D8BD707-D9CF-40AE-B4C6-C98DA3205C09}" type="datetimeFigureOut">
               <a:rPr lang="en-US" smtClean="0"/>
               <a:pPr/>
-              <a:t>12/5/2016</a:t>
+              <a:t>12/28/2016</a:t>
             </a:fld>
             <a:endParaRPr lang="en-US"/>
           </a:p>
@@ -18203,7 +18204,7 @@
             <a:fld id="{1D8BD707-D9CF-40AE-B4C6-C98DA3205C09}" type="datetimeFigureOut">
               <a:rPr lang="en-US" smtClean="0"/>
               <a:pPr/>
-              <a:t>12/5/2016</a:t>
+              <a:t>12/28/2016</a:t>
             </a:fld>
             <a:endParaRPr lang="en-US"/>
           </a:p>
@@ -18622,7 +18623,7 @@
             <a:fld id="{1D8BD707-D9CF-40AE-B4C6-C98DA3205C09}" type="datetimeFigureOut">
               <a:rPr lang="en-US" smtClean="0"/>
               <a:pPr/>
-              <a:t>12/5/2016</a:t>
+              <a:t>12/28/2016</a:t>
             </a:fld>
             <a:endParaRPr lang="en-US"/>
           </a:p>
@@ -18737,7 +18738,7 @@
             <a:fld id="{1D8BD707-D9CF-40AE-B4C6-C98DA3205C09}" type="datetimeFigureOut">
               <a:rPr lang="en-US" smtClean="0"/>
               <a:pPr/>
-              <a:t>12/5/2016</a:t>
+              <a:t>12/28/2016</a:t>
             </a:fld>
             <a:endParaRPr lang="en-US"/>
           </a:p>
@@ -18829,7 +18830,7 @@
             <a:fld id="{1D8BD707-D9CF-40AE-B4C6-C98DA3205C09}" type="datetimeFigureOut">
               <a:rPr lang="en-US" smtClean="0"/>
               <a:pPr/>
-              <a:t>12/5/2016</a:t>
+              <a:t>12/28/2016</a:t>
             </a:fld>
             <a:endParaRPr lang="en-US"/>
           </a:p>
@@ -19103,7 +19104,7 @@
             <a:fld id="{1D8BD707-D9CF-40AE-B4C6-C98DA3205C09}" type="datetimeFigureOut">
               <a:rPr lang="en-US" smtClean="0"/>
               <a:pPr/>
-              <a:t>12/5/2016</a:t>
+              <a:t>12/28/2016</a:t>
             </a:fld>
             <a:endParaRPr lang="en-US"/>
           </a:p>
@@ -19353,7 +19354,7 @@
             <a:fld id="{1D8BD707-D9CF-40AE-B4C6-C98DA3205C09}" type="datetimeFigureOut">
               <a:rPr lang="en-US" smtClean="0"/>
               <a:pPr/>
-              <a:t>12/5/2016</a:t>
+              <a:t>12/28/2016</a:t>
             </a:fld>
             <a:endParaRPr lang="en-US"/>
           </a:p>
@@ -19563,7 +19564,7 @@
             <a:fld id="{1D8BD707-D9CF-40AE-B4C6-C98DA3205C09}" type="datetimeFigureOut">
               <a:rPr lang="en-US" smtClean="0"/>
               <a:pPr/>
-              <a:t>12/5/2016</a:t>
+              <a:t>12/28/2016</a:t>
             </a:fld>
             <a:endParaRPr lang="en-US"/>
           </a:p>
@@ -19989,7 +19990,7 @@
           <p:nvPr>
             <p:extLst>
               <p:ext uri="{D42A27DB-BD31-4B8C-83A1-F6EECF244321}">
-                <p14:modId xmlns:p14="http://schemas.microsoft.com/office/powerpoint/2010/main" val="1262172334"/>
+                <p14:modId xmlns:p14="http://schemas.microsoft.com/office/powerpoint/2010/main" xmlns="" val="1262172334"/>
               </p:ext>
             </p:extLst>
           </p:nvPr>
@@ -20037,7 +20038,7 @@
     </p:spTree>
     <p:extLst>
       <p:ext uri="{BB962C8B-B14F-4D97-AF65-F5344CB8AC3E}">
-        <p14:creationId xmlns:p14="http://schemas.microsoft.com/office/powerpoint/2010/main" val="3650172683"/>
+        <p14:creationId xmlns:p14="http://schemas.microsoft.com/office/powerpoint/2010/main" xmlns="" val="3650172683"/>
       </p:ext>
     </p:extLst>
   </p:cSld>
@@ -20121,7 +20122,7 @@
           <p:nvPr>
             <p:extLst>
               <p:ext uri="{D42A27DB-BD31-4B8C-83A1-F6EECF244321}">
-                <p14:modId xmlns:p14="http://schemas.microsoft.com/office/powerpoint/2010/main" val="4217214646"/>
+                <p14:modId xmlns:p14="http://schemas.microsoft.com/office/powerpoint/2010/main" xmlns="" val="4217214646"/>
               </p:ext>
             </p:extLst>
           </p:nvPr>
@@ -20139,7 +20140,7 @@
     </p:spTree>
     <p:extLst>
       <p:ext uri="{BB962C8B-B14F-4D97-AF65-F5344CB8AC3E}">
-        <p14:creationId xmlns:p14="http://schemas.microsoft.com/office/powerpoint/2010/main" val="1044658037"/>
+        <p14:creationId xmlns:p14="http://schemas.microsoft.com/office/powerpoint/2010/main" xmlns="" val="1044658037"/>
       </p:ext>
     </p:extLst>
   </p:cSld>
@@ -20226,7 +20227,7 @@
           <p:nvPr>
             <p:extLst>
               <p:ext uri="{D42A27DB-BD31-4B8C-83A1-F6EECF244321}">
-                <p14:modId xmlns:p14="http://schemas.microsoft.com/office/powerpoint/2010/main" val="3864352614"/>
+                <p14:modId xmlns:p14="http://schemas.microsoft.com/office/powerpoint/2010/main" xmlns="" val="3864352614"/>
               </p:ext>
             </p:extLst>
           </p:nvPr>
@@ -20244,7 +20245,7 @@
     </p:spTree>
     <p:extLst>
       <p:ext uri="{BB962C8B-B14F-4D97-AF65-F5344CB8AC3E}">
-        <p14:creationId xmlns:p14="http://schemas.microsoft.com/office/powerpoint/2010/main" val="2295323102"/>
+        <p14:creationId xmlns:p14="http://schemas.microsoft.com/office/powerpoint/2010/main" xmlns="" val="2295323102"/>
       </p:ext>
     </p:extLst>
   </p:cSld>
@@ -20314,7 +20315,7 @@
             </a:clrChange>
             <a:extLst>
               <a:ext uri="{28A0092B-C50C-407E-A947-70E740481C1C}">
-                <a14:useLocalDpi xmlns:a14="http://schemas.microsoft.com/office/drawing/2010/main" val="0"/>
+                <a14:useLocalDpi xmlns:a14="http://schemas.microsoft.com/office/drawing/2010/main" xmlns="" val="0"/>
               </a:ext>
             </a:extLst>
           </a:blip>
@@ -20337,14 +20338,14 @@
           </a:ln>
           <a:extLst>
             <a:ext uri="{909E8E84-426E-40DD-AFC4-6F175D3DCCD1}">
-              <a14:hiddenFill xmlns:a14="http://schemas.microsoft.com/office/drawing/2010/main">
+              <a14:hiddenFill xmlns:a14="http://schemas.microsoft.com/office/drawing/2010/main" xmlns="">
                 <a:solidFill>
                   <a:schemeClr val="accent1"/>
                 </a:solidFill>
               </a14:hiddenFill>
             </a:ext>
             <a:ext uri="{91240B29-F687-4F45-9708-019B960494DF}">
-              <a14:hiddenLine xmlns:a14="http://schemas.microsoft.com/office/drawing/2010/main" w="9525">
+              <a14:hiddenLine xmlns:a14="http://schemas.microsoft.com/office/drawing/2010/main" xmlns="" w="9525">
                 <a:solidFill>
                   <a:schemeClr val="tx1"/>
                 </a:solidFill>
@@ -20359,7 +20360,7 @@
     </p:spTree>
     <p:extLst>
       <p:ext uri="{BB962C8B-B14F-4D97-AF65-F5344CB8AC3E}">
-        <p14:creationId xmlns:p14="http://schemas.microsoft.com/office/powerpoint/2010/main" val="2745742463"/>
+        <p14:creationId xmlns:p14="http://schemas.microsoft.com/office/powerpoint/2010/main" xmlns="" val="2745742463"/>
       </p:ext>
     </p:extLst>
   </p:cSld>
@@ -20461,7 +20462,7 @@
             </a:clrChange>
             <a:extLst>
               <a:ext uri="{28A0092B-C50C-407E-A947-70E740481C1C}">
-                <a14:useLocalDpi xmlns:a14="http://schemas.microsoft.com/office/drawing/2010/main" val="0"/>
+                <a14:useLocalDpi xmlns:a14="http://schemas.microsoft.com/office/drawing/2010/main" xmlns="" val="0"/>
               </a:ext>
             </a:extLst>
           </a:blip>
@@ -20484,14 +20485,14 @@
           </a:ln>
           <a:extLst>
             <a:ext uri="{909E8E84-426E-40DD-AFC4-6F175D3DCCD1}">
-              <a14:hiddenFill xmlns:a14="http://schemas.microsoft.com/office/drawing/2010/main">
+              <a14:hiddenFill xmlns:a14="http://schemas.microsoft.com/office/drawing/2010/main" xmlns="">
                 <a:solidFill>
                   <a:schemeClr val="accent1"/>
                 </a:solidFill>
               </a14:hiddenFill>
             </a:ext>
             <a:ext uri="{91240B29-F687-4F45-9708-019B960494DF}">
-              <a14:hiddenLine xmlns:a14="http://schemas.microsoft.com/office/drawing/2010/main" w="9525">
+              <a14:hiddenLine xmlns:a14="http://schemas.microsoft.com/office/drawing/2010/main" xmlns="" w="9525">
                 <a:solidFill>
                   <a:schemeClr val="tx1"/>
                 </a:solidFill>
@@ -20506,7 +20507,7 @@
     </p:spTree>
     <p:extLst>
       <p:ext uri="{BB962C8B-B14F-4D97-AF65-F5344CB8AC3E}">
-        <p14:creationId xmlns:p14="http://schemas.microsoft.com/office/powerpoint/2010/main" val="1306052275"/>
+        <p14:creationId xmlns:p14="http://schemas.microsoft.com/office/powerpoint/2010/main" xmlns="" val="1306052275"/>
       </p:ext>
     </p:extLst>
   </p:cSld>
@@ -20608,7 +20609,7 @@
             </a:clrChange>
             <a:extLst>
               <a:ext uri="{28A0092B-C50C-407E-A947-70E740481C1C}">
-                <a14:useLocalDpi xmlns:a14="http://schemas.microsoft.com/office/drawing/2010/main" val="0"/>
+                <a14:useLocalDpi xmlns:a14="http://schemas.microsoft.com/office/drawing/2010/main" xmlns="" val="0"/>
               </a:ext>
             </a:extLst>
           </a:blip>
@@ -20631,14 +20632,14 @@
           </a:ln>
           <a:extLst>
             <a:ext uri="{909E8E84-426E-40DD-AFC4-6F175D3DCCD1}">
-              <a14:hiddenFill xmlns:a14="http://schemas.microsoft.com/office/drawing/2010/main">
+              <a14:hiddenFill xmlns:a14="http://schemas.microsoft.com/office/drawing/2010/main" xmlns="">
                 <a:solidFill>
                   <a:schemeClr val="accent1"/>
                 </a:solidFill>
               </a14:hiddenFill>
             </a:ext>
             <a:ext uri="{91240B29-F687-4F45-9708-019B960494DF}">
-              <a14:hiddenLine xmlns:a14="http://schemas.microsoft.com/office/drawing/2010/main" w="9525">
+              <a14:hiddenLine xmlns:a14="http://schemas.microsoft.com/office/drawing/2010/main" xmlns="" w="9525">
                 <a:solidFill>
                   <a:schemeClr val="tx1"/>
                 </a:solidFill>
@@ -20653,7 +20654,7 @@
     </p:spTree>
     <p:extLst>
       <p:ext uri="{BB962C8B-B14F-4D97-AF65-F5344CB8AC3E}">
-        <p14:creationId xmlns:p14="http://schemas.microsoft.com/office/powerpoint/2010/main" val="3886907763"/>
+        <p14:creationId xmlns:p14="http://schemas.microsoft.com/office/powerpoint/2010/main" xmlns="" val="3886907763"/>
       </p:ext>
     </p:extLst>
   </p:cSld>
@@ -20762,7 +20763,7 @@
             </a:clrChange>
             <a:extLst>
               <a:ext uri="{28A0092B-C50C-407E-A947-70E740481C1C}">
-                <a14:useLocalDpi xmlns:a14="http://schemas.microsoft.com/office/drawing/2010/main" val="0"/>
+                <a14:useLocalDpi xmlns:a14="http://schemas.microsoft.com/office/drawing/2010/main" xmlns="" val="0"/>
               </a:ext>
             </a:extLst>
           </a:blip>
@@ -20785,14 +20786,14 @@
           </a:ln>
           <a:extLst>
             <a:ext uri="{909E8E84-426E-40DD-AFC4-6F175D3DCCD1}">
-              <a14:hiddenFill xmlns:a14="http://schemas.microsoft.com/office/drawing/2010/main">
+              <a14:hiddenFill xmlns:a14="http://schemas.microsoft.com/office/drawing/2010/main" xmlns="">
                 <a:solidFill>
                   <a:schemeClr val="accent1"/>
                 </a:solidFill>
               </a14:hiddenFill>
             </a:ext>
             <a:ext uri="{91240B29-F687-4F45-9708-019B960494DF}">
-              <a14:hiddenLine xmlns:a14="http://schemas.microsoft.com/office/drawing/2010/main" w="9525">
+              <a14:hiddenLine xmlns:a14="http://schemas.microsoft.com/office/drawing/2010/main" xmlns="" w="9525">
                 <a:solidFill>
                   <a:schemeClr val="tx1"/>
                 </a:solidFill>
@@ -20807,7 +20808,7 @@
     </p:spTree>
     <p:extLst>
       <p:ext uri="{BB962C8B-B14F-4D97-AF65-F5344CB8AC3E}">
-        <p14:creationId xmlns:p14="http://schemas.microsoft.com/office/powerpoint/2010/main" val="2586967119"/>
+        <p14:creationId xmlns:p14="http://schemas.microsoft.com/office/powerpoint/2010/main" xmlns="" val="2586967119"/>
       </p:ext>
     </p:extLst>
   </p:cSld>
@@ -20894,7 +20895,7 @@
           <p:nvPr>
             <p:extLst>
               <p:ext uri="{D42A27DB-BD31-4B8C-83A1-F6EECF244321}">
-                <p14:modId xmlns:p14="http://schemas.microsoft.com/office/powerpoint/2010/main" val="2089266211"/>
+                <p14:modId xmlns:p14="http://schemas.microsoft.com/office/powerpoint/2010/main" xmlns="" val="2089266211"/>
               </p:ext>
             </p:extLst>
           </p:nvPr>
@@ -20912,7 +20913,7 @@
     </p:spTree>
     <p:extLst>
       <p:ext uri="{BB962C8B-B14F-4D97-AF65-F5344CB8AC3E}">
-        <p14:creationId xmlns:p14="http://schemas.microsoft.com/office/powerpoint/2010/main" val="2847007101"/>
+        <p14:creationId xmlns:p14="http://schemas.microsoft.com/office/powerpoint/2010/main" xmlns="" val="2847007101"/>
       </p:ext>
     </p:extLst>
   </p:cSld>
@@ -20972,7 +20973,7 @@
           <a:blip r:embed="rId2">
             <a:extLst>
               <a:ext uri="{28A0092B-C50C-407E-A947-70E740481C1C}">
-                <a14:useLocalDpi xmlns:a14="http://schemas.microsoft.com/office/drawing/2010/main" val="0"/>
+                <a14:useLocalDpi xmlns:a14="http://schemas.microsoft.com/office/drawing/2010/main" xmlns="" val="0"/>
               </a:ext>
             </a:extLst>
           </a:blip>
@@ -20995,14 +20996,14 @@
           </a:ln>
           <a:extLst>
             <a:ext uri="{909E8E84-426E-40DD-AFC4-6F175D3DCCD1}">
-              <a14:hiddenFill xmlns:a14="http://schemas.microsoft.com/office/drawing/2010/main">
+              <a14:hiddenFill xmlns:a14="http://schemas.microsoft.com/office/drawing/2010/main" xmlns="">
                 <a:solidFill>
                   <a:schemeClr val="accent1"/>
                 </a:solidFill>
               </a14:hiddenFill>
             </a:ext>
             <a:ext uri="{91240B29-F687-4F45-9708-019B960494DF}">
-              <a14:hiddenLine xmlns:a14="http://schemas.microsoft.com/office/drawing/2010/main" w="9525">
+              <a14:hiddenLine xmlns:a14="http://schemas.microsoft.com/office/drawing/2010/main" xmlns="" w="9525">
                 <a:solidFill>
                   <a:schemeClr val="tx1"/>
                 </a:solidFill>
@@ -21017,7 +21018,7 @@
     </p:spTree>
     <p:extLst>
       <p:ext uri="{BB962C8B-B14F-4D97-AF65-F5344CB8AC3E}">
-        <p14:creationId xmlns:p14="http://schemas.microsoft.com/office/powerpoint/2010/main" val="3820374464"/>
+        <p14:creationId xmlns:p14="http://schemas.microsoft.com/office/powerpoint/2010/main" xmlns="" val="3820374464"/>
       </p:ext>
     </p:extLst>
   </p:cSld>
@@ -21100,7 +21101,7 @@
           <a:blip r:embed="rId2">
             <a:extLst>
               <a:ext uri="{28A0092B-C50C-407E-A947-70E740481C1C}">
-                <a14:useLocalDpi xmlns:a14="http://schemas.microsoft.com/office/drawing/2010/main" val="0"/>
+                <a14:useLocalDpi xmlns:a14="http://schemas.microsoft.com/office/drawing/2010/main" xmlns="" val="0"/>
               </a:ext>
             </a:extLst>
           </a:blip>
@@ -21123,14 +21124,14 @@
           </a:ln>
           <a:extLst>
             <a:ext uri="{909E8E84-426E-40DD-AFC4-6F175D3DCCD1}">
-              <a14:hiddenFill xmlns:a14="http://schemas.microsoft.com/office/drawing/2010/main">
+              <a14:hiddenFill xmlns:a14="http://schemas.microsoft.com/office/drawing/2010/main" xmlns="">
                 <a:solidFill>
                   <a:schemeClr val="accent1"/>
                 </a:solidFill>
               </a14:hiddenFill>
             </a:ext>
             <a:ext uri="{91240B29-F687-4F45-9708-019B960494DF}">
-              <a14:hiddenLine xmlns:a14="http://schemas.microsoft.com/office/drawing/2010/main" w="9525">
+              <a14:hiddenLine xmlns:a14="http://schemas.microsoft.com/office/drawing/2010/main" xmlns="" w="9525">
                 <a:solidFill>
                   <a:schemeClr val="tx1"/>
                 </a:solidFill>
@@ -21145,7 +21146,7 @@
     </p:spTree>
     <p:extLst>
       <p:ext uri="{BB962C8B-B14F-4D97-AF65-F5344CB8AC3E}">
-        <p14:creationId xmlns:p14="http://schemas.microsoft.com/office/powerpoint/2010/main" val="796640976"/>
+        <p14:creationId xmlns:p14="http://schemas.microsoft.com/office/powerpoint/2010/main" xmlns="" val="796640976"/>
       </p:ext>
     </p:extLst>
   </p:cSld>
@@ -21231,7 +21232,7 @@
           <a:blip r:embed="rId2">
             <a:extLst>
               <a:ext uri="{28A0092B-C50C-407E-A947-70E740481C1C}">
-                <a14:useLocalDpi xmlns:a14="http://schemas.microsoft.com/office/drawing/2010/main" val="0"/>
+                <a14:useLocalDpi xmlns:a14="http://schemas.microsoft.com/office/drawing/2010/main" xmlns="" val="0"/>
               </a:ext>
             </a:extLst>
           </a:blip>
@@ -21254,14 +21255,14 @@
           </a:ln>
           <a:extLst>
             <a:ext uri="{909E8E84-426E-40DD-AFC4-6F175D3DCCD1}">
-              <a14:hiddenFill xmlns:a14="http://schemas.microsoft.com/office/drawing/2010/main">
+              <a14:hiddenFill xmlns:a14="http://schemas.microsoft.com/office/drawing/2010/main" xmlns="">
                 <a:solidFill>
                   <a:schemeClr val="accent1"/>
                 </a:solidFill>
               </a14:hiddenFill>
             </a:ext>
             <a:ext uri="{91240B29-F687-4F45-9708-019B960494DF}">
-              <a14:hiddenLine xmlns:a14="http://schemas.microsoft.com/office/drawing/2010/main" w="9525">
+              <a14:hiddenLine xmlns:a14="http://schemas.microsoft.com/office/drawing/2010/main" xmlns="" w="9525">
                 <a:solidFill>
                   <a:schemeClr val="tx1"/>
                 </a:solidFill>
@@ -21276,7 +21277,7 @@
     </p:spTree>
     <p:extLst>
       <p:ext uri="{BB962C8B-B14F-4D97-AF65-F5344CB8AC3E}">
-        <p14:creationId xmlns:p14="http://schemas.microsoft.com/office/powerpoint/2010/main" val="326179920"/>
+        <p14:creationId xmlns:p14="http://schemas.microsoft.com/office/powerpoint/2010/main" xmlns="" val="326179920"/>
       </p:ext>
     </p:extLst>
   </p:cSld>
@@ -21863,7 +21864,7 @@
     </p:spTree>
     <p:extLst>
       <p:ext uri="{BB962C8B-B14F-4D97-AF65-F5344CB8AC3E}">
-        <p14:creationId xmlns:p14="http://schemas.microsoft.com/office/powerpoint/2010/main" val="3429256208"/>
+        <p14:creationId xmlns:p14="http://schemas.microsoft.com/office/powerpoint/2010/main" xmlns="" val="3429256208"/>
       </p:ext>
     </p:extLst>
   </p:cSld>
@@ -22843,7 +22844,7 @@
     </p:spTree>
     <p:extLst>
       <p:ext uri="{BB962C8B-B14F-4D97-AF65-F5344CB8AC3E}">
-        <p14:creationId xmlns:p14="http://schemas.microsoft.com/office/powerpoint/2010/main" val="2476189663"/>
+        <p14:creationId xmlns:p14="http://schemas.microsoft.com/office/powerpoint/2010/main" xmlns="" val="2476189663"/>
       </p:ext>
     </p:extLst>
   </p:cSld>
@@ -23030,7 +23031,7 @@
           <a:blip r:embed="rId2">
             <a:extLst>
               <a:ext uri="{28A0092B-C50C-407E-A947-70E740481C1C}">
-                <a14:useLocalDpi xmlns:a14="http://schemas.microsoft.com/office/drawing/2010/main" val="0"/>
+                <a14:useLocalDpi xmlns:a14="http://schemas.microsoft.com/office/drawing/2010/main" xmlns="" val="0"/>
               </a:ext>
             </a:extLst>
           </a:blip>
@@ -23050,7 +23051,7 @@
           <a:noFill/>
           <a:extLst>
             <a:ext uri="{909E8E84-426E-40DD-AFC4-6F175D3DCCD1}">
-              <a14:hiddenFill xmlns:a14="http://schemas.microsoft.com/office/drawing/2010/main">
+              <a14:hiddenFill xmlns:a14="http://schemas.microsoft.com/office/drawing/2010/main" xmlns="">
                 <a:solidFill>
                   <a:srgbClr val="FFFFFF"/>
                 </a:solidFill>
@@ -23071,7 +23072,7 @@
           <a:blip r:embed="rId3">
             <a:extLst>
               <a:ext uri="{BEBA8EAE-BF5A-486C-A8C5-ECC9F3942E4B}">
-                <a14:imgProps xmlns:a14="http://schemas.microsoft.com/office/drawing/2010/main">
+                <a14:imgProps xmlns:a14="http://schemas.microsoft.com/office/drawing/2010/main" xmlns="">
                   <a14:imgLayer r:embed="rId4">
                     <a14:imgEffect>
                       <a14:backgroundRemoval t="10000" b="90000" l="10000" r="90000"/>
@@ -23080,7 +23081,7 @@
                 </a14:imgProps>
               </a:ext>
               <a:ext uri="{28A0092B-C50C-407E-A947-70E740481C1C}">
-                <a14:useLocalDpi xmlns:a14="http://schemas.microsoft.com/office/drawing/2010/main" val="0"/>
+                <a14:useLocalDpi xmlns:a14="http://schemas.microsoft.com/office/drawing/2010/main" xmlns="" val="0"/>
               </a:ext>
             </a:extLst>
           </a:blip>
@@ -23100,7 +23101,7 @@
           <a:noFill/>
           <a:extLst>
             <a:ext uri="{909E8E84-426E-40DD-AFC4-6F175D3DCCD1}">
-              <a14:hiddenFill xmlns:a14="http://schemas.microsoft.com/office/drawing/2010/main">
+              <a14:hiddenFill xmlns:a14="http://schemas.microsoft.com/office/drawing/2010/main" xmlns="">
                 <a:solidFill>
                   <a:srgbClr val="FFFFFF"/>
                 </a:solidFill>
@@ -23874,7 +23875,7 @@
     </p:spTree>
     <p:extLst>
       <p:ext uri="{BB962C8B-B14F-4D97-AF65-F5344CB8AC3E}">
-        <p14:creationId xmlns:p14="http://schemas.microsoft.com/office/powerpoint/2010/main" val="860012903"/>
+        <p14:creationId xmlns:p14="http://schemas.microsoft.com/office/powerpoint/2010/main" xmlns="" val="860012903"/>
       </p:ext>
     </p:extLst>
   </p:cSld>
@@ -23982,7 +23983,7 @@
           <a:blip r:embed="rId2">
             <a:extLst>
               <a:ext uri="{28A0092B-C50C-407E-A947-70E740481C1C}">
-                <a14:useLocalDpi xmlns:a14="http://schemas.microsoft.com/office/drawing/2010/main" val="0"/>
+                <a14:useLocalDpi xmlns:a14="http://schemas.microsoft.com/office/drawing/2010/main" xmlns="" val="0"/>
               </a:ext>
             </a:extLst>
           </a:blip>
@@ -24005,14 +24006,14 @@
           </a:ln>
           <a:extLst>
             <a:ext uri="{909E8E84-426E-40DD-AFC4-6F175D3DCCD1}">
-              <a14:hiddenFill xmlns:a14="http://schemas.microsoft.com/office/drawing/2010/main">
+              <a14:hiddenFill xmlns:a14="http://schemas.microsoft.com/office/drawing/2010/main" xmlns="">
                 <a:solidFill>
                   <a:schemeClr val="accent1"/>
                 </a:solidFill>
               </a14:hiddenFill>
             </a:ext>
             <a:ext uri="{91240B29-F687-4F45-9708-019B960494DF}">
-              <a14:hiddenLine xmlns:a14="http://schemas.microsoft.com/office/drawing/2010/main" w="9525">
+              <a14:hiddenLine xmlns:a14="http://schemas.microsoft.com/office/drawing/2010/main" xmlns="" w="9525">
                 <a:solidFill>
                   <a:schemeClr val="tx1"/>
                 </a:solidFill>
@@ -24082,7 +24083,7 @@
           <a:blip r:embed="rId3">
             <a:extLst>
               <a:ext uri="{28A0092B-C50C-407E-A947-70E740481C1C}">
-                <a14:useLocalDpi xmlns:a14="http://schemas.microsoft.com/office/drawing/2010/main" val="0"/>
+                <a14:useLocalDpi xmlns:a14="http://schemas.microsoft.com/office/drawing/2010/main" xmlns="" val="0"/>
               </a:ext>
             </a:extLst>
           </a:blip>
@@ -24102,7 +24103,7 @@
           <a:noFill/>
           <a:extLst>
             <a:ext uri="{909E8E84-426E-40DD-AFC4-6F175D3DCCD1}">
-              <a14:hiddenFill xmlns:a14="http://schemas.microsoft.com/office/drawing/2010/main">
+              <a14:hiddenFill xmlns:a14="http://schemas.microsoft.com/office/drawing/2010/main" xmlns="">
                 <a:solidFill>
                   <a:srgbClr val="FFFFFF"/>
                 </a:solidFill>
@@ -24130,7 +24131,7 @@
           <a:noFill/>
           <a:extLst>
             <a:ext uri="{909E8E84-426E-40DD-AFC4-6F175D3DCCD1}">
-              <a14:hiddenFill xmlns:a14="http://schemas.microsoft.com/office/drawing/2010/main">
+              <a14:hiddenFill xmlns:a14="http://schemas.microsoft.com/office/drawing/2010/main" xmlns="">
                 <a:solidFill>
                   <a:srgbClr val="FFFFFF"/>
                 </a:solidFill>
@@ -24169,7 +24170,7 @@
           <a:noFill/>
           <a:extLst>
             <a:ext uri="{909E8E84-426E-40DD-AFC4-6F175D3DCCD1}">
-              <a14:hiddenFill xmlns:a14="http://schemas.microsoft.com/office/drawing/2010/main">
+              <a14:hiddenFill xmlns:a14="http://schemas.microsoft.com/office/drawing/2010/main" xmlns="">
                 <a:solidFill>
                   <a:srgbClr val="FFFFFF"/>
                 </a:solidFill>
@@ -24201,7 +24202,7 @@
           <a:blip r:embed="rId4" cstate="print">
             <a:extLst>
               <a:ext uri="{28A0092B-C50C-407E-A947-70E740481C1C}">
-                <a14:useLocalDpi xmlns:a14="http://schemas.microsoft.com/office/drawing/2010/main" val="0"/>
+                <a14:useLocalDpi xmlns:a14="http://schemas.microsoft.com/office/drawing/2010/main" xmlns="" val="0"/>
               </a:ext>
             </a:extLst>
           </a:blip>
@@ -24224,14 +24225,14 @@
           </a:ln>
           <a:extLst>
             <a:ext uri="{909E8E84-426E-40DD-AFC4-6F175D3DCCD1}">
-              <a14:hiddenFill xmlns:a14="http://schemas.microsoft.com/office/drawing/2010/main">
+              <a14:hiddenFill xmlns:a14="http://schemas.microsoft.com/office/drawing/2010/main" xmlns="">
                 <a:solidFill>
                   <a:schemeClr val="accent1"/>
                 </a:solidFill>
               </a14:hiddenFill>
             </a:ext>
             <a:ext uri="{91240B29-F687-4F45-9708-019B960494DF}">
-              <a14:hiddenLine xmlns:a14="http://schemas.microsoft.com/office/drawing/2010/main" w="9525">
+              <a14:hiddenLine xmlns:a14="http://schemas.microsoft.com/office/drawing/2010/main" xmlns="" w="9525">
                 <a:solidFill>
                   <a:schemeClr val="tx1"/>
                 </a:solidFill>
@@ -24419,23 +24420,7 @@
           <a:p>
             <a:r>
               <a:rPr lang="en-US" dirty="0" smtClean="0"/>
-              <a:t>Parse the JSON file and get communicator </a:t>
-            </a:r>
-            <a:r>
-              <a:rPr lang="en-US" dirty="0" smtClean="0"/>
-              <a:t>(which </a:t>
-            </a:r>
-            <a:r>
-              <a:rPr lang="en-US" dirty="0" smtClean="0"/>
-              <a:t>uses chosen </a:t>
-            </a:r>
-            <a:r>
-              <a:rPr lang="en-US" dirty="0" smtClean="0"/>
-              <a:t>protocol) </a:t>
-            </a:r>
-            <a:r>
-              <a:rPr lang="en-US" dirty="0" smtClean="0"/>
-              <a:t>by querying the interface</a:t>
+              <a:t>Parse the JSON file and get communicator (which uses chosen protocol) by querying the interface</a:t>
             </a:r>
             <a:endParaRPr lang="en-US" dirty="0"/>
           </a:p>
@@ -24575,7 +24560,7 @@
           <a:blip r:embed="rId5" cstate="print">
             <a:extLst>
               <a:ext uri="{28A0092B-C50C-407E-A947-70E740481C1C}">
-                <a14:useLocalDpi xmlns:a14="http://schemas.microsoft.com/office/drawing/2010/main" val="0"/>
+                <a14:useLocalDpi xmlns:a14="http://schemas.microsoft.com/office/drawing/2010/main" xmlns="" val="0"/>
               </a:ext>
             </a:extLst>
           </a:blip>
@@ -24595,7 +24580,7 @@
           <a:noFill/>
           <a:extLst>
             <a:ext uri="{909E8E84-426E-40DD-AFC4-6F175D3DCCD1}">
-              <a14:hiddenFill xmlns:a14="http://schemas.microsoft.com/office/drawing/2010/main">
+              <a14:hiddenFill xmlns:a14="http://schemas.microsoft.com/office/drawing/2010/main" xmlns="">
                 <a:solidFill>
                   <a:srgbClr val="FFFFFF"/>
                 </a:solidFill>
@@ -24818,9 +24803,99 @@
     </p:spTree>
     <p:extLst>
       <p:ext uri="{BB962C8B-B14F-4D97-AF65-F5344CB8AC3E}">
-        <p14:creationId xmlns:p14="http://schemas.microsoft.com/office/powerpoint/2010/main" val="2956477278"/>
+        <p14:creationId xmlns:p14="http://schemas.microsoft.com/office/powerpoint/2010/main" xmlns="" val="2956477278"/>
       </p:ext>
     </p:extLst>
+  </p:cSld>
+  <p:clrMapOvr>
+    <a:masterClrMapping/>
+  </p:clrMapOvr>
+</p:sld>
+</file>
+
+<file path=ppt/slides/slide23.xml><?xml version="1.0" encoding="utf-8"?>
+<p:sld xmlns:a="http://schemas.openxmlformats.org/drawingml/2006/main" xmlns:r="http://schemas.openxmlformats.org/officeDocument/2006/relationships" xmlns:p="http://schemas.openxmlformats.org/presentationml/2006/main">
+  <p:cSld>
+    <p:spTree>
+      <p:nvGrpSpPr>
+        <p:cNvPr id="1" name=""/>
+        <p:cNvGrpSpPr/>
+        <p:nvPr/>
+      </p:nvGrpSpPr>
+      <p:grpSpPr>
+        <a:xfrm>
+          <a:off x="0" y="0"/>
+          <a:ext cx="0" cy="0"/>
+          <a:chOff x="0" y="0"/>
+          <a:chExt cx="0" cy="0"/>
+        </a:xfrm>
+      </p:grpSpPr>
+      <p:sp>
+        <p:nvSpPr>
+          <p:cNvPr id="2" name="Title 1"/>
+          <p:cNvSpPr>
+            <a:spLocks noGrp="1"/>
+          </p:cNvSpPr>
+          <p:nvPr>
+            <p:ph type="title"/>
+          </p:nvPr>
+        </p:nvSpPr>
+        <p:spPr/>
+        <p:txBody>
+          <a:bodyPr/>
+          <a:lstStyle/>
+          <a:p>
+            <a:endParaRPr lang="en-US"/>
+          </a:p>
+        </p:txBody>
+      </p:sp>
+      <p:pic>
+        <p:nvPicPr>
+          <p:cNvPr id="1026" name="Picture 2"/>
+          <p:cNvPicPr>
+            <a:picLocks noGrp="1" noChangeAspect="1" noChangeArrowheads="1"/>
+          </p:cNvPicPr>
+          <p:nvPr>
+            <p:ph idx="1"/>
+          </p:nvPr>
+        </p:nvPicPr>
+        <p:blipFill>
+          <a:blip r:embed="rId2">
+            <a:clrChange>
+              <a:clrFrom>
+                <a:srgbClr val="FFFFFF"/>
+              </a:clrFrom>
+              <a:clrTo>
+                <a:srgbClr val="FFFFFF">
+                  <a:alpha val="0"/>
+                </a:srgbClr>
+              </a:clrTo>
+            </a:clrChange>
+          </a:blip>
+          <a:srcRect/>
+          <a:stretch>
+            <a:fillRect/>
+          </a:stretch>
+        </p:blipFill>
+        <p:spPr bwMode="auto">
+          <a:xfrm>
+            <a:off x="609600" y="2286000"/>
+            <a:ext cx="7863016" cy="3505200"/>
+          </a:xfrm>
+          <a:prstGeom prst="rect">
+            <a:avLst/>
+          </a:prstGeom>
+          <a:noFill/>
+          <a:ln w="9525">
+            <a:noFill/>
+            <a:miter lim="800000"/>
+            <a:headEnd/>
+            <a:tailEnd/>
+          </a:ln>
+          <a:effectLst/>
+        </p:spPr>
+      </p:pic>
+    </p:spTree>
   </p:cSld>
   <p:clrMapOvr>
     <a:masterClrMapping/>
@@ -24917,7 +24992,7 @@
             </a:clrChange>
             <a:extLst>
               <a:ext uri="{BEBA8EAE-BF5A-486C-A8C5-ECC9F3942E4B}">
-                <a14:imgProps xmlns:a14="http://schemas.microsoft.com/office/drawing/2010/main">
+                <a14:imgProps xmlns:a14="http://schemas.microsoft.com/office/drawing/2010/main" xmlns="">
                   <a14:imgLayer r:embed="rId3">
                     <a14:imgEffect>
                       <a14:brightnessContrast contrast="20000"/>
@@ -24926,7 +25001,7 @@
                 </a14:imgProps>
               </a:ext>
               <a:ext uri="{28A0092B-C50C-407E-A947-70E740481C1C}">
-                <a14:useLocalDpi xmlns:a14="http://schemas.microsoft.com/office/drawing/2010/main" val="0"/>
+                <a14:useLocalDpi xmlns:a14="http://schemas.microsoft.com/office/drawing/2010/main" xmlns="" val="0"/>
               </a:ext>
             </a:extLst>
           </a:blip>
@@ -24946,7 +25021,7 @@
           <a:noFill/>
           <a:extLst>
             <a:ext uri="{909E8E84-426E-40DD-AFC4-6F175D3DCCD1}">
-              <a14:hiddenFill xmlns:a14="http://schemas.microsoft.com/office/drawing/2010/main">
+              <a14:hiddenFill xmlns:a14="http://schemas.microsoft.com/office/drawing/2010/main" xmlns="">
                 <a:solidFill>
                   <a:srgbClr val="FFFFFF"/>
                 </a:solidFill>
@@ -24958,7 +25033,7 @@
     </p:spTree>
     <p:extLst>
       <p:ext uri="{BB962C8B-B14F-4D97-AF65-F5344CB8AC3E}">
-        <p14:creationId xmlns:p14="http://schemas.microsoft.com/office/powerpoint/2010/main" val="3300642838"/>
+        <p14:creationId xmlns:p14="http://schemas.microsoft.com/office/powerpoint/2010/main" xmlns="" val="3300642838"/>
       </p:ext>
     </p:extLst>
   </p:cSld>
@@ -25050,7 +25125,7 @@
           <a:blip r:embed="rId2">
             <a:extLst>
               <a:ext uri="{28A0092B-C50C-407E-A947-70E740481C1C}">
-                <a14:useLocalDpi xmlns:a14="http://schemas.microsoft.com/office/drawing/2010/main" val="0"/>
+                <a14:useLocalDpi xmlns:a14="http://schemas.microsoft.com/office/drawing/2010/main" xmlns="" val="0"/>
               </a:ext>
             </a:extLst>
           </a:blip>
@@ -25070,7 +25145,7 @@
           <a:noFill/>
           <a:extLst>
             <a:ext uri="{909E8E84-426E-40DD-AFC4-6F175D3DCCD1}">
-              <a14:hiddenFill xmlns:a14="http://schemas.microsoft.com/office/drawing/2010/main">
+              <a14:hiddenFill xmlns:a14="http://schemas.microsoft.com/office/drawing/2010/main" xmlns="">
                 <a:solidFill>
                   <a:srgbClr val="FFFFFF"/>
                 </a:solidFill>
@@ -25082,7 +25157,7 @@
     </p:spTree>
     <p:extLst>
       <p:ext uri="{BB962C8B-B14F-4D97-AF65-F5344CB8AC3E}">
-        <p14:creationId xmlns:p14="http://schemas.microsoft.com/office/powerpoint/2010/main" val="101112921"/>
+        <p14:creationId xmlns:p14="http://schemas.microsoft.com/office/powerpoint/2010/main" xmlns="" val="101112921"/>
       </p:ext>
     </p:extLst>
   </p:cSld>
@@ -25142,7 +25217,7 @@
           <a:blip r:embed="rId2">
             <a:extLst>
               <a:ext uri="{28A0092B-C50C-407E-A947-70E740481C1C}">
-                <a14:useLocalDpi xmlns:a14="http://schemas.microsoft.com/office/drawing/2010/main" val="0"/>
+                <a14:useLocalDpi xmlns:a14="http://schemas.microsoft.com/office/drawing/2010/main" xmlns="" val="0"/>
               </a:ext>
             </a:extLst>
           </a:blip>
@@ -25162,7 +25237,7 @@
           <a:noFill/>
           <a:extLst>
             <a:ext uri="{909E8E84-426E-40DD-AFC4-6F175D3DCCD1}">
-              <a14:hiddenFill xmlns:a14="http://schemas.microsoft.com/office/drawing/2010/main">
+              <a14:hiddenFill xmlns:a14="http://schemas.microsoft.com/office/drawing/2010/main" xmlns="">
                 <a:solidFill>
                   <a:srgbClr val="FFFFFF"/>
                 </a:solidFill>
@@ -25174,7 +25249,7 @@
     </p:spTree>
     <p:extLst>
       <p:ext uri="{BB962C8B-B14F-4D97-AF65-F5344CB8AC3E}">
-        <p14:creationId xmlns:p14="http://schemas.microsoft.com/office/powerpoint/2010/main" val="1283153479"/>
+        <p14:creationId xmlns:p14="http://schemas.microsoft.com/office/powerpoint/2010/main" xmlns="" val="1283153479"/>
       </p:ext>
     </p:extLst>
   </p:cSld>
@@ -25244,7 +25319,7 @@
             </a:clrChange>
             <a:extLst>
               <a:ext uri="{28A0092B-C50C-407E-A947-70E740481C1C}">
-                <a14:useLocalDpi xmlns:a14="http://schemas.microsoft.com/office/drawing/2010/main" val="0"/>
+                <a14:useLocalDpi xmlns:a14="http://schemas.microsoft.com/office/drawing/2010/main" xmlns="" val="0"/>
               </a:ext>
             </a:extLst>
           </a:blip>
@@ -25267,14 +25342,14 @@
           </a:ln>
           <a:extLst>
             <a:ext uri="{909E8E84-426E-40DD-AFC4-6F175D3DCCD1}">
-              <a14:hiddenFill xmlns:a14="http://schemas.microsoft.com/office/drawing/2010/main">
+              <a14:hiddenFill xmlns:a14="http://schemas.microsoft.com/office/drawing/2010/main" xmlns="">
                 <a:solidFill>
                   <a:schemeClr val="accent1"/>
                 </a:solidFill>
               </a14:hiddenFill>
             </a:ext>
             <a:ext uri="{91240B29-F687-4F45-9708-019B960494DF}">
-              <a14:hiddenLine xmlns:a14="http://schemas.microsoft.com/office/drawing/2010/main" w="9525">
+              <a14:hiddenLine xmlns:a14="http://schemas.microsoft.com/office/drawing/2010/main" xmlns="" w="9525">
                 <a:solidFill>
                   <a:schemeClr val="tx1"/>
                 </a:solidFill>
@@ -25351,7 +25426,7 @@
               </a:clrChange>
               <a:extLst>
                 <a:ext uri="{28A0092B-C50C-407E-A947-70E740481C1C}">
-                  <a14:useLocalDpi xmlns:a14="http://schemas.microsoft.com/office/drawing/2010/main" val="0"/>
+                  <a14:useLocalDpi xmlns:a14="http://schemas.microsoft.com/office/drawing/2010/main" xmlns="" val="0"/>
                 </a:ext>
               </a:extLst>
             </a:blip>
@@ -25374,14 +25449,14 @@
             </a:ln>
             <a:extLst>
               <a:ext uri="{909E8E84-426E-40DD-AFC4-6F175D3DCCD1}">
-                <a14:hiddenFill xmlns:a14="http://schemas.microsoft.com/office/drawing/2010/main">
+                <a14:hiddenFill xmlns:a14="http://schemas.microsoft.com/office/drawing/2010/main" xmlns="">
                   <a:solidFill>
                     <a:schemeClr val="accent1"/>
                   </a:solidFill>
                 </a14:hiddenFill>
               </a:ext>
               <a:ext uri="{91240B29-F687-4F45-9708-019B960494DF}">
-                <a14:hiddenLine xmlns:a14="http://schemas.microsoft.com/office/drawing/2010/main" w="9525">
+                <a14:hiddenLine xmlns:a14="http://schemas.microsoft.com/office/drawing/2010/main" xmlns="" w="9525">
                   <a:solidFill>
                     <a:schemeClr val="tx1"/>
                   </a:solidFill>
@@ -25466,7 +25541,7 @@
               </a:clrChange>
               <a:extLst>
                 <a:ext uri="{28A0092B-C50C-407E-A947-70E740481C1C}">
-                  <a14:useLocalDpi xmlns:a14="http://schemas.microsoft.com/office/drawing/2010/main" val="0"/>
+                  <a14:useLocalDpi xmlns:a14="http://schemas.microsoft.com/office/drawing/2010/main" xmlns="" val="0"/>
                 </a:ext>
               </a:extLst>
             </a:blip>
@@ -25489,14 +25564,14 @@
             </a:ln>
             <a:extLst>
               <a:ext uri="{909E8E84-426E-40DD-AFC4-6F175D3DCCD1}">
-                <a14:hiddenFill xmlns:a14="http://schemas.microsoft.com/office/drawing/2010/main">
+                <a14:hiddenFill xmlns:a14="http://schemas.microsoft.com/office/drawing/2010/main" xmlns="">
                   <a:solidFill>
                     <a:schemeClr val="accent1"/>
                   </a:solidFill>
                 </a14:hiddenFill>
               </a:ext>
               <a:ext uri="{91240B29-F687-4F45-9708-019B960494DF}">
-                <a14:hiddenLine xmlns:a14="http://schemas.microsoft.com/office/drawing/2010/main" w="9525">
+                <a14:hiddenLine xmlns:a14="http://schemas.microsoft.com/office/drawing/2010/main" xmlns="" w="9525">
                   <a:solidFill>
                     <a:schemeClr val="tx1"/>
                   </a:solidFill>
@@ -25580,7 +25655,7 @@
               </a:clrChange>
               <a:extLst>
                 <a:ext uri="{28A0092B-C50C-407E-A947-70E740481C1C}">
-                  <a14:useLocalDpi xmlns:a14="http://schemas.microsoft.com/office/drawing/2010/main" val="0"/>
+                  <a14:useLocalDpi xmlns:a14="http://schemas.microsoft.com/office/drawing/2010/main" xmlns="" val="0"/>
                 </a:ext>
               </a:extLst>
             </a:blip>
@@ -25603,14 +25678,14 @@
             </a:ln>
             <a:extLst>
               <a:ext uri="{909E8E84-426E-40DD-AFC4-6F175D3DCCD1}">
-                <a14:hiddenFill xmlns:a14="http://schemas.microsoft.com/office/drawing/2010/main">
+                <a14:hiddenFill xmlns:a14="http://schemas.microsoft.com/office/drawing/2010/main" xmlns="">
                   <a:solidFill>
                     <a:schemeClr val="accent1"/>
                   </a:solidFill>
                 </a14:hiddenFill>
               </a:ext>
               <a:ext uri="{91240B29-F687-4F45-9708-019B960494DF}">
-                <a14:hiddenLine xmlns:a14="http://schemas.microsoft.com/office/drawing/2010/main" w="9525">
+                <a14:hiddenLine xmlns:a14="http://schemas.microsoft.com/office/drawing/2010/main" xmlns="" w="9525">
                   <a:solidFill>
                     <a:schemeClr val="tx1"/>
                   </a:solidFill>
@@ -25686,7 +25761,7 @@
             </a:clrChange>
             <a:extLst>
               <a:ext uri="{28A0092B-C50C-407E-A947-70E740481C1C}">
-                <a14:useLocalDpi xmlns:a14="http://schemas.microsoft.com/office/drawing/2010/main" val="0"/>
+                <a14:useLocalDpi xmlns:a14="http://schemas.microsoft.com/office/drawing/2010/main" xmlns="" val="0"/>
               </a:ext>
             </a:extLst>
           </a:blip>
@@ -25709,14 +25784,14 @@
           </a:ln>
           <a:extLst>
             <a:ext uri="{909E8E84-426E-40DD-AFC4-6F175D3DCCD1}">
-              <a14:hiddenFill xmlns:a14="http://schemas.microsoft.com/office/drawing/2010/main">
+              <a14:hiddenFill xmlns:a14="http://schemas.microsoft.com/office/drawing/2010/main" xmlns="">
                 <a:solidFill>
                   <a:schemeClr val="accent1"/>
                 </a:solidFill>
               </a14:hiddenFill>
             </a:ext>
             <a:ext uri="{91240B29-F687-4F45-9708-019B960494DF}">
-              <a14:hiddenLine xmlns:a14="http://schemas.microsoft.com/office/drawing/2010/main" w="9525">
+              <a14:hiddenLine xmlns:a14="http://schemas.microsoft.com/office/drawing/2010/main" xmlns="" w="9525">
                 <a:solidFill>
                   <a:schemeClr val="tx1"/>
                 </a:solidFill>
@@ -25761,7 +25836,7 @@
     </p:spTree>
     <p:extLst>
       <p:ext uri="{BB962C8B-B14F-4D97-AF65-F5344CB8AC3E}">
-        <p14:creationId xmlns:p14="http://schemas.microsoft.com/office/powerpoint/2010/main" val="1294588456"/>
+        <p14:creationId xmlns:p14="http://schemas.microsoft.com/office/powerpoint/2010/main" xmlns="" val="1294588456"/>
       </p:ext>
     </p:extLst>
   </p:cSld>
@@ -25810,7 +25885,7 @@
             </a:clrChange>
             <a:extLst>
               <a:ext uri="{28A0092B-C50C-407E-A947-70E740481C1C}">
-                <a14:useLocalDpi xmlns:a14="http://schemas.microsoft.com/office/drawing/2010/main" val="0"/>
+                <a14:useLocalDpi xmlns:a14="http://schemas.microsoft.com/office/drawing/2010/main" xmlns="" val="0"/>
               </a:ext>
             </a:extLst>
           </a:blip>
@@ -25833,14 +25908,14 @@
           </a:ln>
           <a:extLst>
             <a:ext uri="{909E8E84-426E-40DD-AFC4-6F175D3DCCD1}">
-              <a14:hiddenFill xmlns:a14="http://schemas.microsoft.com/office/drawing/2010/main">
+              <a14:hiddenFill xmlns:a14="http://schemas.microsoft.com/office/drawing/2010/main" xmlns="">
                 <a:solidFill>
                   <a:schemeClr val="accent1"/>
                 </a:solidFill>
               </a14:hiddenFill>
             </a:ext>
             <a:ext uri="{91240B29-F687-4F45-9708-019B960494DF}">
-              <a14:hiddenLine xmlns:a14="http://schemas.microsoft.com/office/drawing/2010/main" w="9525">
+              <a14:hiddenLine xmlns:a14="http://schemas.microsoft.com/office/drawing/2010/main" xmlns="" w="9525">
                 <a:solidFill>
                   <a:schemeClr val="tx1"/>
                 </a:solidFill>
@@ -25927,7 +26002,7 @@
             </a:clrChange>
             <a:extLst>
               <a:ext uri="{28A0092B-C50C-407E-A947-70E740481C1C}">
-                <a14:useLocalDpi xmlns:a14="http://schemas.microsoft.com/office/drawing/2010/main" val="0"/>
+                <a14:useLocalDpi xmlns:a14="http://schemas.microsoft.com/office/drawing/2010/main" xmlns="" val="0"/>
               </a:ext>
             </a:extLst>
           </a:blip>
@@ -25950,14 +26025,14 @@
           </a:ln>
           <a:extLst>
             <a:ext uri="{909E8E84-426E-40DD-AFC4-6F175D3DCCD1}">
-              <a14:hiddenFill xmlns:a14="http://schemas.microsoft.com/office/drawing/2010/main">
+              <a14:hiddenFill xmlns:a14="http://schemas.microsoft.com/office/drawing/2010/main" xmlns="">
                 <a:solidFill>
                   <a:schemeClr val="accent1"/>
                 </a:solidFill>
               </a14:hiddenFill>
             </a:ext>
             <a:ext uri="{91240B29-F687-4F45-9708-019B960494DF}">
-              <a14:hiddenLine xmlns:a14="http://schemas.microsoft.com/office/drawing/2010/main" w="9525">
+              <a14:hiddenLine xmlns:a14="http://schemas.microsoft.com/office/drawing/2010/main" xmlns="" w="9525">
                 <a:solidFill>
                   <a:schemeClr val="tx1"/>
                 </a:solidFill>
@@ -26034,7 +26109,7 @@
               </a:clrChange>
               <a:extLst>
                 <a:ext uri="{28A0092B-C50C-407E-A947-70E740481C1C}">
-                  <a14:useLocalDpi xmlns:a14="http://schemas.microsoft.com/office/drawing/2010/main" val="0"/>
+                  <a14:useLocalDpi xmlns:a14="http://schemas.microsoft.com/office/drawing/2010/main" xmlns="" val="0"/>
                 </a:ext>
               </a:extLst>
             </a:blip>
@@ -26057,14 +26132,14 @@
             </a:ln>
             <a:extLst>
               <a:ext uri="{909E8E84-426E-40DD-AFC4-6F175D3DCCD1}">
-                <a14:hiddenFill xmlns:a14="http://schemas.microsoft.com/office/drawing/2010/main">
+                <a14:hiddenFill xmlns:a14="http://schemas.microsoft.com/office/drawing/2010/main" xmlns="">
                   <a:solidFill>
                     <a:schemeClr val="accent1"/>
                   </a:solidFill>
                 </a14:hiddenFill>
               </a:ext>
               <a:ext uri="{91240B29-F687-4F45-9708-019B960494DF}">
-                <a14:hiddenLine xmlns:a14="http://schemas.microsoft.com/office/drawing/2010/main" w="9525">
+                <a14:hiddenLine xmlns:a14="http://schemas.microsoft.com/office/drawing/2010/main" xmlns="" w="9525">
                   <a:solidFill>
                     <a:schemeClr val="tx1"/>
                   </a:solidFill>
@@ -26184,7 +26259,7 @@
               </a:clrChange>
               <a:extLst>
                 <a:ext uri="{28A0092B-C50C-407E-A947-70E740481C1C}">
-                  <a14:useLocalDpi xmlns:a14="http://schemas.microsoft.com/office/drawing/2010/main" val="0"/>
+                  <a14:useLocalDpi xmlns:a14="http://schemas.microsoft.com/office/drawing/2010/main" xmlns="" val="0"/>
                 </a:ext>
               </a:extLst>
             </a:blip>
@@ -26207,14 +26282,14 @@
             </a:ln>
             <a:extLst>
               <a:ext uri="{909E8E84-426E-40DD-AFC4-6F175D3DCCD1}">
-                <a14:hiddenFill xmlns:a14="http://schemas.microsoft.com/office/drawing/2010/main">
+                <a14:hiddenFill xmlns:a14="http://schemas.microsoft.com/office/drawing/2010/main" xmlns="">
                   <a:solidFill>
                     <a:schemeClr val="accent1"/>
                   </a:solidFill>
                 </a14:hiddenFill>
               </a:ext>
               <a:ext uri="{91240B29-F687-4F45-9708-019B960494DF}">
-                <a14:hiddenLine xmlns:a14="http://schemas.microsoft.com/office/drawing/2010/main" w="9525">
+                <a14:hiddenLine xmlns:a14="http://schemas.microsoft.com/office/drawing/2010/main" xmlns="" w="9525">
                   <a:solidFill>
                     <a:schemeClr val="tx1"/>
                   </a:solidFill>
@@ -26340,7 +26415,7 @@
               </a:clrChange>
               <a:extLst>
                 <a:ext uri="{28A0092B-C50C-407E-A947-70E740481C1C}">
-                  <a14:useLocalDpi xmlns:a14="http://schemas.microsoft.com/office/drawing/2010/main" val="0"/>
+                  <a14:useLocalDpi xmlns:a14="http://schemas.microsoft.com/office/drawing/2010/main" xmlns="" val="0"/>
                 </a:ext>
               </a:extLst>
             </a:blip>
@@ -26363,14 +26438,14 @@
             </a:ln>
             <a:extLst>
               <a:ext uri="{909E8E84-426E-40DD-AFC4-6F175D3DCCD1}">
-                <a14:hiddenFill xmlns:a14="http://schemas.microsoft.com/office/drawing/2010/main">
+                <a14:hiddenFill xmlns:a14="http://schemas.microsoft.com/office/drawing/2010/main" xmlns="">
                   <a:solidFill>
                     <a:schemeClr val="accent1"/>
                   </a:solidFill>
                 </a14:hiddenFill>
               </a:ext>
               <a:ext uri="{91240B29-F687-4F45-9708-019B960494DF}">
-                <a14:hiddenLine xmlns:a14="http://schemas.microsoft.com/office/drawing/2010/main" w="9525">
+                <a14:hiddenLine xmlns:a14="http://schemas.microsoft.com/office/drawing/2010/main" xmlns="" w="9525">
                   <a:solidFill>
                     <a:schemeClr val="tx1"/>
                   </a:solidFill>
@@ -26452,7 +26527,7 @@
             </a:clrChange>
             <a:extLst>
               <a:ext uri="{28A0092B-C50C-407E-A947-70E740481C1C}">
-                <a14:useLocalDpi xmlns:a14="http://schemas.microsoft.com/office/drawing/2010/main" val="0"/>
+                <a14:useLocalDpi xmlns:a14="http://schemas.microsoft.com/office/drawing/2010/main" xmlns="" val="0"/>
               </a:ext>
             </a:extLst>
           </a:blip>
@@ -26475,14 +26550,14 @@
           </a:ln>
           <a:extLst>
             <a:ext uri="{909E8E84-426E-40DD-AFC4-6F175D3DCCD1}">
-              <a14:hiddenFill xmlns:a14="http://schemas.microsoft.com/office/drawing/2010/main">
+              <a14:hiddenFill xmlns:a14="http://schemas.microsoft.com/office/drawing/2010/main" xmlns="">
                 <a:solidFill>
                   <a:schemeClr val="accent1"/>
                 </a:solidFill>
               </a14:hiddenFill>
             </a:ext>
             <a:ext uri="{91240B29-F687-4F45-9708-019B960494DF}">
-              <a14:hiddenLine xmlns:a14="http://schemas.microsoft.com/office/drawing/2010/main" w="9525">
+              <a14:hiddenLine xmlns:a14="http://schemas.microsoft.com/office/drawing/2010/main" xmlns="" w="9525">
                 <a:solidFill>
                   <a:schemeClr val="tx1"/>
                 </a:solidFill>
@@ -26497,7 +26572,7 @@
     </p:spTree>
     <p:extLst>
       <p:ext uri="{BB962C8B-B14F-4D97-AF65-F5344CB8AC3E}">
-        <p14:creationId xmlns:p14="http://schemas.microsoft.com/office/powerpoint/2010/main" val="3928047803"/>
+        <p14:creationId xmlns:p14="http://schemas.microsoft.com/office/powerpoint/2010/main" xmlns="" val="3928047803"/>
       </p:ext>
     </p:extLst>
   </p:cSld>
@@ -26546,7 +26621,7 @@
             </a:clrChange>
             <a:extLst>
               <a:ext uri="{28A0092B-C50C-407E-A947-70E740481C1C}">
-                <a14:useLocalDpi xmlns:a14="http://schemas.microsoft.com/office/drawing/2010/main" val="0"/>
+                <a14:useLocalDpi xmlns:a14="http://schemas.microsoft.com/office/drawing/2010/main" xmlns="" val="0"/>
               </a:ext>
             </a:extLst>
           </a:blip>
@@ -26569,14 +26644,14 @@
           </a:ln>
           <a:extLst>
             <a:ext uri="{909E8E84-426E-40DD-AFC4-6F175D3DCCD1}">
-              <a14:hiddenFill xmlns:a14="http://schemas.microsoft.com/office/drawing/2010/main">
+              <a14:hiddenFill xmlns:a14="http://schemas.microsoft.com/office/drawing/2010/main" xmlns="">
                 <a:solidFill>
                   <a:schemeClr val="accent1"/>
                 </a:solidFill>
               </a14:hiddenFill>
             </a:ext>
             <a:ext uri="{91240B29-F687-4F45-9708-019B960494DF}">
-              <a14:hiddenLine xmlns:a14="http://schemas.microsoft.com/office/drawing/2010/main" w="9525">
+              <a14:hiddenLine xmlns:a14="http://schemas.microsoft.com/office/drawing/2010/main" xmlns="" w="9525">
                 <a:solidFill>
                   <a:schemeClr val="tx1"/>
                 </a:solidFill>
@@ -26663,7 +26738,7 @@
             </a:clrChange>
             <a:extLst>
               <a:ext uri="{28A0092B-C50C-407E-A947-70E740481C1C}">
-                <a14:useLocalDpi xmlns:a14="http://schemas.microsoft.com/office/drawing/2010/main" val="0"/>
+                <a14:useLocalDpi xmlns:a14="http://schemas.microsoft.com/office/drawing/2010/main" xmlns="" val="0"/>
               </a:ext>
             </a:extLst>
           </a:blip>
@@ -26686,14 +26761,14 @@
           </a:ln>
           <a:extLst>
             <a:ext uri="{909E8E84-426E-40DD-AFC4-6F175D3DCCD1}">
-              <a14:hiddenFill xmlns:a14="http://schemas.microsoft.com/office/drawing/2010/main">
+              <a14:hiddenFill xmlns:a14="http://schemas.microsoft.com/office/drawing/2010/main" xmlns="">
                 <a:solidFill>
                   <a:schemeClr val="accent1"/>
                 </a:solidFill>
               </a14:hiddenFill>
             </a:ext>
             <a:ext uri="{91240B29-F687-4F45-9708-019B960494DF}">
-              <a14:hiddenLine xmlns:a14="http://schemas.microsoft.com/office/drawing/2010/main" w="9525">
+              <a14:hiddenLine xmlns:a14="http://schemas.microsoft.com/office/drawing/2010/main" xmlns="" w="9525">
                 <a:solidFill>
                   <a:schemeClr val="tx1"/>
                 </a:solidFill>
@@ -26770,7 +26845,7 @@
               </a:clrChange>
               <a:extLst>
                 <a:ext uri="{28A0092B-C50C-407E-A947-70E740481C1C}">
-                  <a14:useLocalDpi xmlns:a14="http://schemas.microsoft.com/office/drawing/2010/main" val="0"/>
+                  <a14:useLocalDpi xmlns:a14="http://schemas.microsoft.com/office/drawing/2010/main" xmlns="" val="0"/>
                 </a:ext>
               </a:extLst>
             </a:blip>
@@ -26793,14 +26868,14 @@
             </a:ln>
             <a:extLst>
               <a:ext uri="{909E8E84-426E-40DD-AFC4-6F175D3DCCD1}">
-                <a14:hiddenFill xmlns:a14="http://schemas.microsoft.com/office/drawing/2010/main">
+                <a14:hiddenFill xmlns:a14="http://schemas.microsoft.com/office/drawing/2010/main" xmlns="">
                   <a:solidFill>
                     <a:schemeClr val="accent1"/>
                   </a:solidFill>
                 </a14:hiddenFill>
               </a:ext>
               <a:ext uri="{91240B29-F687-4F45-9708-019B960494DF}">
-                <a14:hiddenLine xmlns:a14="http://schemas.microsoft.com/office/drawing/2010/main" w="9525">
+                <a14:hiddenLine xmlns:a14="http://schemas.microsoft.com/office/drawing/2010/main" xmlns="" w="9525">
                   <a:solidFill>
                     <a:schemeClr val="tx1"/>
                   </a:solidFill>
@@ -26950,7 +27025,7 @@
               </a:clrChange>
               <a:extLst>
                 <a:ext uri="{28A0092B-C50C-407E-A947-70E740481C1C}">
-                  <a14:useLocalDpi xmlns:a14="http://schemas.microsoft.com/office/drawing/2010/main" val="0"/>
+                  <a14:useLocalDpi xmlns:a14="http://schemas.microsoft.com/office/drawing/2010/main" xmlns="" val="0"/>
                 </a:ext>
               </a:extLst>
             </a:blip>
@@ -26973,14 +27048,14 @@
             </a:ln>
             <a:extLst>
               <a:ext uri="{909E8E84-426E-40DD-AFC4-6F175D3DCCD1}">
-                <a14:hiddenFill xmlns:a14="http://schemas.microsoft.com/office/drawing/2010/main">
+                <a14:hiddenFill xmlns:a14="http://schemas.microsoft.com/office/drawing/2010/main" xmlns="">
                   <a:solidFill>
                     <a:schemeClr val="accent1"/>
                   </a:solidFill>
                 </a14:hiddenFill>
               </a:ext>
               <a:ext uri="{91240B29-F687-4F45-9708-019B960494DF}">
-                <a14:hiddenLine xmlns:a14="http://schemas.microsoft.com/office/drawing/2010/main" w="9525">
+                <a14:hiddenLine xmlns:a14="http://schemas.microsoft.com/office/drawing/2010/main" xmlns="" w="9525">
                   <a:solidFill>
                     <a:schemeClr val="tx1"/>
                   </a:solidFill>
@@ -27043,7 +27118,7 @@
     </p:spTree>
     <p:extLst>
       <p:ext uri="{BB962C8B-B14F-4D97-AF65-F5344CB8AC3E}">
-        <p14:creationId xmlns:p14="http://schemas.microsoft.com/office/powerpoint/2010/main" val="448705179"/>
+        <p14:creationId xmlns:p14="http://schemas.microsoft.com/office/powerpoint/2010/main" xmlns="" val="448705179"/>
       </p:ext>
     </p:extLst>
   </p:cSld>
@@ -27130,7 +27205,7 @@
           <p:nvPr>
             <p:extLst>
               <p:ext uri="{D42A27DB-BD31-4B8C-83A1-F6EECF244321}">
-                <p14:modId xmlns:p14="http://schemas.microsoft.com/office/powerpoint/2010/main" val="2970409429"/>
+                <p14:modId xmlns:p14="http://schemas.microsoft.com/office/powerpoint/2010/main" xmlns="" val="2970409429"/>
               </p:ext>
             </p:extLst>
           </p:nvPr>
@@ -27217,7 +27292,7 @@
     </p:spTree>
     <p:extLst>
       <p:ext uri="{BB962C8B-B14F-4D97-AF65-F5344CB8AC3E}">
-        <p14:creationId xmlns:p14="http://schemas.microsoft.com/office/powerpoint/2010/main" val="3522882765"/>
+        <p14:creationId xmlns:p14="http://schemas.microsoft.com/office/powerpoint/2010/main" xmlns="" val="3522882765"/>
       </p:ext>
     </p:extLst>
   </p:cSld>

</xml_diff>